<commit_message>
path tracing prez 2
</commit_message>
<xml_diff>
--- a/PBR_EA_02.pptx
+++ b/PBR_EA_02.pptx
@@ -5,14 +5,16 @@
     <p:sldMasterId id="2147483767" r:id="rId1"/>
   </p:sldMasterIdLst>
   <p:notesMasterIdLst>
-    <p:notesMasterId r:id="rId7"/>
+    <p:notesMasterId r:id="rId9"/>
   </p:notesMasterIdLst>
   <p:sldIdLst>
     <p:sldId id="256" r:id="rId2"/>
     <p:sldId id="257" r:id="rId3"/>
-    <p:sldId id="259" r:id="rId4"/>
-    <p:sldId id="258" r:id="rId5"/>
+    <p:sldId id="261" r:id="rId4"/>
+    <p:sldId id="259" r:id="rId5"/>
     <p:sldId id="260" r:id="rId6"/>
+    <p:sldId id="258" r:id="rId7"/>
+    <p:sldId id="262" r:id="rId8"/>
   </p:sldIdLst>
   <p:sldSz cx="12192000" cy="6858000"/>
   <p:notesSz cx="6858000" cy="9144000"/>
@@ -205,7 +207,7 @@
           <a:p>
             <a:fld id="{3A5A56FF-9D9E-417E-8DB7-17CB8EBF566C}" type="datetimeFigureOut">
               <a:rPr lang="hu-HU" smtClean="0"/>
-              <a:t>2018. 03. 10.</a:t>
+              <a:t>2018. 03. 12.</a:t>
             </a:fld>
             <a:endParaRPr lang="hu-HU"/>
           </a:p>
@@ -471,6 +473,150 @@
     </a:lvl9pPr>
   </p:notesStyle>
 </p:notesMaster>
+</file>
+
+<file path=ppt/notesSlides/notesSlide1.xml><?xml version="1.0" encoding="utf-8"?>
+<p:notes xmlns:a="http://schemas.openxmlformats.org/drawingml/2006/main" xmlns:r="http://schemas.openxmlformats.org/officeDocument/2006/relationships" xmlns:p="http://schemas.openxmlformats.org/presentationml/2006/main">
+  <p:cSld>
+    <p:spTree>
+      <p:nvGrpSpPr>
+        <p:cNvPr id="1" name=""/>
+        <p:cNvGrpSpPr/>
+        <p:nvPr/>
+      </p:nvGrpSpPr>
+      <p:grpSpPr>
+        <a:xfrm>
+          <a:off x="0" y="0"/>
+          <a:ext cx="0" cy="0"/>
+          <a:chOff x="0" y="0"/>
+          <a:chExt cx="0" cy="0"/>
+        </a:xfrm>
+      </p:grpSpPr>
+      <p:sp>
+        <p:nvSpPr>
+          <p:cNvPr id="2" name="Slide Image Placeholder 1"/>
+          <p:cNvSpPr>
+            <a:spLocks noGrp="1" noRot="1" noChangeAspect="1"/>
+          </p:cNvSpPr>
+          <p:nvPr>
+            <p:ph type="sldImg"/>
+          </p:nvPr>
+        </p:nvSpPr>
+        <p:spPr/>
+      </p:sp>
+      <p:sp>
+        <p:nvSpPr>
+          <p:cNvPr id="3" name="Notes Placeholder 2"/>
+          <p:cNvSpPr>
+            <a:spLocks noGrp="1"/>
+          </p:cNvSpPr>
+          <p:nvPr>
+            <p:ph type="body" idx="1"/>
+          </p:nvPr>
+        </p:nvSpPr>
+        <p:spPr/>
+        <p:txBody>
+          <a:bodyPr/>
+          <a:lstStyle/>
+          <a:p>
+            <a:r>
+              <a:rPr lang="hu-HU" dirty="0"/>
+              <a:t>E\{f(x)\}_p=\int_D f(x)\ p(x)\ \mathrm{d}x</a:t>
+            </a:r>
+            <a:br>
+              <a:rPr lang="en-US" dirty="0"/>
+            </a:br>
+            <a:r>
+              <a:rPr lang="en-US" dirty="0"/>
+              <a:t>18 </a:t>
+            </a:r>
+            <a:r>
+              <a:rPr lang="en-US" dirty="0" err="1"/>
+              <a:t>pt</a:t>
+            </a:r>
+            <a:r>
+              <a:rPr lang="en-US" dirty="0"/>
+              <a:t>, 120</a:t>
+            </a:r>
+            <a:br>
+              <a:rPr lang="en-US" dirty="0"/>
+            </a:br>
+            <a:br>
+              <a:rPr lang="en-US" dirty="0"/>
+            </a:br>
+            <a:r>
+              <a:rPr lang="en-US" dirty="0"/>
+              <a:t>P(x) = </a:t>
+            </a:r>
+            <a:r>
+              <a:rPr lang="en-US" dirty="0" err="1"/>
+              <a:t>Pr</a:t>
+            </a:r>
+            <a:r>
+              <a:rPr lang="en-US" dirty="0"/>
+              <a:t>{X &lt;= x} </a:t>
+            </a:r>
+            <a:r>
+              <a:rPr lang="en-US" dirty="0" err="1"/>
+              <a:t>ún</a:t>
+            </a:r>
+            <a:r>
+              <a:rPr lang="en-US" dirty="0"/>
+              <a:t>. cumulative distribution function</a:t>
+            </a:r>
+            <a:br>
+              <a:rPr lang="en-US" dirty="0"/>
+            </a:br>
+            <a:r>
+              <a:rPr lang="en-US" dirty="0"/>
+              <a:t>p(x) = </a:t>
+            </a:r>
+            <a:r>
+              <a:rPr lang="en-US" dirty="0" err="1"/>
+              <a:t>dP</a:t>
+            </a:r>
+            <a:r>
+              <a:rPr lang="en-US" dirty="0"/>
+              <a:t>(x) / dx</a:t>
+            </a:r>
+            <a:endParaRPr lang="hu-HU" dirty="0"/>
+          </a:p>
+        </p:txBody>
+      </p:sp>
+      <p:sp>
+        <p:nvSpPr>
+          <p:cNvPr id="4" name="Slide Number Placeholder 3"/>
+          <p:cNvSpPr>
+            <a:spLocks noGrp="1"/>
+          </p:cNvSpPr>
+          <p:nvPr>
+            <p:ph type="sldNum" sz="quarter" idx="10"/>
+          </p:nvPr>
+        </p:nvSpPr>
+        <p:spPr/>
+        <p:txBody>
+          <a:bodyPr/>
+          <a:lstStyle/>
+          <a:p>
+            <a:fld id="{14C09B99-3F57-4C83-A41A-980FBCAF7828}" type="slidenum">
+              <a:rPr lang="hu-HU" smtClean="0"/>
+              <a:t>5</a:t>
+            </a:fld>
+            <a:endParaRPr lang="hu-HU"/>
+          </a:p>
+        </p:txBody>
+      </p:sp>
+    </p:spTree>
+    <p:extLst>
+      <p:ext uri="{BB962C8B-B14F-4D97-AF65-F5344CB8AC3E}">
+        <p14:creationId xmlns:p14="http://schemas.microsoft.com/office/powerpoint/2010/main" val="2482797578"/>
+      </p:ext>
+    </p:extLst>
+  </p:cSld>
+  <p:clrMapOvr>
+    <a:masterClrMapping/>
+  </p:clrMapOvr>
+</p:notes>
 </file>
 
 <file path=ppt/slideLayouts/slideLayout1.xml><?xml version="1.0" encoding="utf-8"?>
@@ -699,7 +845,7 @@
           <a:p>
             <a:fld id="{EE90FBA0-FEE2-473A-A4B4-051DFD2DB1BD}" type="datetimeFigureOut">
               <a:rPr lang="en-US" smtClean="0"/>
-              <a:t>3/10/2018</a:t>
+              <a:t>3/12/2018</a:t>
             </a:fld>
             <a:endParaRPr lang="en-US"/>
           </a:p>
@@ -907,7 +1053,7 @@
           <a:p>
             <a:fld id="{EE90FBA0-FEE2-473A-A4B4-051DFD2DB1BD}" type="datetimeFigureOut">
               <a:rPr lang="en-US" smtClean="0"/>
-              <a:t>3/10/2018</a:t>
+              <a:t>3/12/2018</a:t>
             </a:fld>
             <a:endParaRPr lang="en-US"/>
           </a:p>
@@ -1163,7 +1309,7 @@
           <a:p>
             <a:fld id="{EE90FBA0-FEE2-473A-A4B4-051DFD2DB1BD}" type="datetimeFigureOut">
               <a:rPr lang="en-US" smtClean="0"/>
-              <a:t>3/10/2018</a:t>
+              <a:t>3/12/2018</a:t>
             </a:fld>
             <a:endParaRPr lang="en-US"/>
           </a:p>
@@ -1337,7 +1483,7 @@
           <a:p>
             <a:fld id="{EE90FBA0-FEE2-473A-A4B4-051DFD2DB1BD}" type="datetimeFigureOut">
               <a:rPr lang="en-US" smtClean="0"/>
-              <a:t>3/10/2018</a:t>
+              <a:t>3/12/2018</a:t>
             </a:fld>
             <a:endParaRPr lang="en-US"/>
           </a:p>
@@ -1680,7 +1826,7 @@
           <a:p>
             <a:fld id="{EE90FBA0-FEE2-473A-A4B4-051DFD2DB1BD}" type="datetimeFigureOut">
               <a:rPr lang="en-US" smtClean="0"/>
-              <a:t>3/10/2018</a:t>
+              <a:t>3/12/2018</a:t>
             </a:fld>
             <a:endParaRPr lang="en-US"/>
           </a:p>
@@ -1955,7 +2101,7 @@
           <a:p>
             <a:fld id="{EE90FBA0-FEE2-473A-A4B4-051DFD2DB1BD}" type="datetimeFigureOut">
               <a:rPr lang="en-US" smtClean="0"/>
-              <a:t>3/10/2018</a:t>
+              <a:t>3/12/2018</a:t>
             </a:fld>
             <a:endParaRPr lang="en-US"/>
           </a:p>
@@ -2334,7 +2480,7 @@
           <a:p>
             <a:fld id="{EE90FBA0-FEE2-473A-A4B4-051DFD2DB1BD}" type="datetimeFigureOut">
               <a:rPr lang="en-US" smtClean="0"/>
-              <a:t>3/10/2018</a:t>
+              <a:t>3/12/2018</a:t>
             </a:fld>
             <a:endParaRPr lang="en-US"/>
           </a:p>
@@ -2452,7 +2598,7 @@
           <a:p>
             <a:fld id="{EE90FBA0-FEE2-473A-A4B4-051DFD2DB1BD}" type="datetimeFigureOut">
               <a:rPr lang="en-US" smtClean="0"/>
-              <a:t>3/10/2018</a:t>
+              <a:t>3/12/2018</a:t>
             </a:fld>
             <a:endParaRPr lang="en-US"/>
           </a:p>
@@ -2623,7 +2769,7 @@
           <a:p>
             <a:fld id="{EE90FBA0-FEE2-473A-A4B4-051DFD2DB1BD}" type="datetimeFigureOut">
               <a:rPr lang="en-US" smtClean="0"/>
-              <a:t>3/10/2018</a:t>
+              <a:t>3/12/2018</a:t>
             </a:fld>
             <a:endParaRPr lang="en-US"/>
           </a:p>
@@ -2977,7 +3123,7 @@
           <a:p>
             <a:fld id="{EE90FBA0-FEE2-473A-A4B4-051DFD2DB1BD}" type="datetimeFigureOut">
               <a:rPr lang="en-US" smtClean="0"/>
-              <a:t>3/10/2018</a:t>
+              <a:t>3/12/2018</a:t>
             </a:fld>
             <a:endParaRPr lang="en-US"/>
           </a:p>
@@ -3359,7 +3505,7 @@
           <a:p>
             <a:fld id="{EE90FBA0-FEE2-473A-A4B4-051DFD2DB1BD}" type="datetimeFigureOut">
               <a:rPr lang="en-US" smtClean="0"/>
-              <a:t>3/10/2018</a:t>
+              <a:t>3/12/2018</a:t>
             </a:fld>
             <a:endParaRPr lang="en-US"/>
           </a:p>
@@ -3646,7 +3792,7 @@
           <a:p>
             <a:fld id="{EE90FBA0-FEE2-473A-A4B4-051DFD2DB1BD}" type="datetimeFigureOut">
               <a:rPr lang="en-US" smtClean="0"/>
-              <a:t>3/10/2018</a:t>
+              <a:t>3/12/2018</a:t>
             </a:fld>
             <a:endParaRPr lang="en-US"/>
           </a:p>
@@ -4339,8 +4485,8 @@
           </a:p>
         </p:txBody>
       </p:sp>
-      <mc:AlternateContent xmlns:mc="http://schemas.openxmlformats.org/markup-compatibility/2006">
-        <mc:Choice xmlns:a14="http://schemas.microsoft.com/office/drawing/2010/main" Requires="a14">
+      <mc:AlternateContent xmlns:mc="http://schemas.openxmlformats.org/markup-compatibility/2006" xmlns:a14="http://schemas.microsoft.com/office/drawing/2010/main">
+        <mc:Choice Requires="a14">
           <p:sp>
             <p:nvSpPr>
               <p:cNvPr id="3" name="Content Placeholder 2">
@@ -5436,7 +5582,7 @@
             </p:txBody>
           </p:sp>
         </mc:Choice>
-        <mc:Fallback>
+        <mc:Fallback xmlns="">
           <p:sp>
             <p:nvSpPr>
               <p:cNvPr id="3" name="Content Placeholder 2">
@@ -5511,6 +5657,120 @@
           <p:cNvPr id="2" name="Title 1">
             <a:extLst>
               <a:ext uri="{FF2B5EF4-FFF2-40B4-BE49-F238E27FC236}">
+                <a16:creationId xmlns:a16="http://schemas.microsoft.com/office/drawing/2014/main" id="{77BC34AF-D686-441C-A2FE-C7834EF700A9}"/>
+              </a:ext>
+            </a:extLst>
+          </p:cNvPr>
+          <p:cNvSpPr>
+            <a:spLocks noGrp="1"/>
+          </p:cNvSpPr>
+          <p:nvPr>
+            <p:ph type="title"/>
+          </p:nvPr>
+        </p:nvSpPr>
+        <p:spPr/>
+        <p:txBody>
+          <a:bodyPr/>
+          <a:lstStyle/>
+          <a:p>
+            <a:r>
+              <a:rPr lang="en-US" dirty="0" err="1"/>
+              <a:t>Ahogy</a:t>
+            </a:r>
+            <a:r>
+              <a:rPr lang="en-US" dirty="0"/>
+              <a:t> Boromir </a:t>
+            </a:r>
+            <a:r>
+              <a:rPr lang="en-US" dirty="0" err="1"/>
+              <a:t>mondta</a:t>
+            </a:r>
+            <a:r>
+              <a:rPr lang="en-US" dirty="0"/>
+              <a:t> a </a:t>
+            </a:r>
+            <a:r>
+              <a:rPr lang="en-US" dirty="0" err="1"/>
+              <a:t>LotR</a:t>
+            </a:r>
+            <a:r>
+              <a:rPr lang="en-US" dirty="0"/>
+              <a:t>-ben</a:t>
+            </a:r>
+            <a:endParaRPr lang="hu-HU" dirty="0"/>
+          </a:p>
+        </p:txBody>
+      </p:sp>
+      <p:pic>
+        <p:nvPicPr>
+          <p:cNvPr id="9" name="Content Placeholder 8">
+            <a:extLst>
+              <a:ext uri="{FF2B5EF4-FFF2-40B4-BE49-F238E27FC236}">
+                <a16:creationId xmlns:a16="http://schemas.microsoft.com/office/drawing/2014/main" id="{800BDE39-4699-41B9-9EE6-BDF535727DAD}"/>
+              </a:ext>
+            </a:extLst>
+          </p:cNvPr>
+          <p:cNvPicPr>
+            <a:picLocks noGrp="1" noChangeAspect="1"/>
+          </p:cNvPicPr>
+          <p:nvPr>
+            <p:ph idx="1"/>
+          </p:nvPr>
+        </p:nvPicPr>
+        <p:blipFill>
+          <a:blip r:embed="rId2">
+            <a:extLst>
+              <a:ext uri="{28A0092B-C50C-407E-A947-70E740481C1C}">
+                <a14:useLocalDpi xmlns:a14="http://schemas.microsoft.com/office/drawing/2010/main" val="0"/>
+              </a:ext>
+            </a:extLst>
+          </a:blip>
+          <a:stretch>
+            <a:fillRect/>
+          </a:stretch>
+        </p:blipFill>
+        <p:spPr>
+          <a:xfrm>
+            <a:off x="2895600" y="2377440"/>
+            <a:ext cx="5486400" cy="3235817"/>
+          </a:xfrm>
+        </p:spPr>
+      </p:pic>
+    </p:spTree>
+    <p:extLst>
+      <p:ext uri="{BB962C8B-B14F-4D97-AF65-F5344CB8AC3E}">
+        <p14:creationId xmlns:p14="http://schemas.microsoft.com/office/powerpoint/2010/main" val="2342225630"/>
+      </p:ext>
+    </p:extLst>
+  </p:cSld>
+  <p:clrMapOvr>
+    <a:masterClrMapping/>
+  </p:clrMapOvr>
+</p:sld>
+</file>
+
+<file path=ppt/slides/slide4.xml><?xml version="1.0" encoding="utf-8"?>
+<p:sld xmlns:a="http://schemas.openxmlformats.org/drawingml/2006/main" xmlns:r="http://schemas.openxmlformats.org/officeDocument/2006/relationships" xmlns:p="http://schemas.openxmlformats.org/presentationml/2006/main">
+  <p:cSld>
+    <p:spTree>
+      <p:nvGrpSpPr>
+        <p:cNvPr id="1" name=""/>
+        <p:cNvGrpSpPr/>
+        <p:nvPr/>
+      </p:nvGrpSpPr>
+      <p:grpSpPr>
+        <a:xfrm>
+          <a:off x="0" y="0"/>
+          <a:ext cx="0" cy="0"/>
+          <a:chOff x="0" y="0"/>
+          <a:chExt cx="0" cy="0"/>
+        </a:xfrm>
+      </p:grpSpPr>
+      <p:sp>
+        <p:nvSpPr>
+          <p:cNvPr id="2" name="Title 1">
+            <a:extLst>
+              <a:ext uri="{FF2B5EF4-FFF2-40B4-BE49-F238E27FC236}">
                 <a16:creationId xmlns:a16="http://schemas.microsoft.com/office/drawing/2014/main" id="{73F190C7-20B4-45A5-9CD7-EA36369D9A4F}"/>
               </a:ext>
             </a:extLst>
@@ -5543,101 +5803,1262 @@
           </a:p>
         </p:txBody>
       </p:sp>
-      <p:sp>
-        <p:nvSpPr>
-          <p:cNvPr id="3" name="Content Placeholder 2">
-            <a:extLst>
-              <a:ext uri="{FF2B5EF4-FFF2-40B4-BE49-F238E27FC236}">
-                <a16:creationId xmlns:a16="http://schemas.microsoft.com/office/drawing/2014/main" id="{62CA16AF-F914-4585-8761-F16037745DC2}"/>
-              </a:ext>
-            </a:extLst>
-          </p:cNvPr>
-          <p:cNvSpPr>
-            <a:spLocks noGrp="1"/>
-          </p:cNvSpPr>
-          <p:nvPr>
-            <p:ph idx="1"/>
-          </p:nvPr>
-        </p:nvSpPr>
-        <p:spPr/>
-        <p:txBody>
-          <a:bodyPr/>
-          <a:lstStyle/>
-          <a:p>
-            <a:pPr>
-              <a:buFont typeface="Wingdings" panose="05000000000000000000" pitchFamily="2" charset="2"/>
-              <a:buChar char="§"/>
-            </a:pPr>
-            <a:r>
-              <a:rPr lang="en-US" dirty="0" err="1"/>
-              <a:t>Végeselem</a:t>
-            </a:r>
-            <a:r>
-              <a:rPr lang="en-US" dirty="0"/>
-              <a:t> </a:t>
-            </a:r>
-            <a:r>
-              <a:rPr lang="en-US" dirty="0" err="1"/>
-              <a:t>módszerek</a:t>
-            </a:r>
-            <a:r>
-              <a:rPr lang="en-US" dirty="0"/>
-              <a:t> (</a:t>
-            </a:r>
-            <a:r>
-              <a:rPr lang="en-US" i="1" dirty="0"/>
-              <a:t>finite element methods</a:t>
-            </a:r>
-            <a:r>
-              <a:rPr lang="en-US" dirty="0"/>
-              <a:t>), pl. </a:t>
-            </a:r>
-            <a:r>
-              <a:rPr lang="en-US" i="1" dirty="0"/>
-              <a:t>radiosity</a:t>
-            </a:r>
-          </a:p>
-          <a:p>
-            <a:pPr>
-              <a:buFont typeface="Wingdings" panose="05000000000000000000" pitchFamily="2" charset="2"/>
-              <a:buChar char="§"/>
-            </a:pPr>
-            <a:endParaRPr lang="en-US" dirty="0"/>
-          </a:p>
-          <a:p>
-            <a:pPr>
-              <a:buFont typeface="Wingdings" panose="05000000000000000000" pitchFamily="2" charset="2"/>
-              <a:buChar char="§"/>
-            </a:pPr>
-            <a:r>
-              <a:rPr lang="en-US" dirty="0" err="1"/>
-              <a:t>Numerikus</a:t>
-            </a:r>
-            <a:r>
-              <a:rPr lang="en-US" dirty="0"/>
-              <a:t> </a:t>
-            </a:r>
-            <a:r>
-              <a:rPr lang="en-US" dirty="0" err="1"/>
-              <a:t>integrálás</a:t>
-            </a:r>
-            <a:r>
-              <a:rPr lang="en-US" dirty="0"/>
-              <a:t>, pl. </a:t>
-            </a:r>
-            <a:r>
-              <a:rPr lang="en-US" i="1" dirty="0"/>
-              <a:t>(Monte Carlo) path tracing</a:t>
-            </a:r>
-          </a:p>
-          <a:p>
-            <a:pPr marL="0" indent="0">
-              <a:buNone/>
-            </a:pPr>
-            <a:endParaRPr lang="en-US" i="1" dirty="0"/>
-          </a:p>
-        </p:txBody>
-      </p:sp>
+      <mc:AlternateContent xmlns:mc="http://schemas.openxmlformats.org/markup-compatibility/2006">
+        <mc:Choice xmlns:a14="http://schemas.microsoft.com/office/drawing/2010/main" Requires="a14">
+          <p:sp>
+            <p:nvSpPr>
+              <p:cNvPr id="3" name="Content Placeholder 2">
+                <a:extLst>
+                  <a:ext uri="{FF2B5EF4-FFF2-40B4-BE49-F238E27FC236}">
+                    <a16:creationId xmlns:a16="http://schemas.microsoft.com/office/drawing/2014/main" id="{62CA16AF-F914-4585-8761-F16037745DC2}"/>
+                  </a:ext>
+                </a:extLst>
+              </p:cNvPr>
+              <p:cNvSpPr>
+                <a:spLocks noGrp="1"/>
+              </p:cNvSpPr>
+              <p:nvPr>
+                <p:ph idx="1"/>
+              </p:nvPr>
+            </p:nvSpPr>
+            <p:spPr/>
+            <p:txBody>
+              <a:bodyPr>
+                <a:normAutofit fontScale="92500" lnSpcReduction="10000"/>
+              </a:bodyPr>
+              <a:lstStyle/>
+              <a:p>
+                <a:pPr>
+                  <a:buFont typeface="Wingdings" panose="05000000000000000000" pitchFamily="2" charset="2"/>
+                  <a:buChar char="§"/>
+                </a:pPr>
+                <a:r>
+                  <a:rPr lang="en-US" b="1" dirty="0"/>
+                  <a:t>Végeselem </a:t>
+                </a:r>
+                <a:r>
+                  <a:rPr lang="en-US" b="1" dirty="0" err="1"/>
+                  <a:t>módszerek</a:t>
+                </a:r>
+                <a:r>
+                  <a:rPr lang="en-US" dirty="0"/>
+                  <a:t> (</a:t>
+                </a:r>
+                <a:r>
+                  <a:rPr lang="en-US" i="1" dirty="0"/>
+                  <a:t>finite element methods</a:t>
+                </a:r>
+                <a:r>
+                  <a:rPr lang="en-US" dirty="0"/>
+                  <a:t>), pl. </a:t>
+                </a:r>
+                <a:r>
+                  <a:rPr lang="en-US" i="1" dirty="0"/>
+                  <a:t>radiosity</a:t>
+                </a:r>
+              </a:p>
+              <a:p>
+                <a:pPr marL="0" indent="0" algn="ctr">
+                  <a:buNone/>
+                </a:pPr>
+                <a14:m>
+                  <m:oMathPara xmlns:m="http://schemas.openxmlformats.org/officeDocument/2006/math">
+                    <m:oMathParaPr>
+                      <m:jc m:val="centerGroup"/>
+                    </m:oMathParaPr>
+                    <m:oMath xmlns:m="http://schemas.openxmlformats.org/officeDocument/2006/math">
+                      <m:sSub>
+                        <m:sSubPr>
+                          <m:ctrlPr>
+                            <a:rPr lang="en-US" b="0" i="1" smtClean="0">
+                              <a:latin typeface="Cambria Math" panose="02040503050406030204" pitchFamily="18" charset="0"/>
+                            </a:rPr>
+                          </m:ctrlPr>
+                        </m:sSubPr>
+                        <m:e>
+                          <m:r>
+                            <a:rPr lang="en-US" b="0" i="1" smtClean="0">
+                              <a:latin typeface="Cambria Math" panose="02040503050406030204" pitchFamily="18" charset="0"/>
+                            </a:rPr>
+                            <m:t>𝐵</m:t>
+                          </m:r>
+                        </m:e>
+                        <m:sub>
+                          <m:r>
+                            <a:rPr lang="en-US" b="0" i="1" smtClean="0">
+                              <a:latin typeface="Cambria Math" panose="02040503050406030204" pitchFamily="18" charset="0"/>
+                            </a:rPr>
+                            <m:t>𝑖</m:t>
+                          </m:r>
+                        </m:sub>
+                      </m:sSub>
+                      <m:r>
+                        <a:rPr lang="en-US" b="0" i="1" smtClean="0">
+                          <a:latin typeface="Cambria Math" panose="02040503050406030204" pitchFamily="18" charset="0"/>
+                        </a:rPr>
+                        <m:t>=</m:t>
+                      </m:r>
+                      <m:sSub>
+                        <m:sSubPr>
+                          <m:ctrlPr>
+                            <a:rPr lang="en-US" b="0" i="1" smtClean="0">
+                              <a:latin typeface="Cambria Math" panose="02040503050406030204" pitchFamily="18" charset="0"/>
+                            </a:rPr>
+                          </m:ctrlPr>
+                        </m:sSubPr>
+                        <m:e>
+                          <m:r>
+                            <a:rPr lang="en-US" b="0" i="1" smtClean="0">
+                              <a:latin typeface="Cambria Math" panose="02040503050406030204" pitchFamily="18" charset="0"/>
+                            </a:rPr>
+                            <m:t>𝐸</m:t>
+                          </m:r>
+                        </m:e>
+                        <m:sub>
+                          <m:r>
+                            <a:rPr lang="en-US" b="0" i="1" smtClean="0">
+                              <a:latin typeface="Cambria Math" panose="02040503050406030204" pitchFamily="18" charset="0"/>
+                            </a:rPr>
+                            <m:t>𝑖</m:t>
+                          </m:r>
+                        </m:sub>
+                      </m:sSub>
+                      <m:r>
+                        <a:rPr lang="en-US" b="0" i="1" smtClean="0">
+                          <a:latin typeface="Cambria Math" panose="02040503050406030204" pitchFamily="18" charset="0"/>
+                        </a:rPr>
+                        <m:t>+</m:t>
+                      </m:r>
+                      <m:sSub>
+                        <m:sSubPr>
+                          <m:ctrlPr>
+                            <a:rPr lang="en-US" b="0" i="1" smtClean="0">
+                              <a:latin typeface="Cambria Math" panose="02040503050406030204" pitchFamily="18" charset="0"/>
+                            </a:rPr>
+                          </m:ctrlPr>
+                        </m:sSubPr>
+                        <m:e>
+                          <m:r>
+                            <a:rPr lang="en-US" b="0" i="1" smtClean="0">
+                              <a:latin typeface="Cambria Math" panose="02040503050406030204" pitchFamily="18" charset="0"/>
+                            </a:rPr>
+                            <m:t>𝜌</m:t>
+                          </m:r>
+                        </m:e>
+                        <m:sub>
+                          <m:r>
+                            <a:rPr lang="en-US" b="0" i="1" smtClean="0">
+                              <a:latin typeface="Cambria Math" panose="02040503050406030204" pitchFamily="18" charset="0"/>
+                            </a:rPr>
+                            <m:t>𝑖</m:t>
+                          </m:r>
+                        </m:sub>
+                      </m:sSub>
+                      <m:nary>
+                        <m:naryPr>
+                          <m:chr m:val="∑"/>
+                          <m:ctrlPr>
+                            <a:rPr lang="en-US" b="0" i="1" smtClean="0">
+                              <a:latin typeface="Cambria Math" panose="02040503050406030204" pitchFamily="18" charset="0"/>
+                            </a:rPr>
+                          </m:ctrlPr>
+                        </m:naryPr>
+                        <m:sub>
+                          <m:r>
+                            <m:rPr>
+                              <m:brk m:alnAt="23"/>
+                            </m:rPr>
+                            <a:rPr lang="en-US" b="0" i="1" smtClean="0">
+                              <a:latin typeface="Cambria Math" panose="02040503050406030204" pitchFamily="18" charset="0"/>
+                            </a:rPr>
+                            <m:t>𝑗</m:t>
+                          </m:r>
+                          <m:r>
+                            <a:rPr lang="en-US" b="0" i="1" smtClean="0">
+                              <a:latin typeface="Cambria Math" panose="02040503050406030204" pitchFamily="18" charset="0"/>
+                            </a:rPr>
+                            <m:t>=1</m:t>
+                          </m:r>
+                        </m:sub>
+                        <m:sup>
+                          <m:r>
+                            <a:rPr lang="en-US" b="0" i="1" smtClean="0">
+                              <a:latin typeface="Cambria Math" panose="02040503050406030204" pitchFamily="18" charset="0"/>
+                            </a:rPr>
+                            <m:t>𝑛</m:t>
+                          </m:r>
+                        </m:sup>
+                        <m:e>
+                          <m:sSub>
+                            <m:sSubPr>
+                              <m:ctrlPr>
+                                <a:rPr lang="en-US" b="0" i="1" smtClean="0">
+                                  <a:latin typeface="Cambria Math" panose="02040503050406030204" pitchFamily="18" charset="0"/>
+                                </a:rPr>
+                              </m:ctrlPr>
+                            </m:sSubPr>
+                            <m:e>
+                              <m:r>
+                                <a:rPr lang="en-US" b="0" i="1" smtClean="0">
+                                  <a:latin typeface="Cambria Math" panose="02040503050406030204" pitchFamily="18" charset="0"/>
+                                </a:rPr>
+                                <m:t>𝐹</m:t>
+                              </m:r>
+                            </m:e>
+                            <m:sub>
+                              <m:r>
+                                <a:rPr lang="en-US" b="0" i="1" smtClean="0">
+                                  <a:latin typeface="Cambria Math" panose="02040503050406030204" pitchFamily="18" charset="0"/>
+                                </a:rPr>
+                                <m:t>𝑖𝑗</m:t>
+                              </m:r>
+                            </m:sub>
+                          </m:sSub>
+                          <m:sSub>
+                            <m:sSubPr>
+                              <m:ctrlPr>
+                                <a:rPr lang="en-US" b="0" i="1" smtClean="0">
+                                  <a:latin typeface="Cambria Math" panose="02040503050406030204" pitchFamily="18" charset="0"/>
+                                </a:rPr>
+                              </m:ctrlPr>
+                            </m:sSubPr>
+                            <m:e>
+                              <m:r>
+                                <a:rPr lang="en-US" b="0" i="1" smtClean="0">
+                                  <a:latin typeface="Cambria Math" panose="02040503050406030204" pitchFamily="18" charset="0"/>
+                                </a:rPr>
+                                <m:t>𝐵</m:t>
+                              </m:r>
+                            </m:e>
+                            <m:sub>
+                              <m:r>
+                                <a:rPr lang="en-US" b="0" i="1" smtClean="0">
+                                  <a:latin typeface="Cambria Math" panose="02040503050406030204" pitchFamily="18" charset="0"/>
+                                </a:rPr>
+                                <m:t>𝑗</m:t>
+                              </m:r>
+                            </m:sub>
+                          </m:sSub>
+                        </m:e>
+                      </m:nary>
+                    </m:oMath>
+                  </m:oMathPara>
+                </a14:m>
+                <a:endParaRPr lang="en-US" dirty="0"/>
+              </a:p>
+              <a:p>
+                <a:pPr>
+                  <a:buFont typeface="Wingdings" panose="05000000000000000000" pitchFamily="2" charset="2"/>
+                  <a:buChar char="§"/>
+                </a:pPr>
+                <a:r>
+                  <a:rPr lang="en-US" dirty="0"/>
+                  <a:t>A </a:t>
+                </a:r>
+                <a:r>
+                  <a:rPr lang="en-US" dirty="0" err="1"/>
+                  <a:t>felület</a:t>
+                </a:r>
+                <a:r>
+                  <a:rPr lang="en-US" dirty="0"/>
+                  <a:t> </a:t>
+                </a:r>
+                <a:r>
+                  <a:rPr lang="en-US" dirty="0" err="1"/>
+                  <a:t>véges</a:t>
+                </a:r>
+                <a:r>
+                  <a:rPr lang="en-US" dirty="0"/>
+                  <a:t> </a:t>
+                </a:r>
+                <a:r>
+                  <a:rPr lang="en-US" dirty="0" err="1"/>
+                  <a:t>darab</a:t>
+                </a:r>
+                <a:r>
+                  <a:rPr lang="en-US" dirty="0"/>
+                  <a:t> </a:t>
+                </a:r>
+                <a:r>
+                  <a:rPr lang="en-US" i="1" dirty="0"/>
+                  <a:t>patch</a:t>
+                </a:r>
+                <a:r>
+                  <a:rPr lang="en-US" dirty="0"/>
+                  <a:t>-re van </a:t>
+                </a:r>
+                <a:r>
+                  <a:rPr lang="en-US" dirty="0" err="1"/>
+                  <a:t>osztva</a:t>
+                </a:r>
+                <a:r>
+                  <a:rPr lang="en-US" dirty="0"/>
+                  <a:t>, </a:t>
+                </a:r>
+                <a14:m>
+                  <m:oMath xmlns:m="http://schemas.openxmlformats.org/officeDocument/2006/math">
+                    <m:sSub>
+                      <m:sSubPr>
+                        <m:ctrlPr>
+                          <a:rPr lang="en-US" b="0" i="1" smtClean="0">
+                            <a:latin typeface="Cambria Math" panose="02040503050406030204" pitchFamily="18" charset="0"/>
+                          </a:rPr>
+                        </m:ctrlPr>
+                      </m:sSubPr>
+                      <m:e>
+                        <m:r>
+                          <a:rPr lang="en-US" b="0" i="1" smtClean="0">
+                            <a:latin typeface="Cambria Math" panose="02040503050406030204" pitchFamily="18" charset="0"/>
+                          </a:rPr>
+                          <m:t>𝐵</m:t>
+                        </m:r>
+                      </m:e>
+                      <m:sub>
+                        <m:r>
+                          <a:rPr lang="en-US" b="0" i="1" smtClean="0">
+                            <a:latin typeface="Cambria Math" panose="02040503050406030204" pitchFamily="18" charset="0"/>
+                          </a:rPr>
+                          <m:t>𝑖</m:t>
+                        </m:r>
+                      </m:sub>
+                    </m:sSub>
+                  </m:oMath>
+                </a14:m>
+                <a:r>
+                  <a:rPr lang="en-US" dirty="0"/>
+                  <a:t> </a:t>
+                </a:r>
+                <a:r>
+                  <a:rPr lang="en-US" dirty="0" err="1"/>
+                  <a:t>az</a:t>
+                </a:r>
+                <a:r>
+                  <a:rPr lang="en-US" dirty="0"/>
+                  <a:t> </a:t>
+                </a:r>
+                <a14:m>
+                  <m:oMath xmlns:m="http://schemas.openxmlformats.org/officeDocument/2006/math">
+                    <m:r>
+                      <a:rPr lang="en-US" b="0" i="1" smtClean="0">
+                        <a:latin typeface="Cambria Math" panose="02040503050406030204" pitchFamily="18" charset="0"/>
+                      </a:rPr>
+                      <m:t>𝑖</m:t>
+                    </m:r>
+                  </m:oMath>
+                </a14:m>
+                <a:r>
+                  <a:rPr lang="en-US" dirty="0"/>
+                  <a:t>-</a:t>
+                </a:r>
+                <a:r>
+                  <a:rPr lang="en-US" dirty="0" err="1"/>
+                  <a:t>edik</a:t>
+                </a:r>
+                <a:r>
+                  <a:rPr lang="en-US" dirty="0"/>
+                  <a:t> </a:t>
+                </a:r>
+                <a:r>
+                  <a:rPr lang="en-US" i="1" dirty="0"/>
+                  <a:t>patch</a:t>
+                </a:r>
+                <a:r>
+                  <a:rPr lang="en-US" dirty="0"/>
+                  <a:t> </a:t>
+                </a:r>
+                <a:r>
+                  <a:rPr lang="en-US" dirty="0" err="1"/>
+                  <a:t>radiozitása</a:t>
+                </a:r>
+                <a:r>
+                  <a:rPr lang="en-US" dirty="0"/>
+                  <a:t>, </a:t>
+                </a:r>
+                <a14:m>
+                  <m:oMath xmlns:m="http://schemas.openxmlformats.org/officeDocument/2006/math">
+                    <m:sSub>
+                      <m:sSubPr>
+                        <m:ctrlPr>
+                          <a:rPr lang="en-US" b="0" i="1" smtClean="0">
+                            <a:latin typeface="Cambria Math" panose="02040503050406030204" pitchFamily="18" charset="0"/>
+                          </a:rPr>
+                        </m:ctrlPr>
+                      </m:sSubPr>
+                      <m:e>
+                        <m:r>
+                          <a:rPr lang="en-US" b="0" i="1" smtClean="0">
+                            <a:latin typeface="Cambria Math" panose="02040503050406030204" pitchFamily="18" charset="0"/>
+                          </a:rPr>
+                          <m:t>𝐹</m:t>
+                        </m:r>
+                      </m:e>
+                      <m:sub>
+                        <m:r>
+                          <a:rPr lang="en-US" b="0" i="1" smtClean="0">
+                            <a:latin typeface="Cambria Math" panose="02040503050406030204" pitchFamily="18" charset="0"/>
+                          </a:rPr>
+                          <m:t>𝑖𝑗</m:t>
+                        </m:r>
+                      </m:sub>
+                    </m:sSub>
+                  </m:oMath>
+                </a14:m>
+                <a:r>
+                  <a:rPr lang="en-US" dirty="0"/>
+                  <a:t> </a:t>
+                </a:r>
+                <a:r>
+                  <a:rPr lang="en-US" dirty="0" err="1"/>
+                  <a:t>az</a:t>
+                </a:r>
+                <a:r>
+                  <a:rPr lang="en-US" dirty="0"/>
+                  <a:t> </a:t>
+                </a:r>
+                <a:r>
+                  <a:rPr lang="en-US" dirty="0" err="1"/>
+                  <a:t>ún</a:t>
+                </a:r>
+                <a:r>
+                  <a:rPr lang="en-US" dirty="0"/>
+                  <a:t>. </a:t>
+                </a:r>
+                <a:r>
+                  <a:rPr lang="en-US" i="1" dirty="0"/>
+                  <a:t>form factor</a:t>
+                </a:r>
+              </a:p>
+              <a:p>
+                <a:pPr>
+                  <a:buFont typeface="Wingdings" panose="05000000000000000000" pitchFamily="2" charset="2"/>
+                  <a:buChar char="§"/>
+                </a:pPr>
+                <a:r>
+                  <a:rPr lang="en-US" dirty="0" err="1"/>
+                  <a:t>Eszem</a:t>
+                </a:r>
+                <a:r>
+                  <a:rPr lang="en-US" dirty="0"/>
+                  <a:t> </a:t>
+                </a:r>
+                <a:r>
+                  <a:rPr lang="en-US" dirty="0" err="1"/>
+                  <a:t>ágában</a:t>
+                </a:r>
+                <a:r>
+                  <a:rPr lang="en-US" dirty="0"/>
+                  <a:t> </a:t>
+                </a:r>
+                <a:r>
+                  <a:rPr lang="en-US" dirty="0" err="1"/>
+                  <a:t>nincs</a:t>
+                </a:r>
+                <a:r>
+                  <a:rPr lang="en-US" dirty="0"/>
+                  <a:t> </a:t>
+                </a:r>
+                <a:r>
+                  <a:rPr lang="en-US" dirty="0" err="1"/>
+                  <a:t>levezetni</a:t>
+                </a:r>
+                <a:r>
+                  <a:rPr lang="en-US" dirty="0"/>
+                  <a:t> </a:t>
+                </a:r>
+                <a:r>
+                  <a:rPr lang="en-US" dirty="0">
+                    <a:sym typeface="Wingdings" panose="05000000000000000000" pitchFamily="2" charset="2"/>
+                  </a:rPr>
+                  <a:t> </a:t>
+                </a:r>
+                <a:r>
+                  <a:rPr lang="en-US" dirty="0" err="1">
+                    <a:sym typeface="Wingdings" panose="05000000000000000000" pitchFamily="2" charset="2"/>
+                  </a:rPr>
+                  <a:t>Viszont</a:t>
+                </a:r>
+                <a:r>
+                  <a:rPr lang="en-US" dirty="0">
+                    <a:sym typeface="Wingdings" panose="05000000000000000000" pitchFamily="2" charset="2"/>
+                  </a:rPr>
+                  <a:t> </a:t>
+                </a:r>
+                <a:r>
+                  <a:rPr lang="en-US" dirty="0" err="1">
+                    <a:sym typeface="Wingdings" panose="05000000000000000000" pitchFamily="2" charset="2"/>
+                  </a:rPr>
+                  <a:t>megoldható</a:t>
+                </a:r>
+                <a:r>
+                  <a:rPr lang="en-US" dirty="0">
+                    <a:sym typeface="Wingdings" panose="05000000000000000000" pitchFamily="2" charset="2"/>
+                  </a:rPr>
+                  <a:t> </a:t>
+                </a:r>
+                <a:r>
+                  <a:rPr lang="en-US" dirty="0" err="1">
+                    <a:sym typeface="Wingdings" panose="05000000000000000000" pitchFamily="2" charset="2"/>
+                  </a:rPr>
+                  <a:t>raszterizációval</a:t>
+                </a:r>
+                <a:r>
+                  <a:rPr lang="en-US" dirty="0">
+                    <a:sym typeface="Wingdings" panose="05000000000000000000" pitchFamily="2" charset="2"/>
+                  </a:rPr>
+                  <a:t> (</a:t>
+                </a:r>
+                <a:r>
+                  <a:rPr lang="en-US" i="1" dirty="0">
+                    <a:sym typeface="Wingdings" panose="05000000000000000000" pitchFamily="2" charset="2"/>
+                  </a:rPr>
+                  <a:t>-&gt; lightmap</a:t>
+                </a:r>
+                <a:r>
+                  <a:rPr lang="en-US" dirty="0">
+                    <a:sym typeface="Wingdings" panose="05000000000000000000" pitchFamily="2" charset="2"/>
+                  </a:rPr>
+                  <a:t>) </a:t>
+                </a:r>
+                <a:endParaRPr lang="en-US" dirty="0"/>
+              </a:p>
+              <a:p>
+                <a:pPr>
+                  <a:buFont typeface="Wingdings" panose="05000000000000000000" pitchFamily="2" charset="2"/>
+                  <a:buChar char="§"/>
+                </a:pPr>
+                <a:r>
+                  <a:rPr lang="en-US" b="1" dirty="0" err="1"/>
+                  <a:t>Numerikus</a:t>
+                </a:r>
+                <a:r>
+                  <a:rPr lang="en-US" b="1" dirty="0"/>
+                  <a:t> </a:t>
+                </a:r>
+                <a:r>
+                  <a:rPr lang="en-US" b="1" dirty="0" err="1"/>
+                  <a:t>integrálás</a:t>
+                </a:r>
+                <a:r>
+                  <a:rPr lang="en-US" dirty="0"/>
+                  <a:t>, pl. </a:t>
+                </a:r>
+                <a:r>
+                  <a:rPr lang="en-US" i="1" dirty="0"/>
+                  <a:t>(Monte Carlo) path tracing</a:t>
+                </a:r>
+              </a:p>
+              <a:p>
+                <a:pPr marL="0" indent="0" algn="ctr">
+                  <a:buNone/>
+                </a:pPr>
+                <a14:m>
+                  <m:oMathPara xmlns:m="http://schemas.openxmlformats.org/officeDocument/2006/math">
+                    <m:oMathParaPr>
+                      <m:jc m:val="centerGroup"/>
+                    </m:oMathParaPr>
+                    <m:oMath xmlns:m="http://schemas.openxmlformats.org/officeDocument/2006/math">
+                      <m:sSub>
+                        <m:sSubPr>
+                          <m:ctrlPr>
+                            <a:rPr lang="en-US" b="0" i="1" smtClean="0">
+                              <a:latin typeface="Cambria Math" panose="02040503050406030204" pitchFamily="18" charset="0"/>
+                            </a:rPr>
+                          </m:ctrlPr>
+                        </m:sSubPr>
+                        <m:e>
+                          <m:r>
+                            <a:rPr lang="en-US" b="0" i="1" smtClean="0">
+                              <a:latin typeface="Cambria Math" panose="02040503050406030204" pitchFamily="18" charset="0"/>
+                            </a:rPr>
+                            <m:t>𝐿</m:t>
+                          </m:r>
+                        </m:e>
+                        <m:sub>
+                          <m:r>
+                            <a:rPr lang="en-US" b="0" i="1" smtClean="0">
+                              <a:latin typeface="Cambria Math" panose="02040503050406030204" pitchFamily="18" charset="0"/>
+                            </a:rPr>
+                            <m:t>𝑜</m:t>
+                          </m:r>
+                        </m:sub>
+                      </m:sSub>
+                      <m:d>
+                        <m:dPr>
+                          <m:ctrlPr>
+                            <a:rPr lang="en-US" b="0" i="1" smtClean="0">
+                              <a:latin typeface="Cambria Math" panose="02040503050406030204" pitchFamily="18" charset="0"/>
+                            </a:rPr>
+                          </m:ctrlPr>
+                        </m:dPr>
+                        <m:e>
+                          <m:r>
+                            <a:rPr lang="en-US" b="1" i="1" smtClean="0">
+                              <a:latin typeface="Cambria Math" panose="02040503050406030204" pitchFamily="18" charset="0"/>
+                            </a:rPr>
+                            <m:t>𝒗</m:t>
+                          </m:r>
+                        </m:e>
+                      </m:d>
+                      <m:r>
+                        <a:rPr lang="en-US" b="0" i="1" smtClean="0">
+                          <a:latin typeface="Cambria Math" panose="02040503050406030204" pitchFamily="18" charset="0"/>
+                        </a:rPr>
+                        <m:t>≈</m:t>
+                      </m:r>
+                      <m:sSub>
+                        <m:sSubPr>
+                          <m:ctrlPr>
+                            <a:rPr lang="en-US" b="0" i="1" smtClean="0">
+                              <a:latin typeface="Cambria Math" panose="02040503050406030204" pitchFamily="18" charset="0"/>
+                            </a:rPr>
+                          </m:ctrlPr>
+                        </m:sSubPr>
+                        <m:e>
+                          <m:r>
+                            <a:rPr lang="en-US" b="0" i="1" smtClean="0">
+                              <a:latin typeface="Cambria Math" panose="02040503050406030204" pitchFamily="18" charset="0"/>
+                            </a:rPr>
+                            <m:t>𝐿</m:t>
+                          </m:r>
+                        </m:e>
+                        <m:sub>
+                          <m:r>
+                            <a:rPr lang="en-US" b="0" i="1" smtClean="0">
+                              <a:latin typeface="Cambria Math" panose="02040503050406030204" pitchFamily="18" charset="0"/>
+                            </a:rPr>
+                            <m:t>𝑒</m:t>
+                          </m:r>
+                        </m:sub>
+                      </m:sSub>
+                      <m:d>
+                        <m:dPr>
+                          <m:ctrlPr>
+                            <a:rPr lang="en-US" b="0" i="1" smtClean="0">
+                              <a:latin typeface="Cambria Math" panose="02040503050406030204" pitchFamily="18" charset="0"/>
+                            </a:rPr>
+                          </m:ctrlPr>
+                        </m:dPr>
+                        <m:e>
+                          <m:r>
+                            <a:rPr lang="en-US" b="1" i="1" smtClean="0">
+                              <a:latin typeface="Cambria Math" panose="02040503050406030204" pitchFamily="18" charset="0"/>
+                            </a:rPr>
+                            <m:t>𝒗</m:t>
+                          </m:r>
+                        </m:e>
+                      </m:d>
+                      <m:r>
+                        <a:rPr lang="en-US" b="0" i="1" smtClean="0">
+                          <a:latin typeface="Cambria Math" panose="02040503050406030204" pitchFamily="18" charset="0"/>
+                        </a:rPr>
+                        <m:t>+</m:t>
+                      </m:r>
+                      <m:f>
+                        <m:fPr>
+                          <m:ctrlPr>
+                            <a:rPr lang="en-US" b="0" i="1" smtClean="0">
+                              <a:latin typeface="Cambria Math" panose="02040503050406030204" pitchFamily="18" charset="0"/>
+                            </a:rPr>
+                          </m:ctrlPr>
+                        </m:fPr>
+                        <m:num>
+                          <m:r>
+                            <a:rPr lang="en-US" b="0" i="1" smtClean="0">
+                              <a:latin typeface="Cambria Math" panose="02040503050406030204" pitchFamily="18" charset="0"/>
+                            </a:rPr>
+                            <m:t>1</m:t>
+                          </m:r>
+                        </m:num>
+                        <m:den>
+                          <m:r>
+                            <a:rPr lang="en-US" b="0" i="1" smtClean="0">
+                              <a:latin typeface="Cambria Math" panose="02040503050406030204" pitchFamily="18" charset="0"/>
+                            </a:rPr>
+                            <m:t>𝑁</m:t>
+                          </m:r>
+                        </m:den>
+                      </m:f>
+                      <m:nary>
+                        <m:naryPr>
+                          <m:chr m:val="∑"/>
+                          <m:ctrlPr>
+                            <a:rPr lang="en-US" b="0" i="1" smtClean="0">
+                              <a:latin typeface="Cambria Math" panose="02040503050406030204" pitchFamily="18" charset="0"/>
+                            </a:rPr>
+                          </m:ctrlPr>
+                        </m:naryPr>
+                        <m:sub>
+                          <m:r>
+                            <m:rPr>
+                              <m:brk m:alnAt="23"/>
+                            </m:rPr>
+                            <a:rPr lang="en-US" b="0" i="1" smtClean="0">
+                              <a:latin typeface="Cambria Math" panose="02040503050406030204" pitchFamily="18" charset="0"/>
+                            </a:rPr>
+                            <m:t>𝑘</m:t>
+                          </m:r>
+                          <m:r>
+                            <a:rPr lang="en-US" b="0" i="1" smtClean="0">
+                              <a:latin typeface="Cambria Math" panose="02040503050406030204" pitchFamily="18" charset="0"/>
+                            </a:rPr>
+                            <m:t>=1</m:t>
+                          </m:r>
+                        </m:sub>
+                        <m:sup>
+                          <m:r>
+                            <a:rPr lang="en-US" b="0" i="1" smtClean="0">
+                              <a:latin typeface="Cambria Math" panose="02040503050406030204" pitchFamily="18" charset="0"/>
+                            </a:rPr>
+                            <m:t>𝑁</m:t>
+                          </m:r>
+                        </m:sup>
+                        <m:e>
+                          <m:f>
+                            <m:fPr>
+                              <m:ctrlPr>
+                                <a:rPr lang="en-US" b="0" i="1" smtClean="0">
+                                  <a:latin typeface="Cambria Math" panose="02040503050406030204" pitchFamily="18" charset="0"/>
+                                </a:rPr>
+                              </m:ctrlPr>
+                            </m:fPr>
+                            <m:num>
+                              <m:sSub>
+                                <m:sSubPr>
+                                  <m:ctrlPr>
+                                    <a:rPr lang="en-US" b="0" i="1" smtClean="0">
+                                      <a:latin typeface="Cambria Math" panose="02040503050406030204" pitchFamily="18" charset="0"/>
+                                    </a:rPr>
+                                  </m:ctrlPr>
+                                </m:sSubPr>
+                                <m:e>
+                                  <m:sSub>
+                                    <m:sSubPr>
+                                      <m:ctrlPr>
+                                        <a:rPr lang="en-US" b="0" i="1" smtClean="0">
+                                          <a:latin typeface="Cambria Math" panose="02040503050406030204" pitchFamily="18" charset="0"/>
+                                        </a:rPr>
+                                      </m:ctrlPr>
+                                    </m:sSubPr>
+                                    <m:e>
+                                      <m:r>
+                                        <a:rPr lang="en-US" b="0" i="1" smtClean="0">
+                                          <a:latin typeface="Cambria Math" panose="02040503050406030204" pitchFamily="18" charset="0"/>
+                                        </a:rPr>
+                                        <m:t>𝐿</m:t>
+                                      </m:r>
+                                    </m:e>
+                                    <m:sub>
+                                      <m:r>
+                                        <a:rPr lang="en-US" b="0" i="1" smtClean="0">
+                                          <a:latin typeface="Cambria Math" panose="02040503050406030204" pitchFamily="18" charset="0"/>
+                                        </a:rPr>
+                                        <m:t>𝑖</m:t>
+                                      </m:r>
+                                    </m:sub>
+                                  </m:sSub>
+                                  <m:d>
+                                    <m:dPr>
+                                      <m:ctrlPr>
+                                        <a:rPr lang="en-US" b="0" i="1" smtClean="0">
+                                          <a:latin typeface="Cambria Math" panose="02040503050406030204" pitchFamily="18" charset="0"/>
+                                        </a:rPr>
+                                      </m:ctrlPr>
+                                    </m:dPr>
+                                    <m:e>
+                                      <m:sSub>
+                                        <m:sSubPr>
+                                          <m:ctrlPr>
+                                            <a:rPr lang="en-US" b="0" i="1" smtClean="0">
+                                              <a:latin typeface="Cambria Math" panose="02040503050406030204" pitchFamily="18" charset="0"/>
+                                            </a:rPr>
+                                          </m:ctrlPr>
+                                        </m:sSubPr>
+                                        <m:e>
+                                          <m:r>
+                                            <a:rPr lang="en-US" b="1" i="1" smtClean="0">
+                                              <a:latin typeface="Cambria Math" panose="02040503050406030204" pitchFamily="18" charset="0"/>
+                                            </a:rPr>
+                                            <m:t>𝒍</m:t>
+                                          </m:r>
+                                        </m:e>
+                                        <m:sub>
+                                          <m:r>
+                                            <a:rPr lang="en-US" b="0" i="1" smtClean="0">
+                                              <a:latin typeface="Cambria Math" panose="02040503050406030204" pitchFamily="18" charset="0"/>
+                                            </a:rPr>
+                                            <m:t>𝑘</m:t>
+                                          </m:r>
+                                        </m:sub>
+                                      </m:sSub>
+                                    </m:e>
+                                  </m:d>
+                                  <m:r>
+                                    <a:rPr lang="en-US" b="0" i="1" smtClean="0">
+                                      <a:latin typeface="Cambria Math" panose="02040503050406030204" pitchFamily="18" charset="0"/>
+                                    </a:rPr>
+                                    <m:t>𝑓</m:t>
+                                  </m:r>
+                                </m:e>
+                                <m:sub>
+                                  <m:r>
+                                    <a:rPr lang="en-US" b="0" i="1" smtClean="0">
+                                      <a:latin typeface="Cambria Math" panose="02040503050406030204" pitchFamily="18" charset="0"/>
+                                    </a:rPr>
+                                    <m:t>𝑟</m:t>
+                                  </m:r>
+                                </m:sub>
+                              </m:sSub>
+                              <m:d>
+                                <m:dPr>
+                                  <m:ctrlPr>
+                                    <a:rPr lang="en-US" b="0" i="1" smtClean="0">
+                                      <a:latin typeface="Cambria Math" panose="02040503050406030204" pitchFamily="18" charset="0"/>
+                                    </a:rPr>
+                                  </m:ctrlPr>
+                                </m:dPr>
+                                <m:e>
+                                  <m:r>
+                                    <a:rPr lang="en-US" b="0" i="1" smtClean="0">
+                                      <a:latin typeface="Cambria Math" panose="02040503050406030204" pitchFamily="18" charset="0"/>
+                                    </a:rPr>
+                                    <m:t>𝑣</m:t>
+                                  </m:r>
+                                  <m:r>
+                                    <a:rPr lang="en-US" b="0" i="1" smtClean="0">
+                                      <a:latin typeface="Cambria Math" panose="02040503050406030204" pitchFamily="18" charset="0"/>
+                                    </a:rPr>
+                                    <m:t>, </m:t>
+                                  </m:r>
+                                  <m:sSub>
+                                    <m:sSubPr>
+                                      <m:ctrlPr>
+                                        <a:rPr lang="en-US" b="0" i="1" smtClean="0">
+                                          <a:latin typeface="Cambria Math" panose="02040503050406030204" pitchFamily="18" charset="0"/>
+                                        </a:rPr>
+                                      </m:ctrlPr>
+                                    </m:sSubPr>
+                                    <m:e>
+                                      <m:r>
+                                        <a:rPr lang="en-US" b="1" i="1" smtClean="0">
+                                          <a:latin typeface="Cambria Math" panose="02040503050406030204" pitchFamily="18" charset="0"/>
+                                        </a:rPr>
+                                        <m:t>𝒍</m:t>
+                                      </m:r>
+                                    </m:e>
+                                    <m:sub>
+                                      <m:r>
+                                        <a:rPr lang="en-US" b="0" i="1" smtClean="0">
+                                          <a:latin typeface="Cambria Math" panose="02040503050406030204" pitchFamily="18" charset="0"/>
+                                        </a:rPr>
+                                        <m:t>𝑘</m:t>
+                                      </m:r>
+                                    </m:sub>
+                                  </m:sSub>
+                                </m:e>
+                              </m:d>
+                              <m:func>
+                                <m:funcPr>
+                                  <m:ctrlPr>
+                                    <a:rPr lang="en-US" b="0" i="1" smtClean="0">
+                                      <a:latin typeface="Cambria Math" panose="02040503050406030204" pitchFamily="18" charset="0"/>
+                                    </a:rPr>
+                                  </m:ctrlPr>
+                                </m:funcPr>
+                                <m:fName>
+                                  <m:r>
+                                    <m:rPr>
+                                      <m:sty m:val="p"/>
+                                    </m:rPr>
+                                    <a:rPr lang="en-US" b="0" i="0" smtClean="0">
+                                      <a:latin typeface="Cambria Math" panose="02040503050406030204" pitchFamily="18" charset="0"/>
+                                    </a:rPr>
+                                    <m:t>cos</m:t>
+                                  </m:r>
+                                </m:fName>
+                                <m:e>
+                                  <m:sSub>
+                                    <m:sSubPr>
+                                      <m:ctrlPr>
+                                        <a:rPr lang="en-US" b="0" i="1" smtClean="0">
+                                          <a:latin typeface="Cambria Math" panose="02040503050406030204" pitchFamily="18" charset="0"/>
+                                        </a:rPr>
+                                      </m:ctrlPr>
+                                    </m:sSubPr>
+                                    <m:e>
+                                      <m:sSub>
+                                        <m:sSubPr>
+                                          <m:ctrlPr>
+                                            <a:rPr lang="en-US" b="0" i="1" smtClean="0">
+                                              <a:latin typeface="Cambria Math" panose="02040503050406030204" pitchFamily="18" charset="0"/>
+                                            </a:rPr>
+                                          </m:ctrlPr>
+                                        </m:sSubPr>
+                                        <m:e>
+                                          <m:r>
+                                            <a:rPr lang="en-US" b="0" i="1" smtClean="0">
+                                              <a:latin typeface="Cambria Math" panose="02040503050406030204" pitchFamily="18" charset="0"/>
+                                            </a:rPr>
+                                            <m:t>𝜃</m:t>
+                                          </m:r>
+                                        </m:e>
+                                        <m:sub>
+                                          <m:r>
+                                            <a:rPr lang="en-US" b="1" i="1" smtClean="0">
+                                              <a:latin typeface="Cambria Math" panose="02040503050406030204" pitchFamily="18" charset="0"/>
+                                            </a:rPr>
+                                            <m:t>𝒍</m:t>
+                                          </m:r>
+                                        </m:sub>
+                                      </m:sSub>
+                                    </m:e>
+                                    <m:sub>
+                                      <m:r>
+                                        <a:rPr lang="en-US" b="0" i="1" smtClean="0">
+                                          <a:latin typeface="Cambria Math" panose="02040503050406030204" pitchFamily="18" charset="0"/>
+                                        </a:rPr>
+                                        <m:t>𝑘</m:t>
+                                      </m:r>
+                                    </m:sub>
+                                  </m:sSub>
+                                </m:e>
+                              </m:func>
+                            </m:num>
+                            <m:den>
+                              <m:sSub>
+                                <m:sSubPr>
+                                  <m:ctrlPr>
+                                    <a:rPr lang="en-US" b="0" i="1" smtClean="0">
+                                      <a:latin typeface="Cambria Math" panose="02040503050406030204" pitchFamily="18" charset="0"/>
+                                    </a:rPr>
+                                  </m:ctrlPr>
+                                </m:sSubPr>
+                                <m:e>
+                                  <m:r>
+                                    <a:rPr lang="en-US" b="0" i="1" smtClean="0">
+                                      <a:latin typeface="Cambria Math" panose="02040503050406030204" pitchFamily="18" charset="0"/>
+                                    </a:rPr>
+                                    <m:t>𝑝</m:t>
+                                  </m:r>
+                                </m:e>
+                                <m:sub>
+                                  <m:r>
+                                    <a:rPr lang="en-US" b="0" i="1" smtClean="0">
+                                      <a:latin typeface="Cambria Math" panose="02040503050406030204" pitchFamily="18" charset="0"/>
+                                    </a:rPr>
+                                    <m:t>𝑟</m:t>
+                                  </m:r>
+                                </m:sub>
+                              </m:sSub>
+                              <m:r>
+                                <a:rPr lang="en-US" b="0" i="1" smtClean="0">
+                                  <a:latin typeface="Cambria Math" panose="02040503050406030204" pitchFamily="18" charset="0"/>
+                                </a:rPr>
+                                <m:t>(</m:t>
+                              </m:r>
+                              <m:r>
+                                <a:rPr lang="en-US" b="0" i="1" smtClean="0">
+                                  <a:latin typeface="Cambria Math" panose="02040503050406030204" pitchFamily="18" charset="0"/>
+                                </a:rPr>
+                                <m:t>𝑣</m:t>
+                              </m:r>
+                              <m:r>
+                                <a:rPr lang="en-US" b="0" i="1" smtClean="0">
+                                  <a:latin typeface="Cambria Math" panose="02040503050406030204" pitchFamily="18" charset="0"/>
+                                </a:rPr>
+                                <m:t>, </m:t>
+                              </m:r>
+                              <m:sSub>
+                                <m:sSubPr>
+                                  <m:ctrlPr>
+                                    <a:rPr lang="en-US" b="0" i="1" smtClean="0">
+                                      <a:latin typeface="Cambria Math" panose="02040503050406030204" pitchFamily="18" charset="0"/>
+                                    </a:rPr>
+                                  </m:ctrlPr>
+                                </m:sSubPr>
+                                <m:e>
+                                  <m:r>
+                                    <a:rPr lang="en-US" b="1" i="1" smtClean="0">
+                                      <a:latin typeface="Cambria Math" panose="02040503050406030204" pitchFamily="18" charset="0"/>
+                                    </a:rPr>
+                                    <m:t>𝒍</m:t>
+                                  </m:r>
+                                </m:e>
+                                <m:sub>
+                                  <m:r>
+                                    <a:rPr lang="en-US" b="0" i="1" smtClean="0">
+                                      <a:latin typeface="Cambria Math" panose="02040503050406030204" pitchFamily="18" charset="0"/>
+                                    </a:rPr>
+                                    <m:t>𝑘</m:t>
+                                  </m:r>
+                                </m:sub>
+                              </m:sSub>
+                              <m:r>
+                                <a:rPr lang="en-US" b="0" i="1" smtClean="0">
+                                  <a:latin typeface="Cambria Math" panose="02040503050406030204" pitchFamily="18" charset="0"/>
+                                </a:rPr>
+                                <m:t>)</m:t>
+                              </m:r>
+                            </m:den>
+                          </m:f>
+                        </m:e>
+                      </m:nary>
+                    </m:oMath>
+                  </m:oMathPara>
+                </a14:m>
+                <a:endParaRPr lang="en-US" dirty="0"/>
+              </a:p>
+              <a:p>
+                <a:pPr>
+                  <a:buFont typeface="Wingdings" panose="05000000000000000000" pitchFamily="2" charset="2"/>
+                  <a:buChar char="§"/>
+                </a:pPr>
+                <a:r>
+                  <a:rPr lang="en-US" dirty="0" err="1"/>
+                  <a:t>Ahol</a:t>
+                </a:r>
+                <a:r>
+                  <a:rPr lang="en-US" dirty="0"/>
+                  <a:t> </a:t>
+                </a:r>
+                <a14:m>
+                  <m:oMath xmlns:m="http://schemas.openxmlformats.org/officeDocument/2006/math">
+                    <m:sSub>
+                      <m:sSubPr>
+                        <m:ctrlPr>
+                          <a:rPr lang="en-US" b="0" i="1" smtClean="0">
+                            <a:latin typeface="Cambria Math" panose="02040503050406030204" pitchFamily="18" charset="0"/>
+                          </a:rPr>
+                        </m:ctrlPr>
+                      </m:sSubPr>
+                      <m:e>
+                        <m:r>
+                          <a:rPr lang="en-US" b="0" i="1" smtClean="0">
+                            <a:latin typeface="Cambria Math" panose="02040503050406030204" pitchFamily="18" charset="0"/>
+                          </a:rPr>
+                          <m:t>𝑝</m:t>
+                        </m:r>
+                      </m:e>
+                      <m:sub>
+                        <m:r>
+                          <a:rPr lang="en-US" b="0" i="1" smtClean="0">
+                            <a:latin typeface="Cambria Math" panose="02040503050406030204" pitchFamily="18" charset="0"/>
+                          </a:rPr>
+                          <m:t>𝑟</m:t>
+                        </m:r>
+                      </m:sub>
+                    </m:sSub>
+                  </m:oMath>
+                </a14:m>
+                <a:r>
+                  <a:rPr lang="en-US" dirty="0"/>
+                  <a:t> </a:t>
+                </a:r>
+                <a:r>
+                  <a:rPr lang="en-US" dirty="0" err="1"/>
+                  <a:t>egy</a:t>
+                </a:r>
+                <a:r>
+                  <a:rPr lang="en-US" dirty="0"/>
+                  <a:t> </a:t>
+                </a:r>
+                <a:r>
+                  <a:rPr lang="en-US" dirty="0" err="1"/>
+                  <a:t>ún</a:t>
+                </a:r>
+                <a:r>
+                  <a:rPr lang="en-US" dirty="0"/>
+                  <a:t>. (</a:t>
+                </a:r>
+                <a:r>
+                  <a:rPr lang="en-US" dirty="0" err="1"/>
+                  <a:t>valószínűségi</a:t>
+                </a:r>
+                <a:r>
+                  <a:rPr lang="en-US" dirty="0"/>
+                  <a:t>) </a:t>
+                </a:r>
+                <a:r>
+                  <a:rPr lang="en-US" dirty="0" err="1"/>
+                  <a:t>sűrűségfüggvény</a:t>
+                </a:r>
+                <a:r>
+                  <a:rPr lang="en-US" dirty="0"/>
+                  <a:t> (</a:t>
+                </a:r>
+                <a:r>
+                  <a:rPr lang="en-US" i="1" dirty="0"/>
+                  <a:t>PDF</a:t>
+                </a:r>
+                <a:r>
+                  <a:rPr lang="en-US" dirty="0"/>
+                  <a:t>), </a:t>
+                </a:r>
+                <a14:m>
+                  <m:oMath xmlns:m="http://schemas.openxmlformats.org/officeDocument/2006/math">
+                    <m:sSub>
+                      <m:sSubPr>
+                        <m:ctrlPr>
+                          <a:rPr lang="en-US" b="0" i="1" smtClean="0">
+                            <a:latin typeface="Cambria Math" panose="02040503050406030204" pitchFamily="18" charset="0"/>
+                          </a:rPr>
+                        </m:ctrlPr>
+                      </m:sSubPr>
+                      <m:e>
+                        <m:r>
+                          <a:rPr lang="en-US" b="1" i="1" smtClean="0">
+                            <a:latin typeface="Cambria Math" panose="02040503050406030204" pitchFamily="18" charset="0"/>
+                          </a:rPr>
+                          <m:t>𝒍</m:t>
+                        </m:r>
+                      </m:e>
+                      <m:sub>
+                        <m:r>
+                          <a:rPr lang="en-US" b="0" i="1" smtClean="0">
+                            <a:latin typeface="Cambria Math" panose="02040503050406030204" pitchFamily="18" charset="0"/>
+                          </a:rPr>
+                          <m:t>𝑘</m:t>
+                        </m:r>
+                      </m:sub>
+                    </m:sSub>
+                  </m:oMath>
+                </a14:m>
+                <a:r>
+                  <a:rPr lang="en-US" dirty="0"/>
+                  <a:t> </a:t>
+                </a:r>
+                <a:r>
+                  <a:rPr lang="en-US" dirty="0" err="1"/>
+                  <a:t>pedig</a:t>
+                </a:r>
+                <a:r>
+                  <a:rPr lang="en-US" dirty="0"/>
+                  <a:t> (</a:t>
+                </a:r>
+                <a:r>
+                  <a:rPr lang="en-US" dirty="0" err="1"/>
+                  <a:t>ehhez</a:t>
+                </a:r>
+                <a:r>
+                  <a:rPr lang="en-US" dirty="0"/>
+                  <a:t> </a:t>
+                </a:r>
+                <a:r>
+                  <a:rPr lang="en-US" dirty="0" err="1"/>
+                  <a:t>való</a:t>
+                </a:r>
+                <a:r>
+                  <a:rPr lang="en-US" dirty="0"/>
+                  <a:t>) </a:t>
+                </a:r>
+                <a:r>
+                  <a:rPr lang="en-US" dirty="0" err="1"/>
+                  <a:t>valószínűségi</a:t>
+                </a:r>
+                <a:r>
+                  <a:rPr lang="en-US" dirty="0"/>
+                  <a:t> </a:t>
+                </a:r>
+                <a:r>
+                  <a:rPr lang="en-US" dirty="0" err="1"/>
+                  <a:t>változó</a:t>
+                </a:r>
+                <a:endParaRPr lang="en-US" dirty="0"/>
+              </a:p>
+              <a:p>
+                <a:pPr>
+                  <a:buFont typeface="Wingdings" panose="05000000000000000000" pitchFamily="2" charset="2"/>
+                  <a:buChar char="§"/>
+                </a:pPr>
+                <a:r>
+                  <a:rPr lang="en-US" dirty="0" err="1"/>
+                  <a:t>Részletes</a:t>
+                </a:r>
+                <a:r>
+                  <a:rPr lang="en-US" dirty="0"/>
+                  <a:t> </a:t>
+                </a:r>
+                <a:r>
+                  <a:rPr lang="en-US" dirty="0" err="1"/>
+                  <a:t>leírásokhoz</a:t>
+                </a:r>
+                <a:r>
+                  <a:rPr lang="en-US" dirty="0"/>
+                  <a:t> ld. </a:t>
+                </a:r>
+                <a:r>
+                  <a:rPr lang="en-US" dirty="0" err="1">
+                    <a:hlinkClick r:id="rId2"/>
+                  </a:rPr>
+                  <a:t>ezt</a:t>
+                </a:r>
+                <a:r>
+                  <a:rPr lang="en-US" dirty="0">
+                    <a:hlinkClick r:id="rId2"/>
+                  </a:rPr>
+                  <a:t> a </a:t>
+                </a:r>
+                <a:r>
+                  <a:rPr lang="en-US" dirty="0" err="1">
+                    <a:hlinkClick r:id="rId2"/>
+                  </a:rPr>
+                  <a:t>linket</a:t>
+                </a:r>
+                <a:r>
+                  <a:rPr lang="en-US" dirty="0"/>
+                  <a:t> (</a:t>
+                </a:r>
+                <a:r>
+                  <a:rPr lang="en-US" i="1" dirty="0"/>
+                  <a:t>Teaching -&gt; Advanced Computer Graphics</a:t>
+                </a:r>
+                <a:r>
+                  <a:rPr lang="en-US" dirty="0"/>
+                  <a:t>)</a:t>
+                </a:r>
+              </a:p>
+            </p:txBody>
+          </p:sp>
+        </mc:Choice>
+        <mc:Fallback>
+          <p:sp>
+            <p:nvSpPr>
+              <p:cNvPr id="3" name="Content Placeholder 2">
+                <a:extLst>
+                  <a:ext uri="{FF2B5EF4-FFF2-40B4-BE49-F238E27FC236}">
+                    <a16:creationId xmlns:a16="http://schemas.microsoft.com/office/drawing/2014/main" id="{62CA16AF-F914-4585-8761-F16037745DC2}"/>
+                  </a:ext>
+                </a:extLst>
+              </p:cNvPr>
+              <p:cNvSpPr>
+                <a:spLocks noGrp="1" noRot="1" noChangeAspect="1" noMove="1" noResize="1" noEditPoints="1" noAdjustHandles="1" noChangeArrowheads="1" noChangeShapeType="1" noTextEdit="1"/>
+              </p:cNvSpPr>
+              <p:nvPr>
+                <p:ph idx="1"/>
+              </p:nvPr>
+            </p:nvSpPr>
+            <p:spPr>
+              <a:blipFill>
+                <a:blip r:embed="rId3"/>
+                <a:stretch>
+                  <a:fillRect l="-1333" t="-1970" b="-152"/>
+                </a:stretch>
+              </a:blipFill>
+            </p:spPr>
+            <p:txBody>
+              <a:bodyPr/>
+              <a:lstStyle/>
+              <a:p>
+                <a:r>
+                  <a:rPr lang="hu-HU">
+                    <a:noFill/>
+                  </a:rPr>
+                  <a:t> </a:t>
+                </a:r>
+              </a:p>
+            </p:txBody>
+          </p:sp>
+        </mc:Fallback>
+      </mc:AlternateContent>
     </p:spTree>
     <p:extLst>
       <p:ext uri="{BB962C8B-B14F-4D97-AF65-F5344CB8AC3E}">
@@ -5651,7 +7072,944 @@
 </p:sld>
 </file>
 
-<file path=ppt/slides/slide4.xml><?xml version="1.0" encoding="utf-8"?>
+<file path=ppt/slides/slide5.xml><?xml version="1.0" encoding="utf-8"?>
+<p:sld xmlns:a="http://schemas.openxmlformats.org/drawingml/2006/main" xmlns:r="http://schemas.openxmlformats.org/officeDocument/2006/relationships" xmlns:p="http://schemas.openxmlformats.org/presentationml/2006/main">
+  <p:cSld>
+    <p:spTree>
+      <p:nvGrpSpPr>
+        <p:cNvPr id="1" name=""/>
+        <p:cNvGrpSpPr/>
+        <p:nvPr/>
+      </p:nvGrpSpPr>
+      <p:grpSpPr>
+        <a:xfrm>
+          <a:off x="0" y="0"/>
+          <a:ext cx="0" cy="0"/>
+          <a:chOff x="0" y="0"/>
+          <a:chExt cx="0" cy="0"/>
+        </a:xfrm>
+      </p:grpSpPr>
+      <p:sp>
+        <p:nvSpPr>
+          <p:cNvPr id="2" name="Title 1">
+            <a:extLst>
+              <a:ext uri="{FF2B5EF4-FFF2-40B4-BE49-F238E27FC236}">
+                <a16:creationId xmlns:a16="http://schemas.microsoft.com/office/drawing/2014/main" id="{CE2A3218-D1FC-48F8-ADC6-9E05E8DEED01}"/>
+              </a:ext>
+            </a:extLst>
+          </p:cNvPr>
+          <p:cNvSpPr>
+            <a:spLocks noGrp="1"/>
+          </p:cNvSpPr>
+          <p:nvPr>
+            <p:ph type="title"/>
+          </p:nvPr>
+        </p:nvSpPr>
+        <p:spPr/>
+        <p:txBody>
+          <a:bodyPr/>
+          <a:lstStyle/>
+          <a:p>
+            <a:r>
+              <a:rPr lang="en-US" dirty="0"/>
+              <a:t>Monte Carlo </a:t>
+            </a:r>
+            <a:r>
+              <a:rPr lang="en-US" dirty="0" err="1"/>
+              <a:t>integrálás</a:t>
+            </a:r>
+            <a:endParaRPr lang="hu-HU" dirty="0"/>
+          </a:p>
+        </p:txBody>
+      </p:sp>
+      <mc:AlternateContent xmlns:mc="http://schemas.openxmlformats.org/markup-compatibility/2006">
+        <mc:Choice xmlns:a14="http://schemas.microsoft.com/office/drawing/2010/main" Requires="a14">
+          <p:sp>
+            <p:nvSpPr>
+              <p:cNvPr id="3" name="Content Placeholder 2">
+                <a:extLst>
+                  <a:ext uri="{FF2B5EF4-FFF2-40B4-BE49-F238E27FC236}">
+                    <a16:creationId xmlns:a16="http://schemas.microsoft.com/office/drawing/2014/main" id="{EAB8BE3C-FABB-4543-947B-4C77DD3F5F55}"/>
+                  </a:ext>
+                </a:extLst>
+              </p:cNvPr>
+              <p:cNvSpPr>
+                <a:spLocks noGrp="1"/>
+              </p:cNvSpPr>
+              <p:nvPr>
+                <p:ph idx="1"/>
+              </p:nvPr>
+            </p:nvSpPr>
+            <p:spPr/>
+            <p:txBody>
+              <a:bodyPr>
+                <a:normAutofit/>
+              </a:bodyPr>
+              <a:lstStyle/>
+              <a:p>
+                <a:pPr>
+                  <a:buFont typeface="Wingdings" panose="05000000000000000000" pitchFamily="2" charset="2"/>
+                  <a:buChar char="§"/>
+                </a:pPr>
+                <a:r>
+                  <a:rPr lang="en-US" dirty="0"/>
+                  <a:t>A </a:t>
+                </a:r>
+                <a:r>
+                  <a:rPr lang="en-US" i="1" dirty="0"/>
+                  <a:t>Riemann</a:t>
+                </a:r>
+                <a:r>
+                  <a:rPr lang="en-US" dirty="0"/>
+                  <a:t> </a:t>
+                </a:r>
+                <a:r>
+                  <a:rPr lang="en-US" dirty="0" err="1"/>
+                  <a:t>integrálra</a:t>
+                </a:r>
+                <a:r>
+                  <a:rPr lang="en-US" dirty="0"/>
+                  <a:t> </a:t>
+                </a:r>
+                <a:r>
+                  <a:rPr lang="en-US" dirty="0" err="1"/>
+                  <a:t>ismerjük</a:t>
+                </a:r>
+                <a:r>
+                  <a:rPr lang="en-US" dirty="0"/>
+                  <a:t> </a:t>
+                </a:r>
+                <a:r>
+                  <a:rPr lang="en-US" dirty="0" err="1"/>
+                  <a:t>az</a:t>
+                </a:r>
+                <a:r>
+                  <a:rPr lang="en-US" dirty="0"/>
+                  <a:t> </a:t>
+                </a:r>
+                <a:r>
+                  <a:rPr lang="en-US" dirty="0" err="1"/>
+                  <a:t>ún</a:t>
+                </a:r>
+                <a:r>
+                  <a:rPr lang="en-US" dirty="0"/>
+                  <a:t>. </a:t>
+                </a:r>
+                <a:r>
+                  <a:rPr lang="en-US" dirty="0" err="1"/>
+                  <a:t>trapéz</a:t>
+                </a:r>
+                <a:r>
+                  <a:rPr lang="en-US" dirty="0"/>
+                  <a:t> </a:t>
+                </a:r>
+                <a:r>
+                  <a:rPr lang="en-US" dirty="0" err="1"/>
+                  <a:t>szabályt</a:t>
+                </a:r>
+                <a:r>
+                  <a:rPr lang="en-US" dirty="0"/>
+                  <a:t> (</a:t>
+                </a:r>
+                <a:r>
+                  <a:rPr lang="en-US" dirty="0" err="1"/>
+                  <a:t>egyenletes</a:t>
+                </a:r>
+                <a:r>
+                  <a:rPr lang="en-US" dirty="0"/>
+                  <a:t> </a:t>
+                </a:r>
+                <a:r>
+                  <a:rPr lang="en-US" dirty="0" err="1"/>
+                  <a:t>felosztás</a:t>
+                </a:r>
+                <a:r>
+                  <a:rPr lang="en-US" dirty="0"/>
+                  <a:t> + </a:t>
+                </a:r>
+                <a:r>
+                  <a:rPr lang="en-US" dirty="0" err="1"/>
+                  <a:t>trapézok</a:t>
+                </a:r>
+                <a:r>
+                  <a:rPr lang="en-US" dirty="0"/>
+                  <a:t>)</a:t>
+                </a:r>
+              </a:p>
+              <a:p>
+                <a:pPr>
+                  <a:buFont typeface="Wingdings" panose="05000000000000000000" pitchFamily="2" charset="2"/>
+                  <a:buChar char="§"/>
+                </a:pPr>
+                <a:r>
+                  <a:rPr lang="en-US" dirty="0"/>
+                  <a:t>De </a:t>
+                </a:r>
+                <a:r>
+                  <a:rPr lang="en-US" dirty="0" err="1"/>
+                  <a:t>magasabb</a:t>
+                </a:r>
+                <a:r>
+                  <a:rPr lang="en-US" dirty="0"/>
+                  <a:t> </a:t>
+                </a:r>
+                <a:r>
+                  <a:rPr lang="en-US" dirty="0" err="1"/>
+                  <a:t>dimenziókban</a:t>
+                </a:r>
+                <a:r>
+                  <a:rPr lang="en-US" dirty="0"/>
+                  <a:t> </a:t>
+                </a:r>
+                <a:r>
+                  <a:rPr lang="en-US" dirty="0" err="1"/>
+                  <a:t>túl</a:t>
+                </a:r>
+                <a:r>
+                  <a:rPr lang="en-US" dirty="0"/>
+                  <a:t> </a:t>
+                </a:r>
+                <a:r>
+                  <a:rPr lang="en-US" dirty="0" err="1"/>
+                  <a:t>nagy</a:t>
+                </a:r>
+                <a:r>
+                  <a:rPr lang="en-US" dirty="0"/>
+                  <a:t> a </a:t>
+                </a:r>
+                <a:r>
+                  <a:rPr lang="en-US" dirty="0" err="1"/>
+                  <a:t>hibája</a:t>
+                </a:r>
+                <a:r>
+                  <a:rPr lang="en-US" dirty="0"/>
+                  <a:t>, </a:t>
+                </a:r>
+                <a:r>
+                  <a:rPr lang="en-US" dirty="0" err="1"/>
+                  <a:t>az</a:t>
+                </a:r>
+                <a:r>
+                  <a:rPr lang="en-US" dirty="0"/>
+                  <a:t> </a:t>
+                </a:r>
+                <a:r>
+                  <a:rPr lang="en-US" dirty="0" err="1"/>
+                  <a:t>egyenletes</a:t>
+                </a:r>
+                <a:r>
+                  <a:rPr lang="en-US" dirty="0"/>
+                  <a:t> </a:t>
+                </a:r>
+                <a:r>
+                  <a:rPr lang="en-US" dirty="0" err="1"/>
+                  <a:t>felosztás</a:t>
+                </a:r>
+                <a:r>
+                  <a:rPr lang="en-US" dirty="0"/>
+                  <a:t> </a:t>
+                </a:r>
+                <a:r>
+                  <a:rPr lang="en-US" dirty="0" err="1"/>
+                  <a:t>pedig</a:t>
+                </a:r>
+                <a:r>
+                  <a:rPr lang="en-US" dirty="0"/>
+                  <a:t> </a:t>
+                </a:r>
+                <a:r>
+                  <a:rPr lang="en-US" dirty="0" err="1"/>
+                  <a:t>pazarló</a:t>
+                </a:r>
+                <a:endParaRPr lang="en-US" dirty="0"/>
+              </a:p>
+              <a:p>
+                <a:pPr>
+                  <a:buFont typeface="Wingdings" panose="05000000000000000000" pitchFamily="2" charset="2"/>
+                  <a:buChar char="§"/>
+                </a:pPr>
+                <a:r>
+                  <a:rPr lang="en-US" i="1" dirty="0"/>
+                  <a:t>Monte Carlo</a:t>
+                </a:r>
+                <a:r>
+                  <a:rPr lang="en-US" dirty="0"/>
+                  <a:t>: </a:t>
+                </a:r>
+                <a:r>
+                  <a:rPr lang="en-US" dirty="0" err="1"/>
+                  <a:t>mintavételezzük</a:t>
+                </a:r>
+                <a:r>
+                  <a:rPr lang="en-US" dirty="0"/>
+                  <a:t> a </a:t>
+                </a:r>
+                <a:r>
+                  <a:rPr lang="en-US" dirty="0" err="1"/>
+                  <a:t>függvényt</a:t>
+                </a:r>
+                <a:r>
+                  <a:rPr lang="en-US" dirty="0"/>
+                  <a:t> </a:t>
+                </a:r>
+                <a:r>
+                  <a:rPr lang="en-US" dirty="0" err="1"/>
+                  <a:t>véletlenszer</a:t>
+                </a:r>
+                <a:r>
+                  <a:rPr lang="hu-HU" dirty="0"/>
+                  <a:t>ű</a:t>
+                </a:r>
+                <a:r>
+                  <a:rPr lang="en-US" dirty="0" err="1"/>
+                  <a:t>en</a:t>
+                </a:r>
+                <a:r>
+                  <a:rPr lang="en-US" dirty="0"/>
+                  <a:t> (a </a:t>
+                </a:r>
+                <a14:m>
+                  <m:oMath xmlns:m="http://schemas.openxmlformats.org/officeDocument/2006/math">
+                    <m:r>
+                      <a:rPr lang="en-US" b="0" i="1" smtClean="0">
+                        <a:latin typeface="Cambria Math" panose="02040503050406030204" pitchFamily="18" charset="0"/>
+                      </a:rPr>
+                      <m:t>𝐷</m:t>
+                    </m:r>
+                  </m:oMath>
+                </a14:m>
+                <a:r>
+                  <a:rPr lang="en-US" dirty="0"/>
+                  <a:t> </a:t>
+                </a:r>
+                <a:r>
+                  <a:rPr lang="en-US" dirty="0" err="1"/>
+                  <a:t>tartományon</a:t>
+                </a:r>
+                <a:r>
+                  <a:rPr lang="en-US" dirty="0"/>
+                  <a:t>):</a:t>
+                </a:r>
+              </a:p>
+              <a:p>
+                <a:pPr>
+                  <a:lnSpc>
+                    <a:spcPct val="100000"/>
+                  </a:lnSpc>
+                  <a:buFont typeface="Wingdings" panose="05000000000000000000" pitchFamily="2" charset="2"/>
+                  <a:buChar char="§"/>
+                </a:pPr>
+                <a:r>
+                  <a:rPr lang="en-US" dirty="0"/>
+                  <a:t>A </a:t>
+                </a:r>
+                <a:r>
+                  <a:rPr lang="en-US" dirty="0" err="1"/>
+                  <a:t>várható</a:t>
+                </a:r>
+                <a:r>
+                  <a:rPr lang="en-US" dirty="0"/>
+                  <a:t> </a:t>
+                </a:r>
+                <a:r>
+                  <a:rPr lang="en-US" dirty="0" err="1"/>
+                  <a:t>érték</a:t>
+                </a:r>
+                <a:r>
+                  <a:rPr lang="en-US" dirty="0"/>
+                  <a:t> </a:t>
+                </a:r>
+                <a:r>
+                  <a:rPr lang="en-US" dirty="0" err="1"/>
+                  <a:t>más</a:t>
+                </a:r>
+                <a:r>
+                  <a:rPr lang="en-US" dirty="0"/>
+                  <a:t> </a:t>
+                </a:r>
+                <a:r>
+                  <a:rPr lang="en-US" dirty="0" err="1"/>
+                  <a:t>néven</a:t>
+                </a:r>
+                <a:r>
+                  <a:rPr lang="en-US" dirty="0"/>
+                  <a:t> </a:t>
+                </a:r>
+                <a:r>
+                  <a:rPr lang="en-US" dirty="0" err="1"/>
+                  <a:t>átlag</a:t>
+                </a:r>
+                <a:r>
+                  <a:rPr lang="en-US" dirty="0"/>
+                  <a:t>…</a:t>
+                </a:r>
+              </a:p>
+              <a:p>
+                <a:pPr marL="292608" lvl="1" indent="0">
+                  <a:lnSpc>
+                    <a:spcPct val="100000"/>
+                  </a:lnSpc>
+                  <a:buNone/>
+                </a:pPr>
+                <a14:m>
+                  <m:oMathPara xmlns:m="http://schemas.openxmlformats.org/officeDocument/2006/math">
+                    <m:oMathParaPr>
+                      <m:jc m:val="left"/>
+                    </m:oMathParaPr>
+                    <m:oMath xmlns:m="http://schemas.openxmlformats.org/officeDocument/2006/math">
+                      <m:nary>
+                        <m:naryPr>
+                          <m:ctrlPr>
+                            <a:rPr lang="en-US" i="1" smtClean="0">
+                              <a:latin typeface="Cambria Math" panose="02040503050406030204" pitchFamily="18" charset="0"/>
+                            </a:rPr>
+                          </m:ctrlPr>
+                        </m:naryPr>
+                        <m:sub>
+                          <m:r>
+                            <m:rPr>
+                              <m:brk m:alnAt="23"/>
+                            </m:rPr>
+                            <a:rPr lang="en-US" b="0" i="1" smtClean="0">
+                              <a:latin typeface="Cambria Math" panose="02040503050406030204" pitchFamily="18" charset="0"/>
+                            </a:rPr>
+                            <m:t>𝐷</m:t>
+                          </m:r>
+                        </m:sub>
+                        <m:sup>
+                          <m:r>
+                            <a:rPr lang="en-US" b="0" i="1" smtClean="0">
+                              <a:latin typeface="Cambria Math" panose="02040503050406030204" pitchFamily="18" charset="0"/>
+                            </a:rPr>
+                            <m:t> </m:t>
+                          </m:r>
+                        </m:sup>
+                        <m:e>
+                          <m:r>
+                            <a:rPr lang="en-US" b="0" i="1" smtClean="0">
+                              <a:latin typeface="Cambria Math" panose="02040503050406030204" pitchFamily="18" charset="0"/>
+                            </a:rPr>
+                            <m:t>𝑓</m:t>
+                          </m:r>
+                          <m:d>
+                            <m:dPr>
+                              <m:ctrlPr>
+                                <a:rPr lang="en-US" b="0" i="1" smtClean="0">
+                                  <a:latin typeface="Cambria Math" panose="02040503050406030204" pitchFamily="18" charset="0"/>
+                                </a:rPr>
+                              </m:ctrlPr>
+                            </m:dPr>
+                            <m:e>
+                              <m:r>
+                                <a:rPr lang="en-US" b="0" i="1" smtClean="0">
+                                  <a:latin typeface="Cambria Math" panose="02040503050406030204" pitchFamily="18" charset="0"/>
+                                </a:rPr>
+                                <m:t>𝑥</m:t>
+                              </m:r>
+                            </m:e>
+                          </m:d>
+                          <m:r>
+                            <a:rPr lang="en-US" b="0" i="1" smtClean="0">
+                              <a:latin typeface="Cambria Math" panose="02040503050406030204" pitchFamily="18" charset="0"/>
+                            </a:rPr>
+                            <m:t> </m:t>
+                          </m:r>
+                          <m:r>
+                            <a:rPr lang="en-US" b="0" i="1" smtClean="0">
+                              <a:latin typeface="Cambria Math" panose="02040503050406030204" pitchFamily="18" charset="0"/>
+                            </a:rPr>
+                            <m:t>𝑑𝑥</m:t>
+                          </m:r>
+                        </m:e>
+                      </m:nary>
+                      <m:r>
+                        <a:rPr lang="en-US" b="0" i="1" smtClean="0">
+                          <a:latin typeface="Cambria Math" panose="02040503050406030204" pitchFamily="18" charset="0"/>
+                        </a:rPr>
+                        <m:t>≈</m:t>
+                      </m:r>
+                      <m:f>
+                        <m:fPr>
+                          <m:ctrlPr>
+                            <a:rPr lang="en-US" b="0" i="1" smtClean="0">
+                              <a:latin typeface="Cambria Math" panose="02040503050406030204" pitchFamily="18" charset="0"/>
+                            </a:rPr>
+                          </m:ctrlPr>
+                        </m:fPr>
+                        <m:num>
+                          <m:r>
+                            <a:rPr lang="en-US" b="0" i="1" smtClean="0">
+                              <a:latin typeface="Cambria Math" panose="02040503050406030204" pitchFamily="18" charset="0"/>
+                            </a:rPr>
+                            <m:t>1</m:t>
+                          </m:r>
+                        </m:num>
+                        <m:den>
+                          <m:r>
+                            <a:rPr lang="en-US" b="0" i="1" smtClean="0">
+                              <a:latin typeface="Cambria Math" panose="02040503050406030204" pitchFamily="18" charset="0"/>
+                            </a:rPr>
+                            <m:t>𝑁</m:t>
+                          </m:r>
+                        </m:den>
+                      </m:f>
+                      <m:nary>
+                        <m:naryPr>
+                          <m:chr m:val="∑"/>
+                          <m:ctrlPr>
+                            <a:rPr lang="en-US" b="0" i="1" smtClean="0">
+                              <a:latin typeface="Cambria Math" panose="02040503050406030204" pitchFamily="18" charset="0"/>
+                            </a:rPr>
+                          </m:ctrlPr>
+                        </m:naryPr>
+                        <m:sub>
+                          <m:r>
+                            <m:rPr>
+                              <m:brk m:alnAt="23"/>
+                            </m:rPr>
+                            <a:rPr lang="en-US" b="0" i="1" smtClean="0">
+                              <a:latin typeface="Cambria Math" panose="02040503050406030204" pitchFamily="18" charset="0"/>
+                            </a:rPr>
+                            <m:t>𝑘</m:t>
+                          </m:r>
+                          <m:r>
+                            <a:rPr lang="en-US" b="0" i="1" smtClean="0">
+                              <a:latin typeface="Cambria Math" panose="02040503050406030204" pitchFamily="18" charset="0"/>
+                            </a:rPr>
+                            <m:t>=1</m:t>
+                          </m:r>
+                        </m:sub>
+                        <m:sup>
+                          <m:r>
+                            <a:rPr lang="en-US" b="0" i="1" smtClean="0">
+                              <a:latin typeface="Cambria Math" panose="02040503050406030204" pitchFamily="18" charset="0"/>
+                            </a:rPr>
+                            <m:t>𝑁</m:t>
+                          </m:r>
+                        </m:sup>
+                        <m:e>
+                          <m:f>
+                            <m:fPr>
+                              <m:ctrlPr>
+                                <a:rPr lang="en-US" b="0" i="1" smtClean="0">
+                                  <a:latin typeface="Cambria Math" panose="02040503050406030204" pitchFamily="18" charset="0"/>
+                                </a:rPr>
+                              </m:ctrlPr>
+                            </m:fPr>
+                            <m:num>
+                              <m:r>
+                                <a:rPr lang="en-US" b="0" i="1" smtClean="0">
+                                  <a:latin typeface="Cambria Math" panose="02040503050406030204" pitchFamily="18" charset="0"/>
+                                </a:rPr>
+                                <m:t>𝑓</m:t>
+                              </m:r>
+                              <m:r>
+                                <a:rPr lang="en-US" b="0" i="1" smtClean="0">
+                                  <a:latin typeface="Cambria Math" panose="02040503050406030204" pitchFamily="18" charset="0"/>
+                                </a:rPr>
+                                <m:t>(</m:t>
+                              </m:r>
+                              <m:sSub>
+                                <m:sSubPr>
+                                  <m:ctrlPr>
+                                    <a:rPr lang="en-US" b="0" i="1" smtClean="0">
+                                      <a:latin typeface="Cambria Math" panose="02040503050406030204" pitchFamily="18" charset="0"/>
+                                    </a:rPr>
+                                  </m:ctrlPr>
+                                </m:sSubPr>
+                                <m:e>
+                                  <m:r>
+                                    <a:rPr lang="en-US" b="0" i="1" smtClean="0">
+                                      <a:latin typeface="Cambria Math" panose="02040503050406030204" pitchFamily="18" charset="0"/>
+                                    </a:rPr>
+                                    <m:t>𝑥</m:t>
+                                  </m:r>
+                                </m:e>
+                                <m:sub>
+                                  <m:r>
+                                    <a:rPr lang="en-US" b="0" i="1" smtClean="0">
+                                      <a:latin typeface="Cambria Math" panose="02040503050406030204" pitchFamily="18" charset="0"/>
+                                    </a:rPr>
+                                    <m:t>𝑘</m:t>
+                                  </m:r>
+                                </m:sub>
+                              </m:sSub>
+                              <m:r>
+                                <a:rPr lang="en-US" b="0" i="1" smtClean="0">
+                                  <a:latin typeface="Cambria Math" panose="02040503050406030204" pitchFamily="18" charset="0"/>
+                                </a:rPr>
+                                <m:t>)</m:t>
+                              </m:r>
+                            </m:num>
+                            <m:den>
+                              <m:r>
+                                <a:rPr lang="en-US" b="0" i="1" smtClean="0">
+                                  <a:latin typeface="Cambria Math" panose="02040503050406030204" pitchFamily="18" charset="0"/>
+                                </a:rPr>
+                                <m:t>𝑝</m:t>
+                              </m:r>
+                              <m:r>
+                                <a:rPr lang="en-US" b="0" i="1" smtClean="0">
+                                  <a:latin typeface="Cambria Math" panose="02040503050406030204" pitchFamily="18" charset="0"/>
+                                </a:rPr>
+                                <m:t>(</m:t>
+                              </m:r>
+                              <m:sSub>
+                                <m:sSubPr>
+                                  <m:ctrlPr>
+                                    <a:rPr lang="en-US" b="0" i="1" smtClean="0">
+                                      <a:latin typeface="Cambria Math" panose="02040503050406030204" pitchFamily="18" charset="0"/>
+                                    </a:rPr>
+                                  </m:ctrlPr>
+                                </m:sSubPr>
+                                <m:e>
+                                  <m:r>
+                                    <a:rPr lang="en-US" b="0" i="1" smtClean="0">
+                                      <a:latin typeface="Cambria Math" panose="02040503050406030204" pitchFamily="18" charset="0"/>
+                                    </a:rPr>
+                                    <m:t>𝑥</m:t>
+                                  </m:r>
+                                </m:e>
+                                <m:sub>
+                                  <m:r>
+                                    <a:rPr lang="en-US" b="0" i="1" smtClean="0">
+                                      <a:latin typeface="Cambria Math" panose="02040503050406030204" pitchFamily="18" charset="0"/>
+                                    </a:rPr>
+                                    <m:t>𝑘</m:t>
+                                  </m:r>
+                                </m:sub>
+                              </m:sSub>
+                              <m:r>
+                                <a:rPr lang="en-US" b="0" i="1" smtClean="0">
+                                  <a:latin typeface="Cambria Math" panose="02040503050406030204" pitchFamily="18" charset="0"/>
+                                </a:rPr>
+                                <m:t>)</m:t>
+                              </m:r>
+                            </m:den>
+                          </m:f>
+                        </m:e>
+                      </m:nary>
+                    </m:oMath>
+                  </m:oMathPara>
+                </a14:m>
+                <a:endParaRPr lang="en-US" dirty="0"/>
+              </a:p>
+              <a:p>
+                <a:pPr>
+                  <a:buFont typeface="Wingdings" panose="05000000000000000000" pitchFamily="2" charset="2"/>
+                  <a:buChar char="§"/>
+                </a:pPr>
+                <a:r>
+                  <a:rPr lang="en-US" dirty="0" err="1"/>
+                  <a:t>Nem</a:t>
+                </a:r>
+                <a:r>
+                  <a:rPr lang="en-US" dirty="0"/>
+                  <a:t> </a:t>
+                </a:r>
+                <a:r>
+                  <a:rPr lang="en-US" dirty="0" err="1"/>
+                  <a:t>fért</a:t>
+                </a:r>
+                <a:r>
+                  <a:rPr lang="en-US" dirty="0"/>
+                  <a:t> </a:t>
+                </a:r>
+                <a:r>
+                  <a:rPr lang="en-US" dirty="0" err="1"/>
+                  <a:t>ki</a:t>
+                </a:r>
+                <a:r>
+                  <a:rPr lang="en-US" dirty="0"/>
+                  <a:t>, </a:t>
+                </a:r>
+                <a:r>
+                  <a:rPr lang="en-US" dirty="0" err="1"/>
+                  <a:t>úgyhogy</a:t>
+                </a:r>
+                <a:r>
+                  <a:rPr lang="en-US" dirty="0"/>
+                  <a:t> a </a:t>
+                </a:r>
+                <a:r>
+                  <a:rPr lang="en-US" dirty="0" err="1"/>
+                  <a:t>lényeget</a:t>
+                </a:r>
+                <a:r>
+                  <a:rPr lang="en-US" dirty="0"/>
+                  <a:t> </a:t>
+                </a:r>
+                <a:r>
+                  <a:rPr lang="en-US" dirty="0" err="1"/>
+                  <a:t>írtam</a:t>
+                </a:r>
+                <a:r>
+                  <a:rPr lang="en-US" dirty="0"/>
+                  <a:t> </a:t>
+                </a:r>
+                <a:r>
+                  <a:rPr lang="en-US" dirty="0">
+                    <a:sym typeface="Wingdings" panose="05000000000000000000" pitchFamily="2" charset="2"/>
+                  </a:rPr>
+                  <a:t></a:t>
+                </a:r>
+              </a:p>
+              <a:p>
+                <a:pPr>
+                  <a:buFont typeface="Wingdings" panose="05000000000000000000" pitchFamily="2" charset="2"/>
+                  <a:buChar char="§"/>
+                </a:pPr>
+                <a:r>
+                  <a:rPr lang="en-US" dirty="0">
+                    <a:sym typeface="Wingdings" panose="05000000000000000000" pitchFamily="2" charset="2"/>
+                  </a:rPr>
+                  <a:t>A </a:t>
+                </a:r>
+                <a:r>
+                  <a:rPr lang="en-US" dirty="0" err="1">
+                    <a:sym typeface="Wingdings" panose="05000000000000000000" pitchFamily="2" charset="2"/>
+                  </a:rPr>
+                  <a:t>lényeg</a:t>
+                </a:r>
+                <a:r>
+                  <a:rPr lang="en-US" dirty="0">
+                    <a:sym typeface="Wingdings" panose="05000000000000000000" pitchFamily="2" charset="2"/>
+                  </a:rPr>
+                  <a:t>, </a:t>
+                </a:r>
+                <a:r>
+                  <a:rPr lang="en-US" dirty="0" err="1">
+                    <a:sym typeface="Wingdings" panose="05000000000000000000" pitchFamily="2" charset="2"/>
+                  </a:rPr>
+                  <a:t>hogy</a:t>
+                </a:r>
+                <a:r>
+                  <a:rPr lang="en-US" dirty="0">
+                    <a:sym typeface="Wingdings" panose="05000000000000000000" pitchFamily="2" charset="2"/>
+                  </a:rPr>
+                  <a:t> a </a:t>
+                </a:r>
+                <a:r>
+                  <a:rPr lang="en-US" i="1" dirty="0">
+                    <a:sym typeface="Wingdings" panose="05000000000000000000" pitchFamily="2" charset="2"/>
+                  </a:rPr>
+                  <a:t>PDF</a:t>
+                </a:r>
+                <a:r>
+                  <a:rPr lang="en-US" dirty="0">
+                    <a:sym typeface="Wingdings" panose="05000000000000000000" pitchFamily="2" charset="2"/>
+                  </a:rPr>
+                  <a:t> </a:t>
+                </a:r>
+                <a14:m>
+                  <m:oMath xmlns:m="http://schemas.openxmlformats.org/officeDocument/2006/math">
+                    <m:r>
+                      <a:rPr lang="en-US" b="0" i="1" smtClean="0">
+                        <a:latin typeface="Cambria Math" panose="02040503050406030204" pitchFamily="18" charset="0"/>
+                        <a:sym typeface="Wingdings" panose="05000000000000000000" pitchFamily="2" charset="2"/>
+                      </a:rPr>
+                      <m:t>1</m:t>
+                    </m:r>
+                  </m:oMath>
+                </a14:m>
+                <a:r>
+                  <a:rPr lang="en-US" dirty="0">
+                    <a:sym typeface="Wingdings" panose="05000000000000000000" pitchFamily="2" charset="2"/>
+                  </a:rPr>
+                  <a:t>-hez </a:t>
+                </a:r>
+                <a:r>
+                  <a:rPr lang="en-US" dirty="0" err="1">
+                    <a:sym typeface="Wingdings" panose="05000000000000000000" pitchFamily="2" charset="2"/>
+                  </a:rPr>
+                  <a:t>integrál</a:t>
+                </a:r>
+                <a:r>
+                  <a:rPr lang="en-US" dirty="0">
+                    <a:sym typeface="Wingdings" panose="05000000000000000000" pitchFamily="2" charset="2"/>
+                  </a:rPr>
+                  <a:t> </a:t>
+                </a:r>
+                <a14:m>
+                  <m:oMath xmlns:m="http://schemas.openxmlformats.org/officeDocument/2006/math">
+                    <m:r>
+                      <a:rPr lang="en-US" b="0" i="1" smtClean="0">
+                        <a:latin typeface="Cambria Math" panose="02040503050406030204" pitchFamily="18" charset="0"/>
+                        <a:sym typeface="Wingdings" panose="05000000000000000000" pitchFamily="2" charset="2"/>
+                      </a:rPr>
+                      <m:t>𝐷</m:t>
+                    </m:r>
+                  </m:oMath>
+                </a14:m>
+                <a:r>
+                  <a:rPr lang="en-US" dirty="0">
+                    <a:sym typeface="Wingdings" panose="05000000000000000000" pitchFamily="2" charset="2"/>
+                  </a:rPr>
+                  <a:t>-n</a:t>
+                </a:r>
+              </a:p>
+              <a:p>
+                <a:pPr>
+                  <a:buFont typeface="Wingdings" panose="05000000000000000000" pitchFamily="2" charset="2"/>
+                  <a:buChar char="§"/>
+                </a:pPr>
+                <a:r>
+                  <a:rPr lang="en-US" b="1" dirty="0" err="1">
+                    <a:sym typeface="Wingdings" panose="05000000000000000000" pitchFamily="2" charset="2"/>
+                  </a:rPr>
+                  <a:t>Protip</a:t>
+                </a:r>
+                <a:r>
+                  <a:rPr lang="en-US" b="1" dirty="0">
+                    <a:sym typeface="Wingdings" panose="05000000000000000000" pitchFamily="2" charset="2"/>
+                  </a:rPr>
+                  <a:t>:</a:t>
+                </a:r>
+                <a:r>
+                  <a:rPr lang="en-US" dirty="0">
+                    <a:sym typeface="Wingdings" panose="05000000000000000000" pitchFamily="2" charset="2"/>
+                  </a:rPr>
+                  <a:t> </a:t>
+                </a:r>
+                <a:r>
+                  <a:rPr lang="en-US" dirty="0" err="1">
+                    <a:sym typeface="Wingdings" panose="05000000000000000000" pitchFamily="2" charset="2"/>
+                  </a:rPr>
+                  <a:t>olvasd</a:t>
+                </a:r>
+                <a:r>
+                  <a:rPr lang="en-US" dirty="0">
+                    <a:sym typeface="Wingdings" panose="05000000000000000000" pitchFamily="2" charset="2"/>
+                  </a:rPr>
+                  <a:t> el </a:t>
+                </a:r>
+                <a:r>
+                  <a:rPr lang="en-US" dirty="0" err="1">
+                    <a:sym typeface="Wingdings" panose="05000000000000000000" pitchFamily="2" charset="2"/>
+                  </a:rPr>
+                  <a:t>inkább</a:t>
+                </a:r>
+                <a:r>
+                  <a:rPr lang="en-US" dirty="0">
+                    <a:sym typeface="Wingdings" panose="05000000000000000000" pitchFamily="2" charset="2"/>
+                  </a:rPr>
+                  <a:t> </a:t>
+                </a:r>
+                <a:r>
+                  <a:rPr lang="en-US" dirty="0" err="1">
+                    <a:sym typeface="Wingdings" panose="05000000000000000000" pitchFamily="2" charset="2"/>
+                    <a:hlinkClick r:id="rId3"/>
+                  </a:rPr>
+                  <a:t>ezt</a:t>
+                </a:r>
+                <a:r>
+                  <a:rPr lang="en-US" dirty="0">
+                    <a:sym typeface="Wingdings" panose="05000000000000000000" pitchFamily="2" charset="2"/>
+                  </a:rPr>
+                  <a:t>…</a:t>
+                </a:r>
+              </a:p>
+            </p:txBody>
+          </p:sp>
+        </mc:Choice>
+        <mc:Fallback>
+          <p:sp>
+            <p:nvSpPr>
+              <p:cNvPr id="3" name="Content Placeholder 2">
+                <a:extLst>
+                  <a:ext uri="{FF2B5EF4-FFF2-40B4-BE49-F238E27FC236}">
+                    <a16:creationId xmlns:a16="http://schemas.microsoft.com/office/drawing/2014/main" id="{EAB8BE3C-FABB-4543-947B-4C77DD3F5F55}"/>
+                  </a:ext>
+                </a:extLst>
+              </p:cNvPr>
+              <p:cNvSpPr>
+                <a:spLocks noGrp="1" noRot="1" noChangeAspect="1" noMove="1" noResize="1" noEditPoints="1" noAdjustHandles="1" noChangeArrowheads="1" noChangeShapeType="1" noTextEdit="1"/>
+              </p:cNvSpPr>
+              <p:nvPr>
+                <p:ph idx="1"/>
+              </p:nvPr>
+            </p:nvSpPr>
+            <p:spPr>
+              <a:blipFill>
+                <a:blip r:embed="rId4"/>
+                <a:stretch>
+                  <a:fillRect l="-1455" t="-1667" b="-455"/>
+                </a:stretch>
+              </a:blipFill>
+            </p:spPr>
+            <p:txBody>
+              <a:bodyPr/>
+              <a:lstStyle/>
+              <a:p>
+                <a:r>
+                  <a:rPr lang="hu-HU">
+                    <a:noFill/>
+                  </a:rPr>
+                  <a:t> </a:t>
+                </a:r>
+              </a:p>
+            </p:txBody>
+          </p:sp>
+        </mc:Fallback>
+      </mc:AlternateContent>
+      <p:pic>
+        <p:nvPicPr>
+          <p:cNvPr id="5" name="Picture 4">
+            <a:extLst>
+              <a:ext uri="{FF2B5EF4-FFF2-40B4-BE49-F238E27FC236}">
+                <a16:creationId xmlns:a16="http://schemas.microsoft.com/office/drawing/2014/main" id="{372F46E7-6C6E-4401-AED0-99BC0EB61D1A}"/>
+              </a:ext>
+            </a:extLst>
+          </p:cNvPr>
+          <p:cNvPicPr>
+            <a:picLocks noChangeAspect="1"/>
+          </p:cNvPicPr>
+          <p:nvPr/>
+        </p:nvPicPr>
+        <p:blipFill>
+          <a:blip r:embed="rId5">
+            <a:extLst>
+              <a:ext uri="{28A0092B-C50C-407E-A947-70E740481C1C}">
+                <a14:useLocalDpi xmlns:a14="http://schemas.microsoft.com/office/drawing/2010/main" val="0"/>
+              </a:ext>
+            </a:extLst>
+          </a:blip>
+          <a:stretch>
+            <a:fillRect/>
+          </a:stretch>
+        </p:blipFill>
+        <p:spPr>
+          <a:xfrm>
+            <a:off x="5649850" y="3256705"/>
+            <a:ext cx="5741261" cy="3242123"/>
+          </a:xfrm>
+          <a:prstGeom prst="rect">
+            <a:avLst/>
+          </a:prstGeom>
+          <a:ln>
+            <a:solidFill>
+              <a:schemeClr val="accent1"/>
+            </a:solidFill>
+          </a:ln>
+          <a:effectLst>
+            <a:softEdge rad="0"/>
+          </a:effectLst>
+        </p:spPr>
+      </p:pic>
+    </p:spTree>
+    <p:extLst>
+      <p:ext uri="{BB962C8B-B14F-4D97-AF65-F5344CB8AC3E}">
+        <p14:creationId xmlns:p14="http://schemas.microsoft.com/office/powerpoint/2010/main" val="288118198"/>
+      </p:ext>
+    </p:extLst>
+  </p:cSld>
+  <p:clrMapOvr>
+    <a:masterClrMapping/>
+  </p:clrMapOvr>
+</p:sld>
+</file>
+
+<file path=ppt/slides/slide6.xml><?xml version="1.0" encoding="utf-8"?>
 <p:sld xmlns:a="http://schemas.openxmlformats.org/drawingml/2006/main" xmlns:r="http://schemas.openxmlformats.org/officeDocument/2006/relationships" xmlns:p="http://schemas.openxmlformats.org/presentationml/2006/main">
   <p:cSld>
     <p:spTree>
@@ -5695,7 +8053,7 @@
             </a:r>
             <a:r>
               <a:rPr lang="en-US" dirty="0" err="1"/>
-              <a:t>előzetes</a:t>
+              <a:t>alapok</a:t>
             </a:r>
             <a:endParaRPr lang="hu-HU" dirty="0"/>
           </a:p>
@@ -5721,7 +8079,9 @@
             </p:nvSpPr>
             <p:spPr/>
             <p:txBody>
-              <a:bodyPr/>
+              <a:bodyPr>
+                <a:normAutofit/>
+              </a:bodyPr>
               <a:lstStyle/>
               <a:p>
                 <a:pPr>
@@ -6253,7 +8613,7 @@
                 </a:r>
                 <a:r>
                   <a:rPr lang="en-US" dirty="0"/>
-                  <a:t> maximum 5 </a:t>
+                  <a:t> 5-6 </a:t>
                 </a:r>
                 <a:r>
                   <a:rPr lang="en-US" dirty="0" err="1"/>
@@ -6312,11 +8672,44 @@
                 </a:r>
                 <a:r>
                   <a:rPr lang="en-US" dirty="0" err="1"/>
-                  <a:t>stratégiákkal</a:t>
-                </a:r>
-                <a:r>
-                  <a:rPr lang="en-US" dirty="0"/>
-                  <a:t> </a:t>
+                  <a:t>stratégiával</a:t>
+                </a:r>
+                <a:r>
+                  <a:rPr lang="en-US" dirty="0"/>
+                  <a:t> (ügyes </a:t>
+                </a:r>
+                <a14:m>
+                  <m:oMath xmlns:m="http://schemas.openxmlformats.org/officeDocument/2006/math">
+                    <m:sSub>
+                      <m:sSubPr>
+                        <m:ctrlPr>
+                          <a:rPr lang="en-US" b="0" i="1" smtClean="0">
+                            <a:latin typeface="Cambria Math" panose="02040503050406030204" pitchFamily="18" charset="0"/>
+                          </a:rPr>
+                        </m:ctrlPr>
+                      </m:sSubPr>
+                      <m:e>
+                        <m:r>
+                          <a:rPr lang="en-US" b="0" i="1" smtClean="0">
+                            <a:latin typeface="Cambria Math" panose="02040503050406030204" pitchFamily="18" charset="0"/>
+                          </a:rPr>
+                          <m:t>𝑝</m:t>
+                        </m:r>
+                      </m:e>
+                      <m:sub>
+                        <m:r>
+                          <a:rPr lang="en-US" b="0" i="1" smtClean="0">
+                            <a:latin typeface="Cambria Math" panose="02040503050406030204" pitchFamily="18" charset="0"/>
+                          </a:rPr>
+                          <m:t>𝑟</m:t>
+                        </m:r>
+                      </m:sub>
+                    </m:sSub>
+                  </m:oMath>
+                </a14:m>
+                <a:r>
+                  <a:rPr lang="en-US" dirty="0"/>
+                  <a:t>-el) </a:t>
                 </a:r>
                 <a:r>
                   <a:rPr lang="en-US" dirty="0" err="1"/>
@@ -6536,7 +8929,7 @@
 </p:sld>
 </file>
 
-<file path=ppt/slides/slide5.xml><?xml version="1.0" encoding="utf-8"?>
+<file path=ppt/slides/slide7.xml><?xml version="1.0" encoding="utf-8"?>
 <p:sld xmlns:a="http://schemas.openxmlformats.org/drawingml/2006/main" xmlns:r="http://schemas.openxmlformats.org/officeDocument/2006/relationships" xmlns:p="http://schemas.openxmlformats.org/presentationml/2006/main">
   <p:cSld>
     <p:spTree>
@@ -6558,7 +8951,7 @@
           <p:cNvPr id="2" name="Title 1">
             <a:extLst>
               <a:ext uri="{FF2B5EF4-FFF2-40B4-BE49-F238E27FC236}">
-                <a16:creationId xmlns:a16="http://schemas.microsoft.com/office/drawing/2014/main" id="{CE2A3218-D1FC-48F8-ADC6-9E05E8DEED01}"/>
+                <a16:creationId xmlns:a16="http://schemas.microsoft.com/office/drawing/2014/main" id="{0532C10F-925F-4F27-9DD8-0FBD1828C405}"/>
               </a:ext>
             </a:extLst>
           </p:cNvPr>
@@ -6575,12 +8968,32 @@
           <a:lstStyle/>
           <a:p>
             <a:r>
+              <a:rPr lang="en-US" dirty="0" err="1"/>
+              <a:t>Naiv</a:t>
+            </a:r>
+            <a:r>
               <a:rPr lang="en-US" dirty="0"/>
-              <a:t>Monte Carlo </a:t>
+              <a:t> </a:t>
             </a:r>
             <a:r>
               <a:rPr lang="en-US" dirty="0" err="1"/>
-              <a:t>integrálás</a:t>
+              <a:t>megoldás</a:t>
+            </a:r>
+            <a:r>
+              <a:rPr lang="en-US" dirty="0"/>
+              <a:t>: </a:t>
+            </a:r>
+            <a:r>
+              <a:rPr lang="en-US" dirty="0" err="1"/>
+              <a:t>egyenletes</a:t>
+            </a:r>
+            <a:r>
+              <a:rPr lang="en-US" dirty="0"/>
+              <a:t> </a:t>
+            </a:r>
+            <a:r>
+              <a:rPr lang="en-US" dirty="0" err="1"/>
+              <a:t>eloszlás</a:t>
             </a:r>
             <a:endParaRPr lang="hu-HU" dirty="0"/>
           </a:p>
@@ -6591,7 +9004,7 @@
           <p:cNvPr id="3" name="Content Placeholder 2">
             <a:extLst>
               <a:ext uri="{FF2B5EF4-FFF2-40B4-BE49-F238E27FC236}">
-                <a16:creationId xmlns:a16="http://schemas.microsoft.com/office/drawing/2014/main" id="{EAB8BE3C-FABB-4543-947B-4C77DD3F5F55}"/>
+                <a16:creationId xmlns:a16="http://schemas.microsoft.com/office/drawing/2014/main" id="{ED685A00-6D27-428D-92D6-22F3815E6F1F}"/>
               </a:ext>
             </a:extLst>
           </p:cNvPr>
@@ -6607,14 +9020,14 @@
           <a:bodyPr/>
           <a:lstStyle/>
           <a:p>
-            <a:endParaRPr lang="hu-HU"/>
+            <a:endParaRPr lang="hu-HU" dirty="0"/>
           </a:p>
         </p:txBody>
       </p:sp>
     </p:spTree>
     <p:extLst>
       <p:ext uri="{BB962C8B-B14F-4D97-AF65-F5344CB8AC3E}">
-        <p14:creationId xmlns:p14="http://schemas.microsoft.com/office/powerpoint/2010/main" val="288118198"/>
+        <p14:creationId xmlns:p14="http://schemas.microsoft.com/office/powerpoint/2010/main" val="703572572"/>
       </p:ext>
     </p:extLst>
   </p:cSld>

</xml_diff>

<commit_message>
path tracing prez 3
</commit_message>
<xml_diff>
--- a/PBR_EA_02.pptx
+++ b/PBR_EA_02.pptx
@@ -5,7 +5,7 @@
     <p:sldMasterId id="2147483767" r:id="rId1"/>
   </p:sldMasterIdLst>
   <p:notesMasterIdLst>
-    <p:notesMasterId r:id="rId9"/>
+    <p:notesMasterId r:id="rId11"/>
   </p:notesMasterIdLst>
   <p:sldIdLst>
     <p:sldId id="256" r:id="rId2"/>
@@ -14,7 +14,9 @@
     <p:sldId id="259" r:id="rId5"/>
     <p:sldId id="260" r:id="rId6"/>
     <p:sldId id="258" r:id="rId7"/>
-    <p:sldId id="262" r:id="rId8"/>
+    <p:sldId id="263" r:id="rId8"/>
+    <p:sldId id="262" r:id="rId9"/>
+    <p:sldId id="264" r:id="rId10"/>
   </p:sldIdLst>
   <p:sldSz cx="12192000" cy="6858000"/>
   <p:notesSz cx="6858000" cy="9144000"/>
@@ -207,7 +209,7 @@
           <a:p>
             <a:fld id="{3A5A56FF-9D9E-417E-8DB7-17CB8EBF566C}" type="datetimeFigureOut">
               <a:rPr lang="hu-HU" smtClean="0"/>
-              <a:t>2018. 03. 12.</a:t>
+              <a:t>2018. 03. 14.</a:t>
             </a:fld>
             <a:endParaRPr lang="hu-HU"/>
           </a:p>
@@ -845,7 +847,7 @@
           <a:p>
             <a:fld id="{EE90FBA0-FEE2-473A-A4B4-051DFD2DB1BD}" type="datetimeFigureOut">
               <a:rPr lang="en-US" smtClean="0"/>
-              <a:t>3/12/2018</a:t>
+              <a:t>3/14/2018</a:t>
             </a:fld>
             <a:endParaRPr lang="en-US"/>
           </a:p>
@@ -1053,7 +1055,7 @@
           <a:p>
             <a:fld id="{EE90FBA0-FEE2-473A-A4B4-051DFD2DB1BD}" type="datetimeFigureOut">
               <a:rPr lang="en-US" smtClean="0"/>
-              <a:t>3/12/2018</a:t>
+              <a:t>3/14/2018</a:t>
             </a:fld>
             <a:endParaRPr lang="en-US"/>
           </a:p>
@@ -1309,7 +1311,7 @@
           <a:p>
             <a:fld id="{EE90FBA0-FEE2-473A-A4B4-051DFD2DB1BD}" type="datetimeFigureOut">
               <a:rPr lang="en-US" smtClean="0"/>
-              <a:t>3/12/2018</a:t>
+              <a:t>3/14/2018</a:t>
             </a:fld>
             <a:endParaRPr lang="en-US"/>
           </a:p>
@@ -1483,7 +1485,7 @@
           <a:p>
             <a:fld id="{EE90FBA0-FEE2-473A-A4B4-051DFD2DB1BD}" type="datetimeFigureOut">
               <a:rPr lang="en-US" smtClean="0"/>
-              <a:t>3/12/2018</a:t>
+              <a:t>3/14/2018</a:t>
             </a:fld>
             <a:endParaRPr lang="en-US"/>
           </a:p>
@@ -1826,7 +1828,7 @@
           <a:p>
             <a:fld id="{EE90FBA0-FEE2-473A-A4B4-051DFD2DB1BD}" type="datetimeFigureOut">
               <a:rPr lang="en-US" smtClean="0"/>
-              <a:t>3/12/2018</a:t>
+              <a:t>3/14/2018</a:t>
             </a:fld>
             <a:endParaRPr lang="en-US"/>
           </a:p>
@@ -2101,7 +2103,7 @@
           <a:p>
             <a:fld id="{EE90FBA0-FEE2-473A-A4B4-051DFD2DB1BD}" type="datetimeFigureOut">
               <a:rPr lang="en-US" smtClean="0"/>
-              <a:t>3/12/2018</a:t>
+              <a:t>3/14/2018</a:t>
             </a:fld>
             <a:endParaRPr lang="en-US"/>
           </a:p>
@@ -2480,7 +2482,7 @@
           <a:p>
             <a:fld id="{EE90FBA0-FEE2-473A-A4B4-051DFD2DB1BD}" type="datetimeFigureOut">
               <a:rPr lang="en-US" smtClean="0"/>
-              <a:t>3/12/2018</a:t>
+              <a:t>3/14/2018</a:t>
             </a:fld>
             <a:endParaRPr lang="en-US"/>
           </a:p>
@@ -2598,7 +2600,7 @@
           <a:p>
             <a:fld id="{EE90FBA0-FEE2-473A-A4B4-051DFD2DB1BD}" type="datetimeFigureOut">
               <a:rPr lang="en-US" smtClean="0"/>
-              <a:t>3/12/2018</a:t>
+              <a:t>3/14/2018</a:t>
             </a:fld>
             <a:endParaRPr lang="en-US"/>
           </a:p>
@@ -2769,7 +2771,7 @@
           <a:p>
             <a:fld id="{EE90FBA0-FEE2-473A-A4B4-051DFD2DB1BD}" type="datetimeFigureOut">
               <a:rPr lang="en-US" smtClean="0"/>
-              <a:t>3/12/2018</a:t>
+              <a:t>3/14/2018</a:t>
             </a:fld>
             <a:endParaRPr lang="en-US"/>
           </a:p>
@@ -3123,7 +3125,7 @@
           <a:p>
             <a:fld id="{EE90FBA0-FEE2-473A-A4B4-051DFD2DB1BD}" type="datetimeFigureOut">
               <a:rPr lang="en-US" smtClean="0"/>
-              <a:t>3/12/2018</a:t>
+              <a:t>3/14/2018</a:t>
             </a:fld>
             <a:endParaRPr lang="en-US"/>
           </a:p>
@@ -3505,7 +3507,7 @@
           <a:p>
             <a:fld id="{EE90FBA0-FEE2-473A-A4B4-051DFD2DB1BD}" type="datetimeFigureOut">
               <a:rPr lang="en-US" smtClean="0"/>
-              <a:t>3/12/2018</a:t>
+              <a:t>3/14/2018</a:t>
             </a:fld>
             <a:endParaRPr lang="en-US"/>
           </a:p>
@@ -3792,7 +3794,7 @@
           <a:p>
             <a:fld id="{EE90FBA0-FEE2-473A-A4B4-051DFD2DB1BD}" type="datetimeFigureOut">
               <a:rPr lang="en-US" smtClean="0"/>
-              <a:t>3/12/2018</a:t>
+              <a:t>3/14/2018</a:t>
             </a:fld>
             <a:endParaRPr lang="en-US"/>
           </a:p>
@@ -4485,8 +4487,8 @@
           </a:p>
         </p:txBody>
       </p:sp>
-      <mc:AlternateContent xmlns:mc="http://schemas.openxmlformats.org/markup-compatibility/2006" xmlns:a14="http://schemas.microsoft.com/office/drawing/2010/main">
-        <mc:Choice Requires="a14">
+      <mc:AlternateContent xmlns:mc="http://schemas.openxmlformats.org/markup-compatibility/2006">
+        <mc:Choice xmlns:a14="http://schemas.microsoft.com/office/drawing/2010/main" Requires="a14">
           <p:sp>
             <p:nvSpPr>
               <p:cNvPr id="3" name="Content Placeholder 2">
@@ -5582,7 +5584,7 @@
             </p:txBody>
           </p:sp>
         </mc:Choice>
-        <mc:Fallback xmlns="">
+        <mc:Fallback>
           <p:sp>
             <p:nvSpPr>
               <p:cNvPr id="3" name="Content Placeholder 2">
@@ -5695,7 +5697,7 @@
             </a:r>
             <a:r>
               <a:rPr lang="en-US" dirty="0"/>
-              <a:t>-ben</a:t>
+              <a:t>-ben:</a:t>
             </a:r>
             <a:endParaRPr lang="hu-HU" dirty="0"/>
           </a:p>
@@ -7122,8 +7124,8 @@
           </a:p>
         </p:txBody>
       </p:sp>
-      <mc:AlternateContent xmlns:mc="http://schemas.openxmlformats.org/markup-compatibility/2006">
-        <mc:Choice xmlns:a14="http://schemas.microsoft.com/office/drawing/2010/main" Requires="a14">
+      <mc:AlternateContent xmlns:mc="http://schemas.openxmlformats.org/markup-compatibility/2006" xmlns:a14="http://schemas.microsoft.com/office/drawing/2010/main">
+        <mc:Choice Requires="a14">
           <p:sp>
             <p:nvSpPr>
               <p:cNvPr id="3" name="Content Placeholder 2">
@@ -7912,7 +7914,7 @@
             </p:txBody>
           </p:sp>
         </mc:Choice>
-        <mc:Fallback>
+        <mc:Fallback xmlns="">
           <p:sp>
             <p:nvSpPr>
               <p:cNvPr id="3" name="Content Placeholder 2">
@@ -8550,7 +8552,7 @@
                 </a:r>
                 <a:r>
                   <a:rPr lang="en-US" dirty="0" err="1"/>
-                  <a:t>ség</a:t>
+                  <a:t>ségek</a:t>
                 </a:r>
                 <a:r>
                   <a:rPr lang="en-US" dirty="0"/>
@@ -8951,6 +8953,116 @@
           <p:cNvPr id="2" name="Title 1">
             <a:extLst>
               <a:ext uri="{FF2B5EF4-FFF2-40B4-BE49-F238E27FC236}">
+                <a16:creationId xmlns:a16="http://schemas.microsoft.com/office/drawing/2014/main" id="{969F63CA-8CB5-4ECC-BA92-A6F44E2D16ED}"/>
+              </a:ext>
+            </a:extLst>
+          </p:cNvPr>
+          <p:cNvSpPr>
+            <a:spLocks noGrp="1"/>
+          </p:cNvSpPr>
+          <p:nvPr>
+            <p:ph type="title"/>
+          </p:nvPr>
+        </p:nvSpPr>
+        <p:spPr/>
+        <p:txBody>
+          <a:bodyPr/>
+          <a:lstStyle/>
+          <a:p>
+            <a:r>
+              <a:rPr lang="en-US" dirty="0" err="1"/>
+              <a:t>Ezt</a:t>
+            </a:r>
+            <a:r>
+              <a:rPr lang="en-US" dirty="0"/>
+              <a:t> </a:t>
+            </a:r>
+            <a:r>
+              <a:rPr lang="en-US" dirty="0" err="1"/>
+              <a:t>fogjuk</a:t>
+            </a:r>
+            <a:r>
+              <a:rPr lang="en-US" dirty="0"/>
+              <a:t> ma </a:t>
+            </a:r>
+            <a:r>
+              <a:rPr lang="en-US" dirty="0" err="1"/>
+              <a:t>megtanulni</a:t>
+            </a:r>
+            <a:endParaRPr lang="hu-HU" dirty="0"/>
+          </a:p>
+        </p:txBody>
+      </p:sp>
+      <p:pic>
+        <p:nvPicPr>
+          <p:cNvPr id="5" name="Content Placeholder 4">
+            <a:extLst>
+              <a:ext uri="{FF2B5EF4-FFF2-40B4-BE49-F238E27FC236}">
+                <a16:creationId xmlns:a16="http://schemas.microsoft.com/office/drawing/2014/main" id="{D9618C96-409D-4402-A9ED-D4F3AC1B52AF}"/>
+              </a:ext>
+            </a:extLst>
+          </p:cNvPr>
+          <p:cNvPicPr>
+            <a:picLocks noGrp="1" noChangeAspect="1"/>
+          </p:cNvPicPr>
+          <p:nvPr>
+            <p:ph idx="1"/>
+          </p:nvPr>
+        </p:nvPicPr>
+        <p:blipFill>
+          <a:blip r:embed="rId2">
+            <a:extLst>
+              <a:ext uri="{28A0092B-C50C-407E-A947-70E740481C1C}">
+                <a14:useLocalDpi xmlns:a14="http://schemas.microsoft.com/office/drawing/2010/main" val="0"/>
+              </a:ext>
+            </a:extLst>
+          </a:blip>
+          <a:stretch>
+            <a:fillRect/>
+          </a:stretch>
+        </p:blipFill>
+        <p:spPr>
+          <a:xfrm>
+            <a:off x="1096963" y="1881868"/>
+            <a:ext cx="10058400" cy="3951514"/>
+          </a:xfrm>
+        </p:spPr>
+      </p:pic>
+    </p:spTree>
+    <p:extLst>
+      <p:ext uri="{BB962C8B-B14F-4D97-AF65-F5344CB8AC3E}">
+        <p14:creationId xmlns:p14="http://schemas.microsoft.com/office/powerpoint/2010/main" val="2981647433"/>
+      </p:ext>
+    </p:extLst>
+  </p:cSld>
+  <p:clrMapOvr>
+    <a:masterClrMapping/>
+  </p:clrMapOvr>
+</p:sld>
+</file>
+
+<file path=ppt/slides/slide8.xml><?xml version="1.0" encoding="utf-8"?>
+<p:sld xmlns:a="http://schemas.openxmlformats.org/drawingml/2006/main" xmlns:r="http://schemas.openxmlformats.org/officeDocument/2006/relationships" xmlns:p="http://schemas.openxmlformats.org/presentationml/2006/main">
+  <p:cSld>
+    <p:spTree>
+      <p:nvGrpSpPr>
+        <p:cNvPr id="1" name=""/>
+        <p:cNvGrpSpPr/>
+        <p:nvPr/>
+      </p:nvGrpSpPr>
+      <p:grpSpPr>
+        <a:xfrm>
+          <a:off x="0" y="0"/>
+          <a:ext cx="0" cy="0"/>
+          <a:chOff x="0" y="0"/>
+          <a:chExt cx="0" cy="0"/>
+        </a:xfrm>
+      </p:grpSpPr>
+      <p:sp>
+        <p:nvSpPr>
+          <p:cNvPr id="2" name="Title 1">
+            <a:extLst>
+              <a:ext uri="{FF2B5EF4-FFF2-40B4-BE49-F238E27FC236}">
                 <a16:creationId xmlns:a16="http://schemas.microsoft.com/office/drawing/2014/main" id="{0532C10F-925F-4F27-9DD8-0FBD1828C405}"/>
               </a:ext>
             </a:extLst>
@@ -8973,38 +9085,669 @@
             </a:r>
             <a:r>
               <a:rPr lang="en-US" dirty="0"/>
-              <a:t> </a:t>
+              <a:t> Monte Carlo </a:t>
             </a:r>
             <a:r>
               <a:rPr lang="en-US" dirty="0" err="1"/>
-              <a:t>megoldás</a:t>
-            </a:r>
-            <a:r>
-              <a:rPr lang="en-US" dirty="0"/>
-              <a:t>: </a:t>
-            </a:r>
-            <a:r>
-              <a:rPr lang="en-US" dirty="0" err="1"/>
-              <a:t>egyenletes</a:t>
-            </a:r>
-            <a:r>
-              <a:rPr lang="en-US" dirty="0"/>
-              <a:t> </a:t>
-            </a:r>
-            <a:r>
-              <a:rPr lang="en-US" dirty="0" err="1"/>
-              <a:t>eloszlás</a:t>
+              <a:t>integrálás</a:t>
             </a:r>
             <a:endParaRPr lang="hu-HU" dirty="0"/>
           </a:p>
         </p:txBody>
       </p:sp>
+      <mc:AlternateContent xmlns:mc="http://schemas.openxmlformats.org/markup-compatibility/2006">
+        <mc:Choice xmlns:a14="http://schemas.microsoft.com/office/drawing/2010/main" Requires="a14">
+          <p:sp>
+            <p:nvSpPr>
+              <p:cNvPr id="3" name="Content Placeholder 2">
+                <a:extLst>
+                  <a:ext uri="{FF2B5EF4-FFF2-40B4-BE49-F238E27FC236}">
+                    <a16:creationId xmlns:a16="http://schemas.microsoft.com/office/drawing/2014/main" id="{ED685A00-6D27-428D-92D6-22F3815E6F1F}"/>
+                  </a:ext>
+                </a:extLst>
+              </p:cNvPr>
+              <p:cNvSpPr>
+                <a:spLocks noGrp="1"/>
+              </p:cNvSpPr>
+              <p:nvPr>
+                <p:ph idx="1"/>
+              </p:nvPr>
+            </p:nvSpPr>
+            <p:spPr/>
+            <p:txBody>
+              <a:bodyPr/>
+              <a:lstStyle/>
+              <a:p>
+                <a:pPr>
+                  <a:buFont typeface="Wingdings" panose="05000000000000000000" pitchFamily="2" charset="2"/>
+                  <a:buChar char="§"/>
+                </a:pPr>
+                <a:r>
+                  <a:rPr lang="en-US" dirty="0"/>
+                  <a:t>Térjünk </a:t>
+                </a:r>
+                <a:r>
+                  <a:rPr lang="en-US" dirty="0" err="1"/>
+                  <a:t>vissza</a:t>
+                </a:r>
+                <a:r>
+                  <a:rPr lang="en-US" dirty="0"/>
+                  <a:t> a </a:t>
+                </a:r>
+                <a:r>
+                  <a:rPr lang="en-US" dirty="0" err="1"/>
+                  <a:t>tükröződési</a:t>
+                </a:r>
+                <a:r>
+                  <a:rPr lang="en-US" dirty="0"/>
+                  <a:t> </a:t>
+                </a:r>
+                <a:r>
+                  <a:rPr lang="en-US" dirty="0" err="1"/>
+                  <a:t>egyenletre</a:t>
+                </a:r>
+                <a:r>
+                  <a:rPr lang="en-US" dirty="0"/>
+                  <a:t> (a </a:t>
+                </a:r>
+                <a:r>
+                  <a:rPr lang="en-US" dirty="0" err="1"/>
+                  <a:t>megjelenítési</a:t>
+                </a:r>
+                <a:r>
+                  <a:rPr lang="en-US" dirty="0"/>
+                  <a:t> </a:t>
+                </a:r>
+                <a:r>
+                  <a:rPr lang="en-US" dirty="0" err="1"/>
+                  <a:t>egyenlet</a:t>
+                </a:r>
+                <a:r>
+                  <a:rPr lang="en-US" dirty="0"/>
+                  <a:t> </a:t>
+                </a:r>
+                <a:r>
+                  <a:rPr lang="en-US" dirty="0" err="1"/>
+                  <a:t>valójában</a:t>
+                </a:r>
+                <a:r>
+                  <a:rPr lang="en-US" dirty="0"/>
+                  <a:t> “</a:t>
+                </a:r>
+                <a:r>
+                  <a:rPr lang="en-US" dirty="0" err="1"/>
+                  <a:t>nem</a:t>
+                </a:r>
+                <a:r>
+                  <a:rPr lang="en-US" dirty="0"/>
+                  <a:t> </a:t>
+                </a:r>
+                <a:r>
+                  <a:rPr lang="en-US" dirty="0" err="1"/>
+                  <a:t>kell</a:t>
+                </a:r>
+                <a:r>
+                  <a:rPr lang="en-US" dirty="0"/>
+                  <a:t>”)</a:t>
+                </a:r>
+              </a:p>
+              <a:p>
+                <a:pPr>
+                  <a:buFont typeface="Wingdings" panose="05000000000000000000" pitchFamily="2" charset="2"/>
+                  <a:buChar char="§"/>
+                </a:pPr>
+                <a:r>
+                  <a:rPr lang="en-US" dirty="0" err="1"/>
+                  <a:t>Naiv</a:t>
+                </a:r>
+                <a:r>
+                  <a:rPr lang="en-US" dirty="0"/>
+                  <a:t> </a:t>
+                </a:r>
+                <a:r>
+                  <a:rPr lang="en-US" dirty="0" err="1"/>
+                  <a:t>kérdés</a:t>
+                </a:r>
+                <a:r>
+                  <a:rPr lang="en-US" dirty="0"/>
+                  <a:t>: </a:t>
+                </a:r>
+                <a:r>
+                  <a:rPr lang="en-US" i="1" dirty="0"/>
+                  <a:t>“</a:t>
+                </a:r>
+                <a:r>
+                  <a:rPr lang="en-US" i="1" dirty="0" err="1"/>
+                  <a:t>Mennyi</a:t>
+                </a:r>
+                <a:r>
+                  <a:rPr lang="en-US" i="1" dirty="0"/>
+                  <a:t> a </a:t>
+                </a:r>
+                <a:r>
+                  <a:rPr lang="en-US" i="1" dirty="0" err="1"/>
+                  <a:t>valsége</a:t>
+                </a:r>
+                <a:r>
+                  <a:rPr lang="en-US" i="1" dirty="0"/>
+                  <a:t> </a:t>
+                </a:r>
+                <a:r>
+                  <a:rPr lang="en-US" i="1" dirty="0" err="1"/>
+                  <a:t>annak</a:t>
+                </a:r>
+                <a:r>
+                  <a:rPr lang="en-US" i="1" dirty="0"/>
+                  <a:t>, </a:t>
+                </a:r>
+                <a:r>
+                  <a:rPr lang="en-US" i="1" dirty="0" err="1"/>
+                  <a:t>hogy</a:t>
+                </a:r>
+                <a:r>
+                  <a:rPr lang="en-US" i="1" dirty="0"/>
+                  <a:t> </a:t>
+                </a:r>
+                <a:r>
+                  <a:rPr lang="en-US" i="1" dirty="0" err="1"/>
+                  <a:t>egy</a:t>
+                </a:r>
+                <a:r>
+                  <a:rPr lang="en-US" i="1" dirty="0"/>
+                  <a:t> </a:t>
+                </a:r>
+                <a:r>
+                  <a:rPr lang="en-US" i="1" dirty="0" err="1"/>
+                  <a:t>adott</a:t>
+                </a:r>
+                <a:r>
+                  <a:rPr lang="en-US" i="1" dirty="0"/>
+                  <a:t> </a:t>
+                </a:r>
+                <a:r>
+                  <a:rPr lang="en-US" i="1" dirty="0" err="1"/>
+                  <a:t>pontot</a:t>
+                </a:r>
+                <a:r>
+                  <a:rPr lang="en-US" i="1" dirty="0"/>
+                  <a:t> </a:t>
+                </a:r>
+                <a:r>
+                  <a:rPr lang="en-US" i="1" dirty="0" err="1"/>
+                  <a:t>választok</a:t>
+                </a:r>
+                <a:r>
+                  <a:rPr lang="en-US" i="1" dirty="0"/>
+                  <a:t> a </a:t>
+                </a:r>
+                <a:r>
+                  <a:rPr lang="en-US" i="1" dirty="0" err="1"/>
+                  <a:t>félgömbön</a:t>
+                </a:r>
+                <a:r>
+                  <a:rPr lang="en-US" i="1" dirty="0"/>
+                  <a:t>?”</a:t>
+                </a:r>
+              </a:p>
+              <a:p>
+                <a:pPr>
+                  <a:buFont typeface="Wingdings" panose="05000000000000000000" pitchFamily="2" charset="2"/>
+                  <a:buChar char="§"/>
+                </a:pPr>
+                <a:r>
+                  <a:rPr lang="en-US" dirty="0"/>
+                  <a:t>A </a:t>
+                </a:r>
+                <a:r>
+                  <a:rPr lang="en-US" dirty="0" err="1"/>
+                  <a:t>naiv</a:t>
+                </a:r>
+                <a:r>
+                  <a:rPr lang="en-US" dirty="0"/>
+                  <a:t> </a:t>
+                </a:r>
+                <a:r>
+                  <a:rPr lang="en-US" dirty="0" err="1"/>
+                  <a:t>válasz</a:t>
+                </a:r>
+                <a:r>
+                  <a:rPr lang="en-US" dirty="0"/>
+                  <a:t> </a:t>
+                </a:r>
+                <a14:m>
+                  <m:oMath xmlns:m="http://schemas.openxmlformats.org/officeDocument/2006/math">
+                    <m:sSub>
+                      <m:sSubPr>
+                        <m:ctrlPr>
+                          <a:rPr lang="en-US" b="0" i="1" smtClean="0">
+                            <a:latin typeface="Cambria Math" panose="02040503050406030204" pitchFamily="18" charset="0"/>
+                          </a:rPr>
+                        </m:ctrlPr>
+                      </m:sSubPr>
+                      <m:e>
+                        <m:r>
+                          <a:rPr lang="en-US" b="0" i="1" smtClean="0">
+                            <a:latin typeface="Cambria Math" panose="02040503050406030204" pitchFamily="18" charset="0"/>
+                          </a:rPr>
+                          <m:t>𝑝</m:t>
+                        </m:r>
+                      </m:e>
+                      <m:sub>
+                        <m:r>
+                          <a:rPr lang="en-US" b="0" i="1" smtClean="0">
+                            <a:latin typeface="Cambria Math" panose="02040503050406030204" pitchFamily="18" charset="0"/>
+                          </a:rPr>
+                          <m:t>𝑟</m:t>
+                        </m:r>
+                      </m:sub>
+                    </m:sSub>
+                    <m:r>
+                      <a:rPr lang="en-US" b="0" i="1" smtClean="0">
+                        <a:latin typeface="Cambria Math" panose="02040503050406030204" pitchFamily="18" charset="0"/>
+                      </a:rPr>
+                      <m:t>=</m:t>
+                    </m:r>
+                    <m:f>
+                      <m:fPr>
+                        <m:ctrlPr>
+                          <a:rPr lang="en-US" b="0" i="1" smtClean="0">
+                            <a:latin typeface="Cambria Math" panose="02040503050406030204" pitchFamily="18" charset="0"/>
+                          </a:rPr>
+                        </m:ctrlPr>
+                      </m:fPr>
+                      <m:num>
+                        <m:r>
+                          <a:rPr lang="en-US" b="0" i="1" smtClean="0">
+                            <a:latin typeface="Cambria Math" panose="02040503050406030204" pitchFamily="18" charset="0"/>
+                          </a:rPr>
+                          <m:t>1</m:t>
+                        </m:r>
+                      </m:num>
+                      <m:den>
+                        <m:r>
+                          <a:rPr lang="en-US" b="0" i="1" smtClean="0">
+                            <a:latin typeface="Cambria Math" panose="02040503050406030204" pitchFamily="18" charset="0"/>
+                          </a:rPr>
+                          <m:t>2</m:t>
+                        </m:r>
+                        <m:r>
+                          <a:rPr lang="en-US" b="0" i="1" smtClean="0">
+                            <a:latin typeface="Cambria Math" panose="02040503050406030204" pitchFamily="18" charset="0"/>
+                          </a:rPr>
+                          <m:t>𝜋</m:t>
+                        </m:r>
+                      </m:den>
+                    </m:f>
+                  </m:oMath>
+                </a14:m>
+                <a:r>
+                  <a:rPr lang="en-US" dirty="0"/>
+                  <a:t> , és </a:t>
+                </a:r>
+                <a:r>
+                  <a:rPr lang="en-US" dirty="0" err="1"/>
+                  <a:t>ez</a:t>
+                </a:r>
+                <a:r>
+                  <a:rPr lang="en-US" dirty="0"/>
+                  <a:t> </a:t>
+                </a:r>
+                <a:r>
+                  <a:rPr lang="en-US" i="1" dirty="0"/>
+                  <a:t>PDF</a:t>
+                </a:r>
+                <a:r>
+                  <a:rPr lang="en-US" dirty="0"/>
+                  <a:t>-</a:t>
+                </a:r>
+                <a:r>
+                  <a:rPr lang="en-US" dirty="0" err="1"/>
+                  <a:t>nek</a:t>
+                </a:r>
+                <a:r>
+                  <a:rPr lang="en-US" dirty="0"/>
+                  <a:t> </a:t>
+                </a:r>
+                <a:r>
+                  <a:rPr lang="en-US" dirty="0" err="1"/>
+                  <a:t>teljesen</a:t>
+                </a:r>
+                <a:r>
+                  <a:rPr lang="en-US" dirty="0"/>
+                  <a:t> </a:t>
+                </a:r>
+                <a:r>
+                  <a:rPr lang="en-US" dirty="0" err="1"/>
+                  <a:t>jó</a:t>
+                </a:r>
+                <a:r>
+                  <a:rPr lang="en-US" dirty="0"/>
+                  <a:t> is (</a:t>
+                </a:r>
+                <a:r>
+                  <a:rPr lang="en-US" dirty="0" err="1"/>
+                  <a:t>mégegyszer</a:t>
+                </a:r>
+                <a:r>
+                  <a:rPr lang="en-US" dirty="0"/>
+                  <a:t>: 1-hez </a:t>
+                </a:r>
+                <a:r>
+                  <a:rPr lang="en-US" dirty="0" err="1"/>
+                  <a:t>kell</a:t>
+                </a:r>
+                <a:r>
+                  <a:rPr lang="en-US" dirty="0"/>
+                  <a:t> </a:t>
+                </a:r>
+                <a:r>
+                  <a:rPr lang="en-US" dirty="0" err="1"/>
+                  <a:t>integráljon</a:t>
+                </a:r>
+                <a:r>
+                  <a:rPr lang="en-US" dirty="0"/>
+                  <a:t>)</a:t>
+                </a:r>
+              </a:p>
+            </p:txBody>
+          </p:sp>
+        </mc:Choice>
+        <mc:Fallback>
+          <p:sp>
+            <p:nvSpPr>
+              <p:cNvPr id="3" name="Content Placeholder 2">
+                <a:extLst>
+                  <a:ext uri="{FF2B5EF4-FFF2-40B4-BE49-F238E27FC236}">
+                    <a16:creationId xmlns:a16="http://schemas.microsoft.com/office/drawing/2014/main" id="{ED685A00-6D27-428D-92D6-22F3815E6F1F}"/>
+                  </a:ext>
+                </a:extLst>
+              </p:cNvPr>
+              <p:cNvSpPr>
+                <a:spLocks noGrp="1" noRot="1" noChangeAspect="1" noMove="1" noResize="1" noEditPoints="1" noAdjustHandles="1" noChangeArrowheads="1" noChangeShapeType="1" noTextEdit="1"/>
+              </p:cNvSpPr>
+              <p:nvPr>
+                <p:ph idx="1"/>
+              </p:nvPr>
+            </p:nvSpPr>
+            <p:spPr>
+              <a:blipFill>
+                <a:blip r:embed="rId2"/>
+                <a:stretch>
+                  <a:fillRect l="-1455" t="-1667"/>
+                </a:stretch>
+              </a:blipFill>
+            </p:spPr>
+            <p:txBody>
+              <a:bodyPr/>
+              <a:lstStyle/>
+              <a:p>
+                <a:r>
+                  <a:rPr lang="hu-HU">
+                    <a:noFill/>
+                  </a:rPr>
+                  <a:t> </a:t>
+                </a:r>
+              </a:p>
+            </p:txBody>
+          </p:sp>
+        </mc:Fallback>
+      </mc:AlternateContent>
       <p:sp>
         <p:nvSpPr>
-          <p:cNvPr id="3" name="Content Placeholder 2">
+          <p:cNvPr id="4" name="TextBox 3">
             <a:extLst>
               <a:ext uri="{FF2B5EF4-FFF2-40B4-BE49-F238E27FC236}">
-                <a16:creationId xmlns:a16="http://schemas.microsoft.com/office/drawing/2014/main" id="{ED685A00-6D27-428D-92D6-22F3815E6F1F}"/>
+                <a16:creationId xmlns:a16="http://schemas.microsoft.com/office/drawing/2014/main" id="{D0B83F17-44D4-46CC-A78D-F6F8BC75E9CD}"/>
+              </a:ext>
+            </a:extLst>
+          </p:cNvPr>
+          <p:cNvSpPr txBox="1"/>
+          <p:nvPr/>
+        </p:nvSpPr>
+        <p:spPr>
+          <a:xfrm>
+            <a:off x="3105912" y="3429000"/>
+            <a:ext cx="6898460" cy="2708434"/>
+          </a:xfrm>
+          <a:prstGeom prst="rect">
+            <a:avLst/>
+          </a:prstGeom>
+          <a:solidFill>
+            <a:schemeClr val="bg1">
+              <a:lumMod val="85000"/>
+            </a:schemeClr>
+          </a:solidFill>
+        </p:spPr>
+        <p:txBody>
+          <a:bodyPr wrap="square" rtlCol="0">
+            <a:spAutoFit/>
+          </a:bodyPr>
+          <a:lstStyle/>
+          <a:p>
+            <a:r>
+              <a:rPr lang="hu-HU" sz="1000" dirty="0">
+                <a:latin typeface="Consolas" panose="020B0609020204030204" pitchFamily="49" charset="0"/>
+              </a:rPr>
+              <a:t>vec3 UniformSample(vec3 n, vec3 pixel, float seed)</a:t>
+            </a:r>
+          </a:p>
+          <a:p>
+            <a:r>
+              <a:rPr lang="hu-HU" sz="1000" dirty="0">
+                <a:latin typeface="Consolas" panose="020B0609020204030204" pitchFamily="49" charset="0"/>
+              </a:rPr>
+              <a:t>{</a:t>
+            </a:r>
+          </a:p>
+          <a:p>
+            <a:r>
+              <a:rPr lang="hu-HU" sz="1000" dirty="0">
+                <a:latin typeface="Consolas" panose="020B0609020204030204" pitchFamily="49" charset="0"/>
+              </a:rPr>
+              <a:t>    float u = Random(pixel, vec3(12.9898, 78.233, 151.7182), seed);</a:t>
+            </a:r>
+          </a:p>
+          <a:p>
+            <a:r>
+              <a:rPr lang="hu-HU" sz="1000" dirty="0">
+                <a:latin typeface="Consolas" panose="020B0609020204030204" pitchFamily="49" charset="0"/>
+              </a:rPr>
+              <a:t>    float v = Random(pixel, vec3(63.7264, 10.873, 623.6736), seed);</a:t>
+            </a:r>
+          </a:p>
+          <a:p>
+            <a:r>
+              <a:rPr lang="hu-HU" sz="1000" dirty="0">
+                <a:latin typeface="Consolas" panose="020B0609020204030204" pitchFamily="49" charset="0"/>
+              </a:rPr>
+              <a:t>    float phi = TWO_PI * u;</a:t>
+            </a:r>
+          </a:p>
+          <a:p>
+            <a:r>
+              <a:rPr lang="hu-HU" sz="1000" dirty="0">
+                <a:latin typeface="Consolas" panose="020B0609020204030204" pitchFamily="49" charset="0"/>
+              </a:rPr>
+              <a:t>    float costheta = v;</a:t>
+            </a:r>
+          </a:p>
+          <a:p>
+            <a:r>
+              <a:rPr lang="hu-HU" sz="1000" dirty="0">
+                <a:latin typeface="Consolas" panose="020B0609020204030204" pitchFamily="49" charset="0"/>
+              </a:rPr>
+              <a:t>    float sintheta = sqrt(1 - costheta * costheta);</a:t>
+            </a:r>
+          </a:p>
+          <a:p>
+            <a:endParaRPr lang="hu-HU" sz="1000" dirty="0">
+              <a:latin typeface="Consolas" panose="020B0609020204030204" pitchFamily="49" charset="0"/>
+            </a:endParaRPr>
+          </a:p>
+          <a:p>
+            <a:r>
+              <a:rPr lang="hu-HU" sz="1000" dirty="0">
+                <a:latin typeface="Consolas" panose="020B0609020204030204" pitchFamily="49" charset="0"/>
+              </a:rPr>
+              <a:t>    // ugyanis a normálvektor félgömbjében keressük (ez a rész mindig ua.)</a:t>
+            </a:r>
+            <a:endParaRPr lang="en-US" sz="1000" dirty="0">
+              <a:latin typeface="Consolas" panose="020B0609020204030204" pitchFamily="49" charset="0"/>
+            </a:endParaRPr>
+          </a:p>
+          <a:p>
+            <a:r>
+              <a:rPr lang="en-US" sz="1000" dirty="0">
+                <a:latin typeface="Consolas" panose="020B0609020204030204" pitchFamily="49" charset="0"/>
+              </a:rPr>
+              <a:t>   </a:t>
+            </a:r>
+            <a:r>
+              <a:rPr lang="hu-HU" sz="1000" dirty="0">
+                <a:latin typeface="Consolas" panose="020B0609020204030204" pitchFamily="49" charset="0"/>
+              </a:rPr>
+              <a:t> vec3 H</a:t>
+            </a:r>
+            <a:r>
+              <a:rPr lang="en-US" sz="1000" dirty="0">
+                <a:latin typeface="Consolas" panose="020B0609020204030204" pitchFamily="49" charset="0"/>
+              </a:rPr>
+              <a:t> = vec3(</a:t>
+            </a:r>
+            <a:r>
+              <a:rPr lang="hu-HU" sz="1000" dirty="0">
+                <a:latin typeface="Consolas" panose="020B0609020204030204" pitchFamily="49" charset="0"/>
+              </a:rPr>
+              <a:t>sintheta * cos(phi)</a:t>
+            </a:r>
+            <a:r>
+              <a:rPr lang="en-US" sz="1000" dirty="0">
+                <a:latin typeface="Consolas" panose="020B0609020204030204" pitchFamily="49" charset="0"/>
+              </a:rPr>
+              <a:t>, </a:t>
+            </a:r>
+            <a:r>
+              <a:rPr lang="hu-HU" sz="1000" dirty="0">
+                <a:latin typeface="Consolas" panose="020B0609020204030204" pitchFamily="49" charset="0"/>
+              </a:rPr>
+              <a:t>sintheta * sin(phi)</a:t>
+            </a:r>
+            <a:r>
+              <a:rPr lang="en-US" sz="1000" dirty="0">
+                <a:latin typeface="Consolas" panose="020B0609020204030204" pitchFamily="49" charset="0"/>
+              </a:rPr>
+              <a:t>, </a:t>
+            </a:r>
+            <a:r>
+              <a:rPr lang="hu-HU" sz="1000" dirty="0">
+                <a:latin typeface="Consolas" panose="020B0609020204030204" pitchFamily="49" charset="0"/>
+              </a:rPr>
+              <a:t>costheta</a:t>
+            </a:r>
+            <a:r>
+              <a:rPr lang="en-US" sz="1000" dirty="0">
+                <a:latin typeface="Consolas" panose="020B0609020204030204" pitchFamily="49" charset="0"/>
+              </a:rPr>
+              <a:t>)</a:t>
+            </a:r>
+            <a:r>
+              <a:rPr lang="hu-HU" sz="1000" dirty="0">
+                <a:latin typeface="Consolas" panose="020B0609020204030204" pitchFamily="49" charset="0"/>
+              </a:rPr>
+              <a:t>;</a:t>
+            </a:r>
+            <a:endParaRPr lang="en-US" sz="1000" dirty="0">
+              <a:latin typeface="Consolas" panose="020B0609020204030204" pitchFamily="49" charset="0"/>
+            </a:endParaRPr>
+          </a:p>
+          <a:p>
+            <a:endParaRPr lang="hu-HU" sz="1000" dirty="0">
+              <a:latin typeface="Consolas" panose="020B0609020204030204" pitchFamily="49" charset="0"/>
+            </a:endParaRPr>
+          </a:p>
+          <a:p>
+            <a:r>
+              <a:rPr lang="hu-HU" sz="1000" dirty="0">
+                <a:latin typeface="Consolas" panose="020B0609020204030204" pitchFamily="49" charset="0"/>
+              </a:rPr>
+              <a:t>    vec3 up = ((abs(n.z) &lt; 0.999) ? vec3(0, 0, 1) : vec3(1, 0, 0));</a:t>
+            </a:r>
+          </a:p>
+          <a:p>
+            <a:r>
+              <a:rPr lang="hu-HU" sz="1000" dirty="0">
+                <a:latin typeface="Consolas" panose="020B0609020204030204" pitchFamily="49" charset="0"/>
+              </a:rPr>
+              <a:t>    vec3 tangent = normalize(cross(up, n));</a:t>
+            </a:r>
+          </a:p>
+          <a:p>
+            <a:r>
+              <a:rPr lang="hu-HU" sz="1000" dirty="0">
+                <a:latin typeface="Consolas" panose="020B0609020204030204" pitchFamily="49" charset="0"/>
+              </a:rPr>
+              <a:t>    vec3 bitangent = cross(n, tangent);</a:t>
+            </a:r>
+          </a:p>
+          <a:p>
+            <a:endParaRPr lang="hu-HU" sz="1000" dirty="0">
+              <a:latin typeface="Consolas" panose="020B0609020204030204" pitchFamily="49" charset="0"/>
+            </a:endParaRPr>
+          </a:p>
+          <a:p>
+            <a:r>
+              <a:rPr lang="hu-HU" sz="1000" dirty="0">
+                <a:latin typeface="Consolas" panose="020B0609020204030204" pitchFamily="49" charset="0"/>
+              </a:rPr>
+              <a:t>    return tangent * H.x + bitangent * H.y + n * H.z;</a:t>
+            </a:r>
+          </a:p>
+          <a:p>
+            <a:r>
+              <a:rPr lang="hu-HU" sz="1000" dirty="0">
+                <a:latin typeface="Consolas" panose="020B0609020204030204" pitchFamily="49" charset="0"/>
+              </a:rPr>
+              <a:t>}</a:t>
+            </a:r>
+          </a:p>
+        </p:txBody>
+      </p:sp>
+    </p:spTree>
+    <p:extLst>
+      <p:ext uri="{BB962C8B-B14F-4D97-AF65-F5344CB8AC3E}">
+        <p14:creationId xmlns:p14="http://schemas.microsoft.com/office/powerpoint/2010/main" val="703572572"/>
+      </p:ext>
+    </p:extLst>
+  </p:cSld>
+  <p:clrMapOvr>
+    <a:masterClrMapping/>
+  </p:clrMapOvr>
+</p:sld>
+</file>
+
+<file path=ppt/slides/slide9.xml><?xml version="1.0" encoding="utf-8"?>
+<p:sld xmlns:a="http://schemas.openxmlformats.org/drawingml/2006/main" xmlns:r="http://schemas.openxmlformats.org/officeDocument/2006/relationships" xmlns:p="http://schemas.openxmlformats.org/presentationml/2006/main">
+  <p:cSld>
+    <p:spTree>
+      <p:nvGrpSpPr>
+        <p:cNvPr id="1" name=""/>
+        <p:cNvGrpSpPr/>
+        <p:nvPr/>
+      </p:nvGrpSpPr>
+      <p:grpSpPr>
+        <a:xfrm>
+          <a:off x="0" y="0"/>
+          <a:ext cx="0" cy="0"/>
+          <a:chOff x="0" y="0"/>
+          <a:chExt cx="0" cy="0"/>
+        </a:xfrm>
+      </p:grpSpPr>
+      <p:sp>
+        <p:nvSpPr>
+          <p:cNvPr id="2" name="Title 1">
+            <a:extLst>
+              <a:ext uri="{FF2B5EF4-FFF2-40B4-BE49-F238E27FC236}">
+                <a16:creationId xmlns:a16="http://schemas.microsoft.com/office/drawing/2014/main" id="{D2EEF75E-504A-48E6-B809-DB66513E702F}"/>
               </a:ext>
             </a:extLst>
           </p:cNvPr>
@@ -9012,7 +9755,7 @@
             <a:spLocks noGrp="1"/>
           </p:cNvSpPr>
           <p:nvPr>
-            <p:ph idx="1"/>
+            <p:ph type="title"/>
           </p:nvPr>
         </p:nvSpPr>
         <p:spPr/>
@@ -9020,14 +9763,707 @@
           <a:bodyPr/>
           <a:lstStyle/>
           <a:p>
+            <a:r>
+              <a:rPr lang="en-US" dirty="0"/>
+              <a:t>Importance sampling</a:t>
+            </a:r>
             <a:endParaRPr lang="hu-HU" dirty="0"/>
+          </a:p>
+        </p:txBody>
+      </p:sp>
+      <mc:AlternateContent xmlns:mc="http://schemas.openxmlformats.org/markup-compatibility/2006">
+        <mc:Choice xmlns:a14="http://schemas.microsoft.com/office/drawing/2010/main" Requires="a14">
+          <p:sp>
+            <p:nvSpPr>
+              <p:cNvPr id="3" name="Content Placeholder 2">
+                <a:extLst>
+                  <a:ext uri="{FF2B5EF4-FFF2-40B4-BE49-F238E27FC236}">
+                    <a16:creationId xmlns:a16="http://schemas.microsoft.com/office/drawing/2014/main" id="{F1D06108-E156-4590-9274-21225E15E749}"/>
+                  </a:ext>
+                </a:extLst>
+              </p:cNvPr>
+              <p:cNvSpPr>
+                <a:spLocks noGrp="1"/>
+              </p:cNvSpPr>
+              <p:nvPr>
+                <p:ph idx="1"/>
+              </p:nvPr>
+            </p:nvSpPr>
+            <p:spPr/>
+            <p:txBody>
+              <a:bodyPr/>
+              <a:lstStyle/>
+              <a:p>
+                <a:pPr>
+                  <a:buFont typeface="Wingdings" panose="05000000000000000000" pitchFamily="2" charset="2"/>
+                  <a:buChar char="§"/>
+                </a:pPr>
+                <a:r>
+                  <a:rPr lang="en-US" dirty="0"/>
+                  <a:t>Az </a:t>
+                </a:r>
+                <a:r>
+                  <a:rPr lang="en-US" dirty="0" err="1"/>
+                  <a:t>előző</a:t>
+                </a:r>
+                <a:r>
+                  <a:rPr lang="en-US" dirty="0"/>
+                  <a:t> </a:t>
+                </a:r>
+                <a:r>
+                  <a:rPr lang="en-US" dirty="0" err="1"/>
+                  <a:t>megoldás</a:t>
+                </a:r>
+                <a:r>
+                  <a:rPr lang="en-US" dirty="0"/>
+                  <a:t> </a:t>
+                </a:r>
+                <a:r>
+                  <a:rPr lang="en-US" dirty="0" err="1"/>
+                  <a:t>egyenletes</a:t>
+                </a:r>
+                <a:r>
+                  <a:rPr lang="en-US" dirty="0"/>
+                  <a:t> </a:t>
+                </a:r>
+                <a:r>
+                  <a:rPr lang="en-US" dirty="0" err="1"/>
+                  <a:t>mintavételezés</a:t>
+                </a:r>
+                <a:r>
+                  <a:rPr lang="en-US" dirty="0"/>
+                  <a:t>…</a:t>
+                </a:r>
+                <a:r>
+                  <a:rPr lang="en-US" dirty="0" err="1"/>
+                  <a:t>az</a:t>
+                </a:r>
+                <a:r>
+                  <a:rPr lang="en-US" dirty="0"/>
+                  <a:t> </a:t>
+                </a:r>
+                <a:r>
+                  <a:rPr lang="en-US" dirty="0" err="1"/>
+                  <a:t>esetek</a:t>
+                </a:r>
+                <a:r>
+                  <a:rPr lang="en-US" dirty="0"/>
+                  <a:t> </a:t>
+                </a:r>
+                <a:r>
+                  <a:rPr lang="en-US" dirty="0" err="1"/>
+                  <a:t>többségében</a:t>
+                </a:r>
+                <a:r>
+                  <a:rPr lang="en-US" dirty="0"/>
+                  <a:t> </a:t>
+                </a:r>
+                <a:r>
+                  <a:rPr lang="en-US" dirty="0" err="1"/>
+                  <a:t>csak</a:t>
+                </a:r>
+                <a:r>
+                  <a:rPr lang="en-US" dirty="0"/>
+                  <a:t> </a:t>
+                </a:r>
+                <a:r>
+                  <a:rPr lang="en-US" dirty="0" err="1"/>
+                  <a:t>lassít</a:t>
+                </a:r>
+                <a:r>
+                  <a:rPr lang="en-US" dirty="0"/>
+                  <a:t>…</a:t>
+                </a:r>
+              </a:p>
+              <a:p>
+                <a:pPr>
+                  <a:buFont typeface="Wingdings" panose="05000000000000000000" pitchFamily="2" charset="2"/>
+                  <a:buChar char="§"/>
+                </a:pPr>
+                <a:r>
+                  <a:rPr lang="en-US" dirty="0" err="1"/>
+                  <a:t>Lehetne</a:t>
+                </a:r>
+                <a:r>
+                  <a:rPr lang="en-US" dirty="0"/>
+                  <a:t> </a:t>
+                </a:r>
+                <a:r>
+                  <a:rPr lang="en-US" dirty="0" err="1"/>
+                  <a:t>gondolni</a:t>
+                </a:r>
+                <a:r>
+                  <a:rPr lang="en-US" dirty="0"/>
+                  <a:t> a </a:t>
+                </a:r>
+                <a:r>
+                  <a:rPr lang="en-US" dirty="0" err="1"/>
+                  <a:t>tökéletes</a:t>
+                </a:r>
+                <a:r>
+                  <a:rPr lang="en-US" dirty="0"/>
+                  <a:t> </a:t>
+                </a:r>
+                <a:r>
+                  <a:rPr lang="en-US" dirty="0" err="1"/>
+                  <a:t>tükröződésre</a:t>
+                </a:r>
+                <a:r>
+                  <a:rPr lang="en-US" dirty="0"/>
+                  <a:t> is, de </a:t>
+                </a:r>
+                <a:r>
+                  <a:rPr lang="en-US" dirty="0" err="1"/>
+                  <a:t>már</a:t>
+                </a:r>
+                <a:r>
+                  <a:rPr lang="en-US" dirty="0"/>
+                  <a:t> </a:t>
+                </a:r>
+                <a:r>
+                  <a:rPr lang="en-US" i="1" dirty="0"/>
+                  <a:t>Lambert</a:t>
+                </a:r>
+                <a:r>
+                  <a:rPr lang="en-US" dirty="0"/>
+                  <a:t> </a:t>
+                </a:r>
+                <a:r>
+                  <a:rPr lang="en-US" dirty="0" err="1"/>
+                  <a:t>esetén</a:t>
+                </a:r>
+                <a:r>
+                  <a:rPr lang="en-US" dirty="0"/>
+                  <a:t> is </a:t>
+                </a:r>
+                <a:r>
+                  <a:rPr lang="en-US" dirty="0" err="1"/>
+                  <a:t>tudunk</a:t>
+                </a:r>
+                <a:r>
+                  <a:rPr lang="en-US" dirty="0"/>
+                  <a:t> </a:t>
+                </a:r>
+                <a:r>
+                  <a:rPr lang="en-US" dirty="0" err="1"/>
+                  <a:t>jobbat</a:t>
+                </a:r>
+                <a:r>
+                  <a:rPr lang="en-US" dirty="0"/>
+                  <a:t>:</a:t>
+                </a:r>
+              </a:p>
+              <a:p>
+                <a:pPr>
+                  <a:buFont typeface="Wingdings" panose="05000000000000000000" pitchFamily="2" charset="2"/>
+                  <a:buChar char="§"/>
+                </a:pPr>
+                <a:r>
+                  <a:rPr lang="en-US" dirty="0"/>
+                  <a:t>A </a:t>
+                </a:r>
+                <a:r>
+                  <a:rPr lang="en-US" dirty="0" err="1"/>
+                  <a:t>koszinusz</a:t>
+                </a:r>
+                <a:r>
+                  <a:rPr lang="en-US" dirty="0"/>
+                  <a:t> </a:t>
+                </a:r>
+                <a:r>
+                  <a:rPr lang="en-US" dirty="0" err="1"/>
+                  <a:t>ugyanis</a:t>
+                </a:r>
+                <a:r>
+                  <a:rPr lang="en-US" dirty="0"/>
+                  <a:t> </a:t>
+                </a:r>
+                <a14:m>
+                  <m:oMath xmlns:m="http://schemas.openxmlformats.org/officeDocument/2006/math">
+                    <m:f>
+                      <m:fPr>
+                        <m:ctrlPr>
+                          <a:rPr lang="en-US" i="1" smtClean="0">
+                            <a:latin typeface="Cambria Math" panose="02040503050406030204" pitchFamily="18" charset="0"/>
+                          </a:rPr>
+                        </m:ctrlPr>
+                      </m:fPr>
+                      <m:num>
+                        <m:r>
+                          <a:rPr lang="en-US" b="0" i="1" smtClean="0">
+                            <a:latin typeface="Cambria Math" panose="02040503050406030204" pitchFamily="18" charset="0"/>
+                          </a:rPr>
+                          <m:t>𝜋</m:t>
+                        </m:r>
+                      </m:num>
+                      <m:den>
+                        <m:r>
+                          <a:rPr lang="en-US" b="0" i="1" smtClean="0">
+                            <a:latin typeface="Cambria Math" panose="02040503050406030204" pitchFamily="18" charset="0"/>
+                          </a:rPr>
+                          <m:t>2</m:t>
+                        </m:r>
+                      </m:den>
+                    </m:f>
+                  </m:oMath>
+                </a14:m>
+                <a:r>
+                  <a:rPr lang="en-US" dirty="0"/>
+                  <a:t>-ben 0; </a:t>
+                </a:r>
+                <a:r>
+                  <a:rPr lang="en-US" dirty="0" err="1"/>
+                  <a:t>akkor</a:t>
+                </a:r>
+                <a:r>
+                  <a:rPr lang="en-US" dirty="0"/>
+                  <a:t> </a:t>
+                </a:r>
+                <a:r>
+                  <a:rPr lang="en-US" dirty="0" err="1"/>
+                  <a:t>ott</a:t>
+                </a:r>
+                <a:r>
+                  <a:rPr lang="en-US" dirty="0"/>
+                  <a:t> </a:t>
+                </a:r>
+                <a:r>
+                  <a:rPr lang="en-US" dirty="0" err="1"/>
+                  <a:t>miért</a:t>
+                </a:r>
+                <a:r>
+                  <a:rPr lang="en-US" dirty="0"/>
+                  <a:t> </a:t>
+                </a:r>
+                <a:r>
+                  <a:rPr lang="en-US" dirty="0" err="1"/>
+                  <a:t>vennénk</a:t>
+                </a:r>
+                <a:r>
+                  <a:rPr lang="en-US" dirty="0"/>
+                  <a:t> </a:t>
+                </a:r>
+                <a:r>
+                  <a:rPr lang="en-US" dirty="0" err="1"/>
+                  <a:t>mintát</a:t>
+                </a:r>
+                <a:r>
+                  <a:rPr lang="en-US" dirty="0"/>
+                  <a:t>? </a:t>
+                </a:r>
+                <a:r>
+                  <a:rPr lang="en-US" dirty="0" err="1"/>
+                  <a:t>Legyen</a:t>
+                </a:r>
+                <a:r>
+                  <a:rPr lang="en-US" dirty="0"/>
+                  <a:t> </a:t>
+                </a:r>
+                <a14:m>
+                  <m:oMath xmlns:m="http://schemas.openxmlformats.org/officeDocument/2006/math">
+                    <m:sSub>
+                      <m:sSubPr>
+                        <m:ctrlPr>
+                          <a:rPr lang="en-US" b="0" i="1" smtClean="0">
+                            <a:latin typeface="Cambria Math" panose="02040503050406030204" pitchFamily="18" charset="0"/>
+                          </a:rPr>
+                        </m:ctrlPr>
+                      </m:sSubPr>
+                      <m:e>
+                        <m:r>
+                          <a:rPr lang="en-US" b="0" i="1" smtClean="0">
+                            <a:latin typeface="Cambria Math" panose="02040503050406030204" pitchFamily="18" charset="0"/>
+                          </a:rPr>
+                          <m:t>𝑝</m:t>
+                        </m:r>
+                      </m:e>
+                      <m:sub>
+                        <m:r>
+                          <a:rPr lang="en-US" b="0" i="1" smtClean="0">
+                            <a:latin typeface="Cambria Math" panose="02040503050406030204" pitchFamily="18" charset="0"/>
+                          </a:rPr>
+                          <m:t>𝑟</m:t>
+                        </m:r>
+                      </m:sub>
+                    </m:sSub>
+                    <m:r>
+                      <a:rPr lang="en-US" b="0" i="1" smtClean="0">
+                        <a:latin typeface="Cambria Math" panose="02040503050406030204" pitchFamily="18" charset="0"/>
+                      </a:rPr>
+                      <m:t>=</m:t>
+                    </m:r>
+                    <m:f>
+                      <m:fPr>
+                        <m:ctrlPr>
+                          <a:rPr lang="en-US" b="0" i="1" smtClean="0">
+                            <a:latin typeface="Cambria Math" panose="02040503050406030204" pitchFamily="18" charset="0"/>
+                          </a:rPr>
+                        </m:ctrlPr>
+                      </m:fPr>
+                      <m:num>
+                        <m:func>
+                          <m:funcPr>
+                            <m:ctrlPr>
+                              <a:rPr lang="en-US" b="0" i="1" smtClean="0">
+                                <a:latin typeface="Cambria Math" panose="02040503050406030204" pitchFamily="18" charset="0"/>
+                              </a:rPr>
+                            </m:ctrlPr>
+                          </m:funcPr>
+                          <m:fName>
+                            <m:r>
+                              <m:rPr>
+                                <m:sty m:val="p"/>
+                              </m:rPr>
+                              <a:rPr lang="en-US" b="0" i="0" smtClean="0">
+                                <a:latin typeface="Cambria Math" panose="02040503050406030204" pitchFamily="18" charset="0"/>
+                              </a:rPr>
+                              <m:t>cos</m:t>
+                            </m:r>
+                          </m:fName>
+                          <m:e>
+                            <m:r>
+                              <a:rPr lang="en-US" b="0" i="1" smtClean="0">
+                                <a:latin typeface="Cambria Math" panose="02040503050406030204" pitchFamily="18" charset="0"/>
+                              </a:rPr>
+                              <m:t>𝜃</m:t>
+                            </m:r>
+                          </m:e>
+                        </m:func>
+                      </m:num>
+                      <m:den>
+                        <m:r>
+                          <a:rPr lang="en-US" b="0" i="1" smtClean="0">
+                            <a:latin typeface="Cambria Math" panose="02040503050406030204" pitchFamily="18" charset="0"/>
+                          </a:rPr>
+                          <m:t>𝜋</m:t>
+                        </m:r>
+                      </m:den>
+                    </m:f>
+                  </m:oMath>
+                </a14:m>
+                <a:r>
+                  <a:rPr lang="en-US" dirty="0"/>
+                  <a:t> </a:t>
+                </a:r>
+              </a:p>
+              <a:p>
+                <a:pPr>
+                  <a:buFont typeface="Wingdings" panose="05000000000000000000" pitchFamily="2" charset="2"/>
+                  <a:buChar char="§"/>
+                </a:pPr>
+                <a:endParaRPr lang="en-US" dirty="0"/>
+              </a:p>
+              <a:p>
+                <a:pPr>
+                  <a:buFont typeface="Wingdings" panose="05000000000000000000" pitchFamily="2" charset="2"/>
+                  <a:buChar char="§"/>
+                </a:pPr>
+                <a:endParaRPr lang="en-US" dirty="0"/>
+              </a:p>
+              <a:p>
+                <a:pPr>
+                  <a:buFont typeface="Wingdings" panose="05000000000000000000" pitchFamily="2" charset="2"/>
+                  <a:buChar char="§"/>
+                </a:pPr>
+                <a:endParaRPr lang="en-US" dirty="0"/>
+              </a:p>
+              <a:p>
+                <a:pPr>
+                  <a:buFont typeface="Wingdings" panose="05000000000000000000" pitchFamily="2" charset="2"/>
+                  <a:buChar char="§"/>
+                </a:pPr>
+                <a:endParaRPr lang="en-US" dirty="0"/>
+              </a:p>
+              <a:p>
+                <a:pPr>
+                  <a:buFont typeface="Wingdings" panose="05000000000000000000" pitchFamily="2" charset="2"/>
+                  <a:buChar char="§"/>
+                </a:pPr>
+                <a:r>
+                  <a:rPr lang="en-US" dirty="0" err="1"/>
+                  <a:t>Levezethető</a:t>
+                </a:r>
+                <a:r>
+                  <a:rPr lang="en-US" dirty="0"/>
+                  <a:t> </a:t>
+                </a:r>
+                <a:r>
+                  <a:rPr lang="en-US" dirty="0" err="1"/>
+                  <a:t>ezen</a:t>
+                </a:r>
+                <a:r>
+                  <a:rPr lang="en-US" dirty="0"/>
+                  <a:t> </a:t>
+                </a:r>
+                <a:r>
+                  <a:rPr lang="en-US" dirty="0" err="1"/>
+                  <a:t>dolgozat</a:t>
+                </a:r>
+                <a:r>
+                  <a:rPr lang="en-US" dirty="0"/>
+                  <a:t> </a:t>
+                </a:r>
+                <a:r>
+                  <a:rPr lang="en-US" dirty="0" err="1"/>
+                  <a:t>alapján</a:t>
+                </a:r>
+                <a:r>
+                  <a:rPr lang="en-US" dirty="0"/>
+                  <a:t> (</a:t>
+                </a:r>
+                <a:r>
+                  <a:rPr lang="en-US" dirty="0" err="1"/>
+                  <a:t>én</a:t>
+                </a:r>
+                <a:r>
+                  <a:rPr lang="en-US" dirty="0"/>
+                  <a:t> </a:t>
+                </a:r>
+                <a:r>
+                  <a:rPr lang="en-US" dirty="0" err="1"/>
+                  <a:t>nár</a:t>
+                </a:r>
+                <a:r>
+                  <a:rPr lang="en-US" dirty="0"/>
+                  <a:t> </a:t>
+                </a:r>
+                <a:r>
+                  <a:rPr lang="en-US" dirty="0" err="1"/>
+                  <a:t>megtettem</a:t>
+                </a:r>
+                <a:r>
+                  <a:rPr lang="en-US" dirty="0"/>
+                  <a:t>, most </a:t>
+                </a:r>
+                <a:r>
+                  <a:rPr lang="en-US" dirty="0" err="1"/>
+                  <a:t>nem</a:t>
+                </a:r>
+                <a:r>
+                  <a:rPr lang="en-US" dirty="0"/>
+                  <a:t> </a:t>
+                </a:r>
+                <a:r>
+                  <a:rPr lang="en-US" dirty="0" err="1"/>
+                  <a:t>fogom</a:t>
+                </a:r>
+                <a:r>
+                  <a:rPr lang="en-US" dirty="0"/>
+                  <a:t>)</a:t>
+                </a:r>
+              </a:p>
+            </p:txBody>
+          </p:sp>
+        </mc:Choice>
+        <mc:Fallback>
+          <p:sp>
+            <p:nvSpPr>
+              <p:cNvPr id="3" name="Content Placeholder 2">
+                <a:extLst>
+                  <a:ext uri="{FF2B5EF4-FFF2-40B4-BE49-F238E27FC236}">
+                    <a16:creationId xmlns:a16="http://schemas.microsoft.com/office/drawing/2014/main" id="{F1D06108-E156-4590-9274-21225E15E749}"/>
+                  </a:ext>
+                </a:extLst>
+              </p:cNvPr>
+              <p:cNvSpPr>
+                <a:spLocks noGrp="1" noRot="1" noChangeAspect="1" noMove="1" noResize="1" noEditPoints="1" noAdjustHandles="1" noChangeArrowheads="1" noChangeShapeType="1" noTextEdit="1"/>
+              </p:cNvSpPr>
+              <p:nvPr>
+                <p:ph idx="1"/>
+              </p:nvPr>
+            </p:nvSpPr>
+            <p:spPr>
+              <a:blipFill>
+                <a:blip r:embed="rId2"/>
+                <a:stretch>
+                  <a:fillRect l="-1455" t="-1667"/>
+                </a:stretch>
+              </a:blipFill>
+            </p:spPr>
+            <p:txBody>
+              <a:bodyPr/>
+              <a:lstStyle/>
+              <a:p>
+                <a:r>
+                  <a:rPr lang="hu-HU">
+                    <a:noFill/>
+                  </a:rPr>
+                  <a:t> </a:t>
+                </a:r>
+              </a:p>
+            </p:txBody>
+          </p:sp>
+        </mc:Fallback>
+      </mc:AlternateContent>
+      <p:sp>
+        <p:nvSpPr>
+          <p:cNvPr id="4" name="TextBox 3">
+            <a:extLst>
+              <a:ext uri="{FF2B5EF4-FFF2-40B4-BE49-F238E27FC236}">
+                <a16:creationId xmlns:a16="http://schemas.microsoft.com/office/drawing/2014/main" id="{421E41AA-5223-4524-B995-D99504CFEBCF}"/>
+              </a:ext>
+            </a:extLst>
+          </p:cNvPr>
+          <p:cNvSpPr txBox="1"/>
+          <p:nvPr/>
+        </p:nvSpPr>
+        <p:spPr>
+          <a:xfrm>
+            <a:off x="3105912" y="3429000"/>
+            <a:ext cx="6898460" cy="1477328"/>
+          </a:xfrm>
+          <a:prstGeom prst="rect">
+            <a:avLst/>
+          </a:prstGeom>
+          <a:solidFill>
+            <a:schemeClr val="bg1">
+              <a:lumMod val="85000"/>
+            </a:schemeClr>
+          </a:solidFill>
+        </p:spPr>
+        <p:txBody>
+          <a:bodyPr wrap="square" rtlCol="0">
+            <a:spAutoFit/>
+          </a:bodyPr>
+          <a:lstStyle/>
+          <a:p>
+            <a:r>
+              <a:rPr lang="hu-HU" sz="1000" dirty="0">
+                <a:latin typeface="Consolas" panose="020B0609020204030204" pitchFamily="49" charset="0"/>
+              </a:rPr>
+              <a:t>vec3 </a:t>
+            </a:r>
+            <a:r>
+              <a:rPr lang="en-US" sz="1000" dirty="0">
+                <a:latin typeface="Consolas" panose="020B0609020204030204" pitchFamily="49" charset="0"/>
+              </a:rPr>
+              <a:t>Cosine</a:t>
+            </a:r>
+            <a:r>
+              <a:rPr lang="hu-HU" sz="1000" dirty="0">
+                <a:latin typeface="Consolas" panose="020B0609020204030204" pitchFamily="49" charset="0"/>
+              </a:rPr>
+              <a:t>Sample(vec3 n, vec3 pixel, float seed)</a:t>
+            </a:r>
+          </a:p>
+          <a:p>
+            <a:r>
+              <a:rPr lang="hu-HU" sz="1000" dirty="0">
+                <a:latin typeface="Consolas" panose="020B0609020204030204" pitchFamily="49" charset="0"/>
+              </a:rPr>
+              <a:t>{</a:t>
+            </a:r>
+          </a:p>
+          <a:p>
+            <a:r>
+              <a:rPr lang="hu-HU" sz="1000" dirty="0">
+                <a:latin typeface="Consolas" panose="020B0609020204030204" pitchFamily="49" charset="0"/>
+              </a:rPr>
+              <a:t>    float u = Random(pixel, vec3(12.9898, 78.233, 151.7182), seed);</a:t>
+            </a:r>
+          </a:p>
+          <a:p>
+            <a:r>
+              <a:rPr lang="hu-HU" sz="1000" dirty="0">
+                <a:latin typeface="Consolas" panose="020B0609020204030204" pitchFamily="49" charset="0"/>
+              </a:rPr>
+              <a:t>    float v = Random(pixel, vec3(63.7264, 10.873, 623.6736), seed);</a:t>
+            </a:r>
+          </a:p>
+          <a:p>
+            <a:r>
+              <a:rPr lang="hu-HU" sz="1000" dirty="0">
+                <a:latin typeface="Consolas" panose="020B0609020204030204" pitchFamily="49" charset="0"/>
+              </a:rPr>
+              <a:t>    float phi = TWO_PI * u;</a:t>
+            </a:r>
+          </a:p>
+          <a:p>
+            <a:r>
+              <a:rPr lang="hu-HU" sz="1000" dirty="0">
+                <a:latin typeface="Consolas" panose="020B0609020204030204" pitchFamily="49" charset="0"/>
+              </a:rPr>
+              <a:t>    float costheta = </a:t>
+            </a:r>
+            <a:r>
+              <a:rPr lang="en-US" sz="1000" b="1" dirty="0">
+                <a:latin typeface="Consolas" panose="020B0609020204030204" pitchFamily="49" charset="0"/>
+              </a:rPr>
+              <a:t>sqrt(</a:t>
+            </a:r>
+            <a:r>
+              <a:rPr lang="hu-HU" sz="1000" b="1" dirty="0">
+                <a:latin typeface="Consolas" panose="020B0609020204030204" pitchFamily="49" charset="0"/>
+              </a:rPr>
+              <a:t>v</a:t>
+            </a:r>
+            <a:r>
+              <a:rPr lang="en-US" sz="1000" b="1" dirty="0">
+                <a:latin typeface="Consolas" panose="020B0609020204030204" pitchFamily="49" charset="0"/>
+              </a:rPr>
+              <a:t>)</a:t>
+            </a:r>
+            <a:r>
+              <a:rPr lang="hu-HU" sz="1000" dirty="0">
+                <a:latin typeface="Consolas" panose="020B0609020204030204" pitchFamily="49" charset="0"/>
+              </a:rPr>
+              <a:t>;</a:t>
+            </a:r>
+          </a:p>
+          <a:p>
+            <a:endParaRPr lang="hu-HU" sz="1000" dirty="0">
+              <a:latin typeface="Consolas" panose="020B0609020204030204" pitchFamily="49" charset="0"/>
+            </a:endParaRPr>
+          </a:p>
+          <a:p>
+            <a:r>
+              <a:rPr lang="hu-HU" sz="1000" dirty="0">
+                <a:latin typeface="Consolas" panose="020B0609020204030204" pitchFamily="49" charset="0"/>
+              </a:rPr>
+              <a:t>    return</a:t>
+            </a:r>
+            <a:r>
+              <a:rPr lang="en-US" sz="1000" dirty="0">
+                <a:latin typeface="Consolas" panose="020B0609020204030204" pitchFamily="49" charset="0"/>
+              </a:rPr>
+              <a:t> ..</a:t>
+            </a:r>
+            <a:r>
+              <a:rPr lang="hu-HU" sz="1000" dirty="0">
+                <a:latin typeface="Consolas" panose="020B0609020204030204" pitchFamily="49" charset="0"/>
+              </a:rPr>
+              <a:t>;</a:t>
+            </a:r>
+            <a:r>
+              <a:rPr lang="en-US" sz="1000" dirty="0">
+                <a:latin typeface="Consolas" panose="020B0609020204030204" pitchFamily="49" charset="0"/>
+              </a:rPr>
+              <a:t> // </a:t>
+            </a:r>
+            <a:r>
+              <a:rPr lang="en-US" sz="1000" dirty="0" err="1">
+                <a:latin typeface="Consolas" panose="020B0609020204030204" pitchFamily="49" charset="0"/>
+              </a:rPr>
+              <a:t>ugyanaz</a:t>
+            </a:r>
+            <a:endParaRPr lang="hu-HU" sz="1000" dirty="0">
+              <a:latin typeface="Consolas" panose="020B0609020204030204" pitchFamily="49" charset="0"/>
+            </a:endParaRPr>
+          </a:p>
+          <a:p>
+            <a:r>
+              <a:rPr lang="hu-HU" sz="1000" dirty="0">
+                <a:latin typeface="Consolas" panose="020B0609020204030204" pitchFamily="49" charset="0"/>
+              </a:rPr>
+              <a:t>}</a:t>
+            </a:r>
           </a:p>
         </p:txBody>
       </p:sp>
     </p:spTree>
     <p:extLst>
       <p:ext uri="{BB962C8B-B14F-4D97-AF65-F5344CB8AC3E}">
-        <p14:creationId xmlns:p14="http://schemas.microsoft.com/office/powerpoint/2010/main" val="703572572"/>
+        <p14:creationId xmlns:p14="http://schemas.microsoft.com/office/powerpoint/2010/main" val="1015595444"/>
       </p:ext>
     </p:extLst>
   </p:cSld>

</xml_diff>

<commit_message>
path tracing prez 4
</commit_message>
<xml_diff>
--- a/PBR_EA_02.pptx
+++ b/PBR_EA_02.pptx
@@ -5,7 +5,7 @@
     <p:sldMasterId id="2147483767" r:id="rId1"/>
   </p:sldMasterIdLst>
   <p:notesMasterIdLst>
-    <p:notesMasterId r:id="rId11"/>
+    <p:notesMasterId r:id="rId15"/>
   </p:notesMasterIdLst>
   <p:sldIdLst>
     <p:sldId id="256" r:id="rId2"/>
@@ -17,6 +17,10 @@
     <p:sldId id="263" r:id="rId8"/>
     <p:sldId id="262" r:id="rId9"/>
     <p:sldId id="264" r:id="rId10"/>
+    <p:sldId id="265" r:id="rId11"/>
+    <p:sldId id="266" r:id="rId12"/>
+    <p:sldId id="267" r:id="rId13"/>
+    <p:sldId id="268" r:id="rId14"/>
   </p:sldIdLst>
   <p:sldSz cx="12192000" cy="6858000"/>
   <p:notesSz cx="6858000" cy="9144000"/>
@@ -209,7 +213,7 @@
           <a:p>
             <a:fld id="{3A5A56FF-9D9E-417E-8DB7-17CB8EBF566C}" type="datetimeFigureOut">
               <a:rPr lang="hu-HU" smtClean="0"/>
-              <a:t>2018. 03. 14.</a:t>
+              <a:t>2018. 03. 16.</a:t>
             </a:fld>
             <a:endParaRPr lang="hu-HU"/>
           </a:p>
@@ -847,7 +851,7 @@
           <a:p>
             <a:fld id="{EE90FBA0-FEE2-473A-A4B4-051DFD2DB1BD}" type="datetimeFigureOut">
               <a:rPr lang="en-US" smtClean="0"/>
-              <a:t>3/14/2018</a:t>
+              <a:t>3/16/2018</a:t>
             </a:fld>
             <a:endParaRPr lang="en-US"/>
           </a:p>
@@ -1055,7 +1059,7 @@
           <a:p>
             <a:fld id="{EE90FBA0-FEE2-473A-A4B4-051DFD2DB1BD}" type="datetimeFigureOut">
               <a:rPr lang="en-US" smtClean="0"/>
-              <a:t>3/14/2018</a:t>
+              <a:t>3/16/2018</a:t>
             </a:fld>
             <a:endParaRPr lang="en-US"/>
           </a:p>
@@ -1311,7 +1315,7 @@
           <a:p>
             <a:fld id="{EE90FBA0-FEE2-473A-A4B4-051DFD2DB1BD}" type="datetimeFigureOut">
               <a:rPr lang="en-US" smtClean="0"/>
-              <a:t>3/14/2018</a:t>
+              <a:t>3/16/2018</a:t>
             </a:fld>
             <a:endParaRPr lang="en-US"/>
           </a:p>
@@ -1485,7 +1489,7 @@
           <a:p>
             <a:fld id="{EE90FBA0-FEE2-473A-A4B4-051DFD2DB1BD}" type="datetimeFigureOut">
               <a:rPr lang="en-US" smtClean="0"/>
-              <a:t>3/14/2018</a:t>
+              <a:t>3/16/2018</a:t>
             </a:fld>
             <a:endParaRPr lang="en-US"/>
           </a:p>
@@ -1828,7 +1832,7 @@
           <a:p>
             <a:fld id="{EE90FBA0-FEE2-473A-A4B4-051DFD2DB1BD}" type="datetimeFigureOut">
               <a:rPr lang="en-US" smtClean="0"/>
-              <a:t>3/14/2018</a:t>
+              <a:t>3/16/2018</a:t>
             </a:fld>
             <a:endParaRPr lang="en-US"/>
           </a:p>
@@ -2103,7 +2107,7 @@
           <a:p>
             <a:fld id="{EE90FBA0-FEE2-473A-A4B4-051DFD2DB1BD}" type="datetimeFigureOut">
               <a:rPr lang="en-US" smtClean="0"/>
-              <a:t>3/14/2018</a:t>
+              <a:t>3/16/2018</a:t>
             </a:fld>
             <a:endParaRPr lang="en-US"/>
           </a:p>
@@ -2482,7 +2486,7 @@
           <a:p>
             <a:fld id="{EE90FBA0-FEE2-473A-A4B4-051DFD2DB1BD}" type="datetimeFigureOut">
               <a:rPr lang="en-US" smtClean="0"/>
-              <a:t>3/14/2018</a:t>
+              <a:t>3/16/2018</a:t>
             </a:fld>
             <a:endParaRPr lang="en-US"/>
           </a:p>
@@ -2600,7 +2604,7 @@
           <a:p>
             <a:fld id="{EE90FBA0-FEE2-473A-A4B4-051DFD2DB1BD}" type="datetimeFigureOut">
               <a:rPr lang="en-US" smtClean="0"/>
-              <a:t>3/14/2018</a:t>
+              <a:t>3/16/2018</a:t>
             </a:fld>
             <a:endParaRPr lang="en-US"/>
           </a:p>
@@ -2771,7 +2775,7 @@
           <a:p>
             <a:fld id="{EE90FBA0-FEE2-473A-A4B4-051DFD2DB1BD}" type="datetimeFigureOut">
               <a:rPr lang="en-US" smtClean="0"/>
-              <a:t>3/14/2018</a:t>
+              <a:t>3/16/2018</a:t>
             </a:fld>
             <a:endParaRPr lang="en-US"/>
           </a:p>
@@ -3125,7 +3129,7 @@
           <a:p>
             <a:fld id="{EE90FBA0-FEE2-473A-A4B4-051DFD2DB1BD}" type="datetimeFigureOut">
               <a:rPr lang="en-US" smtClean="0"/>
-              <a:t>3/14/2018</a:t>
+              <a:t>3/16/2018</a:t>
             </a:fld>
             <a:endParaRPr lang="en-US"/>
           </a:p>
@@ -3507,7 +3511,7 @@
           <a:p>
             <a:fld id="{EE90FBA0-FEE2-473A-A4B4-051DFD2DB1BD}" type="datetimeFigureOut">
               <a:rPr lang="en-US" smtClean="0"/>
-              <a:t>3/14/2018</a:t>
+              <a:t>3/16/2018</a:t>
             </a:fld>
             <a:endParaRPr lang="en-US"/>
           </a:p>
@@ -3794,7 +3798,7 @@
           <a:p>
             <a:fld id="{EE90FBA0-FEE2-473A-A4B4-051DFD2DB1BD}" type="datetimeFigureOut">
               <a:rPr lang="en-US" smtClean="0"/>
-              <a:t>3/14/2018</a:t>
+              <a:t>3/16/2018</a:t>
             </a:fld>
             <a:endParaRPr lang="en-US"/>
           </a:p>
@@ -4441,6 +4445,2788 @@
 </p:sld>
 </file>
 
+<file path=ppt/slides/slide10.xml><?xml version="1.0" encoding="utf-8"?>
+<p:sld xmlns:a="http://schemas.openxmlformats.org/drawingml/2006/main" xmlns:r="http://schemas.openxmlformats.org/officeDocument/2006/relationships" xmlns:p="http://schemas.openxmlformats.org/presentationml/2006/main">
+  <p:cSld>
+    <p:spTree>
+      <p:nvGrpSpPr>
+        <p:cNvPr id="1" name=""/>
+        <p:cNvGrpSpPr/>
+        <p:nvPr/>
+      </p:nvGrpSpPr>
+      <p:grpSpPr>
+        <a:xfrm>
+          <a:off x="0" y="0"/>
+          <a:ext cx="0" cy="0"/>
+          <a:chOff x="0" y="0"/>
+          <a:chExt cx="0" cy="0"/>
+        </a:xfrm>
+      </p:grpSpPr>
+      <p:sp>
+        <p:nvSpPr>
+          <p:cNvPr id="2" name="Title 1">
+            <a:extLst>
+              <a:ext uri="{FF2B5EF4-FFF2-40B4-BE49-F238E27FC236}">
+                <a16:creationId xmlns:a16="http://schemas.microsoft.com/office/drawing/2014/main" id="{70209AD0-6083-46CC-AD50-2A5ED04EA630}"/>
+              </a:ext>
+            </a:extLst>
+          </p:cNvPr>
+          <p:cNvSpPr>
+            <a:spLocks noGrp="1"/>
+          </p:cNvSpPr>
+          <p:nvPr>
+            <p:ph type="title"/>
+          </p:nvPr>
+        </p:nvSpPr>
+        <p:spPr/>
+        <p:txBody>
+          <a:bodyPr/>
+          <a:lstStyle/>
+          <a:p>
+            <a:r>
+              <a:rPr lang="en-US" dirty="0"/>
+              <a:t>Multiple importance sampling</a:t>
+            </a:r>
+            <a:endParaRPr lang="hu-HU" dirty="0"/>
+          </a:p>
+        </p:txBody>
+      </p:sp>
+      <mc:AlternateContent xmlns:mc="http://schemas.openxmlformats.org/markup-compatibility/2006">
+        <mc:Choice xmlns:a14="http://schemas.microsoft.com/office/drawing/2010/main" Requires="a14">
+          <p:sp>
+            <p:nvSpPr>
+              <p:cNvPr id="3" name="Content Placeholder 2">
+                <a:extLst>
+                  <a:ext uri="{FF2B5EF4-FFF2-40B4-BE49-F238E27FC236}">
+                    <a16:creationId xmlns:a16="http://schemas.microsoft.com/office/drawing/2014/main" id="{D72606CF-3DD1-4CA8-A893-6DAEB1AFB3F2}"/>
+                  </a:ext>
+                </a:extLst>
+              </p:cNvPr>
+              <p:cNvSpPr>
+                <a:spLocks noGrp="1"/>
+              </p:cNvSpPr>
+              <p:nvPr>
+                <p:ph idx="1"/>
+              </p:nvPr>
+            </p:nvSpPr>
+            <p:spPr/>
+            <p:txBody>
+              <a:bodyPr/>
+              <a:lstStyle/>
+              <a:p>
+                <a:pPr>
+                  <a:buFont typeface="Wingdings" panose="05000000000000000000" pitchFamily="2" charset="2"/>
+                  <a:buChar char="§"/>
+                </a:pPr>
+                <a:r>
+                  <a:rPr lang="en-US" dirty="0"/>
+                  <a:t>Már </a:t>
+                </a:r>
+                <a:r>
+                  <a:rPr lang="en-US" i="1" dirty="0"/>
+                  <a:t>Lambert</a:t>
+                </a:r>
+                <a:r>
+                  <a:rPr lang="en-US" dirty="0"/>
+                  <a:t>-</a:t>
+                </a:r>
+                <a:r>
+                  <a:rPr lang="en-US" dirty="0" err="1"/>
+                  <a:t>nél</a:t>
+                </a:r>
+                <a:r>
+                  <a:rPr lang="en-US" dirty="0"/>
+                  <a:t> is </a:t>
+                </a:r>
+                <a:r>
+                  <a:rPr lang="en-US" dirty="0" err="1"/>
+                  <a:t>problémát</a:t>
+                </a:r>
+                <a:r>
+                  <a:rPr lang="en-US" dirty="0"/>
+                  <a:t> </a:t>
+                </a:r>
+                <a:r>
+                  <a:rPr lang="en-US" dirty="0" err="1"/>
+                  <a:t>okoz</a:t>
+                </a:r>
+                <a:r>
+                  <a:rPr lang="en-US" dirty="0"/>
+                  <a:t>, ha a </a:t>
+                </a:r>
+                <a:r>
+                  <a:rPr lang="en-US" dirty="0" err="1"/>
+                  <a:t>fényforrás</a:t>
+                </a:r>
+                <a:r>
+                  <a:rPr lang="en-US" dirty="0"/>
+                  <a:t> </a:t>
+                </a:r>
+                <a:r>
+                  <a:rPr lang="en-US" dirty="0" err="1"/>
+                  <a:t>túl</a:t>
+                </a:r>
+                <a:r>
+                  <a:rPr lang="en-US" dirty="0"/>
+                  <a:t> </a:t>
+                </a:r>
+                <a:r>
+                  <a:rPr lang="en-US" dirty="0" err="1"/>
+                  <a:t>kicsi</a:t>
+                </a:r>
+                <a:endParaRPr lang="en-US" dirty="0"/>
+              </a:p>
+              <a:p>
+                <a:pPr>
+                  <a:buFont typeface="Wingdings" panose="05000000000000000000" pitchFamily="2" charset="2"/>
+                  <a:buChar char="§"/>
+                </a:pPr>
+                <a:r>
+                  <a:rPr lang="en-US" i="1" dirty="0"/>
+                  <a:t>Cook-Torrance</a:t>
+                </a:r>
+                <a:r>
+                  <a:rPr lang="en-US" dirty="0"/>
+                  <a:t> </a:t>
+                </a:r>
+                <a:r>
+                  <a:rPr lang="en-US" dirty="0" err="1"/>
+                  <a:t>esetén</a:t>
+                </a:r>
+                <a:r>
+                  <a:rPr lang="en-US" dirty="0"/>
+                  <a:t> </a:t>
+                </a:r>
+                <a:r>
+                  <a:rPr lang="en-US" dirty="0" err="1"/>
+                  <a:t>még</a:t>
+                </a:r>
+                <a:r>
+                  <a:rPr lang="en-US" dirty="0"/>
+                  <a:t> </a:t>
+                </a:r>
+                <a:r>
+                  <a:rPr lang="en-US" dirty="0" err="1"/>
+                  <a:t>szembet</a:t>
+                </a:r>
+                <a:r>
+                  <a:rPr lang="hu-HU" dirty="0"/>
+                  <a:t>ű</a:t>
+                </a:r>
+                <a:r>
+                  <a:rPr lang="en-US" dirty="0" err="1"/>
+                  <a:t>nőbb</a:t>
+                </a:r>
+                <a:r>
+                  <a:rPr lang="en-US" dirty="0"/>
+                  <a:t>: </a:t>
+                </a:r>
+                <a:r>
+                  <a:rPr lang="en-US" dirty="0" err="1"/>
+                  <a:t>nagyon</a:t>
+                </a:r>
+                <a:r>
+                  <a:rPr lang="en-US" dirty="0"/>
+                  <a:t> </a:t>
+                </a:r>
+                <a:r>
+                  <a:rPr lang="en-US" dirty="0" err="1"/>
+                  <a:t>ritkán</a:t>
+                </a:r>
+                <a:r>
+                  <a:rPr lang="en-US" dirty="0"/>
+                  <a:t> </a:t>
+                </a:r>
+                <a:r>
+                  <a:rPr lang="en-US" dirty="0" err="1"/>
+                  <a:t>találjuk</a:t>
+                </a:r>
+                <a:r>
+                  <a:rPr lang="en-US" dirty="0"/>
+                  <a:t> el a </a:t>
+                </a:r>
+                <a:r>
+                  <a:rPr lang="en-US" dirty="0" err="1"/>
+                  <a:t>fényforrást</a:t>
+                </a:r>
+                <a:endParaRPr lang="en-US" dirty="0"/>
+              </a:p>
+              <a:p>
+                <a:pPr>
+                  <a:buFont typeface="Wingdings" panose="05000000000000000000" pitchFamily="2" charset="2"/>
+                  <a:buChar char="§"/>
+                </a:pPr>
+                <a:r>
+                  <a:rPr lang="en-US" dirty="0"/>
+                  <a:t>A </a:t>
+                </a:r>
+                <a:r>
+                  <a:rPr lang="en-US" dirty="0" err="1"/>
+                  <a:t>felületdarabka-térszög</a:t>
+                </a:r>
+                <a:r>
+                  <a:rPr lang="en-US" dirty="0"/>
+                  <a:t> </a:t>
+                </a:r>
+                <a:r>
+                  <a:rPr lang="en-US" dirty="0" err="1"/>
+                  <a:t>kapcsolatára</a:t>
+                </a:r>
+                <a:r>
+                  <a:rPr lang="en-US" dirty="0"/>
+                  <a:t> </a:t>
+                </a:r>
+                <a:r>
+                  <a:rPr lang="en-US" dirty="0" err="1"/>
+                  <a:t>vonatkozó</a:t>
+                </a:r>
+                <a:r>
+                  <a:rPr lang="en-US" dirty="0"/>
+                  <a:t> </a:t>
+                </a:r>
+                <a:r>
+                  <a:rPr lang="en-US" dirty="0" err="1"/>
+                  <a:t>képlet</a:t>
+                </a:r>
+                <a:r>
+                  <a:rPr lang="en-US" dirty="0"/>
+                  <a:t> </a:t>
+                </a:r>
+                <a:r>
+                  <a:rPr lang="en-US" dirty="0" err="1"/>
+                  <a:t>miatt</a:t>
+                </a:r>
+                <a:r>
+                  <a:rPr lang="en-US" dirty="0"/>
+                  <a:t> </a:t>
+                </a:r>
+                <a:r>
+                  <a:rPr lang="en-US" dirty="0" err="1"/>
+                  <a:t>tudjuk</a:t>
+                </a:r>
+                <a:r>
+                  <a:rPr lang="en-US" dirty="0"/>
+                  <a:t> </a:t>
+                </a:r>
+                <a:r>
+                  <a:rPr lang="en-US" dirty="0" err="1"/>
+                  <a:t>azonban</a:t>
+                </a:r>
+                <a:r>
+                  <a:rPr lang="en-US" dirty="0"/>
+                  <a:t>, </a:t>
+                </a:r>
+                <a:r>
+                  <a:rPr lang="en-US" dirty="0" err="1"/>
+                  <a:t>hogy</a:t>
+                </a:r>
+                <a:r>
+                  <a:rPr lang="en-US" dirty="0"/>
+                  <a:t>:</a:t>
+                </a:r>
+              </a:p>
+              <a:p>
+                <a:pPr marL="0" indent="0" algn="ctr">
+                  <a:lnSpc>
+                    <a:spcPct val="150000"/>
+                  </a:lnSpc>
+                  <a:buNone/>
+                </a:pPr>
+                <a14:m>
+                  <m:oMathPara xmlns:m="http://schemas.openxmlformats.org/officeDocument/2006/math">
+                    <m:oMathParaPr>
+                      <m:jc m:val="centerGroup"/>
+                    </m:oMathParaPr>
+                    <m:oMath xmlns:m="http://schemas.openxmlformats.org/officeDocument/2006/math">
+                      <m:nary>
+                        <m:naryPr>
+                          <m:ctrlPr>
+                            <a:rPr lang="en-US" i="1" smtClean="0">
+                              <a:latin typeface="Cambria Math" panose="02040503050406030204" pitchFamily="18" charset="0"/>
+                            </a:rPr>
+                          </m:ctrlPr>
+                        </m:naryPr>
+                        <m:sub>
+                          <m:sSub>
+                            <m:sSubPr>
+                              <m:ctrlPr>
+                                <a:rPr lang="en-US" b="0" i="0" smtClean="0">
+                                  <a:latin typeface="Cambria Math" panose="02040503050406030204" pitchFamily="18" charset="0"/>
+                                </a:rPr>
+                              </m:ctrlPr>
+                            </m:sSubPr>
+                            <m:e>
+                              <m:r>
+                                <m:rPr>
+                                  <m:sty m:val="p"/>
+                                </m:rPr>
+                                <a:rPr lang="en-US" b="0" i="0" smtClean="0">
+                                  <a:latin typeface="Cambria Math" panose="02040503050406030204" pitchFamily="18" charset="0"/>
+                                </a:rPr>
+                                <m:t>Ω</m:t>
+                              </m:r>
+                            </m:e>
+                            <m:sub>
+                              <m:r>
+                                <m:rPr>
+                                  <m:sty m:val="p"/>
+                                </m:rPr>
+                                <a:rPr lang="en-US" b="0" i="0" smtClean="0">
+                                  <a:latin typeface="Cambria Math" panose="02040503050406030204" pitchFamily="18" charset="0"/>
+                                </a:rPr>
+                                <m:t>light</m:t>
+                              </m:r>
+                            </m:sub>
+                          </m:sSub>
+                        </m:sub>
+                        <m:sup>
+                          <m:r>
+                            <a:rPr lang="en-US" b="0" i="1" smtClean="0">
+                              <a:latin typeface="Cambria Math" panose="02040503050406030204" pitchFamily="18" charset="0"/>
+                            </a:rPr>
+                            <m:t> </m:t>
+                          </m:r>
+                        </m:sup>
+                        <m:e>
+                          <m:sSub>
+                            <m:sSubPr>
+                              <m:ctrlPr>
+                                <a:rPr lang="en-US" b="0" i="1" smtClean="0">
+                                  <a:latin typeface="Cambria Math" panose="02040503050406030204" pitchFamily="18" charset="0"/>
+                                </a:rPr>
+                              </m:ctrlPr>
+                            </m:sSubPr>
+                            <m:e>
+                              <m:sSub>
+                                <m:sSubPr>
+                                  <m:ctrlPr>
+                                    <a:rPr lang="en-US" b="0" i="1" smtClean="0">
+                                      <a:latin typeface="Cambria Math" panose="02040503050406030204" pitchFamily="18" charset="0"/>
+                                    </a:rPr>
+                                  </m:ctrlPr>
+                                </m:sSubPr>
+                                <m:e>
+                                  <m:r>
+                                    <a:rPr lang="en-US" b="0" i="1" smtClean="0">
+                                      <a:latin typeface="Cambria Math" panose="02040503050406030204" pitchFamily="18" charset="0"/>
+                                    </a:rPr>
+                                    <m:t>𝐿</m:t>
+                                  </m:r>
+                                </m:e>
+                                <m:sub>
+                                  <m:r>
+                                    <a:rPr lang="en-US" b="0" i="1" smtClean="0">
+                                      <a:latin typeface="Cambria Math" panose="02040503050406030204" pitchFamily="18" charset="0"/>
+                                    </a:rPr>
+                                    <m:t>𝑖</m:t>
+                                  </m:r>
+                                </m:sub>
+                              </m:sSub>
+                              <m:d>
+                                <m:dPr>
+                                  <m:ctrlPr>
+                                    <a:rPr lang="en-US" b="0" i="1" smtClean="0">
+                                      <a:latin typeface="Cambria Math" panose="02040503050406030204" pitchFamily="18" charset="0"/>
+                                    </a:rPr>
+                                  </m:ctrlPr>
+                                </m:dPr>
+                                <m:e>
+                                  <m:r>
+                                    <a:rPr lang="en-US" b="1" i="1" smtClean="0">
+                                      <a:latin typeface="Cambria Math" panose="02040503050406030204" pitchFamily="18" charset="0"/>
+                                    </a:rPr>
+                                    <m:t>𝒍</m:t>
+                                  </m:r>
+                                </m:e>
+                              </m:d>
+                              <m:r>
+                                <a:rPr lang="en-US" b="0" i="1" smtClean="0">
+                                  <a:latin typeface="Cambria Math" panose="02040503050406030204" pitchFamily="18" charset="0"/>
+                                </a:rPr>
+                                <m:t> </m:t>
+                              </m:r>
+                              <m:r>
+                                <a:rPr lang="en-US" b="0" i="1" smtClean="0">
+                                  <a:latin typeface="Cambria Math" panose="02040503050406030204" pitchFamily="18" charset="0"/>
+                                </a:rPr>
+                                <m:t>𝑓</m:t>
+                              </m:r>
+                            </m:e>
+                            <m:sub>
+                              <m:r>
+                                <a:rPr lang="en-US" b="0" i="1" smtClean="0">
+                                  <a:latin typeface="Cambria Math" panose="02040503050406030204" pitchFamily="18" charset="0"/>
+                                </a:rPr>
+                                <m:t>𝑟</m:t>
+                              </m:r>
+                            </m:sub>
+                          </m:sSub>
+                          <m:d>
+                            <m:dPr>
+                              <m:ctrlPr>
+                                <a:rPr lang="en-US" b="0" i="1" smtClean="0">
+                                  <a:latin typeface="Cambria Math" panose="02040503050406030204" pitchFamily="18" charset="0"/>
+                                </a:rPr>
+                              </m:ctrlPr>
+                            </m:dPr>
+                            <m:e>
+                              <m:r>
+                                <a:rPr lang="en-US" b="1" i="1" smtClean="0">
+                                  <a:latin typeface="Cambria Math" panose="02040503050406030204" pitchFamily="18" charset="0"/>
+                                </a:rPr>
+                                <m:t>𝒗</m:t>
+                              </m:r>
+                              <m:r>
+                                <a:rPr lang="en-US" b="0" i="1" smtClean="0">
+                                  <a:latin typeface="Cambria Math" panose="02040503050406030204" pitchFamily="18" charset="0"/>
+                                </a:rPr>
+                                <m:t>,</m:t>
+                              </m:r>
+                              <m:r>
+                                <a:rPr lang="en-US" b="1" i="1" smtClean="0">
+                                  <a:latin typeface="Cambria Math" panose="02040503050406030204" pitchFamily="18" charset="0"/>
+                                </a:rPr>
+                                <m:t>𝒍</m:t>
+                              </m:r>
+                            </m:e>
+                          </m:d>
+                          <m:func>
+                            <m:funcPr>
+                              <m:ctrlPr>
+                                <a:rPr lang="en-US" b="0" i="1" smtClean="0">
+                                  <a:latin typeface="Cambria Math" panose="02040503050406030204" pitchFamily="18" charset="0"/>
+                                </a:rPr>
+                              </m:ctrlPr>
+                            </m:funcPr>
+                            <m:fName>
+                              <m:r>
+                                <m:rPr>
+                                  <m:sty m:val="p"/>
+                                </m:rPr>
+                                <a:rPr lang="en-US" b="0" i="0" smtClean="0">
+                                  <a:latin typeface="Cambria Math" panose="02040503050406030204" pitchFamily="18" charset="0"/>
+                                </a:rPr>
+                                <m:t>cos</m:t>
+                              </m:r>
+                            </m:fName>
+                            <m:e>
+                              <m:sSub>
+                                <m:sSubPr>
+                                  <m:ctrlPr>
+                                    <a:rPr lang="en-US" b="0" i="1" smtClean="0">
+                                      <a:latin typeface="Cambria Math" panose="02040503050406030204" pitchFamily="18" charset="0"/>
+                                    </a:rPr>
+                                  </m:ctrlPr>
+                                </m:sSubPr>
+                                <m:e>
+                                  <m:r>
+                                    <a:rPr lang="en-US" b="0" i="1" smtClean="0">
+                                      <a:latin typeface="Cambria Math" panose="02040503050406030204" pitchFamily="18" charset="0"/>
+                                    </a:rPr>
+                                    <m:t>𝜃</m:t>
+                                  </m:r>
+                                </m:e>
+                                <m:sub>
+                                  <m:r>
+                                    <a:rPr lang="en-US" b="1" i="1" smtClean="0">
+                                      <a:latin typeface="Cambria Math" panose="02040503050406030204" pitchFamily="18" charset="0"/>
+                                    </a:rPr>
+                                    <m:t>𝒍</m:t>
+                                  </m:r>
+                                </m:sub>
+                              </m:sSub>
+                              <m:r>
+                                <a:rPr lang="en-US" b="0" i="1" smtClean="0">
+                                  <a:latin typeface="Cambria Math" panose="02040503050406030204" pitchFamily="18" charset="0"/>
+                                </a:rPr>
+                                <m:t> </m:t>
+                              </m:r>
+                              <m:r>
+                                <a:rPr lang="en-US" b="0" i="1" smtClean="0">
+                                  <a:latin typeface="Cambria Math" panose="02040503050406030204" pitchFamily="18" charset="0"/>
+                                </a:rPr>
+                                <m:t>𝑑</m:t>
+                              </m:r>
+                              <m:r>
+                                <a:rPr lang="en-US" b="1" i="1" smtClean="0">
+                                  <a:latin typeface="Cambria Math" panose="02040503050406030204" pitchFamily="18" charset="0"/>
+                                </a:rPr>
+                                <m:t>𝒍</m:t>
+                              </m:r>
+                              <m:r>
+                                <a:rPr lang="en-US" b="0" i="1" smtClean="0">
+                                  <a:latin typeface="Cambria Math" panose="02040503050406030204" pitchFamily="18" charset="0"/>
+                                </a:rPr>
+                                <m:t>= </m:t>
+                              </m:r>
+                              <m:nary>
+                                <m:naryPr>
+                                  <m:ctrlPr>
+                                    <a:rPr lang="en-US" b="0" i="1" smtClean="0">
+                                      <a:latin typeface="Cambria Math" panose="02040503050406030204" pitchFamily="18" charset="0"/>
+                                    </a:rPr>
+                                  </m:ctrlPr>
+                                </m:naryPr>
+                                <m:sub>
+                                  <m:r>
+                                    <m:rPr>
+                                      <m:brk m:alnAt="23"/>
+                                    </m:rPr>
+                                    <a:rPr lang="en-US" b="0" i="1" smtClean="0">
+                                      <a:latin typeface="Cambria Math" panose="02040503050406030204" pitchFamily="18" charset="0"/>
+                                    </a:rPr>
+                                    <m:t>𝐴</m:t>
+                                  </m:r>
+                                </m:sub>
+                                <m:sup>
+                                  <m:r>
+                                    <a:rPr lang="en-US" b="0" i="1" smtClean="0">
+                                      <a:latin typeface="Cambria Math" panose="02040503050406030204" pitchFamily="18" charset="0"/>
+                                    </a:rPr>
+                                    <m:t> </m:t>
+                                  </m:r>
+                                </m:sup>
+                                <m:e>
+                                  <m:sSub>
+                                    <m:sSubPr>
+                                      <m:ctrlPr>
+                                        <a:rPr lang="en-US" b="0" i="1" smtClean="0">
+                                          <a:latin typeface="Cambria Math" panose="02040503050406030204" pitchFamily="18" charset="0"/>
+                                        </a:rPr>
+                                      </m:ctrlPr>
+                                    </m:sSubPr>
+                                    <m:e>
+                                      <m:r>
+                                        <a:rPr lang="en-US" b="0" i="1" smtClean="0">
+                                          <a:latin typeface="Cambria Math" panose="02040503050406030204" pitchFamily="18" charset="0"/>
+                                        </a:rPr>
+                                        <m:t>𝐿</m:t>
+                                      </m:r>
+                                    </m:e>
+                                    <m:sub>
+                                      <m:r>
+                                        <a:rPr lang="en-US" b="0" i="1" smtClean="0">
+                                          <a:latin typeface="Cambria Math" panose="02040503050406030204" pitchFamily="18" charset="0"/>
+                                        </a:rPr>
+                                        <m:t>𝑖</m:t>
+                                      </m:r>
+                                    </m:sub>
+                                  </m:sSub>
+                                  <m:d>
+                                    <m:dPr>
+                                      <m:ctrlPr>
+                                        <a:rPr lang="en-US" b="0" i="1" smtClean="0">
+                                          <a:latin typeface="Cambria Math" panose="02040503050406030204" pitchFamily="18" charset="0"/>
+                                        </a:rPr>
+                                      </m:ctrlPr>
+                                    </m:dPr>
+                                    <m:e>
+                                      <m:r>
+                                        <a:rPr lang="en-US" b="1" i="1" smtClean="0">
+                                          <a:latin typeface="Cambria Math" panose="02040503050406030204" pitchFamily="18" charset="0"/>
+                                        </a:rPr>
+                                        <m:t>𝒍</m:t>
+                                      </m:r>
+                                    </m:e>
+                                  </m:d>
+                                  <m:sSub>
+                                    <m:sSubPr>
+                                      <m:ctrlPr>
+                                        <a:rPr lang="en-US" b="0" i="1" smtClean="0">
+                                          <a:latin typeface="Cambria Math" panose="02040503050406030204" pitchFamily="18" charset="0"/>
+                                        </a:rPr>
+                                      </m:ctrlPr>
+                                    </m:sSubPr>
+                                    <m:e>
+                                      <m:r>
+                                        <a:rPr lang="en-US" b="0" i="1" smtClean="0">
+                                          <a:latin typeface="Cambria Math" panose="02040503050406030204" pitchFamily="18" charset="0"/>
+                                        </a:rPr>
+                                        <m:t>𝑓</m:t>
+                                      </m:r>
+                                    </m:e>
+                                    <m:sub>
+                                      <m:r>
+                                        <a:rPr lang="en-US" b="0" i="1" smtClean="0">
+                                          <a:latin typeface="Cambria Math" panose="02040503050406030204" pitchFamily="18" charset="0"/>
+                                        </a:rPr>
+                                        <m:t>𝑟</m:t>
+                                      </m:r>
+                                    </m:sub>
+                                  </m:sSub>
+                                  <m:d>
+                                    <m:dPr>
+                                      <m:ctrlPr>
+                                        <a:rPr lang="en-US" b="0" i="1" smtClean="0">
+                                          <a:latin typeface="Cambria Math" panose="02040503050406030204" pitchFamily="18" charset="0"/>
+                                        </a:rPr>
+                                      </m:ctrlPr>
+                                    </m:dPr>
+                                    <m:e>
+                                      <m:r>
+                                        <a:rPr lang="en-US" b="1" i="1" smtClean="0">
+                                          <a:latin typeface="Cambria Math" panose="02040503050406030204" pitchFamily="18" charset="0"/>
+                                        </a:rPr>
+                                        <m:t>𝒗</m:t>
+                                      </m:r>
+                                      <m:r>
+                                        <a:rPr lang="en-US" b="0" i="1" smtClean="0">
+                                          <a:latin typeface="Cambria Math" panose="02040503050406030204" pitchFamily="18" charset="0"/>
+                                        </a:rPr>
+                                        <m:t>, </m:t>
+                                      </m:r>
+                                      <m:r>
+                                        <a:rPr lang="en-US" b="1" i="1" smtClean="0">
+                                          <a:latin typeface="Cambria Math" panose="02040503050406030204" pitchFamily="18" charset="0"/>
+                                        </a:rPr>
+                                        <m:t>𝒍</m:t>
+                                      </m:r>
+                                    </m:e>
+                                  </m:d>
+                                  <m:func>
+                                    <m:funcPr>
+                                      <m:ctrlPr>
+                                        <a:rPr lang="en-US" b="0" i="1" smtClean="0">
+                                          <a:latin typeface="Cambria Math" panose="02040503050406030204" pitchFamily="18" charset="0"/>
+                                        </a:rPr>
+                                      </m:ctrlPr>
+                                    </m:funcPr>
+                                    <m:fName>
+                                      <m:r>
+                                        <m:rPr>
+                                          <m:sty m:val="p"/>
+                                        </m:rPr>
+                                        <a:rPr lang="en-US" b="0" i="0" smtClean="0">
+                                          <a:latin typeface="Cambria Math" panose="02040503050406030204" pitchFamily="18" charset="0"/>
+                                        </a:rPr>
+                                        <m:t>cos</m:t>
+                                      </m:r>
+                                    </m:fName>
+                                    <m:e>
+                                      <m:sSub>
+                                        <m:sSubPr>
+                                          <m:ctrlPr>
+                                            <a:rPr lang="en-US" b="0" i="1" smtClean="0">
+                                              <a:latin typeface="Cambria Math" panose="02040503050406030204" pitchFamily="18" charset="0"/>
+                                            </a:rPr>
+                                          </m:ctrlPr>
+                                        </m:sSubPr>
+                                        <m:e>
+                                          <m:r>
+                                            <a:rPr lang="en-US" b="0" i="1" smtClean="0">
+                                              <a:latin typeface="Cambria Math" panose="02040503050406030204" pitchFamily="18" charset="0"/>
+                                            </a:rPr>
+                                            <m:t>𝜃</m:t>
+                                          </m:r>
+                                        </m:e>
+                                        <m:sub>
+                                          <m:r>
+                                            <a:rPr lang="en-US" b="1" i="1" smtClean="0">
+                                              <a:latin typeface="Cambria Math" panose="02040503050406030204" pitchFamily="18" charset="0"/>
+                                            </a:rPr>
+                                            <m:t>𝒍</m:t>
+                                          </m:r>
+                                        </m:sub>
+                                      </m:sSub>
+                                    </m:e>
+                                  </m:func>
+                                  <m:f>
+                                    <m:fPr>
+                                      <m:ctrlPr>
+                                        <a:rPr lang="en-US" b="0" i="1" smtClean="0">
+                                          <a:latin typeface="Cambria Math" panose="02040503050406030204" pitchFamily="18" charset="0"/>
+                                        </a:rPr>
+                                      </m:ctrlPr>
+                                    </m:fPr>
+                                    <m:num>
+                                      <m:func>
+                                        <m:funcPr>
+                                          <m:ctrlPr>
+                                            <a:rPr lang="en-US" b="0" i="1" smtClean="0">
+                                              <a:latin typeface="Cambria Math" panose="02040503050406030204" pitchFamily="18" charset="0"/>
+                                            </a:rPr>
+                                          </m:ctrlPr>
+                                        </m:funcPr>
+                                        <m:fName>
+                                          <m:r>
+                                            <m:rPr>
+                                              <m:sty m:val="p"/>
+                                            </m:rPr>
+                                            <a:rPr lang="en-US" b="0" i="0" smtClean="0">
+                                              <a:latin typeface="Cambria Math" panose="02040503050406030204" pitchFamily="18" charset="0"/>
+                                            </a:rPr>
+                                            <m:t>cos</m:t>
+                                          </m:r>
+                                        </m:fName>
+                                        <m:e>
+                                          <m:sSub>
+                                            <m:sSubPr>
+                                              <m:ctrlPr>
+                                                <a:rPr lang="en-US" b="0" i="1" smtClean="0">
+                                                  <a:latin typeface="Cambria Math" panose="02040503050406030204" pitchFamily="18" charset="0"/>
+                                                </a:rPr>
+                                              </m:ctrlPr>
+                                            </m:sSubPr>
+                                            <m:e>
+                                              <m:r>
+                                                <a:rPr lang="en-US" b="0" i="1" smtClean="0">
+                                                  <a:latin typeface="Cambria Math" panose="02040503050406030204" pitchFamily="18" charset="0"/>
+                                                </a:rPr>
+                                                <m:t>𝜃</m:t>
+                                              </m:r>
+                                            </m:e>
+                                            <m:sub>
+                                              <m:sSup>
+                                                <m:sSupPr>
+                                                  <m:ctrlPr>
+                                                    <a:rPr lang="en-US" b="0" i="1" smtClean="0">
+                                                      <a:latin typeface="Cambria Math" panose="02040503050406030204" pitchFamily="18" charset="0"/>
+                                                    </a:rPr>
+                                                  </m:ctrlPr>
+                                                </m:sSupPr>
+                                                <m:e>
+                                                  <m:r>
+                                                    <a:rPr lang="en-US" b="1" i="1" smtClean="0">
+                                                      <a:latin typeface="Cambria Math" panose="02040503050406030204" pitchFamily="18" charset="0"/>
+                                                    </a:rPr>
+                                                    <m:t>𝒍</m:t>
+                                                  </m:r>
+                                                </m:e>
+                                                <m:sup>
+                                                  <m:r>
+                                                    <a:rPr lang="en-US" b="0" i="1" smtClean="0">
+                                                      <a:latin typeface="Cambria Math" panose="02040503050406030204" pitchFamily="18" charset="0"/>
+                                                    </a:rPr>
+                                                    <m:t>′</m:t>
+                                                  </m:r>
+                                                </m:sup>
+                                              </m:sSup>
+                                            </m:sub>
+                                          </m:sSub>
+                                        </m:e>
+                                      </m:func>
+                                    </m:num>
+                                    <m:den>
+                                      <m:r>
+                                        <a:rPr lang="en-US" b="0" i="1" smtClean="0">
+                                          <a:latin typeface="Cambria Math" panose="02040503050406030204" pitchFamily="18" charset="0"/>
+                                        </a:rPr>
+                                        <m:t>𝑑𝑖𝑠</m:t>
+                                      </m:r>
+                                      <m:sSup>
+                                        <m:sSupPr>
+                                          <m:ctrlPr>
+                                            <a:rPr lang="en-US" b="0" i="1" smtClean="0">
+                                              <a:latin typeface="Cambria Math" panose="02040503050406030204" pitchFamily="18" charset="0"/>
+                                            </a:rPr>
+                                          </m:ctrlPr>
+                                        </m:sSupPr>
+                                        <m:e>
+                                          <m:r>
+                                            <a:rPr lang="en-US" b="0" i="1" smtClean="0">
+                                              <a:latin typeface="Cambria Math" panose="02040503050406030204" pitchFamily="18" charset="0"/>
+                                            </a:rPr>
+                                            <m:t>𝑡</m:t>
+                                          </m:r>
+                                        </m:e>
+                                        <m:sup>
+                                          <m:r>
+                                            <a:rPr lang="en-US" b="0" i="1" smtClean="0">
+                                              <a:latin typeface="Cambria Math" panose="02040503050406030204" pitchFamily="18" charset="0"/>
+                                            </a:rPr>
+                                            <m:t>2</m:t>
+                                          </m:r>
+                                        </m:sup>
+                                      </m:sSup>
+                                    </m:den>
+                                  </m:f>
+                                  <m:r>
+                                    <a:rPr lang="en-US" b="0" i="1" smtClean="0">
+                                      <a:latin typeface="Cambria Math" panose="02040503050406030204" pitchFamily="18" charset="0"/>
+                                    </a:rPr>
+                                    <m:t> </m:t>
+                                  </m:r>
+                                  <m:r>
+                                    <a:rPr lang="en-US" b="0" i="1" smtClean="0">
+                                      <a:latin typeface="Cambria Math" panose="02040503050406030204" pitchFamily="18" charset="0"/>
+                                    </a:rPr>
+                                    <m:t>𝑑𝐴</m:t>
+                                  </m:r>
+                                </m:e>
+                              </m:nary>
+                            </m:e>
+                          </m:func>
+                        </m:e>
+                      </m:nary>
+                    </m:oMath>
+                  </m:oMathPara>
+                </a14:m>
+                <a:endParaRPr lang="en-US" dirty="0"/>
+              </a:p>
+              <a:p>
+                <a:pPr>
+                  <a:buFont typeface="Wingdings" panose="05000000000000000000" pitchFamily="2" charset="2"/>
+                  <a:buChar char="§"/>
+                </a:pPr>
+                <a:r>
+                  <a:rPr lang="en-US" dirty="0" err="1"/>
+                  <a:t>Szóval</a:t>
+                </a:r>
+                <a:r>
+                  <a:rPr lang="en-US" dirty="0"/>
+                  <a:t> </a:t>
+                </a:r>
+                <a:r>
+                  <a:rPr lang="en-US" dirty="0" err="1"/>
+                  <a:t>ilyen</a:t>
+                </a:r>
+                <a:r>
+                  <a:rPr lang="en-US" dirty="0"/>
+                  <a:t> </a:t>
+                </a:r>
+                <a:r>
+                  <a:rPr lang="en-US" dirty="0" err="1"/>
+                  <a:t>esetekben</a:t>
+                </a:r>
+                <a:r>
+                  <a:rPr lang="en-US" dirty="0"/>
+                  <a:t> a </a:t>
+                </a:r>
+                <a:r>
+                  <a:rPr lang="en-US" dirty="0" err="1"/>
+                  <a:t>fényforrásra</a:t>
+                </a:r>
+                <a:r>
+                  <a:rPr lang="en-US" dirty="0"/>
+                  <a:t> </a:t>
+                </a:r>
+                <a:r>
+                  <a:rPr lang="en-US" dirty="0" err="1"/>
+                  <a:t>célszer</a:t>
+                </a:r>
+                <a:r>
+                  <a:rPr lang="hu-HU" dirty="0"/>
+                  <a:t>ű</a:t>
+                </a:r>
+                <a:r>
+                  <a:rPr lang="en-US" dirty="0"/>
+                  <a:t>bb </a:t>
+                </a:r>
+                <a:r>
+                  <a:rPr lang="en-US" dirty="0" err="1"/>
+                  <a:t>alkalmazni</a:t>
+                </a:r>
+                <a:r>
+                  <a:rPr lang="en-US" dirty="0"/>
+                  <a:t> </a:t>
+                </a:r>
+                <a:r>
+                  <a:rPr lang="en-US" dirty="0" err="1"/>
+                  <a:t>az</a:t>
+                </a:r>
+                <a:r>
+                  <a:rPr lang="en-US" dirty="0"/>
+                  <a:t> </a:t>
+                </a:r>
+                <a:r>
+                  <a:rPr lang="en-US" i="1" dirty="0"/>
+                  <a:t>importance sampling</a:t>
+                </a:r>
+                <a:r>
+                  <a:rPr lang="en-US" dirty="0"/>
+                  <a:t>-</a:t>
+                </a:r>
+                <a:r>
+                  <a:rPr lang="en-US" dirty="0" err="1"/>
+                  <a:t>ot</a:t>
+                </a:r>
+                <a:endParaRPr lang="en-US" dirty="0"/>
+              </a:p>
+              <a:p>
+                <a:pPr>
+                  <a:buFont typeface="Wingdings" panose="05000000000000000000" pitchFamily="2" charset="2"/>
+                  <a:buChar char="§"/>
+                </a:pPr>
+                <a:r>
+                  <a:rPr lang="en-US" dirty="0"/>
+                  <a:t>Na </a:t>
+                </a:r>
+                <a:r>
+                  <a:rPr lang="en-US" dirty="0" err="1"/>
+                  <a:t>jó</a:t>
+                </a:r>
+                <a:r>
+                  <a:rPr lang="en-US" dirty="0"/>
+                  <a:t>, de </a:t>
+                </a:r>
+                <a:r>
+                  <a:rPr lang="en-US" dirty="0" err="1"/>
+                  <a:t>hogyan</a:t>
+                </a:r>
+                <a:r>
+                  <a:rPr lang="en-US" dirty="0"/>
+                  <a:t> </a:t>
+                </a:r>
+                <a:r>
+                  <a:rPr lang="en-US" dirty="0" err="1"/>
+                  <a:t>kombináljuk</a:t>
+                </a:r>
+                <a:r>
+                  <a:rPr lang="en-US" dirty="0"/>
+                  <a:t> </a:t>
+                </a:r>
+                <a:r>
+                  <a:rPr lang="en-US" dirty="0" err="1"/>
+                  <a:t>össze</a:t>
+                </a:r>
+                <a:r>
+                  <a:rPr lang="en-US" dirty="0"/>
+                  <a:t> </a:t>
+                </a:r>
+                <a:r>
+                  <a:rPr lang="en-US" dirty="0" err="1"/>
+                  <a:t>őket</a:t>
+                </a:r>
+                <a:r>
+                  <a:rPr lang="en-US" dirty="0"/>
+                  <a:t>?</a:t>
+                </a:r>
+              </a:p>
+              <a:p>
+                <a:pPr>
+                  <a:buFont typeface="Wingdings" panose="05000000000000000000" pitchFamily="2" charset="2"/>
+                  <a:buChar char="§"/>
+                </a:pPr>
+                <a:endParaRPr lang="en-US" dirty="0"/>
+              </a:p>
+              <a:p>
+                <a:pPr marL="0" indent="0" algn="ctr">
+                  <a:buNone/>
+                </a:pPr>
+                <a:endParaRPr lang="en-US" dirty="0"/>
+              </a:p>
+              <a:p>
+                <a:pPr>
+                  <a:buFont typeface="Wingdings" panose="05000000000000000000" pitchFamily="2" charset="2"/>
+                  <a:buChar char="§"/>
+                </a:pPr>
+                <a:endParaRPr lang="hu-HU" dirty="0"/>
+              </a:p>
+            </p:txBody>
+          </p:sp>
+        </mc:Choice>
+        <mc:Fallback>
+          <p:sp>
+            <p:nvSpPr>
+              <p:cNvPr id="3" name="Content Placeholder 2">
+                <a:extLst>
+                  <a:ext uri="{FF2B5EF4-FFF2-40B4-BE49-F238E27FC236}">
+                    <a16:creationId xmlns:a16="http://schemas.microsoft.com/office/drawing/2014/main" id="{D72606CF-3DD1-4CA8-A893-6DAEB1AFB3F2}"/>
+                  </a:ext>
+                </a:extLst>
+              </p:cNvPr>
+              <p:cNvSpPr>
+                <a:spLocks noGrp="1" noRot="1" noChangeAspect="1" noMove="1" noResize="1" noEditPoints="1" noAdjustHandles="1" noChangeArrowheads="1" noChangeShapeType="1" noTextEdit="1"/>
+              </p:cNvSpPr>
+              <p:nvPr>
+                <p:ph idx="1"/>
+              </p:nvPr>
+            </p:nvSpPr>
+            <p:spPr>
+              <a:blipFill>
+                <a:blip r:embed="rId2"/>
+                <a:stretch>
+                  <a:fillRect l="-1455" t="-1667"/>
+                </a:stretch>
+              </a:blipFill>
+            </p:spPr>
+            <p:txBody>
+              <a:bodyPr/>
+              <a:lstStyle/>
+              <a:p>
+                <a:r>
+                  <a:rPr lang="hu-HU">
+                    <a:noFill/>
+                  </a:rPr>
+                  <a:t> </a:t>
+                </a:r>
+              </a:p>
+            </p:txBody>
+          </p:sp>
+        </mc:Fallback>
+      </mc:AlternateContent>
+    </p:spTree>
+    <p:extLst>
+      <p:ext uri="{BB962C8B-B14F-4D97-AF65-F5344CB8AC3E}">
+        <p14:creationId xmlns:p14="http://schemas.microsoft.com/office/powerpoint/2010/main" val="2749592538"/>
+      </p:ext>
+    </p:extLst>
+  </p:cSld>
+  <p:clrMapOvr>
+    <a:masterClrMapping/>
+  </p:clrMapOvr>
+</p:sld>
+</file>
+
+<file path=ppt/slides/slide11.xml><?xml version="1.0" encoding="utf-8"?>
+<p:sld xmlns:a="http://schemas.openxmlformats.org/drawingml/2006/main" xmlns:r="http://schemas.openxmlformats.org/officeDocument/2006/relationships" xmlns:p="http://schemas.openxmlformats.org/presentationml/2006/main">
+  <p:cSld>
+    <p:spTree>
+      <p:nvGrpSpPr>
+        <p:cNvPr id="1" name=""/>
+        <p:cNvGrpSpPr/>
+        <p:nvPr/>
+      </p:nvGrpSpPr>
+      <p:grpSpPr>
+        <a:xfrm>
+          <a:off x="0" y="0"/>
+          <a:ext cx="0" cy="0"/>
+          <a:chOff x="0" y="0"/>
+          <a:chExt cx="0" cy="0"/>
+        </a:xfrm>
+      </p:grpSpPr>
+      <p:sp>
+        <p:nvSpPr>
+          <p:cNvPr id="2" name="Title 1">
+            <a:extLst>
+              <a:ext uri="{FF2B5EF4-FFF2-40B4-BE49-F238E27FC236}">
+                <a16:creationId xmlns:a16="http://schemas.microsoft.com/office/drawing/2014/main" id="{17C01925-E4D4-47B9-BA8F-6C0BC79DDB08}"/>
+              </a:ext>
+            </a:extLst>
+          </p:cNvPr>
+          <p:cNvSpPr>
+            <a:spLocks noGrp="1"/>
+          </p:cNvSpPr>
+          <p:nvPr>
+            <p:ph type="title"/>
+          </p:nvPr>
+        </p:nvSpPr>
+        <p:spPr/>
+        <p:txBody>
+          <a:bodyPr/>
+          <a:lstStyle/>
+          <a:p>
+            <a:r>
+              <a:rPr lang="en-US" dirty="0"/>
+              <a:t>Multiple importance sampling</a:t>
+            </a:r>
+            <a:endParaRPr lang="hu-HU" dirty="0"/>
+          </a:p>
+        </p:txBody>
+      </p:sp>
+      <mc:AlternateContent xmlns:mc="http://schemas.openxmlformats.org/markup-compatibility/2006">
+        <mc:Choice xmlns:a14="http://schemas.microsoft.com/office/drawing/2010/main" Requires="a14">
+          <p:sp>
+            <p:nvSpPr>
+              <p:cNvPr id="3" name="Content Placeholder 2">
+                <a:extLst>
+                  <a:ext uri="{FF2B5EF4-FFF2-40B4-BE49-F238E27FC236}">
+                    <a16:creationId xmlns:a16="http://schemas.microsoft.com/office/drawing/2014/main" id="{A35E5CC8-8456-4C88-A3DE-DD9360B530B1}"/>
+                  </a:ext>
+                </a:extLst>
+              </p:cNvPr>
+              <p:cNvSpPr>
+                <a:spLocks noGrp="1"/>
+              </p:cNvSpPr>
+              <p:nvPr>
+                <p:ph idx="1"/>
+              </p:nvPr>
+            </p:nvSpPr>
+            <p:spPr/>
+            <p:txBody>
+              <a:bodyPr>
+                <a:normAutofit fontScale="92500" lnSpcReduction="10000"/>
+              </a:bodyPr>
+              <a:lstStyle/>
+              <a:p>
+                <a:pPr>
+                  <a:buFont typeface="Wingdings" panose="05000000000000000000" pitchFamily="2" charset="2"/>
+                  <a:buChar char="§"/>
+                </a:pPr>
+                <a:r>
+                  <a:rPr lang="en-US" dirty="0"/>
+                  <a:t>Adott </a:t>
+                </a:r>
+                <a14:m>
+                  <m:oMath xmlns:m="http://schemas.openxmlformats.org/officeDocument/2006/math">
+                    <m:r>
+                      <a:rPr lang="en-US" b="0" i="1" smtClean="0">
+                        <a:latin typeface="Cambria Math" panose="02040503050406030204" pitchFamily="18" charset="0"/>
+                      </a:rPr>
+                      <m:t>𝑀</m:t>
+                    </m:r>
+                  </m:oMath>
+                </a14:m>
+                <a:r>
+                  <a:rPr lang="en-US" dirty="0"/>
+                  <a:t> </a:t>
+                </a:r>
+                <a:r>
+                  <a:rPr lang="en-US" dirty="0" err="1"/>
+                  <a:t>darab</a:t>
+                </a:r>
+                <a:r>
+                  <a:rPr lang="en-US" dirty="0"/>
+                  <a:t> </a:t>
+                </a:r>
+                <a:r>
+                  <a:rPr lang="en-US" dirty="0" err="1"/>
+                  <a:t>eloszlás</a:t>
+                </a:r>
+                <a:r>
+                  <a:rPr lang="en-US" dirty="0"/>
+                  <a:t>, </a:t>
+                </a:r>
+                <a:r>
+                  <a:rPr lang="en-US" dirty="0" err="1"/>
+                  <a:t>ezek</a:t>
+                </a:r>
+                <a:r>
+                  <a:rPr lang="en-US" dirty="0"/>
+                  <a:t> </a:t>
+                </a:r>
+                <a:r>
+                  <a:rPr lang="en-US" dirty="0" err="1"/>
+                  <a:t>közül</a:t>
+                </a:r>
+                <a:r>
+                  <a:rPr lang="en-US" dirty="0"/>
+                  <a:t> </a:t>
+                </a:r>
+                <a:r>
+                  <a:rPr lang="en-US" dirty="0" err="1"/>
+                  <a:t>minden</a:t>
+                </a:r>
+                <a:r>
+                  <a:rPr lang="en-US" dirty="0"/>
+                  <a:t> </a:t>
+                </a:r>
+                <a14:m>
+                  <m:oMath xmlns:m="http://schemas.openxmlformats.org/officeDocument/2006/math">
+                    <m:r>
+                      <a:rPr lang="en-US" b="0" i="1" smtClean="0">
+                        <a:latin typeface="Cambria Math" panose="02040503050406030204" pitchFamily="18" charset="0"/>
+                      </a:rPr>
+                      <m:t>𝑘</m:t>
+                    </m:r>
+                  </m:oMath>
+                </a14:m>
+                <a:r>
+                  <a:rPr lang="en-US" dirty="0"/>
+                  <a:t>-</a:t>
+                </a:r>
+                <a:r>
+                  <a:rPr lang="en-US" dirty="0" err="1"/>
+                  <a:t>adik</a:t>
+                </a:r>
+                <a:r>
+                  <a:rPr lang="en-US" dirty="0"/>
+                  <a:t> </a:t>
+                </a:r>
+                <a:r>
+                  <a:rPr lang="en-US" dirty="0" err="1"/>
+                  <a:t>iterációban</a:t>
+                </a:r>
+                <a:r>
+                  <a:rPr lang="en-US" dirty="0"/>
+                  <a:t>:</a:t>
+                </a:r>
+              </a:p>
+              <a:p>
+                <a:pPr lvl="1">
+                  <a:buFont typeface="Wingdings" panose="05000000000000000000" pitchFamily="2" charset="2"/>
+                  <a:buChar char="§"/>
+                </a:pPr>
+                <a:r>
+                  <a:rPr lang="en-US" dirty="0" err="1"/>
+                  <a:t>Kiválasztasz</a:t>
+                </a:r>
+                <a:r>
+                  <a:rPr lang="en-US" dirty="0"/>
+                  <a:t> </a:t>
+                </a:r>
+                <a:r>
+                  <a:rPr lang="en-US" dirty="0" err="1"/>
+                  <a:t>egyet</a:t>
+                </a:r>
+                <a:r>
+                  <a:rPr lang="en-US" dirty="0"/>
+                  <a:t> </a:t>
+                </a:r>
+                <a14:m>
+                  <m:oMath xmlns:m="http://schemas.openxmlformats.org/officeDocument/2006/math">
+                    <m:r>
+                      <a:rPr lang="en-US" b="0" i="1" smtClean="0">
+                        <a:latin typeface="Cambria Math" panose="02040503050406030204" pitchFamily="18" charset="0"/>
+                      </a:rPr>
+                      <m:t>𝑝</m:t>
+                    </m:r>
+                    <m:d>
+                      <m:dPr>
+                        <m:ctrlPr>
+                          <a:rPr lang="en-US" b="0" i="1" smtClean="0">
+                            <a:latin typeface="Cambria Math" panose="02040503050406030204" pitchFamily="18" charset="0"/>
+                          </a:rPr>
+                        </m:ctrlPr>
+                      </m:dPr>
+                      <m:e>
+                        <m:r>
+                          <a:rPr lang="en-US" b="0" i="1" smtClean="0">
+                            <a:latin typeface="Cambria Math" panose="02040503050406030204" pitchFamily="18" charset="0"/>
+                          </a:rPr>
+                          <m:t>𝑗</m:t>
+                        </m:r>
+                      </m:e>
+                    </m:d>
+                    <m:r>
+                      <a:rPr lang="en-US" b="0" i="1" smtClean="0">
+                        <a:latin typeface="Cambria Math" panose="02040503050406030204" pitchFamily="18" charset="0"/>
+                      </a:rPr>
+                      <m:t>=</m:t>
+                    </m:r>
+                    <m:f>
+                      <m:fPr>
+                        <m:ctrlPr>
+                          <a:rPr lang="en-US" b="0" i="1" smtClean="0">
+                            <a:latin typeface="Cambria Math" panose="02040503050406030204" pitchFamily="18" charset="0"/>
+                          </a:rPr>
+                        </m:ctrlPr>
+                      </m:fPr>
+                      <m:num>
+                        <m:r>
+                          <a:rPr lang="en-US" b="0" i="1" smtClean="0">
+                            <a:latin typeface="Cambria Math" panose="02040503050406030204" pitchFamily="18" charset="0"/>
+                          </a:rPr>
+                          <m:t>1</m:t>
+                        </m:r>
+                      </m:num>
+                      <m:den>
+                        <m:r>
+                          <a:rPr lang="en-US" b="0" i="1" smtClean="0">
+                            <a:latin typeface="Cambria Math" panose="02040503050406030204" pitchFamily="18" charset="0"/>
+                          </a:rPr>
+                          <m:t>𝑀</m:t>
+                        </m:r>
+                      </m:den>
+                    </m:f>
+                  </m:oMath>
+                </a14:m>
+                <a:r>
+                  <a:rPr lang="en-US" dirty="0"/>
+                  <a:t> sűrűségfüggvénnyel, </a:t>
+                </a:r>
+                <a:r>
+                  <a:rPr lang="en-US" dirty="0" err="1"/>
+                  <a:t>legyen</a:t>
+                </a:r>
+                <a:r>
+                  <a:rPr lang="en-US" dirty="0"/>
+                  <a:t> </a:t>
+                </a:r>
+                <a:r>
+                  <a:rPr lang="en-US" dirty="0" err="1"/>
+                  <a:t>ez</a:t>
+                </a:r>
+                <a:r>
+                  <a:rPr lang="en-US" dirty="0"/>
+                  <a:t> a </a:t>
+                </a:r>
+                <a14:m>
+                  <m:oMath xmlns:m="http://schemas.openxmlformats.org/officeDocument/2006/math">
+                    <m:r>
+                      <a:rPr lang="en-US" b="0" i="1" smtClean="0">
+                        <a:latin typeface="Cambria Math" panose="02040503050406030204" pitchFamily="18" charset="0"/>
+                      </a:rPr>
+                      <m:t>𝑗</m:t>
+                    </m:r>
+                  </m:oMath>
+                </a14:m>
+                <a:r>
+                  <a:rPr lang="en-US" dirty="0"/>
+                  <a:t>-</a:t>
+                </a:r>
+                <a:r>
+                  <a:rPr lang="en-US" dirty="0" err="1"/>
+                  <a:t>edik</a:t>
+                </a:r>
+                <a:r>
+                  <a:rPr lang="en-US" dirty="0"/>
+                  <a:t> (</a:t>
+                </a:r>
+                <a14:m>
+                  <m:oMath xmlns:m="http://schemas.openxmlformats.org/officeDocument/2006/math">
+                    <m:sSub>
+                      <m:sSubPr>
+                        <m:ctrlPr>
+                          <a:rPr lang="en-US" b="0" i="1" smtClean="0">
+                            <a:latin typeface="Cambria Math" panose="02040503050406030204" pitchFamily="18" charset="0"/>
+                          </a:rPr>
+                        </m:ctrlPr>
+                      </m:sSubPr>
+                      <m:e>
+                        <m:r>
+                          <a:rPr lang="en-US" b="0" i="1" smtClean="0">
+                            <a:latin typeface="Cambria Math" panose="02040503050406030204" pitchFamily="18" charset="0"/>
+                          </a:rPr>
+                          <m:t>𝑝</m:t>
+                        </m:r>
+                      </m:e>
+                      <m:sub>
+                        <m:r>
+                          <a:rPr lang="en-US" b="0" i="1" smtClean="0">
+                            <a:latin typeface="Cambria Math" panose="02040503050406030204" pitchFamily="18" charset="0"/>
+                          </a:rPr>
+                          <m:t>𝑗</m:t>
+                        </m:r>
+                      </m:sub>
+                    </m:sSub>
+                  </m:oMath>
+                </a14:m>
+                <a:r>
+                  <a:rPr lang="en-US" dirty="0"/>
+                  <a:t>)</a:t>
+                </a:r>
+              </a:p>
+              <a:p>
+                <a:pPr lvl="1">
+                  <a:buFont typeface="Wingdings" panose="05000000000000000000" pitchFamily="2" charset="2"/>
+                  <a:buChar char="§"/>
+                </a:pPr>
+                <a:r>
+                  <a:rPr lang="en-US" dirty="0" err="1"/>
+                  <a:t>Ezzel</a:t>
+                </a:r>
+                <a:r>
+                  <a:rPr lang="en-US" dirty="0"/>
+                  <a:t> a </a:t>
+                </a:r>
+                <a14:m>
+                  <m:oMath xmlns:m="http://schemas.openxmlformats.org/officeDocument/2006/math">
+                    <m:sSub>
+                      <m:sSubPr>
+                        <m:ctrlPr>
+                          <a:rPr lang="en-US" b="0" i="1" smtClean="0">
+                            <a:latin typeface="Cambria Math" panose="02040503050406030204" pitchFamily="18" charset="0"/>
+                          </a:rPr>
+                        </m:ctrlPr>
+                      </m:sSubPr>
+                      <m:e>
+                        <m:r>
+                          <a:rPr lang="en-US" b="0" i="1" smtClean="0">
+                            <a:latin typeface="Cambria Math" panose="02040503050406030204" pitchFamily="18" charset="0"/>
+                          </a:rPr>
+                          <m:t>𝑝</m:t>
+                        </m:r>
+                      </m:e>
+                      <m:sub>
+                        <m:r>
+                          <a:rPr lang="en-US" b="0" i="1" smtClean="0">
+                            <a:latin typeface="Cambria Math" panose="02040503050406030204" pitchFamily="18" charset="0"/>
+                          </a:rPr>
+                          <m:t>𝑗</m:t>
+                        </m:r>
+                      </m:sub>
+                    </m:sSub>
+                  </m:oMath>
+                </a14:m>
+                <a:r>
+                  <a:rPr lang="en-US" dirty="0"/>
+                  <a:t>-</a:t>
+                </a:r>
+                <a:r>
+                  <a:rPr lang="en-US" dirty="0" err="1"/>
+                  <a:t>vel</a:t>
+                </a:r>
+                <a:r>
+                  <a:rPr lang="en-US" dirty="0"/>
+                  <a:t> </a:t>
+                </a:r>
+                <a:r>
+                  <a:rPr lang="en-US" dirty="0" err="1"/>
+                  <a:t>húzol</a:t>
+                </a:r>
+                <a:r>
+                  <a:rPr lang="en-US" dirty="0"/>
+                  <a:t> </a:t>
+                </a:r>
+                <a:r>
+                  <a:rPr lang="en-US" dirty="0" err="1"/>
+                  <a:t>egy</a:t>
+                </a:r>
+                <a:r>
+                  <a:rPr lang="en-US" dirty="0"/>
+                  <a:t> </a:t>
+                </a:r>
+                <a14:m>
+                  <m:oMath xmlns:m="http://schemas.openxmlformats.org/officeDocument/2006/math">
+                    <m:sSub>
+                      <m:sSubPr>
+                        <m:ctrlPr>
+                          <a:rPr lang="en-US" b="0" i="1" smtClean="0">
+                            <a:latin typeface="Cambria Math" panose="02040503050406030204" pitchFamily="18" charset="0"/>
+                          </a:rPr>
+                        </m:ctrlPr>
+                      </m:sSubPr>
+                      <m:e>
+                        <m:r>
+                          <a:rPr lang="en-US" b="0" i="1" smtClean="0">
+                            <a:latin typeface="Cambria Math" panose="02040503050406030204" pitchFamily="18" charset="0"/>
+                          </a:rPr>
+                          <m:t>𝑥</m:t>
+                        </m:r>
+                      </m:e>
+                      <m:sub>
+                        <m:r>
+                          <a:rPr lang="en-US" b="0" i="1" smtClean="0">
+                            <a:latin typeface="Cambria Math" panose="02040503050406030204" pitchFamily="18" charset="0"/>
+                          </a:rPr>
+                          <m:t>𝑘</m:t>
+                        </m:r>
+                      </m:sub>
+                    </m:sSub>
+                  </m:oMath>
+                </a14:m>
+                <a:r>
+                  <a:rPr lang="en-US" dirty="0"/>
+                  <a:t> mintát</a:t>
+                </a:r>
+              </a:p>
+              <a:p>
+                <a:pPr lvl="1">
+                  <a:buFont typeface="Wingdings" panose="05000000000000000000" pitchFamily="2" charset="2"/>
+                  <a:buChar char="§"/>
+                </a:pPr>
+                <a:r>
+                  <a:rPr lang="en-US" dirty="0" err="1"/>
+                  <a:t>Kiszámolod</a:t>
+                </a:r>
+                <a:r>
+                  <a:rPr lang="en-US" dirty="0"/>
+                  <a:t> </a:t>
+                </a:r>
+                <a:r>
+                  <a:rPr lang="en-US" dirty="0" err="1"/>
+                  <a:t>ezt</a:t>
+                </a:r>
+                <a:r>
+                  <a:rPr lang="en-US" dirty="0"/>
+                  <a:t>: </a:t>
+                </a:r>
+                <a14:m>
+                  <m:oMath xmlns:m="http://schemas.openxmlformats.org/officeDocument/2006/math">
+                    <m:f>
+                      <m:fPr>
+                        <m:ctrlPr>
+                          <a:rPr lang="en-US" i="1" smtClean="0">
+                            <a:latin typeface="Cambria Math" panose="02040503050406030204" pitchFamily="18" charset="0"/>
+                          </a:rPr>
+                        </m:ctrlPr>
+                      </m:fPr>
+                      <m:num>
+                        <m:r>
+                          <a:rPr lang="en-US" b="0" i="1" smtClean="0">
+                            <a:latin typeface="Cambria Math" panose="02040503050406030204" pitchFamily="18" charset="0"/>
+                          </a:rPr>
+                          <m:t>𝑓</m:t>
+                        </m:r>
+                        <m:r>
+                          <a:rPr lang="en-US" b="0" i="1" smtClean="0">
+                            <a:latin typeface="Cambria Math" panose="02040503050406030204" pitchFamily="18" charset="0"/>
+                          </a:rPr>
+                          <m:t>(</m:t>
+                        </m:r>
+                        <m:sSub>
+                          <m:sSubPr>
+                            <m:ctrlPr>
+                              <a:rPr lang="en-US" b="0" i="1" smtClean="0">
+                                <a:latin typeface="Cambria Math" panose="02040503050406030204" pitchFamily="18" charset="0"/>
+                              </a:rPr>
+                            </m:ctrlPr>
+                          </m:sSubPr>
+                          <m:e>
+                            <m:r>
+                              <a:rPr lang="en-US" b="0" i="1" smtClean="0">
+                                <a:latin typeface="Cambria Math" panose="02040503050406030204" pitchFamily="18" charset="0"/>
+                              </a:rPr>
+                              <m:t>𝑥</m:t>
+                            </m:r>
+                          </m:e>
+                          <m:sub>
+                            <m:r>
+                              <a:rPr lang="en-US" b="0" i="1" smtClean="0">
+                                <a:latin typeface="Cambria Math" panose="02040503050406030204" pitchFamily="18" charset="0"/>
+                              </a:rPr>
+                              <m:t>𝑘</m:t>
+                            </m:r>
+                          </m:sub>
+                        </m:sSub>
+                        <m:r>
+                          <a:rPr lang="en-US" b="0" i="1" smtClean="0">
+                            <a:latin typeface="Cambria Math" panose="02040503050406030204" pitchFamily="18" charset="0"/>
+                          </a:rPr>
+                          <m:t>)</m:t>
+                        </m:r>
+                      </m:num>
+                      <m:den>
+                        <m:nary>
+                          <m:naryPr>
+                            <m:chr m:val="∑"/>
+                            <m:limLoc m:val="subSup"/>
+                            <m:ctrlPr>
+                              <a:rPr lang="en-US" i="1" smtClean="0">
+                                <a:latin typeface="Cambria Math" panose="02040503050406030204" pitchFamily="18" charset="0"/>
+                              </a:rPr>
+                            </m:ctrlPr>
+                          </m:naryPr>
+                          <m:sub>
+                            <m:r>
+                              <m:rPr>
+                                <m:brk m:alnAt="25"/>
+                              </m:rPr>
+                              <a:rPr lang="en-US" b="0" i="1" smtClean="0">
+                                <a:latin typeface="Cambria Math" panose="02040503050406030204" pitchFamily="18" charset="0"/>
+                              </a:rPr>
+                              <m:t>𝑗</m:t>
+                            </m:r>
+                            <m:r>
+                              <a:rPr lang="en-US" b="0" i="1" smtClean="0">
+                                <a:latin typeface="Cambria Math" panose="02040503050406030204" pitchFamily="18" charset="0"/>
+                              </a:rPr>
+                              <m:t>=1</m:t>
+                            </m:r>
+                          </m:sub>
+                          <m:sup>
+                            <m:r>
+                              <a:rPr lang="en-US" b="0" i="1" smtClean="0">
+                                <a:latin typeface="Cambria Math" panose="02040503050406030204" pitchFamily="18" charset="0"/>
+                              </a:rPr>
+                              <m:t>𝑀</m:t>
+                            </m:r>
+                          </m:sup>
+                          <m:e>
+                            <m:r>
+                              <a:rPr lang="en-US" b="0" i="1" smtClean="0">
+                                <a:latin typeface="Cambria Math" panose="02040503050406030204" pitchFamily="18" charset="0"/>
+                              </a:rPr>
+                              <m:t>𝑝</m:t>
+                            </m:r>
+                            <m:d>
+                              <m:dPr>
+                                <m:ctrlPr>
+                                  <a:rPr lang="en-US" b="0" i="1" smtClean="0">
+                                    <a:latin typeface="Cambria Math" panose="02040503050406030204" pitchFamily="18" charset="0"/>
+                                  </a:rPr>
+                                </m:ctrlPr>
+                              </m:dPr>
+                              <m:e>
+                                <m:r>
+                                  <a:rPr lang="en-US" b="0" i="1" smtClean="0">
+                                    <a:latin typeface="Cambria Math" panose="02040503050406030204" pitchFamily="18" charset="0"/>
+                                  </a:rPr>
+                                  <m:t>𝑗</m:t>
+                                </m:r>
+                              </m:e>
+                            </m:d>
+                            <m:r>
+                              <a:rPr lang="en-US" b="0" i="1" smtClean="0">
+                                <a:latin typeface="Cambria Math" panose="02040503050406030204" pitchFamily="18" charset="0"/>
+                              </a:rPr>
+                              <m:t> </m:t>
+                            </m:r>
+                            <m:sSub>
+                              <m:sSubPr>
+                                <m:ctrlPr>
+                                  <a:rPr lang="en-US" b="0" i="1" smtClean="0">
+                                    <a:latin typeface="Cambria Math" panose="02040503050406030204" pitchFamily="18" charset="0"/>
+                                  </a:rPr>
+                                </m:ctrlPr>
+                              </m:sSubPr>
+                              <m:e>
+                                <m:r>
+                                  <a:rPr lang="en-US" b="0" i="1" smtClean="0">
+                                    <a:latin typeface="Cambria Math" panose="02040503050406030204" pitchFamily="18" charset="0"/>
+                                  </a:rPr>
+                                  <m:t>𝑝</m:t>
+                                </m:r>
+                              </m:e>
+                              <m:sub>
+                                <m:r>
+                                  <a:rPr lang="en-US" b="0" i="1" smtClean="0">
+                                    <a:latin typeface="Cambria Math" panose="02040503050406030204" pitchFamily="18" charset="0"/>
+                                  </a:rPr>
+                                  <m:t>𝑗</m:t>
+                                </m:r>
+                              </m:sub>
+                            </m:sSub>
+                            <m:r>
+                              <a:rPr lang="en-US" b="0" i="1" smtClean="0">
+                                <a:latin typeface="Cambria Math" panose="02040503050406030204" pitchFamily="18" charset="0"/>
+                              </a:rPr>
+                              <m:t>(</m:t>
+                            </m:r>
+                            <m:sSub>
+                              <m:sSubPr>
+                                <m:ctrlPr>
+                                  <a:rPr lang="en-US" b="0" i="1" smtClean="0">
+                                    <a:latin typeface="Cambria Math" panose="02040503050406030204" pitchFamily="18" charset="0"/>
+                                  </a:rPr>
+                                </m:ctrlPr>
+                              </m:sSubPr>
+                              <m:e>
+                                <m:r>
+                                  <a:rPr lang="en-US" b="0" i="1" smtClean="0">
+                                    <a:latin typeface="Cambria Math" panose="02040503050406030204" pitchFamily="18" charset="0"/>
+                                  </a:rPr>
+                                  <m:t>𝑥</m:t>
+                                </m:r>
+                              </m:e>
+                              <m:sub>
+                                <m:r>
+                                  <a:rPr lang="en-US" b="0" i="1" smtClean="0">
+                                    <a:latin typeface="Cambria Math" panose="02040503050406030204" pitchFamily="18" charset="0"/>
+                                  </a:rPr>
+                                  <m:t>𝑘</m:t>
+                                </m:r>
+                              </m:sub>
+                            </m:sSub>
+                            <m:r>
+                              <a:rPr lang="en-US" b="0" i="1" smtClean="0">
+                                <a:latin typeface="Cambria Math" panose="02040503050406030204" pitchFamily="18" charset="0"/>
+                              </a:rPr>
+                              <m:t>)</m:t>
+                            </m:r>
+                          </m:e>
+                        </m:nary>
+                      </m:den>
+                    </m:f>
+                  </m:oMath>
+                </a14:m>
+                <a:endParaRPr lang="en-US" dirty="0"/>
+              </a:p>
+              <a:p>
+                <a:pPr>
+                  <a:buFont typeface="Wingdings" panose="05000000000000000000" pitchFamily="2" charset="2"/>
+                  <a:buChar char="§"/>
+                </a:pPr>
+                <a:r>
+                  <a:rPr lang="en-US" dirty="0"/>
+                  <a:t>A </a:t>
+                </a:r>
+                <a:r>
+                  <a:rPr lang="en-US" dirty="0" err="1"/>
+                  <a:t>végeredmény</a:t>
+                </a:r>
+                <a:r>
+                  <a:rPr lang="en-US" dirty="0"/>
+                  <a:t> </a:t>
+                </a:r>
+                <a:r>
+                  <a:rPr lang="en-US" dirty="0" err="1"/>
+                  <a:t>meglepő</a:t>
+                </a:r>
+                <a:r>
+                  <a:rPr lang="en-US" dirty="0"/>
+                  <a:t> </a:t>
+                </a:r>
+                <a:r>
+                  <a:rPr lang="en-US" dirty="0" err="1"/>
+                  <a:t>módon</a:t>
+                </a:r>
+                <a:endParaRPr lang="en-US" dirty="0"/>
+              </a:p>
+              <a:p>
+                <a:pPr marL="0" indent="0" algn="ctr">
+                  <a:buNone/>
+                </a:pPr>
+                <a14:m>
+                  <m:oMathPara xmlns:m="http://schemas.openxmlformats.org/officeDocument/2006/math">
+                    <m:oMathParaPr>
+                      <m:jc m:val="centerGroup"/>
+                    </m:oMathParaPr>
+                    <m:oMath xmlns:m="http://schemas.openxmlformats.org/officeDocument/2006/math">
+                      <m:f>
+                        <m:fPr>
+                          <m:ctrlPr>
+                            <a:rPr lang="en-US" i="1" smtClean="0">
+                              <a:latin typeface="Cambria Math" panose="02040503050406030204" pitchFamily="18" charset="0"/>
+                            </a:rPr>
+                          </m:ctrlPr>
+                        </m:fPr>
+                        <m:num>
+                          <m:r>
+                            <a:rPr lang="en-US" b="0" i="1" smtClean="0">
+                              <a:latin typeface="Cambria Math" panose="02040503050406030204" pitchFamily="18" charset="0"/>
+                            </a:rPr>
+                            <m:t>1</m:t>
+                          </m:r>
+                        </m:num>
+                        <m:den>
+                          <m:r>
+                            <a:rPr lang="en-US" b="0" i="1" smtClean="0">
+                              <a:latin typeface="Cambria Math" panose="02040503050406030204" pitchFamily="18" charset="0"/>
+                            </a:rPr>
+                            <m:t>𝑁</m:t>
+                          </m:r>
+                        </m:den>
+                      </m:f>
+                      <m:nary>
+                        <m:naryPr>
+                          <m:chr m:val="∑"/>
+                          <m:ctrlPr>
+                            <a:rPr lang="en-US" i="1" smtClean="0">
+                              <a:latin typeface="Cambria Math" panose="02040503050406030204" pitchFamily="18" charset="0"/>
+                            </a:rPr>
+                          </m:ctrlPr>
+                        </m:naryPr>
+                        <m:sub>
+                          <m:r>
+                            <m:rPr>
+                              <m:brk m:alnAt="23"/>
+                            </m:rPr>
+                            <a:rPr lang="en-US" b="0" i="1" smtClean="0">
+                              <a:latin typeface="Cambria Math" panose="02040503050406030204" pitchFamily="18" charset="0"/>
+                            </a:rPr>
+                            <m:t>𝑘</m:t>
+                          </m:r>
+                          <m:r>
+                            <a:rPr lang="en-US" b="0" i="1" smtClean="0">
+                              <a:latin typeface="Cambria Math" panose="02040503050406030204" pitchFamily="18" charset="0"/>
+                            </a:rPr>
+                            <m:t>=1</m:t>
+                          </m:r>
+                        </m:sub>
+                        <m:sup>
+                          <m:r>
+                            <a:rPr lang="en-US" b="0" i="1" smtClean="0">
+                              <a:latin typeface="Cambria Math" panose="02040503050406030204" pitchFamily="18" charset="0"/>
+                            </a:rPr>
+                            <m:t>𝑁</m:t>
+                          </m:r>
+                        </m:sup>
+                        <m:e>
+                          <m:f>
+                            <m:fPr>
+                              <m:ctrlPr>
+                                <a:rPr lang="en-US" i="1" smtClean="0">
+                                  <a:latin typeface="Cambria Math" panose="02040503050406030204" pitchFamily="18" charset="0"/>
+                                </a:rPr>
+                              </m:ctrlPr>
+                            </m:fPr>
+                            <m:num>
+                              <m:r>
+                                <a:rPr lang="en-US" b="0" i="1" smtClean="0">
+                                  <a:latin typeface="Cambria Math" panose="02040503050406030204" pitchFamily="18" charset="0"/>
+                                </a:rPr>
+                                <m:t>𝑓</m:t>
+                              </m:r>
+                              <m:r>
+                                <a:rPr lang="en-US" b="0" i="1" smtClean="0">
+                                  <a:latin typeface="Cambria Math" panose="02040503050406030204" pitchFamily="18" charset="0"/>
+                                </a:rPr>
+                                <m:t>(</m:t>
+                              </m:r>
+                              <m:sSub>
+                                <m:sSubPr>
+                                  <m:ctrlPr>
+                                    <a:rPr lang="en-US" b="0" i="1" smtClean="0">
+                                      <a:latin typeface="Cambria Math" panose="02040503050406030204" pitchFamily="18" charset="0"/>
+                                    </a:rPr>
+                                  </m:ctrlPr>
+                                </m:sSubPr>
+                                <m:e>
+                                  <m:r>
+                                    <a:rPr lang="en-US" b="0" i="1" smtClean="0">
+                                      <a:latin typeface="Cambria Math" panose="02040503050406030204" pitchFamily="18" charset="0"/>
+                                    </a:rPr>
+                                    <m:t>𝑥</m:t>
+                                  </m:r>
+                                </m:e>
+                                <m:sub>
+                                  <m:r>
+                                    <a:rPr lang="en-US" b="0" i="1" smtClean="0">
+                                      <a:latin typeface="Cambria Math" panose="02040503050406030204" pitchFamily="18" charset="0"/>
+                                    </a:rPr>
+                                    <m:t>𝑘</m:t>
+                                  </m:r>
+                                </m:sub>
+                              </m:sSub>
+                              <m:r>
+                                <a:rPr lang="en-US" b="0" i="1" smtClean="0">
+                                  <a:latin typeface="Cambria Math" panose="02040503050406030204" pitchFamily="18" charset="0"/>
+                                </a:rPr>
+                                <m:t>)</m:t>
+                              </m:r>
+                            </m:num>
+                            <m:den>
+                              <m:nary>
+                                <m:naryPr>
+                                  <m:chr m:val="∑"/>
+                                  <m:limLoc m:val="subSup"/>
+                                  <m:ctrlPr>
+                                    <a:rPr lang="en-US" i="1" smtClean="0">
+                                      <a:latin typeface="Cambria Math" panose="02040503050406030204" pitchFamily="18" charset="0"/>
+                                    </a:rPr>
+                                  </m:ctrlPr>
+                                </m:naryPr>
+                                <m:sub>
+                                  <m:r>
+                                    <m:rPr>
+                                      <m:brk m:alnAt="25"/>
+                                    </m:rPr>
+                                    <a:rPr lang="en-US" b="0" i="1" smtClean="0">
+                                      <a:latin typeface="Cambria Math" panose="02040503050406030204" pitchFamily="18" charset="0"/>
+                                    </a:rPr>
+                                    <m:t>𝑗</m:t>
+                                  </m:r>
+                                  <m:r>
+                                    <a:rPr lang="en-US" b="0" i="1" smtClean="0">
+                                      <a:latin typeface="Cambria Math" panose="02040503050406030204" pitchFamily="18" charset="0"/>
+                                    </a:rPr>
+                                    <m:t>=1</m:t>
+                                  </m:r>
+                                </m:sub>
+                                <m:sup>
+                                  <m:r>
+                                    <a:rPr lang="en-US" b="0" i="1" smtClean="0">
+                                      <a:latin typeface="Cambria Math" panose="02040503050406030204" pitchFamily="18" charset="0"/>
+                                    </a:rPr>
+                                    <m:t>𝑀</m:t>
+                                  </m:r>
+                                </m:sup>
+                                <m:e>
+                                  <m:r>
+                                    <a:rPr lang="en-US" b="0" i="1" smtClean="0">
+                                      <a:latin typeface="Cambria Math" panose="02040503050406030204" pitchFamily="18" charset="0"/>
+                                    </a:rPr>
+                                    <m:t>𝑝</m:t>
+                                  </m:r>
+                                  <m:d>
+                                    <m:dPr>
+                                      <m:ctrlPr>
+                                        <a:rPr lang="en-US" b="0" i="1" smtClean="0">
+                                          <a:latin typeface="Cambria Math" panose="02040503050406030204" pitchFamily="18" charset="0"/>
+                                        </a:rPr>
+                                      </m:ctrlPr>
+                                    </m:dPr>
+                                    <m:e>
+                                      <m:r>
+                                        <a:rPr lang="en-US" b="0" i="1" smtClean="0">
+                                          <a:latin typeface="Cambria Math" panose="02040503050406030204" pitchFamily="18" charset="0"/>
+                                        </a:rPr>
+                                        <m:t>𝑗</m:t>
+                                      </m:r>
+                                    </m:e>
+                                  </m:d>
+                                  <m:sSub>
+                                    <m:sSubPr>
+                                      <m:ctrlPr>
+                                        <a:rPr lang="en-US" b="0" i="1" smtClean="0">
+                                          <a:latin typeface="Cambria Math" panose="02040503050406030204" pitchFamily="18" charset="0"/>
+                                        </a:rPr>
+                                      </m:ctrlPr>
+                                    </m:sSubPr>
+                                    <m:e>
+                                      <m:r>
+                                        <a:rPr lang="en-US" b="0" i="1" smtClean="0">
+                                          <a:latin typeface="Cambria Math" panose="02040503050406030204" pitchFamily="18" charset="0"/>
+                                        </a:rPr>
+                                        <m:t> </m:t>
+                                      </m:r>
+                                      <m:r>
+                                        <a:rPr lang="en-US" b="0" i="1" smtClean="0">
+                                          <a:latin typeface="Cambria Math" panose="02040503050406030204" pitchFamily="18" charset="0"/>
+                                        </a:rPr>
+                                        <m:t>𝑝</m:t>
+                                      </m:r>
+                                    </m:e>
+                                    <m:sub>
+                                      <m:r>
+                                        <a:rPr lang="en-US" b="0" i="1" smtClean="0">
+                                          <a:latin typeface="Cambria Math" panose="02040503050406030204" pitchFamily="18" charset="0"/>
+                                        </a:rPr>
+                                        <m:t>𝑗</m:t>
+                                      </m:r>
+                                    </m:sub>
+                                  </m:sSub>
+                                  <m:r>
+                                    <a:rPr lang="en-US" b="0" i="1" smtClean="0">
+                                      <a:latin typeface="Cambria Math" panose="02040503050406030204" pitchFamily="18" charset="0"/>
+                                    </a:rPr>
+                                    <m:t>(</m:t>
+                                  </m:r>
+                                  <m:sSub>
+                                    <m:sSubPr>
+                                      <m:ctrlPr>
+                                        <a:rPr lang="en-US" b="0" i="1" smtClean="0">
+                                          <a:latin typeface="Cambria Math" panose="02040503050406030204" pitchFamily="18" charset="0"/>
+                                        </a:rPr>
+                                      </m:ctrlPr>
+                                    </m:sSubPr>
+                                    <m:e>
+                                      <m:r>
+                                        <a:rPr lang="en-US" b="0" i="1" smtClean="0">
+                                          <a:latin typeface="Cambria Math" panose="02040503050406030204" pitchFamily="18" charset="0"/>
+                                        </a:rPr>
+                                        <m:t>𝑥</m:t>
+                                      </m:r>
+                                    </m:e>
+                                    <m:sub>
+                                      <m:r>
+                                        <a:rPr lang="en-US" b="0" i="1" smtClean="0">
+                                          <a:latin typeface="Cambria Math" panose="02040503050406030204" pitchFamily="18" charset="0"/>
+                                        </a:rPr>
+                                        <m:t>𝑘</m:t>
+                                      </m:r>
+                                    </m:sub>
+                                  </m:sSub>
+                                  <m:r>
+                                    <a:rPr lang="en-US" b="0" i="1" smtClean="0">
+                                      <a:latin typeface="Cambria Math" panose="02040503050406030204" pitchFamily="18" charset="0"/>
+                                    </a:rPr>
+                                    <m:t>)</m:t>
+                                  </m:r>
+                                </m:e>
+                              </m:nary>
+                            </m:den>
+                          </m:f>
+                        </m:e>
+                      </m:nary>
+                    </m:oMath>
+                  </m:oMathPara>
+                </a14:m>
+                <a:endParaRPr lang="en-US" dirty="0"/>
+              </a:p>
+              <a:p>
+                <a:pPr>
+                  <a:buFont typeface="Wingdings" panose="05000000000000000000" pitchFamily="2" charset="2"/>
+                  <a:buChar char="§"/>
+                </a:pPr>
+                <a:r>
+                  <a:rPr lang="en-US" dirty="0" err="1"/>
+                  <a:t>Höfö</a:t>
+                </a:r>
+                <a:r>
+                  <a:rPr lang="en-US" dirty="0"/>
+                  <a:t> </a:t>
+                </a:r>
+                <a:r>
+                  <a:rPr lang="en-US" dirty="0" err="1"/>
+                  <a:t>megcsinálni</a:t>
+                </a:r>
+                <a:r>
+                  <a:rPr lang="en-US" dirty="0"/>
+                  <a:t> </a:t>
+                </a:r>
+                <a:r>
+                  <a:rPr lang="en-US" dirty="0">
+                    <a:sym typeface="Wingdings" panose="05000000000000000000" pitchFamily="2" charset="2"/>
+                  </a:rPr>
+                  <a:t> pl. </a:t>
+                </a:r>
+                <a:r>
+                  <a:rPr lang="en-US" i="1" dirty="0">
+                    <a:sym typeface="Wingdings" panose="05000000000000000000" pitchFamily="2" charset="2"/>
+                  </a:rPr>
+                  <a:t>Lambert</a:t>
+                </a:r>
+                <a:r>
+                  <a:rPr lang="en-US" dirty="0">
+                    <a:sym typeface="Wingdings" panose="05000000000000000000" pitchFamily="2" charset="2"/>
+                  </a:rPr>
+                  <a:t> + </a:t>
+                </a:r>
+                <a:r>
+                  <a:rPr lang="en-US" i="1" dirty="0">
+                    <a:sym typeface="Wingdings" panose="05000000000000000000" pitchFamily="2" charset="2"/>
+                  </a:rPr>
+                  <a:t>Cook-Torrance</a:t>
+                </a:r>
+              </a:p>
+              <a:p>
+                <a:pPr>
+                  <a:buFont typeface="Wingdings" panose="05000000000000000000" pitchFamily="2" charset="2"/>
+                  <a:buChar char="§"/>
+                </a:pPr>
+                <a:r>
+                  <a:rPr lang="en-US" dirty="0"/>
+                  <a:t>Ha </a:t>
+                </a:r>
+                <a:r>
+                  <a:rPr lang="en-US" dirty="0" err="1"/>
+                  <a:t>valaki</a:t>
+                </a:r>
+                <a:r>
+                  <a:rPr lang="en-US" dirty="0"/>
+                  <a:t> </a:t>
+                </a:r>
+                <a:r>
+                  <a:rPr lang="en-US" dirty="0" err="1"/>
+                  <a:t>megcsinálja</a:t>
+                </a:r>
+                <a:r>
+                  <a:rPr lang="en-US" dirty="0"/>
+                  <a:t> a </a:t>
+                </a:r>
+                <a:r>
+                  <a:rPr lang="en-US" dirty="0" err="1"/>
+                  <a:t>beadandójában</a:t>
+                </a:r>
+                <a:r>
+                  <a:rPr lang="en-US" dirty="0"/>
+                  <a:t> (</a:t>
+                </a:r>
+                <a:r>
+                  <a:rPr lang="en-US" dirty="0" err="1"/>
+                  <a:t>úgy</a:t>
+                </a:r>
+                <a:r>
+                  <a:rPr lang="en-US" dirty="0"/>
+                  <a:t>, </a:t>
+                </a:r>
+                <a:r>
+                  <a:rPr lang="en-US" dirty="0" err="1"/>
+                  <a:t>hogy</a:t>
+                </a:r>
+                <a:r>
+                  <a:rPr lang="en-US" dirty="0"/>
+                  <a:t> </a:t>
+                </a:r>
+                <a:r>
+                  <a:rPr lang="en-US" dirty="0" err="1"/>
+                  <a:t>pici</a:t>
+                </a:r>
+                <a:r>
+                  <a:rPr lang="en-US" dirty="0"/>
+                  <a:t> </a:t>
+                </a:r>
+                <a:r>
+                  <a:rPr lang="en-US" dirty="0" err="1"/>
+                  <a:t>fényekre</a:t>
+                </a:r>
+                <a:r>
+                  <a:rPr lang="en-US" dirty="0"/>
+                  <a:t> is m</a:t>
+                </a:r>
+                <a:r>
+                  <a:rPr lang="hu-HU" dirty="0"/>
+                  <a:t>ű</a:t>
+                </a:r>
+                <a:r>
+                  <a:rPr lang="en-US" dirty="0" err="1"/>
+                  <a:t>ködik</a:t>
+                </a:r>
+                <a:r>
+                  <a:rPr lang="en-US" dirty="0"/>
+                  <a:t>), </a:t>
+                </a:r>
+                <a:r>
+                  <a:rPr lang="en-US" dirty="0" err="1"/>
+                  <a:t>akkor</a:t>
+                </a:r>
+                <a:r>
+                  <a:rPr lang="en-US" dirty="0"/>
+                  <a:t> </a:t>
+                </a:r>
+                <a:r>
+                  <a:rPr lang="en-US" dirty="0" err="1"/>
+                  <a:t>megszavazom</a:t>
+                </a:r>
+                <a:r>
+                  <a:rPr lang="en-US" dirty="0"/>
+                  <a:t> a </a:t>
+                </a:r>
+                <a:r>
+                  <a:rPr lang="en-US" dirty="0" err="1"/>
+                  <a:t>pluszpontot</a:t>
+                </a:r>
+                <a:br>
+                  <a:rPr lang="en-US" dirty="0"/>
+                </a:br>
+                <a:endParaRPr lang="hu-HU" dirty="0"/>
+              </a:p>
+            </p:txBody>
+          </p:sp>
+        </mc:Choice>
+        <mc:Fallback>
+          <p:sp>
+            <p:nvSpPr>
+              <p:cNvPr id="3" name="Content Placeholder 2">
+                <a:extLst>
+                  <a:ext uri="{FF2B5EF4-FFF2-40B4-BE49-F238E27FC236}">
+                    <a16:creationId xmlns:a16="http://schemas.microsoft.com/office/drawing/2014/main" id="{A35E5CC8-8456-4C88-A3DE-DD9360B530B1}"/>
+                  </a:ext>
+                </a:extLst>
+              </p:cNvPr>
+              <p:cNvSpPr>
+                <a:spLocks noGrp="1" noRot="1" noChangeAspect="1" noMove="1" noResize="1" noEditPoints="1" noAdjustHandles="1" noChangeArrowheads="1" noChangeShapeType="1" noTextEdit="1"/>
+              </p:cNvSpPr>
+              <p:nvPr>
+                <p:ph idx="1"/>
+              </p:nvPr>
+            </p:nvSpPr>
+            <p:spPr>
+              <a:blipFill>
+                <a:blip r:embed="rId2"/>
+                <a:stretch>
+                  <a:fillRect l="-1333" t="-1970"/>
+                </a:stretch>
+              </a:blipFill>
+            </p:spPr>
+            <p:txBody>
+              <a:bodyPr/>
+              <a:lstStyle/>
+              <a:p>
+                <a:r>
+                  <a:rPr lang="hu-HU">
+                    <a:noFill/>
+                  </a:rPr>
+                  <a:t> </a:t>
+                </a:r>
+              </a:p>
+            </p:txBody>
+          </p:sp>
+        </mc:Fallback>
+      </mc:AlternateContent>
+    </p:spTree>
+    <p:extLst>
+      <p:ext uri="{BB962C8B-B14F-4D97-AF65-F5344CB8AC3E}">
+        <p14:creationId xmlns:p14="http://schemas.microsoft.com/office/powerpoint/2010/main" val="34772828"/>
+      </p:ext>
+    </p:extLst>
+  </p:cSld>
+  <p:clrMapOvr>
+    <a:masterClrMapping/>
+  </p:clrMapOvr>
+</p:sld>
+</file>
+
+<file path=ppt/slides/slide12.xml><?xml version="1.0" encoding="utf-8"?>
+<p:sld xmlns:a="http://schemas.openxmlformats.org/drawingml/2006/main" xmlns:r="http://schemas.openxmlformats.org/officeDocument/2006/relationships" xmlns:p="http://schemas.openxmlformats.org/presentationml/2006/main">
+  <p:cSld>
+    <p:spTree>
+      <p:nvGrpSpPr>
+        <p:cNvPr id="1" name=""/>
+        <p:cNvGrpSpPr/>
+        <p:nvPr/>
+      </p:nvGrpSpPr>
+      <p:grpSpPr>
+        <a:xfrm>
+          <a:off x="0" y="0"/>
+          <a:ext cx="0" cy="0"/>
+          <a:chOff x="0" y="0"/>
+          <a:chExt cx="0" cy="0"/>
+        </a:xfrm>
+      </p:grpSpPr>
+      <p:sp>
+        <p:nvSpPr>
+          <p:cNvPr id="2" name="Title 1">
+            <a:extLst>
+              <a:ext uri="{FF2B5EF4-FFF2-40B4-BE49-F238E27FC236}">
+                <a16:creationId xmlns:a16="http://schemas.microsoft.com/office/drawing/2014/main" id="{B6058E9B-DEE1-4BA3-9C73-2FAD23DF49CC}"/>
+              </a:ext>
+            </a:extLst>
+          </p:cNvPr>
+          <p:cNvSpPr>
+            <a:spLocks noGrp="1"/>
+          </p:cNvSpPr>
+          <p:nvPr>
+            <p:ph type="title"/>
+          </p:nvPr>
+        </p:nvSpPr>
+        <p:spPr/>
+        <p:txBody>
+          <a:bodyPr/>
+          <a:lstStyle/>
+          <a:p>
+            <a:r>
+              <a:rPr lang="en-US" dirty="0" err="1"/>
+              <a:t>Bónusz</a:t>
+            </a:r>
+            <a:r>
+              <a:rPr lang="en-US" dirty="0"/>
+              <a:t>: explicit light sampling</a:t>
+            </a:r>
+            <a:endParaRPr lang="hu-HU" dirty="0"/>
+          </a:p>
+        </p:txBody>
+      </p:sp>
+      <p:sp>
+        <p:nvSpPr>
+          <p:cNvPr id="3" name="Content Placeholder 2">
+            <a:extLst>
+              <a:ext uri="{FF2B5EF4-FFF2-40B4-BE49-F238E27FC236}">
+                <a16:creationId xmlns:a16="http://schemas.microsoft.com/office/drawing/2014/main" id="{939278C4-ADD8-46DB-B0C0-9566BD1A2824}"/>
+              </a:ext>
+            </a:extLst>
+          </p:cNvPr>
+          <p:cNvSpPr>
+            <a:spLocks noGrp="1"/>
+          </p:cNvSpPr>
+          <p:nvPr>
+            <p:ph idx="1"/>
+          </p:nvPr>
+        </p:nvSpPr>
+        <p:spPr/>
+        <p:txBody>
+          <a:bodyPr/>
+          <a:lstStyle/>
+          <a:p>
+            <a:pPr>
+              <a:buFont typeface="Wingdings" panose="05000000000000000000" pitchFamily="2" charset="2"/>
+              <a:buChar char="§"/>
+            </a:pPr>
+            <a:r>
+              <a:rPr lang="en-US" dirty="0"/>
+              <a:t>Más </a:t>
+            </a:r>
+            <a:r>
+              <a:rPr lang="en-US" dirty="0" err="1"/>
+              <a:t>néven</a:t>
+            </a:r>
+            <a:r>
+              <a:rPr lang="en-US" dirty="0"/>
+              <a:t> </a:t>
+            </a:r>
+            <a:r>
+              <a:rPr lang="en-US" i="1" dirty="0"/>
+              <a:t>next event estimation</a:t>
+            </a:r>
+            <a:r>
+              <a:rPr lang="en-US" dirty="0"/>
+              <a:t>; </a:t>
+            </a:r>
+            <a:r>
+              <a:rPr lang="en-US" dirty="0" err="1"/>
+              <a:t>ez</a:t>
+            </a:r>
+            <a:r>
+              <a:rPr lang="en-US" dirty="0"/>
+              <a:t> is </a:t>
+            </a:r>
+            <a:r>
+              <a:rPr lang="en-US" dirty="0" err="1"/>
+              <a:t>gyorsítási</a:t>
+            </a:r>
+            <a:r>
+              <a:rPr lang="en-US" dirty="0"/>
+              <a:t> </a:t>
+            </a:r>
+            <a:r>
+              <a:rPr lang="en-US" dirty="0" err="1"/>
+              <a:t>módszer</a:t>
+            </a:r>
+            <a:endParaRPr lang="en-US" dirty="0"/>
+          </a:p>
+          <a:p>
+            <a:pPr>
+              <a:buFont typeface="Wingdings" panose="05000000000000000000" pitchFamily="2" charset="2"/>
+              <a:buChar char="§"/>
+            </a:pPr>
+            <a:r>
+              <a:rPr lang="en-US" dirty="0"/>
+              <a:t>Minden </a:t>
+            </a:r>
+            <a:r>
+              <a:rPr lang="en-US" dirty="0" err="1"/>
+              <a:t>pattogásnál</a:t>
+            </a:r>
+            <a:r>
+              <a:rPr lang="en-US" dirty="0"/>
+              <a:t> </a:t>
+            </a:r>
+            <a:r>
+              <a:rPr lang="en-US" dirty="0" err="1"/>
+              <a:t>indítunk</a:t>
+            </a:r>
+            <a:r>
+              <a:rPr lang="en-US" dirty="0"/>
+              <a:t> </a:t>
+            </a:r>
+            <a:r>
+              <a:rPr lang="en-US" dirty="0" err="1"/>
+              <a:t>egy</a:t>
+            </a:r>
+            <a:r>
+              <a:rPr lang="en-US" dirty="0"/>
+              <a:t> </a:t>
+            </a:r>
+            <a:r>
+              <a:rPr lang="en-US" dirty="0" err="1"/>
+              <a:t>sugarat</a:t>
+            </a:r>
+            <a:r>
+              <a:rPr lang="en-US" dirty="0"/>
+              <a:t> </a:t>
+            </a:r>
+            <a:r>
+              <a:rPr lang="en-US" dirty="0" err="1"/>
+              <a:t>valamelyik</a:t>
+            </a:r>
+            <a:r>
+              <a:rPr lang="en-US" dirty="0"/>
+              <a:t> </a:t>
+            </a:r>
+            <a:r>
+              <a:rPr lang="en-US" dirty="0" err="1"/>
+              <a:t>fényforrásba</a:t>
+            </a:r>
+            <a:r>
+              <a:rPr lang="en-US" dirty="0"/>
+              <a:t> is</a:t>
+            </a:r>
+          </a:p>
+          <a:p>
+            <a:pPr>
+              <a:buFont typeface="Wingdings" panose="05000000000000000000" pitchFamily="2" charset="2"/>
+              <a:buChar char="§"/>
+            </a:pPr>
+            <a:r>
+              <a:rPr lang="en-US" i="1" dirty="0"/>
+              <a:t>Bidirectional path tracing</a:t>
+            </a:r>
+            <a:r>
+              <a:rPr lang="en-US" dirty="0"/>
+              <a:t>-gel </a:t>
+            </a:r>
+            <a:r>
+              <a:rPr lang="en-US" dirty="0" err="1"/>
+              <a:t>kombinálva</a:t>
+            </a:r>
+            <a:r>
+              <a:rPr lang="en-US" dirty="0"/>
+              <a:t> </a:t>
+            </a:r>
+            <a:r>
+              <a:rPr lang="en-US" dirty="0" err="1"/>
+              <a:t>már</a:t>
+            </a:r>
+            <a:r>
+              <a:rPr lang="en-US" dirty="0"/>
+              <a:t> </a:t>
+            </a:r>
+            <a:r>
+              <a:rPr lang="en-US" dirty="0" err="1"/>
+              <a:t>nagyságrendbeli</a:t>
+            </a:r>
+            <a:r>
+              <a:rPr lang="en-US" dirty="0"/>
+              <a:t> </a:t>
+            </a:r>
+            <a:r>
+              <a:rPr lang="en-US" dirty="0" err="1"/>
+              <a:t>gyorsítás</a:t>
+            </a:r>
+            <a:endParaRPr lang="en-US" dirty="0"/>
+          </a:p>
+          <a:p>
+            <a:pPr>
+              <a:buFont typeface="Wingdings" panose="05000000000000000000" pitchFamily="2" charset="2"/>
+              <a:buChar char="§"/>
+            </a:pPr>
+            <a:r>
+              <a:rPr lang="en-US" dirty="0"/>
+              <a:t>Ld. </a:t>
+            </a:r>
+            <a:r>
+              <a:rPr lang="en-US" i="1" dirty="0"/>
+              <a:t>Eric </a:t>
+            </a:r>
+            <a:r>
+              <a:rPr lang="en-US" i="1" dirty="0" err="1"/>
+              <a:t>Veach</a:t>
+            </a:r>
+            <a:r>
+              <a:rPr lang="en-US" dirty="0"/>
+              <a:t> </a:t>
+            </a:r>
+            <a:r>
+              <a:rPr lang="en-US" dirty="0" err="1">
+                <a:hlinkClick r:id="rId2"/>
+              </a:rPr>
+              <a:t>dolgozatát</a:t>
+            </a:r>
+            <a:r>
+              <a:rPr lang="en-US" dirty="0"/>
+              <a:t> </a:t>
+            </a:r>
+          </a:p>
+          <a:p>
+            <a:pPr>
+              <a:buFont typeface="Wingdings" panose="05000000000000000000" pitchFamily="2" charset="2"/>
+              <a:buChar char="§"/>
+            </a:pPr>
+            <a:r>
+              <a:rPr lang="en-US" dirty="0" err="1"/>
+              <a:t>Vagy</a:t>
+            </a:r>
+            <a:r>
+              <a:rPr lang="en-US" dirty="0"/>
+              <a:t> </a:t>
+            </a:r>
+            <a:r>
+              <a:rPr lang="en-US" dirty="0" err="1"/>
+              <a:t>ezt</a:t>
+            </a:r>
+            <a:r>
+              <a:rPr lang="en-US" dirty="0"/>
+              <a:t> a </a:t>
+            </a:r>
+            <a:r>
+              <a:rPr lang="en-US" i="1" dirty="0" err="1"/>
+              <a:t>WebGL</a:t>
+            </a:r>
+            <a:r>
+              <a:rPr lang="en-US" dirty="0"/>
+              <a:t> </a:t>
+            </a:r>
+            <a:r>
+              <a:rPr lang="en-US" dirty="0" err="1">
+                <a:hlinkClick r:id="rId3"/>
+              </a:rPr>
+              <a:t>kódot</a:t>
+            </a:r>
+            <a:r>
+              <a:rPr lang="en-US" dirty="0"/>
+              <a:t> (de </a:t>
+            </a:r>
+            <a:r>
+              <a:rPr lang="en-US" dirty="0" err="1"/>
+              <a:t>elég</a:t>
+            </a:r>
+            <a:r>
+              <a:rPr lang="en-US" dirty="0"/>
+              <a:t> </a:t>
+            </a:r>
+            <a:r>
+              <a:rPr lang="en-US" dirty="0" err="1"/>
+              <a:t>sok</a:t>
+            </a:r>
+            <a:r>
+              <a:rPr lang="en-US" dirty="0"/>
+              <a:t> </a:t>
+            </a:r>
+            <a:r>
+              <a:rPr lang="en-US" dirty="0" err="1"/>
+              <a:t>helyen</a:t>
+            </a:r>
+            <a:r>
+              <a:rPr lang="en-US" dirty="0"/>
+              <a:t> </a:t>
+            </a:r>
+            <a:r>
+              <a:rPr lang="en-US" dirty="0" err="1"/>
+              <a:t>rossz</a:t>
+            </a:r>
+            <a:r>
+              <a:rPr lang="en-US" dirty="0"/>
+              <a:t>, </a:t>
+            </a:r>
+            <a:r>
+              <a:rPr lang="en-US" dirty="0" err="1"/>
+              <a:t>illetve</a:t>
+            </a:r>
+            <a:r>
+              <a:rPr lang="en-US" dirty="0"/>
+              <a:t> </a:t>
+            </a:r>
+            <a:r>
+              <a:rPr lang="en-US" dirty="0" err="1"/>
+              <a:t>csal</a:t>
+            </a:r>
+            <a:r>
+              <a:rPr lang="en-US" dirty="0"/>
+              <a:t>…)</a:t>
+            </a:r>
+          </a:p>
+          <a:p>
+            <a:pPr marL="0" indent="0">
+              <a:buNone/>
+            </a:pPr>
+            <a:endParaRPr lang="en-US" dirty="0"/>
+          </a:p>
+          <a:p>
+            <a:pPr>
+              <a:buFont typeface="Wingdings" panose="05000000000000000000" pitchFamily="2" charset="2"/>
+              <a:buChar char="§"/>
+            </a:pPr>
+            <a:r>
+              <a:rPr lang="en-US" i="1" dirty="0"/>
+              <a:t>(</a:t>
+            </a:r>
+            <a:r>
+              <a:rPr lang="en-US" i="1" dirty="0" err="1"/>
+              <a:t>megj</a:t>
+            </a:r>
+            <a:r>
+              <a:rPr lang="en-US" i="1" dirty="0"/>
+              <a:t>.: </a:t>
+            </a:r>
+            <a:r>
+              <a:rPr lang="en-US" i="1" dirty="0" err="1"/>
+              <a:t>ez</a:t>
+            </a:r>
+            <a:r>
+              <a:rPr lang="en-US" i="1" dirty="0"/>
+              <a:t> </a:t>
+            </a:r>
+            <a:r>
+              <a:rPr lang="en-US" i="1" dirty="0" err="1"/>
+              <a:t>már</a:t>
+            </a:r>
+            <a:r>
+              <a:rPr lang="en-US" i="1" dirty="0"/>
+              <a:t> </a:t>
+            </a:r>
+            <a:r>
+              <a:rPr lang="en-US" i="1" dirty="0" err="1"/>
+              <a:t>nehéz</a:t>
+            </a:r>
+            <a:r>
+              <a:rPr lang="en-US" i="1" dirty="0"/>
+              <a:t> </a:t>
+            </a:r>
+            <a:r>
+              <a:rPr lang="en-US" i="1" dirty="0" err="1"/>
+              <a:t>téma</a:t>
+            </a:r>
+            <a:r>
+              <a:rPr lang="en-US" i="1" dirty="0"/>
+              <a:t>, </a:t>
+            </a:r>
+            <a:r>
+              <a:rPr lang="en-US" i="1" dirty="0" err="1"/>
+              <a:t>nekem</a:t>
+            </a:r>
+            <a:r>
+              <a:rPr lang="en-US" i="1" dirty="0"/>
+              <a:t> </a:t>
+            </a:r>
+            <a:r>
+              <a:rPr lang="en-US" i="1" dirty="0" err="1"/>
+              <a:t>sem</a:t>
+            </a:r>
+            <a:r>
+              <a:rPr lang="en-US" i="1" dirty="0"/>
+              <a:t> </a:t>
+            </a:r>
+            <a:r>
+              <a:rPr lang="en-US" i="1" dirty="0" err="1"/>
+              <a:t>sikerült</a:t>
+            </a:r>
+            <a:r>
+              <a:rPr lang="en-US" i="1" dirty="0"/>
+              <a:t> </a:t>
+            </a:r>
+            <a:r>
+              <a:rPr lang="en-US" i="1" dirty="0" err="1"/>
+              <a:t>rendesen</a:t>
+            </a:r>
+            <a:r>
+              <a:rPr lang="en-US" i="1" dirty="0"/>
+              <a:t> </a:t>
+            </a:r>
+            <a:r>
+              <a:rPr lang="en-US" i="1" dirty="0" err="1"/>
+              <a:t>megcsinálni</a:t>
+            </a:r>
+            <a:r>
+              <a:rPr lang="en-US" i="1" dirty="0"/>
+              <a:t>)</a:t>
+            </a:r>
+            <a:endParaRPr lang="hu-HU" i="1" dirty="0"/>
+          </a:p>
+        </p:txBody>
+      </p:sp>
+    </p:spTree>
+    <p:extLst>
+      <p:ext uri="{BB962C8B-B14F-4D97-AF65-F5344CB8AC3E}">
+        <p14:creationId xmlns:p14="http://schemas.microsoft.com/office/powerpoint/2010/main" val="245178758"/>
+      </p:ext>
+    </p:extLst>
+  </p:cSld>
+  <p:clrMapOvr>
+    <a:masterClrMapping/>
+  </p:clrMapOvr>
+</p:sld>
+</file>
+
+<file path=ppt/slides/slide13.xml><?xml version="1.0" encoding="utf-8"?>
+<p:sld xmlns:a="http://schemas.openxmlformats.org/drawingml/2006/main" xmlns:r="http://schemas.openxmlformats.org/officeDocument/2006/relationships" xmlns:p="http://schemas.openxmlformats.org/presentationml/2006/main">
+  <p:cSld>
+    <p:spTree>
+      <p:nvGrpSpPr>
+        <p:cNvPr id="1" name=""/>
+        <p:cNvGrpSpPr/>
+        <p:nvPr/>
+      </p:nvGrpSpPr>
+      <p:grpSpPr>
+        <a:xfrm>
+          <a:off x="0" y="0"/>
+          <a:ext cx="0" cy="0"/>
+          <a:chOff x="0" y="0"/>
+          <a:chExt cx="0" cy="0"/>
+        </a:xfrm>
+      </p:grpSpPr>
+      <p:sp>
+        <p:nvSpPr>
+          <p:cNvPr id="2" name="Title 1">
+            <a:extLst>
+              <a:ext uri="{FF2B5EF4-FFF2-40B4-BE49-F238E27FC236}">
+                <a16:creationId xmlns:a16="http://schemas.microsoft.com/office/drawing/2014/main" id="{8B89D6C4-AA38-4542-8EC5-601F0FAA859B}"/>
+              </a:ext>
+            </a:extLst>
+          </p:cNvPr>
+          <p:cNvSpPr>
+            <a:spLocks noGrp="1"/>
+          </p:cNvSpPr>
+          <p:nvPr>
+            <p:ph type="title"/>
+          </p:nvPr>
+        </p:nvSpPr>
+        <p:spPr/>
+        <p:txBody>
+          <a:bodyPr/>
+          <a:lstStyle/>
+          <a:p>
+            <a:r>
+              <a:rPr lang="en-US" dirty="0" err="1"/>
+              <a:t>Lehet</a:t>
+            </a:r>
+            <a:r>
+              <a:rPr lang="en-US" dirty="0"/>
+              <a:t> </a:t>
+            </a:r>
+            <a:r>
+              <a:rPr lang="en-US" dirty="0" err="1"/>
+              <a:t>lesni</a:t>
+            </a:r>
+            <a:r>
+              <a:rPr lang="en-US" dirty="0"/>
+              <a:t> a DX10-es </a:t>
+            </a:r>
+            <a:r>
+              <a:rPr lang="en-US" dirty="0" err="1"/>
+              <a:t>példaprogimból</a:t>
+            </a:r>
+            <a:endParaRPr lang="hu-HU" dirty="0"/>
+          </a:p>
+        </p:txBody>
+      </p:sp>
+      <p:pic>
+        <p:nvPicPr>
+          <p:cNvPr id="6" name="Picture Placeholder 5">
+            <a:extLst>
+              <a:ext uri="{FF2B5EF4-FFF2-40B4-BE49-F238E27FC236}">
+                <a16:creationId xmlns:a16="http://schemas.microsoft.com/office/drawing/2014/main" id="{BC2DC178-D83B-4CB9-9B92-35BC61D9D3C4}"/>
+              </a:ext>
+            </a:extLst>
+          </p:cNvPr>
+          <p:cNvPicPr>
+            <a:picLocks noGrp="1" noChangeAspect="1"/>
+          </p:cNvPicPr>
+          <p:nvPr>
+            <p:ph type="pic" idx="1"/>
+          </p:nvPr>
+        </p:nvPicPr>
+        <p:blipFill>
+          <a:blip r:embed="rId2">
+            <a:extLst>
+              <a:ext uri="{28A0092B-C50C-407E-A947-70E740481C1C}">
+                <a14:useLocalDpi xmlns:a14="http://schemas.microsoft.com/office/drawing/2010/main" val="0"/>
+              </a:ext>
+            </a:extLst>
+          </a:blip>
+          <a:srcRect t="4464" b="4464"/>
+          <a:stretch>
+            <a:fillRect/>
+          </a:stretch>
+        </p:blipFill>
+        <p:spPr/>
+      </p:pic>
+      <p:sp>
+        <p:nvSpPr>
+          <p:cNvPr id="4" name="Text Placeholder 3">
+            <a:extLst>
+              <a:ext uri="{FF2B5EF4-FFF2-40B4-BE49-F238E27FC236}">
+                <a16:creationId xmlns:a16="http://schemas.microsoft.com/office/drawing/2014/main" id="{504352A2-C8A8-4F9E-BDD6-7E04BEA9E018}"/>
+              </a:ext>
+            </a:extLst>
+          </p:cNvPr>
+          <p:cNvSpPr>
+            <a:spLocks noGrp="1"/>
+          </p:cNvSpPr>
+          <p:nvPr>
+            <p:ph type="body" sz="half" idx="2"/>
+          </p:nvPr>
+        </p:nvSpPr>
+        <p:spPr/>
+        <p:txBody>
+          <a:bodyPr/>
+          <a:lstStyle/>
+          <a:p>
+            <a:r>
+              <a:rPr lang="en-US" dirty="0"/>
+              <a:t>(de </a:t>
+            </a:r>
+            <a:r>
+              <a:rPr lang="en-US" dirty="0" err="1"/>
+              <a:t>sokra</a:t>
+            </a:r>
+            <a:r>
+              <a:rPr lang="en-US" dirty="0"/>
+              <a:t> </a:t>
+            </a:r>
+            <a:r>
+              <a:rPr lang="en-US" dirty="0" err="1"/>
+              <a:t>nem</a:t>
+            </a:r>
+            <a:r>
+              <a:rPr lang="en-US" dirty="0"/>
+              <a:t> </a:t>
+            </a:r>
+            <a:r>
+              <a:rPr lang="en-US" dirty="0" err="1"/>
+              <a:t>mentek</a:t>
+            </a:r>
+            <a:r>
+              <a:rPr lang="en-US" dirty="0"/>
+              <a:t> </a:t>
+            </a:r>
+            <a:r>
+              <a:rPr lang="en-US" dirty="0" err="1"/>
+              <a:t>vele</a:t>
+            </a:r>
+            <a:r>
+              <a:rPr lang="en-US" dirty="0"/>
+              <a:t> </a:t>
+            </a:r>
+            <a:r>
+              <a:rPr lang="en-US" dirty="0">
+                <a:sym typeface="Wingdings" panose="05000000000000000000" pitchFamily="2" charset="2"/>
+              </a:rPr>
+              <a:t></a:t>
+            </a:r>
+            <a:r>
+              <a:rPr lang="en-US" dirty="0"/>
+              <a:t>)</a:t>
+            </a:r>
+            <a:endParaRPr lang="hu-HU" dirty="0"/>
+          </a:p>
+        </p:txBody>
+      </p:sp>
+    </p:spTree>
+    <p:extLst>
+      <p:ext uri="{BB962C8B-B14F-4D97-AF65-F5344CB8AC3E}">
+        <p14:creationId xmlns:p14="http://schemas.microsoft.com/office/powerpoint/2010/main" val="4043157184"/>
+      </p:ext>
+    </p:extLst>
+  </p:cSld>
+  <p:clrMapOvr>
+    <a:masterClrMapping/>
+  </p:clrMapOvr>
+</p:sld>
+</file>
+
 <file path=ppt/slides/slide2.xml><?xml version="1.0" encoding="utf-8"?>
 <p:sld xmlns:a="http://schemas.openxmlformats.org/drawingml/2006/main" xmlns:r="http://schemas.openxmlformats.org/officeDocument/2006/relationships" xmlns:p="http://schemas.openxmlformats.org/presentationml/2006/main">
   <p:cSld>
@@ -5577,7 +8363,7 @@
                 </a:r>
                 <a:r>
                   <a:rPr lang="en-US" dirty="0"/>
-                  <a:t>?</a:t>
+                  <a:t>…?</a:t>
                 </a:r>
                 <a:endParaRPr lang="hu-HU" dirty="0"/>
               </a:p>
@@ -5805,8 +8591,8 @@
           </a:p>
         </p:txBody>
       </p:sp>
-      <mc:AlternateContent xmlns:mc="http://schemas.openxmlformats.org/markup-compatibility/2006">
-        <mc:Choice xmlns:a14="http://schemas.microsoft.com/office/drawing/2010/main" Requires="a14">
+      <mc:AlternateContent xmlns:mc="http://schemas.openxmlformats.org/markup-compatibility/2006" xmlns:a14="http://schemas.microsoft.com/office/drawing/2010/main">
+        <mc:Choice Requires="a14">
           <p:sp>
             <p:nvSpPr>
               <p:cNvPr id="3" name="Content Placeholder 2">
@@ -7021,7 +9807,7 @@
             </p:txBody>
           </p:sp>
         </mc:Choice>
-        <mc:Fallback>
+        <mc:Fallback xmlns="">
           <p:sp>
             <p:nvSpPr>
               <p:cNvPr id="3" name="Content Placeholder 2">
@@ -7124,8 +9910,8 @@
           </a:p>
         </p:txBody>
       </p:sp>
-      <mc:AlternateContent xmlns:mc="http://schemas.openxmlformats.org/markup-compatibility/2006" xmlns:a14="http://schemas.microsoft.com/office/drawing/2010/main">
-        <mc:Choice Requires="a14">
+      <mc:AlternateContent xmlns:mc="http://schemas.openxmlformats.org/markup-compatibility/2006">
+        <mc:Choice xmlns:a14="http://schemas.microsoft.com/office/drawing/2010/main" Requires="a14">
           <p:sp>
             <p:nvSpPr>
               <p:cNvPr id="3" name="Content Placeholder 2">
@@ -7142,7 +9928,12 @@
                 <p:ph idx="1"/>
               </p:nvPr>
             </p:nvSpPr>
-            <p:spPr/>
+            <p:spPr>
+              <a:xfrm>
+                <a:off x="1097280" y="1845733"/>
+                <a:ext cx="10058400" cy="4218567"/>
+              </a:xfrm>
+            </p:spPr>
             <p:txBody>
               <a:bodyPr>
                 <a:normAutofit/>
@@ -7154,193 +9945,8 @@
                   <a:buChar char="§"/>
                 </a:pPr>
                 <a:r>
-                  <a:rPr lang="en-US" dirty="0"/>
-                  <a:t>A </a:t>
-                </a:r>
-                <a:r>
-                  <a:rPr lang="en-US" i="1" dirty="0"/>
-                  <a:t>Riemann</a:t>
-                </a:r>
-                <a:r>
-                  <a:rPr lang="en-US" dirty="0"/>
-                  <a:t> </a:t>
-                </a:r>
-                <a:r>
-                  <a:rPr lang="en-US" dirty="0" err="1"/>
-                  <a:t>integrálra</a:t>
-                </a:r>
-                <a:r>
-                  <a:rPr lang="en-US" dirty="0"/>
-                  <a:t> </a:t>
-                </a:r>
-                <a:r>
-                  <a:rPr lang="en-US" dirty="0" err="1"/>
-                  <a:t>ismerjük</a:t>
-                </a:r>
-                <a:r>
-                  <a:rPr lang="en-US" dirty="0"/>
-                  <a:t> </a:t>
-                </a:r>
-                <a:r>
-                  <a:rPr lang="en-US" dirty="0" err="1"/>
-                  <a:t>az</a:t>
-                </a:r>
-                <a:r>
-                  <a:rPr lang="en-US" dirty="0"/>
-                  <a:t> </a:t>
-                </a:r>
-                <a:r>
-                  <a:rPr lang="en-US" dirty="0" err="1"/>
-                  <a:t>ún</a:t>
-                </a:r>
-                <a:r>
-                  <a:rPr lang="en-US" dirty="0"/>
-                  <a:t>. </a:t>
-                </a:r>
-                <a:r>
-                  <a:rPr lang="en-US" dirty="0" err="1"/>
-                  <a:t>trapéz</a:t>
-                </a:r>
-                <a:r>
-                  <a:rPr lang="en-US" dirty="0"/>
-                  <a:t> </a:t>
-                </a:r>
-                <a:r>
-                  <a:rPr lang="en-US" dirty="0" err="1"/>
-                  <a:t>szabályt</a:t>
-                </a:r>
-                <a:r>
-                  <a:rPr lang="en-US" dirty="0"/>
-                  <a:t> (</a:t>
-                </a:r>
-                <a:r>
-                  <a:rPr lang="en-US" dirty="0" err="1"/>
-                  <a:t>egyenletes</a:t>
-                </a:r>
-                <a:r>
-                  <a:rPr lang="en-US" dirty="0"/>
-                  <a:t> </a:t>
-                </a:r>
-                <a:r>
-                  <a:rPr lang="en-US" dirty="0" err="1"/>
-                  <a:t>felosztás</a:t>
-                </a:r>
-                <a:r>
-                  <a:rPr lang="en-US" dirty="0"/>
-                  <a:t> + </a:t>
-                </a:r>
-                <a:r>
-                  <a:rPr lang="en-US" dirty="0" err="1"/>
-                  <a:t>trapézok</a:t>
-                </a:r>
-                <a:r>
-                  <a:rPr lang="en-US" dirty="0"/>
-                  <a:t>)</a:t>
-                </a:r>
-              </a:p>
-              <a:p>
-                <a:pPr>
-                  <a:buFont typeface="Wingdings" panose="05000000000000000000" pitchFamily="2" charset="2"/>
-                  <a:buChar char="§"/>
-                </a:pPr>
-                <a:r>
-                  <a:rPr lang="en-US" dirty="0"/>
-                  <a:t>De </a:t>
-                </a:r>
-                <a:r>
-                  <a:rPr lang="en-US" dirty="0" err="1"/>
-                  <a:t>magasabb</a:t>
-                </a:r>
-                <a:r>
-                  <a:rPr lang="en-US" dirty="0"/>
-                  <a:t> </a:t>
-                </a:r>
-                <a:r>
-                  <a:rPr lang="en-US" dirty="0" err="1"/>
-                  <a:t>dimenziókban</a:t>
-                </a:r>
-                <a:r>
-                  <a:rPr lang="en-US" dirty="0"/>
-                  <a:t> </a:t>
-                </a:r>
-                <a:r>
-                  <a:rPr lang="en-US" dirty="0" err="1"/>
-                  <a:t>túl</a:t>
-                </a:r>
-                <a:r>
-                  <a:rPr lang="en-US" dirty="0"/>
-                  <a:t> </a:t>
-                </a:r>
-                <a:r>
-                  <a:rPr lang="en-US" dirty="0" err="1"/>
-                  <a:t>nagy</a:t>
-                </a:r>
-                <a:r>
-                  <a:rPr lang="en-US" dirty="0"/>
-                  <a:t> a </a:t>
-                </a:r>
-                <a:r>
-                  <a:rPr lang="en-US" dirty="0" err="1"/>
-                  <a:t>hibája</a:t>
-                </a:r>
-                <a:r>
-                  <a:rPr lang="en-US" dirty="0"/>
-                  <a:t>, </a:t>
-                </a:r>
-                <a:r>
-                  <a:rPr lang="en-US" dirty="0" err="1"/>
-                  <a:t>az</a:t>
-                </a:r>
-                <a:r>
-                  <a:rPr lang="en-US" dirty="0"/>
-                  <a:t> </a:t>
-                </a:r>
-                <a:r>
-                  <a:rPr lang="en-US" dirty="0" err="1"/>
-                  <a:t>egyenletes</a:t>
-                </a:r>
-                <a:r>
-                  <a:rPr lang="en-US" dirty="0"/>
-                  <a:t> </a:t>
-                </a:r>
-                <a:r>
-                  <a:rPr lang="en-US" dirty="0" err="1"/>
-                  <a:t>felosztás</a:t>
-                </a:r>
-                <a:r>
-                  <a:rPr lang="en-US" dirty="0"/>
-                  <a:t> </a:t>
-                </a:r>
-                <a:r>
-                  <a:rPr lang="en-US" dirty="0" err="1"/>
-                  <a:t>pedig</a:t>
-                </a:r>
-                <a:r>
-                  <a:rPr lang="en-US" dirty="0"/>
-                  <a:t> </a:t>
-                </a:r>
-                <a:r>
-                  <a:rPr lang="en-US" dirty="0" err="1"/>
-                  <a:t>pazarló</a:t>
-                </a:r>
-                <a:endParaRPr lang="en-US" dirty="0"/>
-              </a:p>
-              <a:p>
-                <a:pPr>
-                  <a:buFont typeface="Wingdings" panose="05000000000000000000" pitchFamily="2" charset="2"/>
-                  <a:buChar char="§"/>
-                </a:pPr>
-                <a:r>
-                  <a:rPr lang="en-US" i="1" dirty="0"/>
-                  <a:t>Monte Carlo</a:t>
-                </a:r>
-                <a:r>
-                  <a:rPr lang="en-US" dirty="0"/>
-                  <a:t>: </a:t>
-                </a:r>
-                <a:r>
-                  <a:rPr lang="en-US" dirty="0" err="1"/>
-                  <a:t>mintavételezzük</a:t>
+                  <a:rPr lang="en-US" dirty="0" err="1"/>
+                  <a:t>Mintavételezzük</a:t>
                 </a:r>
                 <a:r>
                   <a:rPr lang="en-US" dirty="0"/>
@@ -7390,7 +9996,81 @@
                 </a:r>
                 <a:r>
                   <a:rPr lang="en-US" dirty="0"/>
-                  <a:t>):</a:t>
+                  <a:t>)</a:t>
+                </a:r>
+              </a:p>
+              <a:p>
+                <a:pPr>
+                  <a:buFont typeface="Wingdings" panose="05000000000000000000" pitchFamily="2" charset="2"/>
+                  <a:buChar char="§"/>
+                </a:pPr>
+                <a:r>
+                  <a:rPr lang="en-US" dirty="0"/>
+                  <a:t>A </a:t>
+                </a:r>
+                <a:r>
+                  <a:rPr lang="en-US" dirty="0" err="1"/>
+                  <a:t>konvergencia</a:t>
+                </a:r>
+                <a:r>
+                  <a:rPr lang="en-US" dirty="0"/>
+                  <a:t> </a:t>
+                </a:r>
+                <a:r>
+                  <a:rPr lang="en-US" dirty="0" err="1"/>
+                  <a:t>sebessége</a:t>
+                </a:r>
+                <a:r>
+                  <a:rPr lang="en-US" dirty="0"/>
+                  <a:t> </a:t>
+                </a:r>
+                <a:r>
+                  <a:rPr lang="en-US" dirty="0" err="1"/>
+                  <a:t>független</a:t>
+                </a:r>
+                <a:r>
+                  <a:rPr lang="en-US" dirty="0"/>
+                  <a:t> a </a:t>
+                </a:r>
+                <a:r>
+                  <a:rPr lang="en-US" dirty="0" err="1"/>
+                  <a:t>dimenziók</a:t>
+                </a:r>
+                <a:r>
+                  <a:rPr lang="en-US" dirty="0"/>
+                  <a:t> </a:t>
+                </a:r>
+                <a:r>
+                  <a:rPr lang="en-US" dirty="0" err="1"/>
+                  <a:t>számától</a:t>
+                </a:r>
+                <a:r>
+                  <a:rPr lang="en-US" dirty="0"/>
+                  <a:t> (</a:t>
+                </a:r>
+                <a:r>
+                  <a:rPr lang="en-US" dirty="0" err="1"/>
+                  <a:t>szemben</a:t>
+                </a:r>
+                <a:r>
+                  <a:rPr lang="en-US" dirty="0"/>
+                  <a:t> pl. a </a:t>
+                </a:r>
+                <a:r>
+                  <a:rPr lang="en-US" dirty="0" err="1"/>
+                  <a:t>trapéz</a:t>
+                </a:r>
+                <a:r>
+                  <a:rPr lang="en-US" dirty="0"/>
+                  <a:t> </a:t>
+                </a:r>
+                <a:r>
+                  <a:rPr lang="en-US" dirty="0" err="1"/>
+                  <a:t>szabállyal</a:t>
+                </a:r>
+                <a:r>
+                  <a:rPr lang="en-US" dirty="0"/>
+                  <a:t>)</a:t>
                 </a:r>
               </a:p>
               <a:p>
@@ -7445,6 +10125,68 @@
                   <a:rPr lang="en-US" dirty="0"/>
                   <a:t>…</a:t>
                 </a:r>
+              </a:p>
+              <a:p>
+                <a:pPr>
+                  <a:lnSpc>
+                    <a:spcPct val="100000"/>
+                  </a:lnSpc>
+                  <a:buFont typeface="Wingdings" panose="05000000000000000000" pitchFamily="2" charset="2"/>
+                  <a:buChar char="§"/>
+                </a:pPr>
+                <a:r>
+                  <a:rPr lang="en-US" dirty="0">
+                    <a:sym typeface="Wingdings" panose="05000000000000000000" pitchFamily="2" charset="2"/>
+                  </a:rPr>
+                  <a:t>A </a:t>
+                </a:r>
+                <a:r>
+                  <a:rPr lang="en-US" i="1" dirty="0">
+                    <a:sym typeface="Wingdings" panose="05000000000000000000" pitchFamily="2" charset="2"/>
+                  </a:rPr>
+                  <a:t>PDF</a:t>
+                </a:r>
+                <a:r>
+                  <a:rPr lang="en-US" dirty="0">
+                    <a:sym typeface="Wingdings" panose="05000000000000000000" pitchFamily="2" charset="2"/>
+                  </a:rPr>
+                  <a:t> </a:t>
+                </a:r>
+                <a14:m>
+                  <m:oMath xmlns:m="http://schemas.openxmlformats.org/officeDocument/2006/math">
+                    <m:r>
+                      <a:rPr lang="en-US" i="1">
+                        <a:latin typeface="Cambria Math" panose="02040503050406030204" pitchFamily="18" charset="0"/>
+                        <a:sym typeface="Wingdings" panose="05000000000000000000" pitchFamily="2" charset="2"/>
+                      </a:rPr>
+                      <m:t>1</m:t>
+                    </m:r>
+                  </m:oMath>
+                </a14:m>
+                <a:r>
+                  <a:rPr lang="en-US" dirty="0">
+                    <a:sym typeface="Wingdings" panose="05000000000000000000" pitchFamily="2" charset="2"/>
+                  </a:rPr>
+                  <a:t>-hez integrál a </a:t>
+                </a:r>
+                <a14:m>
+                  <m:oMath xmlns:m="http://schemas.openxmlformats.org/officeDocument/2006/math">
+                    <m:r>
+                      <a:rPr lang="en-US" i="1">
+                        <a:latin typeface="Cambria Math" panose="02040503050406030204" pitchFamily="18" charset="0"/>
+                        <a:sym typeface="Wingdings" panose="05000000000000000000" pitchFamily="2" charset="2"/>
+                      </a:rPr>
+                      <m:t>𝐷</m:t>
+                    </m:r>
+                  </m:oMath>
+                </a14:m>
+                <a:r>
+                  <a:rPr lang="en-US" dirty="0">
+                    <a:sym typeface="Wingdings" panose="05000000000000000000" pitchFamily="2" charset="2"/>
+                  </a:rPr>
+                  <a:t> tartományon</a:t>
+                </a:r>
+                <a:endParaRPr lang="en-US" dirty="0"/>
               </a:p>
               <a:p>
                 <a:pPr marL="292608" lvl="1" indent="0">
@@ -7762,100 +10504,6 @@
                   <a:buChar char="§"/>
                 </a:pPr>
                 <a:r>
-                  <a:rPr lang="en-US" dirty="0">
-                    <a:sym typeface="Wingdings" panose="05000000000000000000" pitchFamily="2" charset="2"/>
-                  </a:rPr>
-                  <a:t>A </a:t>
-                </a:r>
-                <a:r>
-                  <a:rPr lang="en-US" dirty="0" err="1">
-                    <a:sym typeface="Wingdings" panose="05000000000000000000" pitchFamily="2" charset="2"/>
-                  </a:rPr>
-                  <a:t>lényeg</a:t>
-                </a:r>
-                <a:r>
-                  <a:rPr lang="en-US" dirty="0">
-                    <a:sym typeface="Wingdings" panose="05000000000000000000" pitchFamily="2" charset="2"/>
-                  </a:rPr>
-                  <a:t>, </a:t>
-                </a:r>
-                <a:r>
-                  <a:rPr lang="en-US" dirty="0" err="1">
-                    <a:sym typeface="Wingdings" panose="05000000000000000000" pitchFamily="2" charset="2"/>
-                  </a:rPr>
-                  <a:t>hogy</a:t>
-                </a:r>
-                <a:r>
-                  <a:rPr lang="en-US" dirty="0">
-                    <a:sym typeface="Wingdings" panose="05000000000000000000" pitchFamily="2" charset="2"/>
-                  </a:rPr>
-                  <a:t> a </a:t>
-                </a:r>
-                <a:r>
-                  <a:rPr lang="en-US" i="1" dirty="0">
-                    <a:sym typeface="Wingdings" panose="05000000000000000000" pitchFamily="2" charset="2"/>
-                  </a:rPr>
-                  <a:t>PDF</a:t>
-                </a:r>
-                <a:r>
-                  <a:rPr lang="en-US" dirty="0">
-                    <a:sym typeface="Wingdings" panose="05000000000000000000" pitchFamily="2" charset="2"/>
-                  </a:rPr>
-                  <a:t> </a:t>
-                </a:r>
-                <a14:m>
-                  <m:oMath xmlns:m="http://schemas.openxmlformats.org/officeDocument/2006/math">
-                    <m:r>
-                      <a:rPr lang="en-US" b="0" i="1" smtClean="0">
-                        <a:latin typeface="Cambria Math" panose="02040503050406030204" pitchFamily="18" charset="0"/>
-                        <a:sym typeface="Wingdings" panose="05000000000000000000" pitchFamily="2" charset="2"/>
-                      </a:rPr>
-                      <m:t>1</m:t>
-                    </m:r>
-                  </m:oMath>
-                </a14:m>
-                <a:r>
-                  <a:rPr lang="en-US" dirty="0">
-                    <a:sym typeface="Wingdings" panose="05000000000000000000" pitchFamily="2" charset="2"/>
-                  </a:rPr>
-                  <a:t>-hez </a:t>
-                </a:r>
-                <a:r>
-                  <a:rPr lang="en-US" dirty="0" err="1">
-                    <a:sym typeface="Wingdings" panose="05000000000000000000" pitchFamily="2" charset="2"/>
-                  </a:rPr>
-                  <a:t>integrál</a:t>
-                </a:r>
-                <a:r>
-                  <a:rPr lang="en-US" dirty="0">
-                    <a:sym typeface="Wingdings" panose="05000000000000000000" pitchFamily="2" charset="2"/>
-                  </a:rPr>
-                  <a:t> </a:t>
-                </a:r>
-                <a14:m>
-                  <m:oMath xmlns:m="http://schemas.openxmlformats.org/officeDocument/2006/math">
-                    <m:r>
-                      <a:rPr lang="en-US" b="0" i="1" smtClean="0">
-                        <a:latin typeface="Cambria Math" panose="02040503050406030204" pitchFamily="18" charset="0"/>
-                        <a:sym typeface="Wingdings" panose="05000000000000000000" pitchFamily="2" charset="2"/>
-                      </a:rPr>
-                      <m:t>𝐷</m:t>
-                    </m:r>
-                  </m:oMath>
-                </a14:m>
-                <a:r>
-                  <a:rPr lang="en-US" dirty="0">
-                    <a:sym typeface="Wingdings" panose="05000000000000000000" pitchFamily="2" charset="2"/>
-                  </a:rPr>
-                  <a:t>-n</a:t>
-                </a:r>
-              </a:p>
-              <a:p>
-                <a:pPr>
-                  <a:buFont typeface="Wingdings" panose="05000000000000000000" pitchFamily="2" charset="2"/>
-                  <a:buChar char="§"/>
-                </a:pPr>
-                <a:r>
                   <a:rPr lang="en-US" b="1" dirty="0" err="1">
                     <a:sym typeface="Wingdings" panose="05000000000000000000" pitchFamily="2" charset="2"/>
                   </a:rPr>
@@ -7884,18 +10532,6 @@
                     <a:sym typeface="Wingdings" panose="05000000000000000000" pitchFamily="2" charset="2"/>
                   </a:rPr>
                   <a:t> el </a:t>
-                </a:r>
-                <a:r>
-                  <a:rPr lang="en-US" dirty="0" err="1">
-                    <a:sym typeface="Wingdings" panose="05000000000000000000" pitchFamily="2" charset="2"/>
-                  </a:rPr>
-                  <a:t>inkább</a:t>
-                </a:r>
-                <a:r>
-                  <a:rPr lang="en-US" dirty="0">
-                    <a:sym typeface="Wingdings" panose="05000000000000000000" pitchFamily="2" charset="2"/>
-                  </a:rPr>
-                  <a:t> </a:t>
                 </a:r>
                 <a:r>
                   <a:rPr lang="en-US" dirty="0" err="1">
@@ -7914,7 +10550,7 @@
             </p:txBody>
           </p:sp>
         </mc:Choice>
-        <mc:Fallback xmlns="">
+        <mc:Fallback>
           <p:sp>
             <p:nvSpPr>
               <p:cNvPr id="3" name="Content Placeholder 2">
@@ -7932,10 +10568,14 @@
               </p:nvPr>
             </p:nvSpPr>
             <p:spPr>
+              <a:xfrm>
+                <a:off x="1097280" y="1845733"/>
+                <a:ext cx="10058400" cy="4218567"/>
+              </a:xfrm>
               <a:blipFill>
                 <a:blip r:embed="rId4"/>
                 <a:stretch>
-                  <a:fillRect l="-1455" t="-1667" b="-455"/>
+                  <a:fillRect l="-1455" t="-1590"/>
                 </a:stretch>
               </a:blipFill>
             </p:spPr>
@@ -7982,7 +10622,7 @@
         </p:blipFill>
         <p:spPr>
           <a:xfrm>
-            <a:off x="5649850" y="3256705"/>
+            <a:off x="5547437" y="2822177"/>
             <a:ext cx="5741261" cy="3242123"/>
           </a:xfrm>
           <a:prstGeom prst="rect">
@@ -8061,8 +10701,8 @@
           </a:p>
         </p:txBody>
       </p:sp>
-      <mc:AlternateContent xmlns:mc="http://schemas.openxmlformats.org/markup-compatibility/2006">
-        <mc:Choice xmlns:a14="http://schemas.microsoft.com/office/drawing/2010/main" Requires="a14">
+      <mc:AlternateContent xmlns:mc="http://schemas.openxmlformats.org/markup-compatibility/2006" xmlns:a14="http://schemas.microsoft.com/office/drawing/2010/main">
+        <mc:Choice Requires="a14">
           <p:sp>
             <p:nvSpPr>
               <p:cNvPr id="3" name="Content Placeholder 2">
@@ -8878,7 +11518,7 @@
             </p:txBody>
           </p:sp>
         </mc:Choice>
-        <mc:Fallback>
+        <mc:Fallback xmlns="">
           <p:sp>
             <p:nvSpPr>
               <p:cNvPr id="3" name="Content Placeholder 2">
@@ -9095,8 +11735,8 @@
           </a:p>
         </p:txBody>
       </p:sp>
-      <mc:AlternateContent xmlns:mc="http://schemas.openxmlformats.org/markup-compatibility/2006">
-        <mc:Choice xmlns:a14="http://schemas.microsoft.com/office/drawing/2010/main" Requires="a14">
+      <mc:AlternateContent xmlns:mc="http://schemas.openxmlformats.org/markup-compatibility/2006" xmlns:a14="http://schemas.microsoft.com/office/drawing/2010/main">
+        <mc:Choice Requires="a14">
           <p:sp>
             <p:nvSpPr>
               <p:cNvPr id="3" name="Content Placeholder 2">
@@ -9452,7 +12092,7 @@
             </p:txBody>
           </p:sp>
         </mc:Choice>
-        <mc:Fallback>
+        <mc:Fallback xmlns="">
           <p:sp>
             <p:nvSpPr>
               <p:cNvPr id="3" name="Content Placeholder 2">
@@ -9832,47 +12472,31 @@
                 </a:r>
                 <a:r>
                   <a:rPr lang="en-US" dirty="0"/>
-                  <a:t>…</a:t>
-                </a:r>
-                <a:r>
-                  <a:rPr lang="en-US" dirty="0" err="1"/>
-                  <a:t>az</a:t>
-                </a:r>
-                <a:r>
-                  <a:rPr lang="en-US" dirty="0"/>
-                  <a:t> </a:t>
-                </a:r>
-                <a:r>
-                  <a:rPr lang="en-US" dirty="0" err="1"/>
-                  <a:t>esetek</a:t>
-                </a:r>
-                <a:r>
-                  <a:rPr lang="en-US" dirty="0"/>
-                  <a:t> </a:t>
-                </a:r>
-                <a:r>
-                  <a:rPr lang="en-US" dirty="0" err="1"/>
-                  <a:t>többségében</a:t>
-                </a:r>
-                <a:r>
-                  <a:rPr lang="en-US" dirty="0"/>
-                  <a:t> </a:t>
-                </a:r>
-                <a:r>
-                  <a:rPr lang="en-US" dirty="0" err="1"/>
-                  <a:t>csak</a:t>
-                </a:r>
-                <a:r>
-                  <a:rPr lang="en-US" dirty="0"/>
-                  <a:t> </a:t>
-                </a:r>
-                <a:r>
-                  <a:rPr lang="en-US" dirty="0" err="1"/>
-                  <a:t>lassít</a:t>
-                </a:r>
-                <a:r>
-                  <a:rPr lang="en-US" dirty="0"/>
-                  <a:t>…</a:t>
+                  <a:t>…mi </a:t>
+                </a:r>
+                <a:r>
+                  <a:rPr lang="en-US" dirty="0" err="1"/>
+                  <a:t>lenne</a:t>
+                </a:r>
+                <a:r>
+                  <a:rPr lang="en-US" dirty="0"/>
+                  <a:t> ha </a:t>
+                </a:r>
+                <a:r>
+                  <a:rPr lang="en-US" dirty="0" err="1"/>
+                  <a:t>kihasználnánk</a:t>
+                </a:r>
+                <a:r>
+                  <a:rPr lang="en-US" dirty="0"/>
+                  <a:t> a </a:t>
+                </a:r>
+                <a:r>
+                  <a:rPr lang="en-US" i="1" dirty="0"/>
+                  <a:t>BRDF</a:t>
+                </a:r>
+                <a:r>
+                  <a:rPr lang="en-US" dirty="0"/>
+                  <a:t>-et?</a:t>
                 </a:r>
               </a:p>
               <a:p>
@@ -10188,7 +12812,9 @@
                   <a:t> </a:t>
                 </a:r>
                 <a:r>
-                  <a:rPr lang="en-US" dirty="0" err="1"/>
+                  <a:rPr lang="en-US" dirty="0" err="1">
+                    <a:hlinkClick r:id="rId2"/>
+                  </a:rPr>
                   <a:t>ezen</a:t>
                 </a:r>
                 <a:r>
@@ -10213,27 +12839,11 @@
                 </a:r>
                 <a:r>
                   <a:rPr lang="en-US" dirty="0" err="1"/>
-                  <a:t>én</a:t>
-                </a:r>
-                <a:r>
-                  <a:rPr lang="en-US" dirty="0"/>
-                  <a:t> </a:t>
-                </a:r>
-                <a:r>
-                  <a:rPr lang="en-US" dirty="0" err="1"/>
-                  <a:t>nár</a:t>
-                </a:r>
-                <a:r>
-                  <a:rPr lang="en-US" dirty="0"/>
-                  <a:t> </a:t>
-                </a:r>
-                <a:r>
-                  <a:rPr lang="en-US" dirty="0" err="1"/>
-                  <a:t>megtettem</a:t>
-                </a:r>
-                <a:r>
-                  <a:rPr lang="en-US" dirty="0"/>
-                  <a:t>, most </a:t>
+                  <a:t>annyira</a:t>
+                </a:r>
+                <a:r>
+                  <a:rPr lang="en-US" dirty="0"/>
+                  <a:t> </a:t>
                 </a:r>
                 <a:r>
                   <a:rPr lang="en-US" dirty="0" err="1"/>
@@ -10245,7 +12855,33 @@
                 </a:r>
                 <a:r>
                   <a:rPr lang="en-US" dirty="0" err="1"/>
-                  <a:t>fogom</a:t>
+                  <a:t>triviális</a:t>
+                </a:r>
+                <a:r>
+                  <a:rPr lang="en-US" dirty="0"/>
+                  <a:t>…</a:t>
+                </a:r>
+                <a:r>
+                  <a:rPr lang="en-US" dirty="0" err="1"/>
+                  <a:t>talán</a:t>
+                </a:r>
+                <a:r>
+                  <a:rPr lang="en-US" dirty="0"/>
+                  <a:t> </a:t>
+                </a:r>
+                <a:r>
+                  <a:rPr lang="en-US" dirty="0" err="1"/>
+                  <a:t>levezetem</a:t>
+                </a:r>
+                <a:r>
+                  <a:rPr lang="en-US" dirty="0"/>
+                  <a:t> </a:t>
+                </a:r>
+                <a:r>
+                  <a:rPr lang="en-US" dirty="0">
+                    <a:sym typeface="Wingdings" panose="05000000000000000000" pitchFamily="2" charset="2"/>
+                  </a:rPr>
+                  <a:t></a:t>
                 </a:r>
                 <a:r>
                   <a:rPr lang="en-US" dirty="0"/>
@@ -10274,7 +12910,7 @@
             </p:nvSpPr>
             <p:spPr>
               <a:blipFill>
-                <a:blip r:embed="rId2"/>
+                <a:blip r:embed="rId3"/>
                 <a:stretch>
                   <a:fillRect l="-1455" t="-1667"/>
                 </a:stretch>

</xml_diff>

<commit_message>
path tracing prez 5
</commit_message>
<xml_diff>
--- a/PBR_EA_02.pptx
+++ b/PBR_EA_02.pptx
@@ -5,7 +5,7 @@
     <p:sldMasterId id="2147483767" r:id="rId1"/>
   </p:sldMasterIdLst>
   <p:notesMasterIdLst>
-    <p:notesMasterId r:id="rId15"/>
+    <p:notesMasterId r:id="rId16"/>
   </p:notesMasterIdLst>
   <p:sldIdLst>
     <p:sldId id="256" r:id="rId2"/>
@@ -16,11 +16,12 @@
     <p:sldId id="258" r:id="rId7"/>
     <p:sldId id="263" r:id="rId8"/>
     <p:sldId id="262" r:id="rId9"/>
-    <p:sldId id="264" r:id="rId10"/>
-    <p:sldId id="265" r:id="rId11"/>
-    <p:sldId id="266" r:id="rId12"/>
-    <p:sldId id="267" r:id="rId13"/>
-    <p:sldId id="268" r:id="rId14"/>
+    <p:sldId id="269" r:id="rId10"/>
+    <p:sldId id="264" r:id="rId11"/>
+    <p:sldId id="265" r:id="rId12"/>
+    <p:sldId id="266" r:id="rId13"/>
+    <p:sldId id="267" r:id="rId14"/>
+    <p:sldId id="268" r:id="rId15"/>
   </p:sldIdLst>
   <p:sldSz cx="12192000" cy="6858000"/>
   <p:notesSz cx="6858000" cy="9144000"/>
@@ -213,7 +214,7 @@
           <a:p>
             <a:fld id="{3A5A56FF-9D9E-417E-8DB7-17CB8EBF566C}" type="datetimeFigureOut">
               <a:rPr lang="hu-HU" smtClean="0"/>
-              <a:t>2018. 03. 16.</a:t>
+              <a:t>2018. 03. 17.</a:t>
             </a:fld>
             <a:endParaRPr lang="hu-HU"/>
           </a:p>
@@ -526,6 +527,110 @@
           <a:lstStyle/>
           <a:p>
             <a:r>
+              <a:rPr lang="en-US" dirty="0"/>
+              <a:t>* </a:t>
+            </a:r>
+            <a:r>
+              <a:rPr lang="en-US" dirty="0" err="1"/>
+              <a:t>anizotróp</a:t>
+            </a:r>
+            <a:r>
+              <a:rPr lang="en-US" dirty="0"/>
+              <a:t> </a:t>
+            </a:r>
+            <a:r>
+              <a:rPr lang="en-US" dirty="0" err="1"/>
+              <a:t>felületekhez</a:t>
+            </a:r>
+            <a:r>
+              <a:rPr lang="en-US" dirty="0"/>
+              <a:t> SVBSDF</a:t>
+            </a:r>
+            <a:endParaRPr lang="hu-HU" dirty="0"/>
+          </a:p>
+        </p:txBody>
+      </p:sp>
+      <p:sp>
+        <p:nvSpPr>
+          <p:cNvPr id="4" name="Slide Number Placeholder 3"/>
+          <p:cNvSpPr>
+            <a:spLocks noGrp="1"/>
+          </p:cNvSpPr>
+          <p:nvPr>
+            <p:ph type="sldNum" sz="quarter" idx="10"/>
+          </p:nvPr>
+        </p:nvSpPr>
+        <p:spPr/>
+        <p:txBody>
+          <a:bodyPr/>
+          <a:lstStyle/>
+          <a:p>
+            <a:fld id="{14C09B99-3F57-4C83-A41A-980FBCAF7828}" type="slidenum">
+              <a:rPr lang="hu-HU" smtClean="0"/>
+              <a:t>2</a:t>
+            </a:fld>
+            <a:endParaRPr lang="hu-HU"/>
+          </a:p>
+        </p:txBody>
+      </p:sp>
+    </p:spTree>
+    <p:extLst>
+      <p:ext uri="{BB962C8B-B14F-4D97-AF65-F5344CB8AC3E}">
+        <p14:creationId xmlns:p14="http://schemas.microsoft.com/office/powerpoint/2010/main" val="4046879742"/>
+      </p:ext>
+    </p:extLst>
+  </p:cSld>
+  <p:clrMapOvr>
+    <a:masterClrMapping/>
+  </p:clrMapOvr>
+</p:notes>
+</file>
+
+<file path=ppt/notesSlides/notesSlide2.xml><?xml version="1.0" encoding="utf-8"?>
+<p:notes xmlns:a="http://schemas.openxmlformats.org/drawingml/2006/main" xmlns:r="http://schemas.openxmlformats.org/officeDocument/2006/relationships" xmlns:p="http://schemas.openxmlformats.org/presentationml/2006/main">
+  <p:cSld>
+    <p:spTree>
+      <p:nvGrpSpPr>
+        <p:cNvPr id="1" name=""/>
+        <p:cNvGrpSpPr/>
+        <p:nvPr/>
+      </p:nvGrpSpPr>
+      <p:grpSpPr>
+        <a:xfrm>
+          <a:off x="0" y="0"/>
+          <a:ext cx="0" cy="0"/>
+          <a:chOff x="0" y="0"/>
+          <a:chExt cx="0" cy="0"/>
+        </a:xfrm>
+      </p:grpSpPr>
+      <p:sp>
+        <p:nvSpPr>
+          <p:cNvPr id="2" name="Slide Image Placeholder 1"/>
+          <p:cNvSpPr>
+            <a:spLocks noGrp="1" noRot="1" noChangeAspect="1"/>
+          </p:cNvSpPr>
+          <p:nvPr>
+            <p:ph type="sldImg"/>
+          </p:nvPr>
+        </p:nvSpPr>
+        <p:spPr/>
+      </p:sp>
+      <p:sp>
+        <p:nvSpPr>
+          <p:cNvPr id="3" name="Notes Placeholder 2"/>
+          <p:cNvSpPr>
+            <a:spLocks noGrp="1"/>
+          </p:cNvSpPr>
+          <p:nvPr>
+            <p:ph type="body" idx="1"/>
+          </p:nvPr>
+        </p:nvSpPr>
+        <p:spPr/>
+        <p:txBody>
+          <a:bodyPr/>
+          <a:lstStyle/>
+          <a:p>
+            <a:r>
               <a:rPr lang="hu-HU" dirty="0"/>
               <a:t>E\{f(x)\}_p=\int_D f(x)\ p(x)\ \mathrm{d}x</a:t>
             </a:r>
@@ -851,7 +956,7 @@
           <a:p>
             <a:fld id="{EE90FBA0-FEE2-473A-A4B4-051DFD2DB1BD}" type="datetimeFigureOut">
               <a:rPr lang="en-US" smtClean="0"/>
-              <a:t>3/16/2018</a:t>
+              <a:t>3/17/2018</a:t>
             </a:fld>
             <a:endParaRPr lang="en-US"/>
           </a:p>
@@ -1059,7 +1164,7 @@
           <a:p>
             <a:fld id="{EE90FBA0-FEE2-473A-A4B4-051DFD2DB1BD}" type="datetimeFigureOut">
               <a:rPr lang="en-US" smtClean="0"/>
-              <a:t>3/16/2018</a:t>
+              <a:t>3/17/2018</a:t>
             </a:fld>
             <a:endParaRPr lang="en-US"/>
           </a:p>
@@ -1315,7 +1420,7 @@
           <a:p>
             <a:fld id="{EE90FBA0-FEE2-473A-A4B4-051DFD2DB1BD}" type="datetimeFigureOut">
               <a:rPr lang="en-US" smtClean="0"/>
-              <a:t>3/16/2018</a:t>
+              <a:t>3/17/2018</a:t>
             </a:fld>
             <a:endParaRPr lang="en-US"/>
           </a:p>
@@ -1489,7 +1594,7 @@
           <a:p>
             <a:fld id="{EE90FBA0-FEE2-473A-A4B4-051DFD2DB1BD}" type="datetimeFigureOut">
               <a:rPr lang="en-US" smtClean="0"/>
-              <a:t>3/16/2018</a:t>
+              <a:t>3/17/2018</a:t>
             </a:fld>
             <a:endParaRPr lang="en-US"/>
           </a:p>
@@ -1832,7 +1937,7 @@
           <a:p>
             <a:fld id="{EE90FBA0-FEE2-473A-A4B4-051DFD2DB1BD}" type="datetimeFigureOut">
               <a:rPr lang="en-US" smtClean="0"/>
-              <a:t>3/16/2018</a:t>
+              <a:t>3/17/2018</a:t>
             </a:fld>
             <a:endParaRPr lang="en-US"/>
           </a:p>
@@ -2107,7 +2212,7 @@
           <a:p>
             <a:fld id="{EE90FBA0-FEE2-473A-A4B4-051DFD2DB1BD}" type="datetimeFigureOut">
               <a:rPr lang="en-US" smtClean="0"/>
-              <a:t>3/16/2018</a:t>
+              <a:t>3/17/2018</a:t>
             </a:fld>
             <a:endParaRPr lang="en-US"/>
           </a:p>
@@ -2486,7 +2591,7 @@
           <a:p>
             <a:fld id="{EE90FBA0-FEE2-473A-A4B4-051DFD2DB1BD}" type="datetimeFigureOut">
               <a:rPr lang="en-US" smtClean="0"/>
-              <a:t>3/16/2018</a:t>
+              <a:t>3/17/2018</a:t>
             </a:fld>
             <a:endParaRPr lang="en-US"/>
           </a:p>
@@ -2604,7 +2709,7 @@
           <a:p>
             <a:fld id="{EE90FBA0-FEE2-473A-A4B4-051DFD2DB1BD}" type="datetimeFigureOut">
               <a:rPr lang="en-US" smtClean="0"/>
-              <a:t>3/16/2018</a:t>
+              <a:t>3/17/2018</a:t>
             </a:fld>
             <a:endParaRPr lang="en-US"/>
           </a:p>
@@ -2775,7 +2880,7 @@
           <a:p>
             <a:fld id="{EE90FBA0-FEE2-473A-A4B4-051DFD2DB1BD}" type="datetimeFigureOut">
               <a:rPr lang="en-US" smtClean="0"/>
-              <a:t>3/16/2018</a:t>
+              <a:t>3/17/2018</a:t>
             </a:fld>
             <a:endParaRPr lang="en-US"/>
           </a:p>
@@ -3129,7 +3234,7 @@
           <a:p>
             <a:fld id="{EE90FBA0-FEE2-473A-A4B4-051DFD2DB1BD}" type="datetimeFigureOut">
               <a:rPr lang="en-US" smtClean="0"/>
-              <a:t>3/16/2018</a:t>
+              <a:t>3/17/2018</a:t>
             </a:fld>
             <a:endParaRPr lang="en-US"/>
           </a:p>
@@ -3511,7 +3616,7 @@
           <a:p>
             <a:fld id="{EE90FBA0-FEE2-473A-A4B4-051DFD2DB1BD}" type="datetimeFigureOut">
               <a:rPr lang="en-US" smtClean="0"/>
-              <a:t>3/16/2018</a:t>
+              <a:t>3/17/2018</a:t>
             </a:fld>
             <a:endParaRPr lang="en-US"/>
           </a:p>
@@ -3798,7 +3903,7 @@
           <a:p>
             <a:fld id="{EE90FBA0-FEE2-473A-A4B4-051DFD2DB1BD}" type="datetimeFigureOut">
               <a:rPr lang="en-US" smtClean="0"/>
-              <a:t>3/16/2018</a:t>
+              <a:t>3/17/2018</a:t>
             </a:fld>
             <a:endParaRPr lang="en-US"/>
           </a:p>
@@ -4467,6 +4572,779 @@
           <p:cNvPr id="2" name="Title 1">
             <a:extLst>
               <a:ext uri="{FF2B5EF4-FFF2-40B4-BE49-F238E27FC236}">
+                <a16:creationId xmlns:a16="http://schemas.microsoft.com/office/drawing/2014/main" id="{D2EEF75E-504A-48E6-B809-DB66513E702F}"/>
+              </a:ext>
+            </a:extLst>
+          </p:cNvPr>
+          <p:cNvSpPr>
+            <a:spLocks noGrp="1"/>
+          </p:cNvSpPr>
+          <p:nvPr>
+            <p:ph type="title"/>
+          </p:nvPr>
+        </p:nvSpPr>
+        <p:spPr/>
+        <p:txBody>
+          <a:bodyPr/>
+          <a:lstStyle/>
+          <a:p>
+            <a:r>
+              <a:rPr lang="en-US" dirty="0"/>
+              <a:t>Importance sampling</a:t>
+            </a:r>
+            <a:endParaRPr lang="hu-HU" dirty="0"/>
+          </a:p>
+        </p:txBody>
+      </p:sp>
+      <mc:AlternateContent xmlns:mc="http://schemas.openxmlformats.org/markup-compatibility/2006">
+        <mc:Choice xmlns:a14="http://schemas.microsoft.com/office/drawing/2010/main" Requires="a14">
+          <p:sp>
+            <p:nvSpPr>
+              <p:cNvPr id="3" name="Content Placeholder 2">
+                <a:extLst>
+                  <a:ext uri="{FF2B5EF4-FFF2-40B4-BE49-F238E27FC236}">
+                    <a16:creationId xmlns:a16="http://schemas.microsoft.com/office/drawing/2014/main" id="{F1D06108-E156-4590-9274-21225E15E749}"/>
+                  </a:ext>
+                </a:extLst>
+              </p:cNvPr>
+              <p:cNvSpPr>
+                <a:spLocks noGrp="1"/>
+              </p:cNvSpPr>
+              <p:nvPr>
+                <p:ph idx="1"/>
+              </p:nvPr>
+            </p:nvSpPr>
+            <p:spPr/>
+            <p:txBody>
+              <a:bodyPr>
+                <a:normAutofit lnSpcReduction="10000"/>
+              </a:bodyPr>
+              <a:lstStyle/>
+              <a:p>
+                <a:pPr>
+                  <a:buFont typeface="Wingdings" panose="05000000000000000000" pitchFamily="2" charset="2"/>
+                  <a:buChar char="§"/>
+                </a:pPr>
+                <a:r>
+                  <a:rPr lang="en-US" dirty="0"/>
+                  <a:t>Az </a:t>
+                </a:r>
+                <a:r>
+                  <a:rPr lang="en-US" dirty="0" err="1"/>
+                  <a:t>előző</a:t>
+                </a:r>
+                <a:r>
+                  <a:rPr lang="en-US" dirty="0"/>
+                  <a:t> </a:t>
+                </a:r>
+                <a:r>
+                  <a:rPr lang="en-US" dirty="0" err="1"/>
+                  <a:t>példa</a:t>
+                </a:r>
+                <a:r>
+                  <a:rPr lang="en-US" dirty="0"/>
+                  <a:t> </a:t>
+                </a:r>
+                <a:r>
+                  <a:rPr lang="en-US" dirty="0" err="1"/>
+                  <a:t>egyenletes</a:t>
+                </a:r>
+                <a:r>
+                  <a:rPr lang="en-US" dirty="0"/>
+                  <a:t> </a:t>
+                </a:r>
+                <a:r>
+                  <a:rPr lang="en-US" dirty="0" err="1"/>
+                  <a:t>mintavételezés</a:t>
+                </a:r>
+                <a:r>
+                  <a:rPr lang="en-US" dirty="0"/>
+                  <a:t> volt…mi </a:t>
+                </a:r>
+                <a:r>
+                  <a:rPr lang="en-US" dirty="0" err="1"/>
+                  <a:t>lenne</a:t>
+                </a:r>
+                <a:r>
+                  <a:rPr lang="en-US" dirty="0"/>
+                  <a:t> ha </a:t>
+                </a:r>
+                <a:r>
+                  <a:rPr lang="en-US" dirty="0" err="1"/>
+                  <a:t>kihasználnánk</a:t>
+                </a:r>
+                <a:r>
+                  <a:rPr lang="en-US" dirty="0"/>
+                  <a:t> a </a:t>
+                </a:r>
+                <a:r>
+                  <a:rPr lang="en-US" i="1" dirty="0"/>
+                  <a:t>BRDF</a:t>
+                </a:r>
+                <a:r>
+                  <a:rPr lang="en-US" dirty="0"/>
+                  <a:t>-et?</a:t>
+                </a:r>
+              </a:p>
+              <a:p>
+                <a:pPr>
+                  <a:buFont typeface="Wingdings" panose="05000000000000000000" pitchFamily="2" charset="2"/>
+                  <a:buChar char="§"/>
+                </a:pPr>
+                <a:r>
+                  <a:rPr lang="en-US" dirty="0" err="1"/>
+                  <a:t>Lehet</a:t>
+                </a:r>
+                <a:r>
+                  <a:rPr lang="en-US" dirty="0"/>
+                  <a:t> </a:t>
+                </a:r>
+                <a:r>
+                  <a:rPr lang="en-US" dirty="0" err="1"/>
+                  <a:t>gondolni</a:t>
+                </a:r>
+                <a:r>
+                  <a:rPr lang="en-US" dirty="0"/>
+                  <a:t> a </a:t>
+                </a:r>
+                <a:r>
+                  <a:rPr lang="en-US" dirty="0" err="1"/>
+                  <a:t>tökéletes</a:t>
+                </a:r>
+                <a:r>
+                  <a:rPr lang="en-US" dirty="0"/>
+                  <a:t> </a:t>
+                </a:r>
+                <a:r>
+                  <a:rPr lang="en-US" dirty="0" err="1"/>
+                  <a:t>tükröződésre</a:t>
+                </a:r>
+                <a:r>
+                  <a:rPr lang="en-US" dirty="0"/>
+                  <a:t> is, de </a:t>
+                </a:r>
+                <a:r>
+                  <a:rPr lang="en-US" dirty="0" err="1"/>
+                  <a:t>már</a:t>
+                </a:r>
+                <a:r>
+                  <a:rPr lang="en-US" dirty="0"/>
+                  <a:t> </a:t>
+                </a:r>
+                <a:r>
+                  <a:rPr lang="en-US" i="1" dirty="0"/>
+                  <a:t>Lambert</a:t>
+                </a:r>
+                <a:r>
+                  <a:rPr lang="en-US" dirty="0"/>
+                  <a:t> </a:t>
+                </a:r>
+                <a:r>
+                  <a:rPr lang="en-US" dirty="0" err="1"/>
+                  <a:t>esetén</a:t>
+                </a:r>
+                <a:r>
+                  <a:rPr lang="en-US" dirty="0"/>
+                  <a:t> is </a:t>
+                </a:r>
+                <a:r>
+                  <a:rPr lang="en-US" dirty="0" err="1"/>
+                  <a:t>tudunk</a:t>
+                </a:r>
+                <a:r>
+                  <a:rPr lang="en-US" dirty="0"/>
+                  <a:t> </a:t>
+                </a:r>
+                <a:r>
+                  <a:rPr lang="en-US" dirty="0" err="1"/>
+                  <a:t>jobbat</a:t>
+                </a:r>
+                <a:r>
+                  <a:rPr lang="en-US" dirty="0"/>
+                  <a:t>:</a:t>
+                </a:r>
+              </a:p>
+              <a:p>
+                <a:pPr>
+                  <a:buFont typeface="Wingdings" panose="05000000000000000000" pitchFamily="2" charset="2"/>
+                  <a:buChar char="§"/>
+                </a:pPr>
+                <a:r>
+                  <a:rPr lang="en-US" dirty="0"/>
+                  <a:t>A </a:t>
+                </a:r>
+                <a:r>
+                  <a:rPr lang="en-US" dirty="0" err="1"/>
+                  <a:t>koszinusz</a:t>
+                </a:r>
+                <a:r>
+                  <a:rPr lang="en-US" dirty="0"/>
+                  <a:t> </a:t>
+                </a:r>
+                <a:r>
+                  <a:rPr lang="en-US" dirty="0" err="1"/>
+                  <a:t>ugyanis</a:t>
+                </a:r>
+                <a:r>
+                  <a:rPr lang="en-US" dirty="0"/>
+                  <a:t> </a:t>
+                </a:r>
+                <a14:m>
+                  <m:oMath xmlns:m="http://schemas.openxmlformats.org/officeDocument/2006/math">
+                    <m:f>
+                      <m:fPr>
+                        <m:ctrlPr>
+                          <a:rPr lang="en-US" i="1" smtClean="0">
+                            <a:latin typeface="Cambria Math" panose="02040503050406030204" pitchFamily="18" charset="0"/>
+                          </a:rPr>
+                        </m:ctrlPr>
+                      </m:fPr>
+                      <m:num>
+                        <m:r>
+                          <a:rPr lang="en-US" b="0" i="1" smtClean="0">
+                            <a:latin typeface="Cambria Math" panose="02040503050406030204" pitchFamily="18" charset="0"/>
+                          </a:rPr>
+                          <m:t>𝜋</m:t>
+                        </m:r>
+                      </m:num>
+                      <m:den>
+                        <m:r>
+                          <a:rPr lang="en-US" b="0" i="1" smtClean="0">
+                            <a:latin typeface="Cambria Math" panose="02040503050406030204" pitchFamily="18" charset="0"/>
+                          </a:rPr>
+                          <m:t>2</m:t>
+                        </m:r>
+                      </m:den>
+                    </m:f>
+                  </m:oMath>
+                </a14:m>
+                <a:r>
+                  <a:rPr lang="en-US" dirty="0"/>
+                  <a:t>-ben 0; </a:t>
+                </a:r>
+                <a:r>
+                  <a:rPr lang="en-US" dirty="0" err="1"/>
+                  <a:t>akkor</a:t>
+                </a:r>
+                <a:r>
+                  <a:rPr lang="en-US" dirty="0"/>
+                  <a:t> </a:t>
+                </a:r>
+                <a:r>
+                  <a:rPr lang="en-US" dirty="0" err="1"/>
+                  <a:t>ott</a:t>
+                </a:r>
+                <a:r>
+                  <a:rPr lang="en-US" dirty="0"/>
+                  <a:t> </a:t>
+                </a:r>
+                <a:r>
+                  <a:rPr lang="en-US" dirty="0" err="1"/>
+                  <a:t>miért</a:t>
+                </a:r>
+                <a:r>
+                  <a:rPr lang="en-US" dirty="0"/>
+                  <a:t> </a:t>
+                </a:r>
+                <a:r>
+                  <a:rPr lang="en-US" dirty="0" err="1"/>
+                  <a:t>vennénk</a:t>
+                </a:r>
+                <a:r>
+                  <a:rPr lang="en-US" dirty="0"/>
+                  <a:t> </a:t>
+                </a:r>
+                <a:r>
+                  <a:rPr lang="en-US" dirty="0" err="1"/>
+                  <a:t>mintát</a:t>
+                </a:r>
+                <a:r>
+                  <a:rPr lang="en-US" dirty="0"/>
+                  <a:t>? </a:t>
+                </a:r>
+                <a:r>
+                  <a:rPr lang="en-US" dirty="0" err="1"/>
+                  <a:t>Legyen</a:t>
+                </a:r>
+                <a:r>
+                  <a:rPr lang="en-US" dirty="0"/>
+                  <a:t> </a:t>
+                </a:r>
+                <a14:m>
+                  <m:oMath xmlns:m="http://schemas.openxmlformats.org/officeDocument/2006/math">
+                    <m:sSub>
+                      <m:sSubPr>
+                        <m:ctrlPr>
+                          <a:rPr lang="en-US" b="0" i="1" smtClean="0">
+                            <a:latin typeface="Cambria Math" panose="02040503050406030204" pitchFamily="18" charset="0"/>
+                          </a:rPr>
+                        </m:ctrlPr>
+                      </m:sSubPr>
+                      <m:e>
+                        <m:r>
+                          <a:rPr lang="en-US" b="0" i="1" smtClean="0">
+                            <a:latin typeface="Cambria Math" panose="02040503050406030204" pitchFamily="18" charset="0"/>
+                          </a:rPr>
+                          <m:t>𝑝</m:t>
+                        </m:r>
+                      </m:e>
+                      <m:sub>
+                        <m:r>
+                          <a:rPr lang="en-US" b="0" i="1" smtClean="0">
+                            <a:latin typeface="Cambria Math" panose="02040503050406030204" pitchFamily="18" charset="0"/>
+                          </a:rPr>
+                          <m:t>𝑟</m:t>
+                        </m:r>
+                      </m:sub>
+                    </m:sSub>
+                    <m:r>
+                      <a:rPr lang="en-US" b="0" i="1" smtClean="0">
+                        <a:latin typeface="Cambria Math" panose="02040503050406030204" pitchFamily="18" charset="0"/>
+                      </a:rPr>
+                      <m:t>=</m:t>
+                    </m:r>
+                    <m:f>
+                      <m:fPr>
+                        <m:ctrlPr>
+                          <a:rPr lang="en-US" b="0" i="1" smtClean="0">
+                            <a:latin typeface="Cambria Math" panose="02040503050406030204" pitchFamily="18" charset="0"/>
+                          </a:rPr>
+                        </m:ctrlPr>
+                      </m:fPr>
+                      <m:num>
+                        <m:func>
+                          <m:funcPr>
+                            <m:ctrlPr>
+                              <a:rPr lang="en-US" b="0" i="1" smtClean="0">
+                                <a:latin typeface="Cambria Math" panose="02040503050406030204" pitchFamily="18" charset="0"/>
+                              </a:rPr>
+                            </m:ctrlPr>
+                          </m:funcPr>
+                          <m:fName>
+                            <m:r>
+                              <m:rPr>
+                                <m:sty m:val="p"/>
+                              </m:rPr>
+                              <a:rPr lang="en-US" b="0" i="0" smtClean="0">
+                                <a:latin typeface="Cambria Math" panose="02040503050406030204" pitchFamily="18" charset="0"/>
+                              </a:rPr>
+                              <m:t>cos</m:t>
+                            </m:r>
+                          </m:fName>
+                          <m:e>
+                            <m:r>
+                              <a:rPr lang="en-US" b="0" i="1" smtClean="0">
+                                <a:latin typeface="Cambria Math" panose="02040503050406030204" pitchFamily="18" charset="0"/>
+                              </a:rPr>
+                              <m:t>𝜃</m:t>
+                            </m:r>
+                          </m:e>
+                        </m:func>
+                      </m:num>
+                      <m:den>
+                        <m:r>
+                          <a:rPr lang="en-US" b="0" i="1" smtClean="0">
+                            <a:latin typeface="Cambria Math" panose="02040503050406030204" pitchFamily="18" charset="0"/>
+                          </a:rPr>
+                          <m:t>𝜋</m:t>
+                        </m:r>
+                      </m:den>
+                    </m:f>
+                  </m:oMath>
+                </a14:m>
+                <a:r>
+                  <a:rPr lang="en-US" dirty="0"/>
+                  <a:t> </a:t>
+                </a:r>
+              </a:p>
+              <a:p>
+                <a:pPr>
+                  <a:buFont typeface="Wingdings" panose="05000000000000000000" pitchFamily="2" charset="2"/>
+                  <a:buChar char="§"/>
+                </a:pPr>
+                <a:endParaRPr lang="en-US" dirty="0"/>
+              </a:p>
+              <a:p>
+                <a:pPr>
+                  <a:buFont typeface="Wingdings" panose="05000000000000000000" pitchFamily="2" charset="2"/>
+                  <a:buChar char="§"/>
+                </a:pPr>
+                <a:endParaRPr lang="en-US" dirty="0"/>
+              </a:p>
+              <a:p>
+                <a:pPr>
+                  <a:buFont typeface="Wingdings" panose="05000000000000000000" pitchFamily="2" charset="2"/>
+                  <a:buChar char="§"/>
+                </a:pPr>
+                <a:endParaRPr lang="en-US" dirty="0"/>
+              </a:p>
+              <a:p>
+                <a:pPr>
+                  <a:buFont typeface="Wingdings" panose="05000000000000000000" pitchFamily="2" charset="2"/>
+                  <a:buChar char="§"/>
+                </a:pPr>
+                <a:endParaRPr lang="en-US" dirty="0"/>
+              </a:p>
+              <a:p>
+                <a:pPr>
+                  <a:buFont typeface="Wingdings" panose="05000000000000000000" pitchFamily="2" charset="2"/>
+                  <a:buChar char="§"/>
+                </a:pPr>
+                <a:r>
+                  <a:rPr lang="en-US" dirty="0"/>
+                  <a:t>A </a:t>
+                </a:r>
+                <a:r>
+                  <a:rPr lang="en-US" i="1" dirty="0"/>
+                  <a:t>Cook-Torrance</a:t>
+                </a:r>
+                <a:r>
+                  <a:rPr lang="en-US" dirty="0"/>
+                  <a:t> </a:t>
+                </a:r>
+                <a:r>
+                  <a:rPr lang="en-US" dirty="0" err="1"/>
+                  <a:t>modellhez</a:t>
+                </a:r>
+                <a:r>
+                  <a:rPr lang="en-US" dirty="0"/>
+                  <a:t> a </a:t>
+                </a:r>
+                <a:r>
+                  <a:rPr lang="en-US" i="1" dirty="0"/>
+                  <a:t>GGX</a:t>
+                </a:r>
+                <a:r>
+                  <a:rPr lang="en-US" dirty="0"/>
+                  <a:t> </a:t>
+                </a:r>
+                <a:r>
+                  <a:rPr lang="en-US" dirty="0" err="1"/>
+                  <a:t>mintavételezés</a:t>
+                </a:r>
+                <a:r>
+                  <a:rPr lang="en-US" dirty="0"/>
+                  <a:t> </a:t>
+                </a:r>
+                <a:r>
+                  <a:rPr lang="en-US" dirty="0" err="1"/>
+                  <a:t>megtalálható</a:t>
+                </a:r>
+                <a:r>
+                  <a:rPr lang="en-US" dirty="0"/>
+                  <a:t> a </a:t>
+                </a:r>
+                <a:r>
+                  <a:rPr lang="en-US" dirty="0">
+                    <a:hlinkClick r:id="rId2"/>
+                  </a:rPr>
+                  <a:t>PBR </a:t>
+                </a:r>
+                <a:r>
+                  <a:rPr lang="en-US" dirty="0" err="1">
+                    <a:hlinkClick r:id="rId2"/>
+                  </a:rPr>
+                  <a:t>cikkemben</a:t>
+                </a:r>
+                <a:endParaRPr lang="en-US" dirty="0"/>
+              </a:p>
+              <a:p>
+                <a:pPr>
+                  <a:buFont typeface="Wingdings" panose="05000000000000000000" pitchFamily="2" charset="2"/>
+                  <a:buChar char="§"/>
+                </a:pPr>
+                <a:r>
+                  <a:rPr lang="en-US" dirty="0" err="1"/>
+                  <a:t>Illetve</a:t>
+                </a:r>
+                <a:r>
+                  <a:rPr lang="en-US" dirty="0"/>
+                  <a:t> </a:t>
+                </a:r>
+                <a:r>
+                  <a:rPr lang="en-US" dirty="0" err="1"/>
+                  <a:t>szinte</a:t>
+                </a:r>
+                <a:r>
+                  <a:rPr lang="en-US" dirty="0"/>
+                  <a:t> </a:t>
+                </a:r>
+                <a:r>
+                  <a:rPr lang="en-US" dirty="0" err="1"/>
+                  <a:t>az</a:t>
+                </a:r>
+                <a:r>
+                  <a:rPr lang="en-US" dirty="0"/>
+                  <a:t> </a:t>
+                </a:r>
+                <a:r>
+                  <a:rPr lang="en-US" dirty="0" err="1"/>
+                  <a:t>összes</a:t>
+                </a:r>
+                <a:r>
+                  <a:rPr lang="en-US" dirty="0"/>
+                  <a:t> </a:t>
+                </a:r>
+                <a:r>
+                  <a:rPr lang="en-US" dirty="0" err="1"/>
+                  <a:t>hivatkozott</a:t>
+                </a:r>
+                <a:r>
+                  <a:rPr lang="en-US" dirty="0"/>
+                  <a:t> </a:t>
+                </a:r>
+                <a:r>
+                  <a:rPr lang="en-US" dirty="0" err="1"/>
+                  <a:t>irodalomban</a:t>
+                </a:r>
+                <a:r>
+                  <a:rPr lang="en-US" dirty="0"/>
+                  <a:t>…</a:t>
+                </a:r>
+              </a:p>
+            </p:txBody>
+          </p:sp>
+        </mc:Choice>
+        <mc:Fallback>
+          <p:sp>
+            <p:nvSpPr>
+              <p:cNvPr id="3" name="Content Placeholder 2">
+                <a:extLst>
+                  <a:ext uri="{FF2B5EF4-FFF2-40B4-BE49-F238E27FC236}">
+                    <a16:creationId xmlns:a16="http://schemas.microsoft.com/office/drawing/2014/main" id="{F1D06108-E156-4590-9274-21225E15E749}"/>
+                  </a:ext>
+                </a:extLst>
+              </p:cNvPr>
+              <p:cNvSpPr>
+                <a:spLocks noGrp="1" noRot="1" noChangeAspect="1" noMove="1" noResize="1" noEditPoints="1" noAdjustHandles="1" noChangeArrowheads="1" noChangeShapeType="1" noTextEdit="1"/>
+              </p:cNvSpPr>
+              <p:nvPr>
+                <p:ph idx="1"/>
+              </p:nvPr>
+            </p:nvSpPr>
+            <p:spPr>
+              <a:blipFill>
+                <a:blip r:embed="rId3"/>
+                <a:stretch>
+                  <a:fillRect l="-1455" t="-2273"/>
+                </a:stretch>
+              </a:blipFill>
+            </p:spPr>
+            <p:txBody>
+              <a:bodyPr/>
+              <a:lstStyle/>
+              <a:p>
+                <a:r>
+                  <a:rPr lang="hu-HU">
+                    <a:noFill/>
+                  </a:rPr>
+                  <a:t> </a:t>
+                </a:r>
+              </a:p>
+            </p:txBody>
+          </p:sp>
+        </mc:Fallback>
+      </mc:AlternateContent>
+      <p:sp>
+        <p:nvSpPr>
+          <p:cNvPr id="4" name="TextBox 3">
+            <a:extLst>
+              <a:ext uri="{FF2B5EF4-FFF2-40B4-BE49-F238E27FC236}">
+                <a16:creationId xmlns:a16="http://schemas.microsoft.com/office/drawing/2014/main" id="{421E41AA-5223-4524-B995-D99504CFEBCF}"/>
+              </a:ext>
+            </a:extLst>
+          </p:cNvPr>
+          <p:cNvSpPr txBox="1"/>
+          <p:nvPr/>
+        </p:nvSpPr>
+        <p:spPr>
+          <a:xfrm>
+            <a:off x="2648712" y="3291840"/>
+            <a:ext cx="6898460" cy="1477328"/>
+          </a:xfrm>
+          <a:prstGeom prst="rect">
+            <a:avLst/>
+          </a:prstGeom>
+          <a:solidFill>
+            <a:schemeClr val="bg1">
+              <a:lumMod val="85000"/>
+            </a:schemeClr>
+          </a:solidFill>
+        </p:spPr>
+        <p:txBody>
+          <a:bodyPr wrap="square" rtlCol="0">
+            <a:spAutoFit/>
+          </a:bodyPr>
+          <a:lstStyle/>
+          <a:p>
+            <a:r>
+              <a:rPr lang="hu-HU" sz="1000" dirty="0">
+                <a:latin typeface="Consolas" panose="020B0609020204030204" pitchFamily="49" charset="0"/>
+              </a:rPr>
+              <a:t>vec3 </a:t>
+            </a:r>
+            <a:r>
+              <a:rPr lang="en-US" sz="1000" dirty="0">
+                <a:latin typeface="Consolas" panose="020B0609020204030204" pitchFamily="49" charset="0"/>
+              </a:rPr>
+              <a:t>Cosine</a:t>
+            </a:r>
+            <a:r>
+              <a:rPr lang="hu-HU" sz="1000" dirty="0">
+                <a:latin typeface="Consolas" panose="020B0609020204030204" pitchFamily="49" charset="0"/>
+              </a:rPr>
+              <a:t>Sample(vec3 n, vec3 pixel, float seed)</a:t>
+            </a:r>
+          </a:p>
+          <a:p>
+            <a:r>
+              <a:rPr lang="hu-HU" sz="1000" dirty="0">
+                <a:latin typeface="Consolas" panose="020B0609020204030204" pitchFamily="49" charset="0"/>
+              </a:rPr>
+              <a:t>{</a:t>
+            </a:r>
+          </a:p>
+          <a:p>
+            <a:r>
+              <a:rPr lang="hu-HU" sz="1000" dirty="0">
+                <a:latin typeface="Consolas" panose="020B0609020204030204" pitchFamily="49" charset="0"/>
+              </a:rPr>
+              <a:t>    float u = Random(pixel, vec3(12.9898, 78.233, 151.7182), seed);</a:t>
+            </a:r>
+          </a:p>
+          <a:p>
+            <a:r>
+              <a:rPr lang="hu-HU" sz="1000" dirty="0">
+                <a:latin typeface="Consolas" panose="020B0609020204030204" pitchFamily="49" charset="0"/>
+              </a:rPr>
+              <a:t>    float v = Random(pixel, vec3(63.7264, 10.873, 623.6736), seed);</a:t>
+            </a:r>
+          </a:p>
+          <a:p>
+            <a:r>
+              <a:rPr lang="hu-HU" sz="1000" dirty="0">
+                <a:latin typeface="Consolas" panose="020B0609020204030204" pitchFamily="49" charset="0"/>
+              </a:rPr>
+              <a:t>    float phi = TWO_PI * u;</a:t>
+            </a:r>
+          </a:p>
+          <a:p>
+            <a:r>
+              <a:rPr lang="hu-HU" sz="1000" dirty="0">
+                <a:latin typeface="Consolas" panose="020B0609020204030204" pitchFamily="49" charset="0"/>
+              </a:rPr>
+              <a:t>    float costheta = </a:t>
+            </a:r>
+            <a:r>
+              <a:rPr lang="en-US" sz="1000" b="1" dirty="0">
+                <a:latin typeface="Consolas" panose="020B0609020204030204" pitchFamily="49" charset="0"/>
+              </a:rPr>
+              <a:t>sqrt(</a:t>
+            </a:r>
+            <a:r>
+              <a:rPr lang="hu-HU" sz="1000" b="1" dirty="0">
+                <a:latin typeface="Consolas" panose="020B0609020204030204" pitchFamily="49" charset="0"/>
+              </a:rPr>
+              <a:t>v</a:t>
+            </a:r>
+            <a:r>
+              <a:rPr lang="en-US" sz="1000" b="1" dirty="0">
+                <a:latin typeface="Consolas" panose="020B0609020204030204" pitchFamily="49" charset="0"/>
+              </a:rPr>
+              <a:t>)</a:t>
+            </a:r>
+            <a:r>
+              <a:rPr lang="hu-HU" sz="1000" dirty="0">
+                <a:latin typeface="Consolas" panose="020B0609020204030204" pitchFamily="49" charset="0"/>
+              </a:rPr>
+              <a:t>;</a:t>
+            </a:r>
+          </a:p>
+          <a:p>
+            <a:endParaRPr lang="hu-HU" sz="1000" dirty="0">
+              <a:latin typeface="Consolas" panose="020B0609020204030204" pitchFamily="49" charset="0"/>
+            </a:endParaRPr>
+          </a:p>
+          <a:p>
+            <a:r>
+              <a:rPr lang="hu-HU" sz="1000" dirty="0">
+                <a:latin typeface="Consolas" panose="020B0609020204030204" pitchFamily="49" charset="0"/>
+              </a:rPr>
+              <a:t>    return</a:t>
+            </a:r>
+            <a:r>
+              <a:rPr lang="en-US" sz="1000" dirty="0">
+                <a:latin typeface="Consolas" panose="020B0609020204030204" pitchFamily="49" charset="0"/>
+              </a:rPr>
+              <a:t> ..</a:t>
+            </a:r>
+            <a:r>
+              <a:rPr lang="hu-HU" sz="1000" dirty="0">
+                <a:latin typeface="Consolas" panose="020B0609020204030204" pitchFamily="49" charset="0"/>
+              </a:rPr>
+              <a:t>;</a:t>
+            </a:r>
+            <a:r>
+              <a:rPr lang="en-US" sz="1000" dirty="0">
+                <a:latin typeface="Consolas" panose="020B0609020204030204" pitchFamily="49" charset="0"/>
+              </a:rPr>
+              <a:t> // </a:t>
+            </a:r>
+            <a:r>
+              <a:rPr lang="en-US" sz="1000" dirty="0" err="1">
+                <a:latin typeface="Consolas" panose="020B0609020204030204" pitchFamily="49" charset="0"/>
+              </a:rPr>
+              <a:t>ugyanaz</a:t>
+            </a:r>
+            <a:endParaRPr lang="hu-HU" sz="1000" dirty="0">
+              <a:latin typeface="Consolas" panose="020B0609020204030204" pitchFamily="49" charset="0"/>
+            </a:endParaRPr>
+          </a:p>
+          <a:p>
+            <a:r>
+              <a:rPr lang="hu-HU" sz="1000" dirty="0">
+                <a:latin typeface="Consolas" panose="020B0609020204030204" pitchFamily="49" charset="0"/>
+              </a:rPr>
+              <a:t>}</a:t>
+            </a:r>
+          </a:p>
+        </p:txBody>
+      </p:sp>
+    </p:spTree>
+    <p:extLst>
+      <p:ext uri="{BB962C8B-B14F-4D97-AF65-F5344CB8AC3E}">
+        <p14:creationId xmlns:p14="http://schemas.microsoft.com/office/powerpoint/2010/main" val="1015595444"/>
+      </p:ext>
+    </p:extLst>
+  </p:cSld>
+  <p:clrMapOvr>
+    <a:masterClrMapping/>
+  </p:clrMapOvr>
+</p:sld>
+</file>
+
+<file path=ppt/slides/slide11.xml><?xml version="1.0" encoding="utf-8"?>
+<p:sld xmlns:a="http://schemas.openxmlformats.org/drawingml/2006/main" xmlns:r="http://schemas.openxmlformats.org/officeDocument/2006/relationships" xmlns:p="http://schemas.openxmlformats.org/presentationml/2006/main">
+  <p:cSld>
+    <p:spTree>
+      <p:nvGrpSpPr>
+        <p:cNvPr id="1" name=""/>
+        <p:cNvGrpSpPr/>
+        <p:nvPr/>
+      </p:nvGrpSpPr>
+      <p:grpSpPr>
+        <a:xfrm>
+          <a:off x="0" y="0"/>
+          <a:ext cx="0" cy="0"/>
+          <a:chOff x="0" y="0"/>
+          <a:chExt cx="0" cy="0"/>
+        </a:xfrm>
+      </p:grpSpPr>
+      <p:sp>
+        <p:nvSpPr>
+          <p:cNvPr id="2" name="Title 1">
+            <a:extLst>
+              <a:ext uri="{FF2B5EF4-FFF2-40B4-BE49-F238E27FC236}">
                 <a16:creationId xmlns:a16="http://schemas.microsoft.com/office/drawing/2014/main" id="{70209AD0-6083-46CC-AD50-2A5ED04EA630}"/>
               </a:ext>
             </a:extLst>
@@ -4519,8 +5397,20 @@
                   <a:buChar char="§"/>
                 </a:pPr>
                 <a:r>
-                  <a:rPr lang="en-US" dirty="0"/>
-                  <a:t>Már </a:t>
+                  <a:rPr lang="en-US" dirty="0" err="1"/>
+                  <a:t>Probléma</a:t>
+                </a:r>
+                <a:r>
+                  <a:rPr lang="en-US" dirty="0"/>
+                  <a:t>: </a:t>
+                </a:r>
+                <a:r>
+                  <a:rPr lang="en-US" dirty="0" err="1"/>
+                  <a:t>már</a:t>
+                </a:r>
+                <a:r>
+                  <a:rPr lang="en-US" dirty="0"/>
+                  <a:t> </a:t>
                 </a:r>
                 <a:r>
                   <a:rPr lang="en-US" i="1" dirty="0"/>
@@ -4540,19 +5430,11 @@
                 </a:r>
                 <a:r>
                   <a:rPr lang="en-US" dirty="0" err="1"/>
-                  <a:t>problémát</a:t>
-                </a:r>
-                <a:r>
-                  <a:rPr lang="en-US" dirty="0"/>
-                  <a:t> </a:t>
-                </a:r>
-                <a:r>
-                  <a:rPr lang="en-US" dirty="0" err="1"/>
-                  <a:t>okoz</a:t>
-                </a:r>
-                <a:r>
-                  <a:rPr lang="en-US" dirty="0"/>
-                  <a:t>, ha a </a:t>
+                  <a:t>baj</a:t>
+                </a:r>
+                <a:r>
+                  <a:rPr lang="en-US" dirty="0"/>
+                  <a:t> van, ha a </a:t>
                 </a:r>
                 <a:r>
                   <a:rPr lang="en-US" dirty="0" err="1"/>
@@ -4750,7 +5632,7 @@
                           <m:sSub>
                             <m:sSubPr>
                               <m:ctrlPr>
-                                <a:rPr lang="en-US" b="0" i="0" smtClean="0">
+                                <a:rPr lang="en-US" b="0" i="1" smtClean="0">
                                   <a:latin typeface="Cambria Math" panose="02040503050406030204" pitchFamily="18" charset="0"/>
                                 </a:rPr>
                               </m:ctrlPr>
@@ -5369,7 +6251,7 @@
                 </a:r>
                 <a:r>
                   <a:rPr lang="en-US" dirty="0" err="1"/>
-                  <a:t>kombináljuk</a:t>
+                  <a:t>kombinálunk</a:t>
                 </a:r>
                 <a:r>
                   <a:rPr lang="en-US" dirty="0"/>
@@ -5385,7 +6267,15 @@
                 </a:r>
                 <a:r>
                   <a:rPr lang="en-US" dirty="0" err="1"/>
-                  <a:t>őket</a:t>
+                  <a:t>többféle</a:t>
+                </a:r>
+                <a:r>
+                  <a:rPr lang="en-US" dirty="0"/>
+                  <a:t> </a:t>
+                </a:r>
+                <a:r>
+                  <a:rPr lang="en-US" dirty="0" err="1"/>
+                  <a:t>mintavételezést</a:t>
                 </a:r>
                 <a:r>
                   <a:rPr lang="en-US" dirty="0"/>
@@ -5468,7 +6358,7 @@
 </p:sld>
 </file>
 
-<file path=ppt/slides/slide11.xml><?xml version="1.0" encoding="utf-8"?>
+<file path=ppt/slides/slide12.xml><?xml version="1.0" encoding="utf-8"?>
 <p:sld xmlns:a="http://schemas.openxmlformats.org/drawingml/2006/main" xmlns:r="http://schemas.openxmlformats.org/officeDocument/2006/relationships" xmlns:p="http://schemas.openxmlformats.org/presentationml/2006/main">
   <p:cSld>
     <p:spTree>
@@ -5535,7 +6425,7 @@
             <p:spPr/>
             <p:txBody>
               <a:bodyPr>
-                <a:normAutofit fontScale="92500" lnSpcReduction="10000"/>
+                <a:normAutofit lnSpcReduction="10000"/>
               </a:bodyPr>
               <a:lstStyle/>
               <a:p>
@@ -5639,7 +6529,7 @@
                 </a:pPr>
                 <a:r>
                   <a:rPr lang="en-US" dirty="0" err="1"/>
-                  <a:t>Kiválasztasz</a:t>
+                  <a:t>Kiválasztunk</a:t>
                 </a:r>
                 <a:r>
                   <a:rPr lang="en-US" dirty="0"/>
@@ -6258,6 +7148,31 @@
                               </m:r>
                             </m:num>
                             <m:den>
+                              <m:f>
+                                <m:fPr>
+                                  <m:ctrlPr>
+                                    <a:rPr lang="en-US" b="0" i="1" smtClean="0">
+                                      <a:latin typeface="Cambria Math" panose="02040503050406030204" pitchFamily="18" charset="0"/>
+                                    </a:rPr>
+                                  </m:ctrlPr>
+                                </m:fPr>
+                                <m:num>
+                                  <m:r>
+                                    <a:rPr lang="en-US" b="0" i="1" smtClean="0">
+                                      <a:latin typeface="Cambria Math" panose="02040503050406030204" pitchFamily="18" charset="0"/>
+                                    </a:rPr>
+                                    <m:t>1</m:t>
+                                  </m:r>
+                                </m:num>
+                                <m:den>
+                                  <m:r>
+                                    <a:rPr lang="en-US" b="0" i="1" smtClean="0">
+                                      <a:latin typeface="Cambria Math" panose="02040503050406030204" pitchFamily="18" charset="0"/>
+                                    </a:rPr>
+                                    <m:t>𝑀</m:t>
+                                  </m:r>
+                                </m:den>
+                              </m:f>
                               <m:nary>
                                 <m:naryPr>
                                   <m:chr m:val="∑"/>
@@ -6294,29 +7209,6 @@
                                   </m:r>
                                 </m:sup>
                                 <m:e>
-                                  <m:r>
-                                    <a:rPr lang="en-US" b="0" i="1" smtClean="0">
-                                      <a:latin typeface="Cambria Math" panose="02040503050406030204" pitchFamily="18" charset="0"/>
-                                    </a:rPr>
-                                    <m:t>𝑝</m:t>
-                                  </m:r>
-                                  <m:d>
-                                    <m:dPr>
-                                      <m:ctrlPr>
-                                        <a:rPr lang="en-US" b="0" i="1" smtClean="0">
-                                          <a:latin typeface="Cambria Math" panose="02040503050406030204" pitchFamily="18" charset="0"/>
-                                        </a:rPr>
-                                      </m:ctrlPr>
-                                    </m:dPr>
-                                    <m:e>
-                                      <m:r>
-                                        <a:rPr lang="en-US" b="0" i="1" smtClean="0">
-                                          <a:latin typeface="Cambria Math" panose="02040503050406030204" pitchFamily="18" charset="0"/>
-                                        </a:rPr>
-                                        <m:t>𝑗</m:t>
-                                      </m:r>
-                                    </m:e>
-                                  </m:d>
                                   <m:sSub>
                                     <m:sSubPr>
                                       <m:ctrlPr>
@@ -6326,12 +7218,6 @@
                                       </m:ctrlPr>
                                     </m:sSubPr>
                                     <m:e>
-                                      <m:r>
-                                        <a:rPr lang="en-US" b="0" i="1" smtClean="0">
-                                          <a:latin typeface="Cambria Math" panose="02040503050406030204" pitchFamily="18" charset="0"/>
-                                        </a:rPr>
-                                        <m:t> </m:t>
-                                      </m:r>
                                       <m:r>
                                         <a:rPr lang="en-US" b="0" i="1" smtClean="0">
                                           <a:latin typeface="Cambria Math" panose="02040503050406030204" pitchFamily="18" charset="0"/>
@@ -6402,45 +7288,95 @@
                   <a:buChar char="§"/>
                 </a:pPr>
                 <a:r>
-                  <a:rPr lang="en-US" dirty="0" err="1"/>
-                  <a:t>Höfö</a:t>
-                </a:r>
-                <a:r>
-                  <a:rPr lang="en-US" dirty="0"/>
-                  <a:t> </a:t>
-                </a:r>
-                <a:r>
-                  <a:rPr lang="en-US" dirty="0" err="1"/>
-                  <a:t>megcsinálni</a:t>
-                </a:r>
-                <a:r>
-                  <a:rPr lang="en-US" dirty="0"/>
-                  <a:t> </a:t>
+                  <a:rPr lang="en-US" dirty="0" err="1">
+                    <a:sym typeface="Wingdings" panose="05000000000000000000" pitchFamily="2" charset="2"/>
+                  </a:rPr>
+                  <a:t>Ennyire</a:t>
                 </a:r>
                 <a:r>
                   <a:rPr lang="en-US" dirty="0">
                     <a:sym typeface="Wingdings" panose="05000000000000000000" pitchFamily="2" charset="2"/>
                   </a:rPr>
-                  <a:t> pl. </a:t>
-                </a:r>
-                <a:r>
-                  <a:rPr lang="en-US" i="1" dirty="0">
+                  <a:t> </a:t>
+                </a:r>
+                <a:r>
+                  <a:rPr lang="en-US" dirty="0" err="1">
                     <a:sym typeface="Wingdings" panose="05000000000000000000" pitchFamily="2" charset="2"/>
                   </a:rPr>
-                  <a:t>Lambert</a:t>
+                  <a:t>azért</a:t>
                 </a:r>
                 <a:r>
                   <a:rPr lang="en-US" dirty="0">
                     <a:sym typeface="Wingdings" panose="05000000000000000000" pitchFamily="2" charset="2"/>
                   </a:rPr>
-                  <a:t> + </a:t>
-                </a:r>
-                <a:r>
-                  <a:rPr lang="en-US" i="1" dirty="0">
+                  <a:t> </a:t>
+                </a:r>
+                <a:r>
+                  <a:rPr lang="en-US" dirty="0" err="1">
+                    <a:sym typeface="Wingdings" panose="05000000000000000000" pitchFamily="2" charset="2"/>
+                    <a:hlinkClick r:id="rId2"/>
+                  </a:rPr>
+                  <a:t>nem</a:t>
+                </a:r>
+                <a:r>
+                  <a:rPr lang="en-US" dirty="0">
+                    <a:sym typeface="Wingdings" panose="05000000000000000000" pitchFamily="2" charset="2"/>
+                    <a:hlinkClick r:id="rId2"/>
+                  </a:rPr>
+                  <a:t> </a:t>
+                </a:r>
+                <a:r>
+                  <a:rPr lang="en-US" dirty="0" err="1">
+                    <a:sym typeface="Wingdings" panose="05000000000000000000" pitchFamily="2" charset="2"/>
+                    <a:hlinkClick r:id="rId2"/>
+                  </a:rPr>
+                  <a:t>egyszerű</a:t>
+                </a:r>
+                <a:r>
+                  <a:rPr lang="en-US" dirty="0">
                     <a:sym typeface="Wingdings" panose="05000000000000000000" pitchFamily="2" charset="2"/>
                   </a:rPr>
-                  <a:t>Cook-Torrance</a:t>
-                </a:r>
+                  <a:t>. De </a:t>
+                </a:r>
+                <a:r>
+                  <a:rPr lang="en-US" dirty="0" err="1">
+                    <a:sym typeface="Wingdings" panose="05000000000000000000" pitchFamily="2" charset="2"/>
+                  </a:rPr>
+                  <a:t>beadandónak</a:t>
+                </a:r>
+                <a:r>
+                  <a:rPr lang="en-US" dirty="0">
+                    <a:sym typeface="Wingdings" panose="05000000000000000000" pitchFamily="2" charset="2"/>
+                  </a:rPr>
+                  <a:t> </a:t>
+                </a:r>
+                <a:r>
+                  <a:rPr lang="en-US" dirty="0" err="1">
+                    <a:sym typeface="Wingdings" panose="05000000000000000000" pitchFamily="2" charset="2"/>
+                  </a:rPr>
+                  <a:t>jó</a:t>
+                </a:r>
+                <a:r>
+                  <a:rPr lang="en-US" dirty="0">
+                    <a:sym typeface="Wingdings" panose="05000000000000000000" pitchFamily="2" charset="2"/>
+                  </a:rPr>
+                  <a:t> </a:t>
+                </a:r>
+                <a:r>
+                  <a:rPr lang="en-US" dirty="0" err="1">
+                    <a:sym typeface="Wingdings" panose="05000000000000000000" pitchFamily="2" charset="2"/>
+                  </a:rPr>
+                  <a:t>feladat</a:t>
+                </a:r>
+                <a:r>
+                  <a:rPr lang="en-US" dirty="0">
+                    <a:sym typeface="Wingdings" panose="05000000000000000000" pitchFamily="2" charset="2"/>
+                  </a:rPr>
+                  <a:t> </a:t>
+                </a:r>
+                <a:endParaRPr lang="en-US" i="1" dirty="0">
+                  <a:sym typeface="Wingdings" panose="05000000000000000000" pitchFamily="2" charset="2"/>
+                </a:endParaRPr>
               </a:p>
               <a:p>
                 <a:pPr>
@@ -6465,15 +7401,7 @@
                 </a:r>
                 <a:r>
                   <a:rPr lang="en-US" dirty="0"/>
-                  <a:t> a </a:t>
-                </a:r>
-                <a:r>
-                  <a:rPr lang="en-US" dirty="0" err="1"/>
-                  <a:t>beadandójában</a:t>
-                </a:r>
-                <a:r>
-                  <a:rPr lang="en-US" dirty="0"/>
-                  <a:t> (</a:t>
+                  <a:t> </a:t>
                 </a:r>
                 <a:r>
                   <a:rPr lang="en-US" dirty="0" err="1"/>
@@ -6517,27 +7445,35 @@
                 </a:r>
                 <a:r>
                   <a:rPr lang="en-US" dirty="0"/>
+                  <a:t> (</a:t>
+                </a:r>
+                <a:r>
+                  <a:rPr lang="en-US" i="1" dirty="0"/>
+                  <a:t>roughness = 0</a:t>
+                </a:r>
+                <a:r>
+                  <a:rPr lang="en-US" dirty="0"/>
+                  <a:t> </a:t>
+                </a:r>
+                <a:r>
+                  <a:rPr lang="en-US" dirty="0" err="1"/>
+                  <a:t>mellett</a:t>
+                </a:r>
+                <a:r>
+                  <a:rPr lang="en-US" dirty="0"/>
                   <a:t>), </a:t>
                 </a:r>
                 <a:r>
                   <a:rPr lang="en-US" dirty="0" err="1"/>
-                  <a:t>akkor</a:t>
-                </a:r>
-                <a:r>
-                  <a:rPr lang="en-US" dirty="0"/>
-                  <a:t> </a:t>
-                </a:r>
-                <a:r>
-                  <a:rPr lang="en-US" dirty="0" err="1"/>
-                  <a:t>megszavazom</a:t>
-                </a:r>
-                <a:r>
-                  <a:rPr lang="en-US" dirty="0"/>
-                  <a:t> a </a:t>
-                </a:r>
-                <a:r>
-                  <a:rPr lang="en-US" dirty="0" err="1"/>
-                  <a:t>pluszpontot</a:t>
+                  <a:t>az</a:t>
+                </a:r>
+                <a:r>
+                  <a:rPr lang="en-US" dirty="0"/>
+                  <a:t> </a:t>
+                </a:r>
+                <a:r>
+                  <a:rPr lang="en-US" dirty="0" err="1"/>
+                  <a:t>pluszpont</a:t>
                 </a:r>
                 <a:br>
                   <a:rPr lang="en-US" dirty="0"/>
@@ -6566,9 +7502,9 @@
             </p:nvSpPr>
             <p:spPr>
               <a:blipFill>
-                <a:blip r:embed="rId2"/>
+                <a:blip r:embed="rId3"/>
                 <a:stretch>
-                  <a:fillRect l="-1333" t="-1970"/>
+                  <a:fillRect l="-1455" t="-2273"/>
                 </a:stretch>
               </a:blipFill>
             </p:spPr>
@@ -6600,7 +7536,7 @@
 </p:sld>
 </file>
 
-<file path=ppt/slides/slide12.xml><?xml version="1.0" encoding="utf-8"?>
+<file path=ppt/slides/slide13.xml><?xml version="1.0" encoding="utf-8"?>
 <p:sld xmlns:a="http://schemas.openxmlformats.org/drawingml/2006/main" xmlns:r="http://schemas.openxmlformats.org/officeDocument/2006/relationships" xmlns:p="http://schemas.openxmlformats.org/presentationml/2006/main">
   <p:cSld>
     <p:spTree>
@@ -6995,7 +7931,7 @@
             </a:r>
             <a:r>
               <a:rPr lang="en-US" i="1" dirty="0" err="1"/>
-              <a:t>nekem</a:t>
+              <a:t>eddig</a:t>
             </a:r>
             <a:r>
               <a:rPr lang="en-US" i="1" dirty="0"/>
@@ -7003,7 +7939,7 @@
             </a:r>
             <a:r>
               <a:rPr lang="en-US" i="1" dirty="0" err="1"/>
-              <a:t>sem</a:t>
+              <a:t>én</a:t>
             </a:r>
             <a:r>
               <a:rPr lang="en-US" i="1" dirty="0"/>
@@ -7011,7 +7947,7 @@
             </a:r>
             <a:r>
               <a:rPr lang="en-US" i="1" dirty="0" err="1"/>
-              <a:t>sikerült</a:t>
+              <a:t>sem</a:t>
             </a:r>
             <a:r>
               <a:rPr lang="en-US" i="1" dirty="0"/>
@@ -7019,19 +7955,11 @@
             </a:r>
             <a:r>
               <a:rPr lang="en-US" i="1" dirty="0" err="1"/>
-              <a:t>rendesen</a:t>
+              <a:t>csináltam</a:t>
             </a:r>
             <a:r>
               <a:rPr lang="en-US" i="1" dirty="0"/>
-              <a:t> </a:t>
-            </a:r>
-            <a:r>
-              <a:rPr lang="en-US" i="1" dirty="0" err="1"/>
-              <a:t>megcsinálni</a:t>
-            </a:r>
-            <a:r>
-              <a:rPr lang="en-US" i="1" dirty="0"/>
-              <a:t>)</a:t>
+              <a:t> meg)</a:t>
             </a:r>
             <a:endParaRPr lang="hu-HU" i="1" dirty="0"/>
           </a:p>
@@ -7050,7 +7978,7 @@
 </p:sld>
 </file>
 
-<file path=ppt/slides/slide13.xml><?xml version="1.0" encoding="utf-8"?>
+<file path=ppt/slides/slide14.xml><?xml version="1.0" encoding="utf-8"?>
 <p:sld xmlns:a="http://schemas.openxmlformats.org/drawingml/2006/main" xmlns:r="http://schemas.openxmlformats.org/officeDocument/2006/relationships" xmlns:p="http://schemas.openxmlformats.org/presentationml/2006/main">
   <p:cSld>
     <p:spTree>
@@ -7107,6 +8035,10 @@
             <a:r>
               <a:rPr lang="en-US" dirty="0" err="1"/>
               <a:t>példaprogimból</a:t>
+            </a:r>
+            <a:r>
+              <a:rPr lang="en-US" dirty="0"/>
+              <a:t> (blog)</a:t>
             </a:r>
             <a:endParaRPr lang="hu-HU" dirty="0"/>
           </a:p>
@@ -7166,7 +8098,7 @@
           <a:p>
             <a:r>
               <a:rPr lang="en-US" dirty="0"/>
-              <a:t>(de </a:t>
+              <a:t>De </a:t>
             </a:r>
             <a:r>
               <a:rPr lang="en-US" dirty="0" err="1"/>
@@ -7198,17 +8130,45 @@
             </a:r>
             <a:r>
               <a:rPr lang="en-US" dirty="0"/>
+              <a:t>, </a:t>
+            </a:r>
+            <a:r>
+              <a:rPr lang="en-US" dirty="0" err="1"/>
+              <a:t>mert</a:t>
+            </a:r>
+            <a:r>
+              <a:rPr lang="en-US" dirty="0"/>
               <a:t> </a:t>
+            </a:r>
+            <a:r>
+              <a:rPr lang="en-US" dirty="0" err="1"/>
+              <a:t>nincs</a:t>
+            </a:r>
+            <a:r>
+              <a:rPr lang="en-US" dirty="0"/>
+              <a:t> </a:t>
+            </a:r>
+            <a:r>
+              <a:rPr lang="en-US" dirty="0" err="1"/>
+              <a:t>teljesen</a:t>
+            </a:r>
+            <a:r>
+              <a:rPr lang="en-US" dirty="0"/>
+              <a:t> “</a:t>
+            </a:r>
+            <a:r>
+              <a:rPr lang="en-US" dirty="0" err="1"/>
+              <a:t>kész</a:t>
+            </a:r>
+            <a:r>
+              <a:rPr lang="en-US" dirty="0"/>
+              <a:t>” </a:t>
             </a:r>
             <a:r>
               <a:rPr lang="en-US" dirty="0">
                 <a:sym typeface="Wingdings" panose="05000000000000000000" pitchFamily="2" charset="2"/>
               </a:rPr>
               <a:t></a:t>
-            </a:r>
-            <a:r>
-              <a:rPr lang="en-US" dirty="0"/>
-              <a:t>)</a:t>
             </a:r>
             <a:endParaRPr lang="hu-HU" dirty="0"/>
           </a:p>
@@ -7400,7 +8360,6 @@
                       </m:r>
                       <m:nary>
                         <m:naryPr>
-                          <m:limLoc m:val="undOvr"/>
                           <m:ctrlPr>
                             <a:rPr lang="en-US" b="0" i="1" smtClean="0">
                               <a:latin typeface="Cambria Math" panose="02040503050406030204" pitchFamily="18" charset="0"/>
@@ -7421,440 +8380,6 @@
                         <m:sup>
                           <m:r>
                             <a:rPr lang="en-US" b="0" i="1" smtClean="0">
-                              <a:latin typeface="Cambria Math" panose="02040503050406030204" pitchFamily="18" charset="0"/>
-                            </a:rPr>
-                            <m:t> </m:t>
-                          </m:r>
-                        </m:sup>
-                        <m:e>
-                          <m:sSub>
-                            <m:sSubPr>
-                              <m:ctrlPr>
-                                <a:rPr lang="en-US" b="0" i="1" smtClean="0">
-                                  <a:latin typeface="Cambria Math" panose="02040503050406030204" pitchFamily="18" charset="0"/>
-                                </a:rPr>
-                              </m:ctrlPr>
-                            </m:sSubPr>
-                            <m:e>
-                              <m:r>
-                                <a:rPr lang="en-US" b="0" i="1" smtClean="0">
-                                  <a:latin typeface="Cambria Math" panose="02040503050406030204" pitchFamily="18" charset="0"/>
-                                </a:rPr>
-                                <m:t>𝐿</m:t>
-                              </m:r>
-                            </m:e>
-                            <m:sub>
-                              <m:r>
-                                <a:rPr lang="en-US" b="0" i="1" smtClean="0">
-                                  <a:latin typeface="Cambria Math" panose="02040503050406030204" pitchFamily="18" charset="0"/>
-                                </a:rPr>
-                                <m:t>𝑖</m:t>
-                              </m:r>
-                            </m:sub>
-                          </m:sSub>
-                          <m:d>
-                            <m:dPr>
-                              <m:ctrlPr>
-                                <a:rPr lang="en-US" b="0" i="1" smtClean="0">
-                                  <a:latin typeface="Cambria Math" panose="02040503050406030204" pitchFamily="18" charset="0"/>
-                                </a:rPr>
-                              </m:ctrlPr>
-                            </m:dPr>
-                            <m:e>
-                              <m:sSub>
-                                <m:sSubPr>
-                                  <m:ctrlPr>
-                                    <a:rPr lang="en-US" b="0" i="1" smtClean="0">
-                                      <a:latin typeface="Cambria Math" panose="02040503050406030204" pitchFamily="18" charset="0"/>
-                                    </a:rPr>
-                                  </m:ctrlPr>
-                                </m:sSubPr>
-                                <m:e>
-                                  <m:r>
-                                    <a:rPr lang="en-US" b="0" i="1" smtClean="0">
-                                      <a:latin typeface="Cambria Math" panose="02040503050406030204" pitchFamily="18" charset="0"/>
-                                    </a:rPr>
-                                    <m:t>𝜔</m:t>
-                                  </m:r>
-                                </m:e>
-                                <m:sub>
-                                  <m:r>
-                                    <a:rPr lang="en-US" b="0" i="1" smtClean="0">
-                                      <a:latin typeface="Cambria Math" panose="02040503050406030204" pitchFamily="18" charset="0"/>
-                                    </a:rPr>
-                                    <m:t>𝑖</m:t>
-                                  </m:r>
-                                </m:sub>
-                              </m:sSub>
-                            </m:e>
-                          </m:d>
-                          <m:r>
-                            <a:rPr lang="en-US" b="0" i="1" smtClean="0">
-                              <a:latin typeface="Cambria Math" panose="02040503050406030204" pitchFamily="18" charset="0"/>
-                            </a:rPr>
-                            <m:t> </m:t>
-                          </m:r>
-                          <m:sSub>
-                            <m:sSubPr>
-                              <m:ctrlPr>
-                                <a:rPr lang="en-US" b="0" i="1" smtClean="0">
-                                  <a:latin typeface="Cambria Math" panose="02040503050406030204" pitchFamily="18" charset="0"/>
-                                </a:rPr>
-                              </m:ctrlPr>
-                            </m:sSubPr>
-                            <m:e>
-                              <m:r>
-                                <a:rPr lang="en-US" b="0" i="1" smtClean="0">
-                                  <a:latin typeface="Cambria Math" panose="02040503050406030204" pitchFamily="18" charset="0"/>
-                                </a:rPr>
-                                <m:t>𝑓</m:t>
-                              </m:r>
-                            </m:e>
-                            <m:sub>
-                              <m:r>
-                                <a:rPr lang="en-US" b="0" i="1" smtClean="0">
-                                  <a:latin typeface="Cambria Math" panose="02040503050406030204" pitchFamily="18" charset="0"/>
-                                </a:rPr>
-                                <m:t>𝑟</m:t>
-                              </m:r>
-                            </m:sub>
-                          </m:sSub>
-                          <m:d>
-                            <m:dPr>
-                              <m:ctrlPr>
-                                <a:rPr lang="en-US" b="0" i="1" smtClean="0">
-                                  <a:latin typeface="Cambria Math" panose="02040503050406030204" pitchFamily="18" charset="0"/>
-                                </a:rPr>
-                              </m:ctrlPr>
-                            </m:dPr>
-                            <m:e>
-                              <m:sSub>
-                                <m:sSubPr>
-                                  <m:ctrlPr>
-                                    <a:rPr lang="en-US" b="0" i="1" smtClean="0">
-                                      <a:latin typeface="Cambria Math" panose="02040503050406030204" pitchFamily="18" charset="0"/>
-                                    </a:rPr>
-                                  </m:ctrlPr>
-                                </m:sSubPr>
-                                <m:e>
-                                  <m:r>
-                                    <a:rPr lang="en-US" b="0" i="1" smtClean="0">
-                                      <a:latin typeface="Cambria Math" panose="02040503050406030204" pitchFamily="18" charset="0"/>
-                                    </a:rPr>
-                                    <m:t>𝜔</m:t>
-                                  </m:r>
-                                </m:e>
-                                <m:sub>
-                                  <m:r>
-                                    <a:rPr lang="en-US" b="0" i="1" smtClean="0">
-                                      <a:latin typeface="Cambria Math" panose="02040503050406030204" pitchFamily="18" charset="0"/>
-                                    </a:rPr>
-                                    <m:t>𝑜</m:t>
-                                  </m:r>
-                                </m:sub>
-                              </m:sSub>
-                              <m:r>
-                                <a:rPr lang="en-US" b="0" i="1" smtClean="0">
-                                  <a:latin typeface="Cambria Math" panose="02040503050406030204" pitchFamily="18" charset="0"/>
-                                </a:rPr>
-                                <m:t>,</m:t>
-                              </m:r>
-                              <m:sSub>
-                                <m:sSubPr>
-                                  <m:ctrlPr>
-                                    <a:rPr lang="en-US" b="0" i="1" smtClean="0">
-                                      <a:latin typeface="Cambria Math" panose="02040503050406030204" pitchFamily="18" charset="0"/>
-                                    </a:rPr>
-                                  </m:ctrlPr>
-                                </m:sSubPr>
-                                <m:e>
-                                  <m:r>
-                                    <a:rPr lang="en-US" b="0" i="1" smtClean="0">
-                                      <a:latin typeface="Cambria Math" panose="02040503050406030204" pitchFamily="18" charset="0"/>
-                                    </a:rPr>
-                                    <m:t>𝜔</m:t>
-                                  </m:r>
-                                </m:e>
-                                <m:sub>
-                                  <m:r>
-                                    <a:rPr lang="en-US" b="0" i="1" smtClean="0">
-                                      <a:latin typeface="Cambria Math" panose="02040503050406030204" pitchFamily="18" charset="0"/>
-                                    </a:rPr>
-                                    <m:t>𝑖</m:t>
-                                  </m:r>
-                                </m:sub>
-                              </m:sSub>
-                            </m:e>
-                          </m:d>
-                          <m:func>
-                            <m:funcPr>
-                              <m:ctrlPr>
-                                <a:rPr lang="en-US" b="0" i="1" smtClean="0">
-                                  <a:latin typeface="Cambria Math" panose="02040503050406030204" pitchFamily="18" charset="0"/>
-                                </a:rPr>
-                              </m:ctrlPr>
-                            </m:funcPr>
-                            <m:fName>
-                              <m:r>
-                                <m:rPr>
-                                  <m:sty m:val="p"/>
-                                </m:rPr>
-                                <a:rPr lang="en-US" b="0" i="0" smtClean="0">
-                                  <a:latin typeface="Cambria Math" panose="02040503050406030204" pitchFamily="18" charset="0"/>
-                                </a:rPr>
-                                <m:t>cos</m:t>
-                              </m:r>
-                            </m:fName>
-                            <m:e>
-                              <m:r>
-                                <a:rPr lang="en-US" b="0" i="1" smtClean="0">
-                                  <a:latin typeface="Cambria Math" panose="02040503050406030204" pitchFamily="18" charset="0"/>
-                                </a:rPr>
-                                <m:t>𝜃</m:t>
-                              </m:r>
-                              <m:r>
-                                <a:rPr lang="en-US" b="0" i="1" smtClean="0">
-                                  <a:latin typeface="Cambria Math" panose="02040503050406030204" pitchFamily="18" charset="0"/>
-                                </a:rPr>
-                                <m:t> </m:t>
-                              </m:r>
-                              <m:r>
-                                <a:rPr lang="en-US" b="0" i="1" smtClean="0">
-                                  <a:latin typeface="Cambria Math" panose="02040503050406030204" pitchFamily="18" charset="0"/>
-                                </a:rPr>
-                                <m:t>𝑑</m:t>
-                              </m:r>
-                              <m:sSub>
-                                <m:sSubPr>
-                                  <m:ctrlPr>
-                                    <a:rPr lang="en-US" b="0" i="1" smtClean="0">
-                                      <a:latin typeface="Cambria Math" panose="02040503050406030204" pitchFamily="18" charset="0"/>
-                                    </a:rPr>
-                                  </m:ctrlPr>
-                                </m:sSubPr>
-                                <m:e>
-                                  <m:r>
-                                    <a:rPr lang="en-US" b="0" i="1" smtClean="0">
-                                      <a:latin typeface="Cambria Math" panose="02040503050406030204" pitchFamily="18" charset="0"/>
-                                    </a:rPr>
-                                    <m:t>𝜔</m:t>
-                                  </m:r>
-                                </m:e>
-                                <m:sub>
-                                  <m:r>
-                                    <a:rPr lang="en-US" b="0" i="1" smtClean="0">
-                                      <a:latin typeface="Cambria Math" panose="02040503050406030204" pitchFamily="18" charset="0"/>
-                                    </a:rPr>
-                                    <m:t>𝑖</m:t>
-                                  </m:r>
-                                </m:sub>
-                              </m:sSub>
-                            </m:e>
-                          </m:func>
-                        </m:e>
-                      </m:nary>
-                    </m:oMath>
-                  </m:oMathPara>
-                </a14:m>
-                <a:endParaRPr lang="en-US" dirty="0"/>
-              </a:p>
-              <a:p>
-                <a:pPr>
-                  <a:buFont typeface="Wingdings" panose="05000000000000000000" pitchFamily="2" charset="2"/>
-                  <a:buChar char="§"/>
-                </a:pPr>
-                <a:r>
-                  <a:rPr lang="en-US" dirty="0" err="1"/>
-                  <a:t>Megjelenítési</a:t>
-                </a:r>
-                <a:r>
-                  <a:rPr lang="en-US" dirty="0"/>
-                  <a:t> </a:t>
-                </a:r>
-                <a:r>
-                  <a:rPr lang="en-US" dirty="0" err="1"/>
-                  <a:t>egyenlet</a:t>
-                </a:r>
-                <a:r>
-                  <a:rPr lang="en-US" dirty="0"/>
-                  <a:t> (</a:t>
-                </a:r>
-                <a:r>
-                  <a:rPr lang="en-US" i="1" dirty="0"/>
-                  <a:t>rendering equation</a:t>
-                </a:r>
-                <a:r>
-                  <a:rPr lang="en-US" dirty="0"/>
-                  <a:t>):</a:t>
-                </a:r>
-              </a:p>
-              <a:p>
-                <a:pPr marL="0" indent="0" algn="ctr">
-                  <a:buNone/>
-                </a:pPr>
-                <a14:m>
-                  <m:oMathPara xmlns:m="http://schemas.openxmlformats.org/officeDocument/2006/math">
-                    <m:oMathParaPr>
-                      <m:jc m:val="centerGroup"/>
-                    </m:oMathParaPr>
-                    <m:oMath xmlns:m="http://schemas.openxmlformats.org/officeDocument/2006/math">
-                      <m:sSub>
-                        <m:sSubPr>
-                          <m:ctrlPr>
-                            <a:rPr lang="en-US" i="1">
-                              <a:latin typeface="Cambria Math" panose="02040503050406030204" pitchFamily="18" charset="0"/>
-                            </a:rPr>
-                          </m:ctrlPr>
-                        </m:sSubPr>
-                        <m:e>
-                          <m:r>
-                            <a:rPr lang="en-US" i="1">
-                              <a:latin typeface="Cambria Math" panose="02040503050406030204" pitchFamily="18" charset="0"/>
-                            </a:rPr>
-                            <m:t>𝐿</m:t>
-                          </m:r>
-                        </m:e>
-                        <m:sub>
-                          <m:r>
-                            <a:rPr lang="en-US" i="1">
-                              <a:latin typeface="Cambria Math" panose="02040503050406030204" pitchFamily="18" charset="0"/>
-                            </a:rPr>
-                            <m:t>𝑜</m:t>
-                          </m:r>
-                        </m:sub>
-                      </m:sSub>
-                      <m:d>
-                        <m:dPr>
-                          <m:ctrlPr>
-                            <a:rPr lang="en-US" i="1">
-                              <a:latin typeface="Cambria Math" panose="02040503050406030204" pitchFamily="18" charset="0"/>
-                            </a:rPr>
-                          </m:ctrlPr>
-                        </m:dPr>
-                        <m:e>
-                          <m:sSub>
-                            <m:sSubPr>
-                              <m:ctrlPr>
-                                <a:rPr lang="en-US" i="1">
-                                  <a:latin typeface="Cambria Math" panose="02040503050406030204" pitchFamily="18" charset="0"/>
-                                </a:rPr>
-                              </m:ctrlPr>
-                            </m:sSubPr>
-                            <m:e>
-                              <m:r>
-                                <a:rPr lang="en-US" i="1">
-                                  <a:latin typeface="Cambria Math" panose="02040503050406030204" pitchFamily="18" charset="0"/>
-                                </a:rPr>
-                                <m:t>𝜔</m:t>
-                              </m:r>
-                            </m:e>
-                            <m:sub>
-                              <m:r>
-                                <a:rPr lang="en-US" i="1">
-                                  <a:latin typeface="Cambria Math" panose="02040503050406030204" pitchFamily="18" charset="0"/>
-                                </a:rPr>
-                                <m:t>𝑜</m:t>
-                              </m:r>
-                            </m:sub>
-                          </m:sSub>
-                        </m:e>
-                      </m:d>
-                      <m:r>
-                        <a:rPr lang="en-US" i="1">
-                          <a:latin typeface="Cambria Math" panose="02040503050406030204" pitchFamily="18" charset="0"/>
-                        </a:rPr>
-                        <m:t>=</m:t>
-                      </m:r>
-                      <m:sSub>
-                        <m:sSubPr>
-                          <m:ctrlPr>
-                            <a:rPr lang="en-US" b="0" i="1" smtClean="0">
-                              <a:latin typeface="Cambria Math" panose="02040503050406030204" pitchFamily="18" charset="0"/>
-                            </a:rPr>
-                          </m:ctrlPr>
-                        </m:sSubPr>
-                        <m:e>
-                          <m:r>
-                            <a:rPr lang="en-US" b="0" i="1" smtClean="0">
-                              <a:latin typeface="Cambria Math" panose="02040503050406030204" pitchFamily="18" charset="0"/>
-                            </a:rPr>
-                            <m:t>𝐿</m:t>
-                          </m:r>
-                        </m:e>
-                        <m:sub>
-                          <m:r>
-                            <a:rPr lang="en-US" b="0" i="1" smtClean="0">
-                              <a:latin typeface="Cambria Math" panose="02040503050406030204" pitchFamily="18" charset="0"/>
-                            </a:rPr>
-                            <m:t>𝑒</m:t>
-                          </m:r>
-                        </m:sub>
-                      </m:sSub>
-                      <m:d>
-                        <m:dPr>
-                          <m:ctrlPr>
-                            <a:rPr lang="en-US" b="0" i="1" smtClean="0">
-                              <a:latin typeface="Cambria Math" panose="02040503050406030204" pitchFamily="18" charset="0"/>
-                            </a:rPr>
-                          </m:ctrlPr>
-                        </m:dPr>
-                        <m:e>
-                          <m:sSub>
-                            <m:sSubPr>
-                              <m:ctrlPr>
-                                <a:rPr lang="en-US" b="0" i="1" smtClean="0">
-                                  <a:latin typeface="Cambria Math" panose="02040503050406030204" pitchFamily="18" charset="0"/>
-                                </a:rPr>
-                              </m:ctrlPr>
-                            </m:sSubPr>
-                            <m:e>
-                              <m:r>
-                                <a:rPr lang="en-US" b="0" i="1" smtClean="0">
-                                  <a:latin typeface="Cambria Math" panose="02040503050406030204" pitchFamily="18" charset="0"/>
-                                </a:rPr>
-                                <m:t>𝜔</m:t>
-                              </m:r>
-                            </m:e>
-                            <m:sub>
-                              <m:r>
-                                <a:rPr lang="en-US" b="0" i="1" smtClean="0">
-                                  <a:latin typeface="Cambria Math" panose="02040503050406030204" pitchFamily="18" charset="0"/>
-                                </a:rPr>
-                                <m:t>𝑜</m:t>
-                              </m:r>
-                            </m:sub>
-                          </m:sSub>
-                        </m:e>
-                      </m:d>
-                      <m:r>
-                        <a:rPr lang="en-US" b="0" i="1" smtClean="0">
-                          <a:latin typeface="Cambria Math" panose="02040503050406030204" pitchFamily="18" charset="0"/>
-                        </a:rPr>
-                        <m:t>+</m:t>
-                      </m:r>
-                      <m:nary>
-                        <m:naryPr>
-                          <m:limLoc m:val="undOvr"/>
-                          <m:ctrlPr>
-                            <a:rPr lang="en-US" i="1">
-                              <a:latin typeface="Cambria Math" panose="02040503050406030204" pitchFamily="18" charset="0"/>
-                            </a:rPr>
-                          </m:ctrlPr>
-                        </m:naryPr>
-                        <m:sub>
-                          <m:r>
-                            <m:rPr>
-                              <m:sty m:val="p"/>
-                            </m:rPr>
-                            <a:rPr lang="en-US">
-                              <a:latin typeface="Cambria Math" panose="02040503050406030204" pitchFamily="18" charset="0"/>
-                            </a:rPr>
-                            <m:t>Ω</m:t>
-                          </m:r>
-                        </m:sub>
-                        <m:sup>
-                          <m:r>
-                            <a:rPr lang="en-US" i="1">
                               <a:latin typeface="Cambria Math" panose="02040503050406030204" pitchFamily="18" charset="0"/>
                             </a:rPr>
                             <m:t> </m:t>
@@ -8099,6 +8624,439 @@
                 </a:pPr>
                 <a:r>
                   <a:rPr lang="en-US" dirty="0" err="1"/>
+                  <a:t>Megjelenítési</a:t>
+                </a:r>
+                <a:r>
+                  <a:rPr lang="en-US" dirty="0"/>
+                  <a:t> </a:t>
+                </a:r>
+                <a:r>
+                  <a:rPr lang="en-US" dirty="0" err="1"/>
+                  <a:t>egyenlet</a:t>
+                </a:r>
+                <a:r>
+                  <a:rPr lang="en-US" dirty="0"/>
+                  <a:t> (</a:t>
+                </a:r>
+                <a:r>
+                  <a:rPr lang="en-US" i="1" dirty="0"/>
+                  <a:t>rendering equation</a:t>
+                </a:r>
+                <a:r>
+                  <a:rPr lang="en-US" dirty="0"/>
+                  <a:t>):</a:t>
+                </a:r>
+              </a:p>
+              <a:p>
+                <a:pPr marL="0" indent="0" algn="ctr">
+                  <a:buNone/>
+                </a:pPr>
+                <a14:m>
+                  <m:oMathPara xmlns:m="http://schemas.openxmlformats.org/officeDocument/2006/math">
+                    <m:oMathParaPr>
+                      <m:jc m:val="centerGroup"/>
+                    </m:oMathParaPr>
+                    <m:oMath xmlns:m="http://schemas.openxmlformats.org/officeDocument/2006/math">
+                      <m:sSub>
+                        <m:sSubPr>
+                          <m:ctrlPr>
+                            <a:rPr lang="en-US" i="1">
+                              <a:latin typeface="Cambria Math" panose="02040503050406030204" pitchFamily="18" charset="0"/>
+                            </a:rPr>
+                          </m:ctrlPr>
+                        </m:sSubPr>
+                        <m:e>
+                          <m:r>
+                            <a:rPr lang="en-US" i="1">
+                              <a:latin typeface="Cambria Math" panose="02040503050406030204" pitchFamily="18" charset="0"/>
+                            </a:rPr>
+                            <m:t>𝐿</m:t>
+                          </m:r>
+                        </m:e>
+                        <m:sub>
+                          <m:r>
+                            <a:rPr lang="en-US" i="1">
+                              <a:latin typeface="Cambria Math" panose="02040503050406030204" pitchFamily="18" charset="0"/>
+                            </a:rPr>
+                            <m:t>𝑜</m:t>
+                          </m:r>
+                        </m:sub>
+                      </m:sSub>
+                      <m:d>
+                        <m:dPr>
+                          <m:ctrlPr>
+                            <a:rPr lang="en-US" i="1">
+                              <a:latin typeface="Cambria Math" panose="02040503050406030204" pitchFamily="18" charset="0"/>
+                            </a:rPr>
+                          </m:ctrlPr>
+                        </m:dPr>
+                        <m:e>
+                          <m:sSub>
+                            <m:sSubPr>
+                              <m:ctrlPr>
+                                <a:rPr lang="en-US" i="1">
+                                  <a:latin typeface="Cambria Math" panose="02040503050406030204" pitchFamily="18" charset="0"/>
+                                </a:rPr>
+                              </m:ctrlPr>
+                            </m:sSubPr>
+                            <m:e>
+                              <m:r>
+                                <a:rPr lang="en-US" i="1">
+                                  <a:latin typeface="Cambria Math" panose="02040503050406030204" pitchFamily="18" charset="0"/>
+                                </a:rPr>
+                                <m:t>𝜔</m:t>
+                              </m:r>
+                            </m:e>
+                            <m:sub>
+                              <m:r>
+                                <a:rPr lang="en-US" i="1">
+                                  <a:latin typeface="Cambria Math" panose="02040503050406030204" pitchFamily="18" charset="0"/>
+                                </a:rPr>
+                                <m:t>𝑜</m:t>
+                              </m:r>
+                            </m:sub>
+                          </m:sSub>
+                        </m:e>
+                      </m:d>
+                      <m:r>
+                        <a:rPr lang="en-US" i="1">
+                          <a:latin typeface="Cambria Math" panose="02040503050406030204" pitchFamily="18" charset="0"/>
+                        </a:rPr>
+                        <m:t>=</m:t>
+                      </m:r>
+                      <m:sSub>
+                        <m:sSubPr>
+                          <m:ctrlPr>
+                            <a:rPr lang="en-US" b="0" i="1" smtClean="0">
+                              <a:latin typeface="Cambria Math" panose="02040503050406030204" pitchFamily="18" charset="0"/>
+                            </a:rPr>
+                          </m:ctrlPr>
+                        </m:sSubPr>
+                        <m:e>
+                          <m:r>
+                            <a:rPr lang="en-US" b="0" i="1" smtClean="0">
+                              <a:latin typeface="Cambria Math" panose="02040503050406030204" pitchFamily="18" charset="0"/>
+                            </a:rPr>
+                            <m:t>𝐿</m:t>
+                          </m:r>
+                        </m:e>
+                        <m:sub>
+                          <m:r>
+                            <a:rPr lang="en-US" b="0" i="1" smtClean="0">
+                              <a:latin typeface="Cambria Math" panose="02040503050406030204" pitchFamily="18" charset="0"/>
+                            </a:rPr>
+                            <m:t>𝑒</m:t>
+                          </m:r>
+                        </m:sub>
+                      </m:sSub>
+                      <m:d>
+                        <m:dPr>
+                          <m:ctrlPr>
+                            <a:rPr lang="en-US" b="0" i="1" smtClean="0">
+                              <a:latin typeface="Cambria Math" panose="02040503050406030204" pitchFamily="18" charset="0"/>
+                            </a:rPr>
+                          </m:ctrlPr>
+                        </m:dPr>
+                        <m:e>
+                          <m:sSub>
+                            <m:sSubPr>
+                              <m:ctrlPr>
+                                <a:rPr lang="en-US" b="0" i="1" smtClean="0">
+                                  <a:latin typeface="Cambria Math" panose="02040503050406030204" pitchFamily="18" charset="0"/>
+                                </a:rPr>
+                              </m:ctrlPr>
+                            </m:sSubPr>
+                            <m:e>
+                              <m:r>
+                                <a:rPr lang="en-US" b="0" i="1" smtClean="0">
+                                  <a:latin typeface="Cambria Math" panose="02040503050406030204" pitchFamily="18" charset="0"/>
+                                </a:rPr>
+                                <m:t>𝜔</m:t>
+                              </m:r>
+                            </m:e>
+                            <m:sub>
+                              <m:r>
+                                <a:rPr lang="en-US" b="0" i="1" smtClean="0">
+                                  <a:latin typeface="Cambria Math" panose="02040503050406030204" pitchFamily="18" charset="0"/>
+                                </a:rPr>
+                                <m:t>𝑜</m:t>
+                              </m:r>
+                            </m:sub>
+                          </m:sSub>
+                        </m:e>
+                      </m:d>
+                      <m:r>
+                        <a:rPr lang="en-US" b="0" i="1" smtClean="0">
+                          <a:latin typeface="Cambria Math" panose="02040503050406030204" pitchFamily="18" charset="0"/>
+                        </a:rPr>
+                        <m:t>+</m:t>
+                      </m:r>
+                      <m:nary>
+                        <m:naryPr>
+                          <m:ctrlPr>
+                            <a:rPr lang="en-US" b="0" i="1" smtClean="0">
+                              <a:latin typeface="Cambria Math" panose="02040503050406030204" pitchFamily="18" charset="0"/>
+                            </a:rPr>
+                          </m:ctrlPr>
+                        </m:naryPr>
+                        <m:sub>
+                          <m:r>
+                            <m:rPr>
+                              <m:sty m:val="p"/>
+                            </m:rPr>
+                            <a:rPr lang="en-US" b="0" i="0" smtClean="0">
+                              <a:latin typeface="Cambria Math" panose="02040503050406030204" pitchFamily="18" charset="0"/>
+                            </a:rPr>
+                            <m:t>Ω</m:t>
+                          </m:r>
+                        </m:sub>
+                        <m:sup>
+                          <m:r>
+                            <a:rPr lang="en-US" b="0" i="1" smtClean="0">
+                              <a:latin typeface="Cambria Math" panose="02040503050406030204" pitchFamily="18" charset="0"/>
+                            </a:rPr>
+                            <m:t> </m:t>
+                          </m:r>
+                        </m:sup>
+                        <m:e>
+                          <m:sSub>
+                            <m:sSubPr>
+                              <m:ctrlPr>
+                                <a:rPr lang="en-US" i="1">
+                                  <a:latin typeface="Cambria Math" panose="02040503050406030204" pitchFamily="18" charset="0"/>
+                                </a:rPr>
+                              </m:ctrlPr>
+                            </m:sSubPr>
+                            <m:e>
+                              <m:r>
+                                <a:rPr lang="en-US" i="1">
+                                  <a:latin typeface="Cambria Math" panose="02040503050406030204" pitchFamily="18" charset="0"/>
+                                </a:rPr>
+                                <m:t>𝐿</m:t>
+                              </m:r>
+                            </m:e>
+                            <m:sub>
+                              <m:r>
+                                <a:rPr lang="en-US" i="1">
+                                  <a:latin typeface="Cambria Math" panose="02040503050406030204" pitchFamily="18" charset="0"/>
+                                </a:rPr>
+                                <m:t>𝑖</m:t>
+                              </m:r>
+                            </m:sub>
+                          </m:sSub>
+                          <m:d>
+                            <m:dPr>
+                              <m:ctrlPr>
+                                <a:rPr lang="en-US" i="1">
+                                  <a:latin typeface="Cambria Math" panose="02040503050406030204" pitchFamily="18" charset="0"/>
+                                </a:rPr>
+                              </m:ctrlPr>
+                            </m:dPr>
+                            <m:e>
+                              <m:sSub>
+                                <m:sSubPr>
+                                  <m:ctrlPr>
+                                    <a:rPr lang="en-US" i="1">
+                                      <a:latin typeface="Cambria Math" panose="02040503050406030204" pitchFamily="18" charset="0"/>
+                                    </a:rPr>
+                                  </m:ctrlPr>
+                                </m:sSubPr>
+                                <m:e>
+                                  <m:r>
+                                    <a:rPr lang="en-US" i="1">
+                                      <a:latin typeface="Cambria Math" panose="02040503050406030204" pitchFamily="18" charset="0"/>
+                                    </a:rPr>
+                                    <m:t>𝜔</m:t>
+                                  </m:r>
+                                </m:e>
+                                <m:sub>
+                                  <m:r>
+                                    <a:rPr lang="en-US" i="1">
+                                      <a:latin typeface="Cambria Math" panose="02040503050406030204" pitchFamily="18" charset="0"/>
+                                    </a:rPr>
+                                    <m:t>𝑖</m:t>
+                                  </m:r>
+                                </m:sub>
+                              </m:sSub>
+                            </m:e>
+                          </m:d>
+                          <m:r>
+                            <a:rPr lang="en-US" i="1">
+                              <a:latin typeface="Cambria Math" panose="02040503050406030204" pitchFamily="18" charset="0"/>
+                            </a:rPr>
+                            <m:t> </m:t>
+                          </m:r>
+                          <m:sSub>
+                            <m:sSubPr>
+                              <m:ctrlPr>
+                                <a:rPr lang="en-US" i="1">
+                                  <a:latin typeface="Cambria Math" panose="02040503050406030204" pitchFamily="18" charset="0"/>
+                                </a:rPr>
+                              </m:ctrlPr>
+                            </m:sSubPr>
+                            <m:e>
+                              <m:r>
+                                <a:rPr lang="en-US" i="1">
+                                  <a:latin typeface="Cambria Math" panose="02040503050406030204" pitchFamily="18" charset="0"/>
+                                </a:rPr>
+                                <m:t>𝑓</m:t>
+                              </m:r>
+                            </m:e>
+                            <m:sub>
+                              <m:r>
+                                <a:rPr lang="en-US" i="1">
+                                  <a:latin typeface="Cambria Math" panose="02040503050406030204" pitchFamily="18" charset="0"/>
+                                </a:rPr>
+                                <m:t>𝑟</m:t>
+                              </m:r>
+                            </m:sub>
+                          </m:sSub>
+                          <m:d>
+                            <m:dPr>
+                              <m:ctrlPr>
+                                <a:rPr lang="en-US" i="1">
+                                  <a:latin typeface="Cambria Math" panose="02040503050406030204" pitchFamily="18" charset="0"/>
+                                </a:rPr>
+                              </m:ctrlPr>
+                            </m:dPr>
+                            <m:e>
+                              <m:sSub>
+                                <m:sSubPr>
+                                  <m:ctrlPr>
+                                    <a:rPr lang="en-US" i="1">
+                                      <a:latin typeface="Cambria Math" panose="02040503050406030204" pitchFamily="18" charset="0"/>
+                                    </a:rPr>
+                                  </m:ctrlPr>
+                                </m:sSubPr>
+                                <m:e>
+                                  <m:r>
+                                    <a:rPr lang="en-US" i="1">
+                                      <a:latin typeface="Cambria Math" panose="02040503050406030204" pitchFamily="18" charset="0"/>
+                                    </a:rPr>
+                                    <m:t>𝜔</m:t>
+                                  </m:r>
+                                </m:e>
+                                <m:sub>
+                                  <m:r>
+                                    <a:rPr lang="en-US" i="1">
+                                      <a:latin typeface="Cambria Math" panose="02040503050406030204" pitchFamily="18" charset="0"/>
+                                    </a:rPr>
+                                    <m:t>𝑜</m:t>
+                                  </m:r>
+                                </m:sub>
+                              </m:sSub>
+                              <m:r>
+                                <a:rPr lang="en-US" i="1">
+                                  <a:latin typeface="Cambria Math" panose="02040503050406030204" pitchFamily="18" charset="0"/>
+                                </a:rPr>
+                                <m:t>,</m:t>
+                              </m:r>
+                              <m:sSub>
+                                <m:sSubPr>
+                                  <m:ctrlPr>
+                                    <a:rPr lang="en-US" i="1">
+                                      <a:latin typeface="Cambria Math" panose="02040503050406030204" pitchFamily="18" charset="0"/>
+                                    </a:rPr>
+                                  </m:ctrlPr>
+                                </m:sSubPr>
+                                <m:e>
+                                  <m:r>
+                                    <a:rPr lang="en-US" i="1">
+                                      <a:latin typeface="Cambria Math" panose="02040503050406030204" pitchFamily="18" charset="0"/>
+                                    </a:rPr>
+                                    <m:t>𝜔</m:t>
+                                  </m:r>
+                                </m:e>
+                                <m:sub>
+                                  <m:r>
+                                    <a:rPr lang="en-US" i="1">
+                                      <a:latin typeface="Cambria Math" panose="02040503050406030204" pitchFamily="18" charset="0"/>
+                                    </a:rPr>
+                                    <m:t>𝑖</m:t>
+                                  </m:r>
+                                </m:sub>
+                              </m:sSub>
+                            </m:e>
+                          </m:d>
+                          <m:func>
+                            <m:funcPr>
+                              <m:ctrlPr>
+                                <a:rPr lang="en-US" i="1">
+                                  <a:latin typeface="Cambria Math" panose="02040503050406030204" pitchFamily="18" charset="0"/>
+                                </a:rPr>
+                              </m:ctrlPr>
+                            </m:funcPr>
+                            <m:fName>
+                              <m:r>
+                                <m:rPr>
+                                  <m:sty m:val="p"/>
+                                </m:rPr>
+                                <a:rPr lang="en-US">
+                                  <a:latin typeface="Cambria Math" panose="02040503050406030204" pitchFamily="18" charset="0"/>
+                                </a:rPr>
+                                <m:t>cos</m:t>
+                              </m:r>
+                            </m:fName>
+                            <m:e>
+                              <m:r>
+                                <a:rPr lang="en-US" i="1">
+                                  <a:latin typeface="Cambria Math" panose="02040503050406030204" pitchFamily="18" charset="0"/>
+                                </a:rPr>
+                                <m:t>𝜃</m:t>
+                              </m:r>
+                              <m:r>
+                                <a:rPr lang="en-US" i="1">
+                                  <a:latin typeface="Cambria Math" panose="02040503050406030204" pitchFamily="18" charset="0"/>
+                                </a:rPr>
+                                <m:t> </m:t>
+                              </m:r>
+                              <m:r>
+                                <a:rPr lang="en-US" i="1">
+                                  <a:latin typeface="Cambria Math" panose="02040503050406030204" pitchFamily="18" charset="0"/>
+                                </a:rPr>
+                                <m:t>𝑑</m:t>
+                              </m:r>
+                              <m:sSub>
+                                <m:sSubPr>
+                                  <m:ctrlPr>
+                                    <a:rPr lang="en-US" i="1">
+                                      <a:latin typeface="Cambria Math" panose="02040503050406030204" pitchFamily="18" charset="0"/>
+                                    </a:rPr>
+                                  </m:ctrlPr>
+                                </m:sSubPr>
+                                <m:e>
+                                  <m:r>
+                                    <a:rPr lang="en-US" i="1">
+                                      <a:latin typeface="Cambria Math" panose="02040503050406030204" pitchFamily="18" charset="0"/>
+                                    </a:rPr>
+                                    <m:t>𝜔</m:t>
+                                  </m:r>
+                                </m:e>
+                                <m:sub>
+                                  <m:r>
+                                    <a:rPr lang="en-US" i="1">
+                                      <a:latin typeface="Cambria Math" panose="02040503050406030204" pitchFamily="18" charset="0"/>
+                                    </a:rPr>
+                                    <m:t>𝑖</m:t>
+                                  </m:r>
+                                </m:sub>
+                              </m:sSub>
+                            </m:e>
+                          </m:func>
+                        </m:e>
+                      </m:nary>
+                    </m:oMath>
+                  </m:oMathPara>
+                </a14:m>
+                <a:endParaRPr lang="en-US" dirty="0"/>
+              </a:p>
+              <a:p>
+                <a:pPr>
+                  <a:buFont typeface="Wingdings" panose="05000000000000000000" pitchFamily="2" charset="2"/>
+                  <a:buChar char="§"/>
+                </a:pPr>
+                <a:r>
+                  <a:rPr lang="en-US" dirty="0" err="1"/>
                   <a:t>Ahol</a:t>
                 </a:r>
                 <a:r>
@@ -8264,7 +9222,15 @@
                 </a:r>
                 <a:r>
                   <a:rPr lang="en-US" dirty="0"/>
-                  <a:t> a BTDF-el a </a:t>
+                  <a:t> a </a:t>
+                </a:r>
+                <a:r>
+                  <a:rPr lang="en-US" i="1" dirty="0"/>
+                  <a:t>BTDF</a:t>
+                </a:r>
+                <a:r>
+                  <a:rPr lang="en-US" dirty="0"/>
+                  <a:t>-el a “</a:t>
                 </a:r>
                 <a:r>
                   <a:rPr lang="en-US" dirty="0" err="1"/>
@@ -8272,7 +9238,7 @@
                 </a:r>
                 <a:r>
                   <a:rPr lang="en-US" dirty="0"/>
-                  <a:t> </a:t>
+                  <a:t>” </a:t>
                 </a:r>
                 <a:r>
                   <a:rPr lang="en-US" dirty="0" err="1"/>
@@ -8294,7 +9260,10 @@
                   <a:rPr lang="en-US" dirty="0" err="1"/>
                   <a:t>leírja</a:t>
                 </a:r>
-                <a:endParaRPr lang="en-US" dirty="0"/>
+                <a:r>
+                  <a:rPr lang="en-US" dirty="0"/>
+                  <a:t>*</a:t>
+                </a:r>
               </a:p>
               <a:p>
                 <a:pPr>
@@ -8323,7 +9292,15 @@
                 </a:r>
                 <a:r>
                   <a:rPr lang="en-US" dirty="0"/>
-                  <a:t> a BRDF is; </a:t>
+                  <a:t> a </a:t>
+                </a:r>
+                <a:r>
+                  <a:rPr lang="en-US" i="1" dirty="0"/>
+                  <a:t>BRDF</a:t>
+                </a:r>
+                <a:r>
+                  <a:rPr lang="en-US" dirty="0"/>
+                  <a:t> is; </a:t>
                 </a:r>
                 <a:r>
                   <a:rPr lang="en-US" dirty="0" err="1"/>
@@ -8389,7 +9366,7 @@
             </p:nvSpPr>
             <p:spPr>
               <a:blipFill>
-                <a:blip r:embed="rId2"/>
+                <a:blip r:embed="rId3"/>
                 <a:stretch>
                   <a:fillRect l="-1455" t="-1667"/>
                 </a:stretch>
@@ -8467,11 +9444,11 @@
             </a:r>
             <a:r>
               <a:rPr lang="en-US" dirty="0"/>
-              <a:t> Boromir </a:t>
+              <a:t> Boromir is </a:t>
             </a:r>
             <a:r>
               <a:rPr lang="en-US" dirty="0" err="1"/>
-              <a:t>mondta</a:t>
+              <a:t>említette</a:t>
             </a:r>
             <a:r>
               <a:rPr lang="en-US" dirty="0"/>
@@ -8591,8 +9568,8 @@
           </a:p>
         </p:txBody>
       </p:sp>
-      <mc:AlternateContent xmlns:mc="http://schemas.openxmlformats.org/markup-compatibility/2006" xmlns:a14="http://schemas.microsoft.com/office/drawing/2010/main">
-        <mc:Choice Requires="a14">
+      <mc:AlternateContent xmlns:mc="http://schemas.openxmlformats.org/markup-compatibility/2006">
+        <mc:Choice xmlns:a14="http://schemas.microsoft.com/office/drawing/2010/main" Requires="a14">
           <p:sp>
             <p:nvSpPr>
               <p:cNvPr id="3" name="Content Placeholder 2">
@@ -9093,13 +10070,13 @@
                   <a:rPr lang="en-US" dirty="0">
                     <a:sym typeface="Wingdings" panose="05000000000000000000" pitchFamily="2" charset="2"/>
                   </a:rPr>
-                  <a:t> (</a:t>
+                  <a:t> is (</a:t>
                 </a:r>
                 <a:r>
                   <a:rPr lang="en-US" i="1" dirty="0">
                     <a:sym typeface="Wingdings" panose="05000000000000000000" pitchFamily="2" charset="2"/>
                   </a:rPr>
-                  <a:t>-&gt; lightmap</a:t>
+                  <a:t>→ lightmap</a:t>
                 </a:r>
                 <a:r>
                   <a:rPr lang="en-US" dirty="0">
@@ -9797,7 +10774,7 @@
                 </a:r>
                 <a:r>
                   <a:rPr lang="en-US" i="1" dirty="0"/>
-                  <a:t>Teaching -&gt; Advanced Computer Graphics</a:t>
+                  <a:t>Teaching → Advanced Computer Graphics → Guest Access</a:t>
                 </a:r>
                 <a:r>
                   <a:rPr lang="en-US" dirty="0"/>
@@ -9807,7 +10784,7 @@
             </p:txBody>
           </p:sp>
         </mc:Choice>
-        <mc:Fallback xmlns="">
+        <mc:Fallback>
           <p:sp>
             <p:nvSpPr>
               <p:cNvPr id="3" name="Content Placeholder 2">
@@ -9996,7 +10973,7 @@
                 </a:r>
                 <a:r>
                   <a:rPr lang="en-US" dirty="0"/>
-                  <a:t>)</a:t>
+                  <a:t>)!</a:t>
                 </a:r>
               </a:p>
               <a:p>
@@ -10070,67 +11047,11 @@
                 </a:r>
                 <a:r>
                   <a:rPr lang="en-US" dirty="0"/>
-                  <a:t>)</a:t>
+                  <a:t>)!</a:t>
                 </a:r>
               </a:p>
               <a:p>
                 <a:pPr>
-                  <a:lnSpc>
-                    <a:spcPct val="100000"/>
-                  </a:lnSpc>
-                  <a:buFont typeface="Wingdings" panose="05000000000000000000" pitchFamily="2" charset="2"/>
-                  <a:buChar char="§"/>
-                </a:pPr>
-                <a:r>
-                  <a:rPr lang="en-US" dirty="0"/>
-                  <a:t>A </a:t>
-                </a:r>
-                <a:r>
-                  <a:rPr lang="en-US" dirty="0" err="1"/>
-                  <a:t>várható</a:t>
-                </a:r>
-                <a:r>
-                  <a:rPr lang="en-US" dirty="0"/>
-                  <a:t> </a:t>
-                </a:r>
-                <a:r>
-                  <a:rPr lang="en-US" dirty="0" err="1"/>
-                  <a:t>érték</a:t>
-                </a:r>
-                <a:r>
-                  <a:rPr lang="en-US" dirty="0"/>
-                  <a:t> </a:t>
-                </a:r>
-                <a:r>
-                  <a:rPr lang="en-US" dirty="0" err="1"/>
-                  <a:t>más</a:t>
-                </a:r>
-                <a:r>
-                  <a:rPr lang="en-US" dirty="0"/>
-                  <a:t> </a:t>
-                </a:r>
-                <a:r>
-                  <a:rPr lang="en-US" dirty="0" err="1"/>
-                  <a:t>néven</a:t>
-                </a:r>
-                <a:r>
-                  <a:rPr lang="en-US" dirty="0"/>
-                  <a:t> </a:t>
-                </a:r>
-                <a:r>
-                  <a:rPr lang="en-US" dirty="0" err="1"/>
-                  <a:t>átlag</a:t>
-                </a:r>
-                <a:r>
-                  <a:rPr lang="en-US" dirty="0"/>
-                  <a:t>…</a:t>
-                </a:r>
-              </a:p>
-              <a:p>
-                <a:pPr>
-                  <a:lnSpc>
-                    <a:spcPct val="100000"/>
-                  </a:lnSpc>
                   <a:buFont typeface="Wingdings" panose="05000000000000000000" pitchFamily="2" charset="2"/>
                   <a:buChar char="§"/>
                 </a:pPr>
@@ -10167,7 +11088,31 @@
                   <a:rPr lang="en-US" dirty="0">
                     <a:sym typeface="Wingdings" panose="05000000000000000000" pitchFamily="2" charset="2"/>
                   </a:rPr>
-                  <a:t>-hez integrál a </a:t>
+                  <a:t>-hez </a:t>
+                </a:r>
+                <a:r>
+                  <a:rPr lang="en-US" dirty="0" err="1">
+                    <a:sym typeface="Wingdings" panose="05000000000000000000" pitchFamily="2" charset="2"/>
+                  </a:rPr>
+                  <a:t>kell</a:t>
+                </a:r>
+                <a:r>
+                  <a:rPr lang="en-US" dirty="0">
+                    <a:sym typeface="Wingdings" panose="05000000000000000000" pitchFamily="2" charset="2"/>
+                  </a:rPr>
+                  <a:t> </a:t>
+                </a:r>
+                <a:r>
+                  <a:rPr lang="en-US" dirty="0" err="1">
+                    <a:sym typeface="Wingdings" panose="05000000000000000000" pitchFamily="2" charset="2"/>
+                  </a:rPr>
+                  <a:t>integráljon</a:t>
+                </a:r>
+                <a:r>
+                  <a:rPr lang="en-US" dirty="0">
+                    <a:sym typeface="Wingdings" panose="05000000000000000000" pitchFamily="2" charset="2"/>
+                  </a:rPr>
+                  <a:t> </a:t>
                 </a:r>
                 <a14:m>
                   <m:oMath xmlns:m="http://schemas.openxmlformats.org/officeDocument/2006/math">
@@ -10184,9 +11129,62 @@
                   <a:rPr lang="en-US" dirty="0">
                     <a:sym typeface="Wingdings" panose="05000000000000000000" pitchFamily="2" charset="2"/>
                   </a:rPr>
-                  <a:t> tartományon</a:t>
+                  <a:t>-n</a:t>
                 </a:r>
                 <a:endParaRPr lang="en-US" dirty="0"/>
+              </a:p>
+              <a:p>
+                <a:pPr>
+                  <a:lnSpc>
+                    <a:spcPct val="100000"/>
+                  </a:lnSpc>
+                  <a:buFont typeface="Wingdings" panose="05000000000000000000" pitchFamily="2" charset="2"/>
+                  <a:buChar char="§"/>
+                </a:pPr>
+                <a:r>
+                  <a:rPr lang="en-US" dirty="0"/>
+                  <a:t>A </a:t>
+                </a:r>
+                <a:r>
+                  <a:rPr lang="en-US" dirty="0" err="1"/>
+                  <a:t>várható</a:t>
+                </a:r>
+                <a:r>
+                  <a:rPr lang="en-US" dirty="0"/>
+                  <a:t> </a:t>
+                </a:r>
+                <a:r>
+                  <a:rPr lang="en-US" dirty="0" err="1"/>
+                  <a:t>érték</a:t>
+                </a:r>
+                <a:r>
+                  <a:rPr lang="en-US" dirty="0"/>
+                  <a:t> </a:t>
+                </a:r>
+                <a:r>
+                  <a:rPr lang="en-US" dirty="0" err="1"/>
+                  <a:t>más</a:t>
+                </a:r>
+                <a:r>
+                  <a:rPr lang="en-US" dirty="0"/>
+                  <a:t> </a:t>
+                </a:r>
+                <a:r>
+                  <a:rPr lang="en-US" dirty="0" err="1"/>
+                  <a:t>néven</a:t>
+                </a:r>
+                <a:r>
+                  <a:rPr lang="en-US" dirty="0"/>
+                  <a:t> </a:t>
+                </a:r>
+                <a:r>
+                  <a:rPr lang="en-US" dirty="0" err="1"/>
+                  <a:t>átlag</a:t>
+                </a:r>
+                <a:r>
+                  <a:rPr lang="en-US" dirty="0"/>
+                  <a:t>:</a:t>
+                </a:r>
               </a:p>
               <a:p>
                 <a:pPr marL="292608" lvl="1" indent="0">
@@ -11623,7 +12621,7 @@
             </a:r>
             <a:r>
               <a:rPr lang="en-US" dirty="0"/>
-              <a:t> ma </a:t>
+              <a:t> </a:t>
             </a:r>
             <a:r>
               <a:rPr lang="en-US" dirty="0" err="1"/>
@@ -12146,7 +13144,7 @@
         </p:nvSpPr>
         <p:spPr>
           <a:xfrm>
-            <a:off x="3105912" y="3429000"/>
+            <a:off x="2648712" y="3429000"/>
             <a:ext cx="6898460" cy="2708434"/>
           </a:xfrm>
           <a:prstGeom prst="rect">
@@ -12387,7 +13385,7 @@
           <p:cNvPr id="2" name="Title 1">
             <a:extLst>
               <a:ext uri="{FF2B5EF4-FFF2-40B4-BE49-F238E27FC236}">
-                <a16:creationId xmlns:a16="http://schemas.microsoft.com/office/drawing/2014/main" id="{D2EEF75E-504A-48E6-B809-DB66513E702F}"/>
+                <a16:creationId xmlns:a16="http://schemas.microsoft.com/office/drawing/2014/main" id="{1E3F3663-7EDF-4B3F-A7F9-E15D3A10C617}"/>
               </a:ext>
             </a:extLst>
           </p:cNvPr>
@@ -12404,8 +13402,28 @@
           <a:lstStyle/>
           <a:p>
             <a:r>
+              <a:rPr lang="en-US" dirty="0" err="1"/>
+              <a:t>Hogyan</a:t>
+            </a:r>
+            <a:r>
               <a:rPr lang="en-US" dirty="0"/>
-              <a:t>Importance sampling</a:t>
+              <a:t> </a:t>
+            </a:r>
+            <a:r>
+              <a:rPr lang="en-US" dirty="0" err="1"/>
+              <a:t>választjuk</a:t>
+            </a:r>
+            <a:r>
+              <a:rPr lang="en-US" dirty="0"/>
+              <a:t> a </a:t>
+            </a:r>
+            <a:r>
+              <a:rPr lang="en-US" dirty="0" err="1"/>
+              <a:t>mintákat</a:t>
+            </a:r>
+            <a:r>
+              <a:rPr lang="en-US" dirty="0"/>
+              <a:t>?</a:t>
             </a:r>
             <a:endParaRPr lang="hu-HU" dirty="0"/>
           </a:p>
@@ -12418,7 +13436,7 @@
               <p:cNvPr id="3" name="Content Placeholder 2">
                 <a:extLst>
                   <a:ext uri="{FF2B5EF4-FFF2-40B4-BE49-F238E27FC236}">
-                    <a16:creationId xmlns:a16="http://schemas.microsoft.com/office/drawing/2014/main" id="{F1D06108-E156-4590-9274-21225E15E749}"/>
+                    <a16:creationId xmlns:a16="http://schemas.microsoft.com/office/drawing/2014/main" id="{37D61CA9-663D-4AD8-8D24-EAFDAF9040E3}"/>
                   </a:ext>
                 </a:extLst>
               </p:cNvPr>
@@ -12429,9 +13447,16 @@
                 <p:ph idx="1"/>
               </p:nvPr>
             </p:nvSpPr>
-            <p:spPr/>
+            <p:spPr>
+              <a:xfrm>
+                <a:off x="1097280" y="1845733"/>
+                <a:ext cx="10058400" cy="4525805"/>
+              </a:xfrm>
+            </p:spPr>
             <p:txBody>
-              <a:bodyPr/>
+              <a:bodyPr>
+                <a:normAutofit/>
+              </a:bodyPr>
               <a:lstStyle/>
               <a:p>
                 <a:pPr>
@@ -12440,63 +13465,69 @@
                 </a:pPr>
                 <a:r>
                   <a:rPr lang="en-US" dirty="0"/>
-                  <a:t>Az </a:t>
-                </a:r>
-                <a:r>
-                  <a:rPr lang="en-US" dirty="0" err="1"/>
-                  <a:t>előző</a:t>
-                </a:r>
-                <a:r>
-                  <a:rPr lang="en-US" dirty="0"/>
-                  <a:t> </a:t>
-                </a:r>
-                <a:r>
-                  <a:rPr lang="en-US" dirty="0" err="1"/>
-                  <a:t>megoldás</a:t>
-                </a:r>
-                <a:r>
-                  <a:rPr lang="en-US" dirty="0"/>
-                  <a:t> </a:t>
-                </a:r>
-                <a:r>
-                  <a:rPr lang="en-US" dirty="0" err="1"/>
-                  <a:t>egyenletes</a:t>
-                </a:r>
-                <a:r>
-                  <a:rPr lang="en-US" dirty="0"/>
-                  <a:t> </a:t>
-                </a:r>
-                <a:r>
-                  <a:rPr lang="en-US" dirty="0" err="1"/>
-                  <a:t>mintavételezés</a:t>
-                </a:r>
-                <a:r>
-                  <a:rPr lang="en-US" dirty="0"/>
-                  <a:t>…mi </a:t>
-                </a:r>
-                <a:r>
-                  <a:rPr lang="en-US" dirty="0" err="1"/>
-                  <a:t>lenne</a:t>
-                </a:r>
-                <a:r>
-                  <a:rPr lang="en-US" dirty="0"/>
-                  <a:t> ha </a:t>
-                </a:r>
-                <a:r>
-                  <a:rPr lang="en-US" dirty="0" err="1"/>
-                  <a:t>kihasználnánk</a:t>
-                </a:r>
-                <a:r>
-                  <a:rPr lang="en-US" dirty="0"/>
-                  <a:t> a </a:t>
-                </a:r>
-                <a:r>
-                  <a:rPr lang="en-US" i="1" dirty="0"/>
-                  <a:t>BRDF</a:t>
-                </a:r>
-                <a:r>
-                  <a:rPr lang="en-US" dirty="0"/>
-                  <a:t>-et?</a:t>
+                  <a:t>Többféleképpen is </a:t>
+                </a:r>
+                <a:r>
+                  <a:rPr lang="en-US" dirty="0" err="1"/>
+                  <a:t>lehet</a:t>
+                </a:r>
+                <a:r>
+                  <a:rPr lang="en-US" dirty="0"/>
+                  <a:t>, </a:t>
+                </a:r>
+                <a:r>
+                  <a:rPr lang="en-US" dirty="0" err="1"/>
+                  <a:t>én</a:t>
+                </a:r>
+                <a:r>
+                  <a:rPr lang="en-US" dirty="0"/>
+                  <a:t> </a:t>
+                </a:r>
+                <a:r>
+                  <a:rPr lang="en-US" dirty="0" err="1"/>
+                  <a:t>itt</a:t>
+                </a:r>
+                <a:r>
+                  <a:rPr lang="en-US" dirty="0"/>
+                  <a:t> </a:t>
+                </a:r>
+                <a:r>
+                  <a:rPr lang="en-US" dirty="0" err="1"/>
+                  <a:t>az</a:t>
+                </a:r>
+                <a:r>
+                  <a:rPr lang="en-US" dirty="0"/>
+                  <a:t> </a:t>
+                </a:r>
+                <a:r>
+                  <a:rPr lang="en-US" dirty="0" err="1">
+                    <a:hlinkClick r:id="rId2"/>
+                  </a:rPr>
+                  <a:t>inverziós</a:t>
+                </a:r>
+                <a:r>
+                  <a:rPr lang="en-US" dirty="0">
+                    <a:hlinkClick r:id="rId2"/>
+                  </a:rPr>
+                  <a:t> </a:t>
+                </a:r>
+                <a:r>
+                  <a:rPr lang="en-US" dirty="0" err="1">
+                    <a:hlinkClick r:id="rId2"/>
+                  </a:rPr>
+                  <a:t>módszert</a:t>
+                </a:r>
+                <a:r>
+                  <a:rPr lang="en-US" dirty="0"/>
+                  <a:t> </a:t>
+                </a:r>
+                <a:r>
+                  <a:rPr lang="en-US" dirty="0" err="1"/>
+                  <a:t>mutatom</a:t>
+                </a:r>
+                <a:r>
+                  <a:rPr lang="en-US" dirty="0"/>
+                  <a:t> meg</a:t>
                 </a:r>
               </a:p>
               <a:p>
@@ -12505,276 +13536,79 @@
                   <a:buChar char="§"/>
                 </a:pPr>
                 <a:r>
-                  <a:rPr lang="en-US" dirty="0" err="1"/>
-                  <a:t>Lehetne</a:t>
-                </a:r>
-                <a:r>
-                  <a:rPr lang="en-US" dirty="0"/>
-                  <a:t> </a:t>
-                </a:r>
-                <a:r>
-                  <a:rPr lang="en-US" dirty="0" err="1"/>
-                  <a:t>gondolni</a:t>
-                </a:r>
-                <a:r>
-                  <a:rPr lang="en-US" dirty="0"/>
-                  <a:t> a </a:t>
-                </a:r>
-                <a:r>
-                  <a:rPr lang="en-US" dirty="0" err="1"/>
-                  <a:t>tökéletes</a:t>
-                </a:r>
-                <a:r>
-                  <a:rPr lang="en-US" dirty="0"/>
-                  <a:t> </a:t>
-                </a:r>
-                <a:r>
-                  <a:rPr lang="en-US" dirty="0" err="1"/>
-                  <a:t>tükröződésre</a:t>
-                </a:r>
-                <a:r>
-                  <a:rPr lang="en-US" dirty="0"/>
-                  <a:t> is, de </a:t>
-                </a:r>
-                <a:r>
-                  <a:rPr lang="en-US" dirty="0" err="1"/>
-                  <a:t>már</a:t>
-                </a:r>
-                <a:r>
-                  <a:rPr lang="en-US" dirty="0"/>
-                  <a:t> </a:t>
+                  <a:rPr lang="en-US" dirty="0"/>
+                  <a:t>1D-ben a </a:t>
                 </a:r>
                 <a:r>
                   <a:rPr lang="en-US" i="1" dirty="0"/>
-                  <a:t>Lambert</a:t>
-                </a:r>
-                <a:r>
-                  <a:rPr lang="en-US" dirty="0"/>
-                  <a:t> </a:t>
-                </a:r>
-                <a:r>
-                  <a:rPr lang="en-US" dirty="0" err="1"/>
-                  <a:t>esetén</a:t>
+                  <a:t>PDF</a:t>
+                </a:r>
+                <a:r>
+                  <a:rPr lang="en-US" dirty="0"/>
+                  <a:t>-</a:t>
+                </a:r>
+                <a:r>
+                  <a:rPr lang="en-US" dirty="0" err="1"/>
+                  <a:t>ből</a:t>
+                </a:r>
+                <a:r>
+                  <a:rPr lang="en-US" dirty="0"/>
+                  <a:t> </a:t>
+                </a:r>
+                <a:r>
+                  <a:rPr lang="en-US" dirty="0" err="1"/>
+                  <a:t>kiszámoljuk</a:t>
+                </a:r>
+                <a:r>
+                  <a:rPr lang="en-US" dirty="0"/>
+                  <a:t> </a:t>
+                </a:r>
+                <a:r>
+                  <a:rPr lang="en-US" dirty="0" err="1"/>
+                  <a:t>az</a:t>
+                </a:r>
+                <a:r>
+                  <a:rPr lang="en-US" dirty="0"/>
+                  <a:t> </a:t>
+                </a:r>
+                <a:r>
+                  <a:rPr lang="en-US" dirty="0" err="1"/>
+                  <a:t>eloszlásfüggvényt</a:t>
+                </a:r>
+                <a:r>
+                  <a:rPr lang="en-US" dirty="0"/>
+                  <a:t> </a:t>
+                </a:r>
+                <a:r>
+                  <a:rPr lang="en-US" dirty="0" err="1"/>
+                  <a:t>és</a:t>
+                </a:r>
+                <a:r>
+                  <a:rPr lang="en-US" dirty="0"/>
+                  <a:t> </a:t>
+                </a:r>
+                <a:r>
+                  <a:rPr lang="en-US" dirty="0" err="1"/>
+                  <a:t>invertáljuk</a:t>
+                </a:r>
+                <a:r>
+                  <a:rPr lang="en-US" dirty="0"/>
+                  <a:t> → </a:t>
+                </a:r>
+                <a:r>
+                  <a:rPr lang="en-US" dirty="0" err="1"/>
+                  <a:t>kész</a:t>
                 </a:r>
                 <a:r>
                   <a:rPr lang="en-US" dirty="0"/>
                   <a:t> is </a:t>
                 </a:r>
                 <a:r>
-                  <a:rPr lang="en-US" dirty="0" err="1"/>
-                  <a:t>tudunk</a:t>
-                </a:r>
-                <a:r>
-                  <a:rPr lang="en-US" dirty="0"/>
-                  <a:t> </a:t>
-                </a:r>
-                <a:r>
-                  <a:rPr lang="en-US" dirty="0" err="1"/>
-                  <a:t>jobbat</a:t>
-                </a:r>
-                <a:r>
-                  <a:rPr lang="en-US" dirty="0"/>
-                  <a:t>:</a:t>
-                </a:r>
-              </a:p>
-              <a:p>
-                <a:pPr>
-                  <a:buFont typeface="Wingdings" panose="05000000000000000000" pitchFamily="2" charset="2"/>
-                  <a:buChar char="§"/>
-                </a:pPr>
-                <a:r>
-                  <a:rPr lang="en-US" dirty="0"/>
-                  <a:t>A </a:t>
-                </a:r>
-                <a:r>
-                  <a:rPr lang="en-US" dirty="0" err="1"/>
-                  <a:t>koszinusz</a:t>
-                </a:r>
-                <a:r>
-                  <a:rPr lang="en-US" dirty="0"/>
-                  <a:t> </a:t>
-                </a:r>
-                <a:r>
-                  <a:rPr lang="en-US" dirty="0" err="1"/>
-                  <a:t>ugyanis</a:t>
-                </a:r>
-                <a:r>
-                  <a:rPr lang="en-US" dirty="0"/>
-                  <a:t> </a:t>
-                </a:r>
-                <a14:m>
-                  <m:oMath xmlns:m="http://schemas.openxmlformats.org/officeDocument/2006/math">
-                    <m:f>
-                      <m:fPr>
-                        <m:ctrlPr>
-                          <a:rPr lang="en-US" i="1" smtClean="0">
-                            <a:latin typeface="Cambria Math" panose="02040503050406030204" pitchFamily="18" charset="0"/>
-                          </a:rPr>
-                        </m:ctrlPr>
-                      </m:fPr>
-                      <m:num>
-                        <m:r>
-                          <a:rPr lang="en-US" b="0" i="1" smtClean="0">
-                            <a:latin typeface="Cambria Math" panose="02040503050406030204" pitchFamily="18" charset="0"/>
-                          </a:rPr>
-                          <m:t>𝜋</m:t>
-                        </m:r>
-                      </m:num>
-                      <m:den>
-                        <m:r>
-                          <a:rPr lang="en-US" b="0" i="1" smtClean="0">
-                            <a:latin typeface="Cambria Math" panose="02040503050406030204" pitchFamily="18" charset="0"/>
-                          </a:rPr>
-                          <m:t>2</m:t>
-                        </m:r>
-                      </m:den>
-                    </m:f>
-                  </m:oMath>
-                </a14:m>
-                <a:r>
-                  <a:rPr lang="en-US" dirty="0"/>
-                  <a:t>-ben 0; </a:t>
-                </a:r>
-                <a:r>
-                  <a:rPr lang="en-US" dirty="0" err="1"/>
-                  <a:t>akkor</a:t>
-                </a:r>
-                <a:r>
-                  <a:rPr lang="en-US" dirty="0"/>
-                  <a:t> </a:t>
-                </a:r>
-                <a:r>
-                  <a:rPr lang="en-US" dirty="0" err="1"/>
-                  <a:t>ott</a:t>
-                </a:r>
-                <a:r>
-                  <a:rPr lang="en-US" dirty="0"/>
-                  <a:t> </a:t>
-                </a:r>
-                <a:r>
-                  <a:rPr lang="en-US" dirty="0" err="1"/>
-                  <a:t>miért</a:t>
-                </a:r>
-                <a:r>
-                  <a:rPr lang="en-US" dirty="0"/>
-                  <a:t> </a:t>
-                </a:r>
-                <a:r>
-                  <a:rPr lang="en-US" dirty="0" err="1"/>
-                  <a:t>vennénk</a:t>
-                </a:r>
-                <a:r>
-                  <a:rPr lang="en-US" dirty="0"/>
-                  <a:t> </a:t>
-                </a:r>
-                <a:r>
-                  <a:rPr lang="en-US" dirty="0" err="1"/>
-                  <a:t>mintát</a:t>
-                </a:r>
-                <a:r>
-                  <a:rPr lang="en-US" dirty="0"/>
-                  <a:t>? </a:t>
-                </a:r>
-                <a:r>
-                  <a:rPr lang="en-US" dirty="0" err="1"/>
-                  <a:t>Legyen</a:t>
-                </a:r>
-                <a:r>
-                  <a:rPr lang="en-US" dirty="0"/>
-                  <a:t> </a:t>
-                </a:r>
-                <a14:m>
-                  <m:oMath xmlns:m="http://schemas.openxmlformats.org/officeDocument/2006/math">
-                    <m:sSub>
-                      <m:sSubPr>
-                        <m:ctrlPr>
-                          <a:rPr lang="en-US" b="0" i="1" smtClean="0">
-                            <a:latin typeface="Cambria Math" panose="02040503050406030204" pitchFamily="18" charset="0"/>
-                          </a:rPr>
-                        </m:ctrlPr>
-                      </m:sSubPr>
-                      <m:e>
-                        <m:r>
-                          <a:rPr lang="en-US" b="0" i="1" smtClean="0">
-                            <a:latin typeface="Cambria Math" panose="02040503050406030204" pitchFamily="18" charset="0"/>
-                          </a:rPr>
-                          <m:t>𝑝</m:t>
-                        </m:r>
-                      </m:e>
-                      <m:sub>
-                        <m:r>
-                          <a:rPr lang="en-US" b="0" i="1" smtClean="0">
-                            <a:latin typeface="Cambria Math" panose="02040503050406030204" pitchFamily="18" charset="0"/>
-                          </a:rPr>
-                          <m:t>𝑟</m:t>
-                        </m:r>
-                      </m:sub>
-                    </m:sSub>
-                    <m:r>
-                      <a:rPr lang="en-US" b="0" i="1" smtClean="0">
-                        <a:latin typeface="Cambria Math" panose="02040503050406030204" pitchFamily="18" charset="0"/>
-                      </a:rPr>
-                      <m:t>=</m:t>
-                    </m:r>
-                    <m:f>
-                      <m:fPr>
-                        <m:ctrlPr>
-                          <a:rPr lang="en-US" b="0" i="1" smtClean="0">
-                            <a:latin typeface="Cambria Math" panose="02040503050406030204" pitchFamily="18" charset="0"/>
-                          </a:rPr>
-                        </m:ctrlPr>
-                      </m:fPr>
-                      <m:num>
-                        <m:func>
-                          <m:funcPr>
-                            <m:ctrlPr>
-                              <a:rPr lang="en-US" b="0" i="1" smtClean="0">
-                                <a:latin typeface="Cambria Math" panose="02040503050406030204" pitchFamily="18" charset="0"/>
-                              </a:rPr>
-                            </m:ctrlPr>
-                          </m:funcPr>
-                          <m:fName>
-                            <m:r>
-                              <m:rPr>
-                                <m:sty m:val="p"/>
-                              </m:rPr>
-                              <a:rPr lang="en-US" b="0" i="0" smtClean="0">
-                                <a:latin typeface="Cambria Math" panose="02040503050406030204" pitchFamily="18" charset="0"/>
-                              </a:rPr>
-                              <m:t>cos</m:t>
-                            </m:r>
-                          </m:fName>
-                          <m:e>
-                            <m:r>
-                              <a:rPr lang="en-US" b="0" i="1" smtClean="0">
-                                <a:latin typeface="Cambria Math" panose="02040503050406030204" pitchFamily="18" charset="0"/>
-                              </a:rPr>
-                              <m:t>𝜃</m:t>
-                            </m:r>
-                          </m:e>
-                        </m:func>
-                      </m:num>
-                      <m:den>
-                        <m:r>
-                          <a:rPr lang="en-US" b="0" i="1" smtClean="0">
-                            <a:latin typeface="Cambria Math" panose="02040503050406030204" pitchFamily="18" charset="0"/>
-                          </a:rPr>
-                          <m:t>𝜋</m:t>
-                        </m:r>
-                      </m:den>
-                    </m:f>
-                  </m:oMath>
-                </a14:m>
-                <a:r>
-                  <a:rPr lang="en-US" dirty="0"/>
-                  <a:t> </a:t>
-                </a:r>
-              </a:p>
-              <a:p>
-                <a:pPr>
-                  <a:buFont typeface="Wingdings" panose="05000000000000000000" pitchFamily="2" charset="2"/>
-                  <a:buChar char="§"/>
-                </a:pPr>
+                  <a:rPr lang="en-US" dirty="0">
+                    <a:sym typeface="Wingdings" panose="05000000000000000000" pitchFamily="2" charset="2"/>
+                  </a:rPr>
+                  <a:t></a:t>
+                </a:r>
                 <a:endParaRPr lang="en-US" dirty="0"/>
               </a:p>
               <a:p>
@@ -12782,6 +13616,242 @@
                   <a:buFont typeface="Wingdings" panose="05000000000000000000" pitchFamily="2" charset="2"/>
                   <a:buChar char="§"/>
                 </a:pPr>
+                <a:r>
+                  <a:rPr lang="en-US" dirty="0" err="1"/>
+                  <a:t>Jó</a:t>
+                </a:r>
+                <a:r>
+                  <a:rPr lang="en-US" dirty="0"/>
+                  <a:t> </a:t>
+                </a:r>
+                <a:r>
+                  <a:rPr lang="en-US" dirty="0" err="1"/>
+                  <a:t>vicc</a:t>
+                </a:r>
+                <a:r>
+                  <a:rPr lang="en-US" dirty="0"/>
+                  <a:t>…</a:t>
+                </a:r>
+                <a:r>
+                  <a:rPr lang="en-US" dirty="0" err="1"/>
+                  <a:t>felgömbre</a:t>
+                </a:r>
+                <a:r>
+                  <a:rPr lang="en-US" dirty="0"/>
+                  <a:t> a </a:t>
+                </a:r>
+                <a:r>
+                  <a:rPr lang="en-US" i="1" dirty="0"/>
+                  <a:t>PDF</a:t>
+                </a:r>
+                <a:r>
+                  <a:rPr lang="en-US" dirty="0"/>
+                  <a:t>-</a:t>
+                </a:r>
+                <a:r>
+                  <a:rPr lang="en-US" dirty="0" err="1"/>
+                  <a:t>ünk</a:t>
+                </a:r>
+                <a:r>
+                  <a:rPr lang="en-US" dirty="0"/>
+                  <a:t> (</a:t>
+                </a:r>
+                <a14:m>
+                  <m:oMath xmlns:m="http://schemas.openxmlformats.org/officeDocument/2006/math">
+                    <m:r>
+                      <a:rPr lang="en-US" b="0" i="1" smtClean="0">
+                        <a:latin typeface="Cambria Math" panose="02040503050406030204" pitchFamily="18" charset="0"/>
+                      </a:rPr>
+                      <m:t>𝑝</m:t>
+                    </m:r>
+                    <m:r>
+                      <a:rPr lang="en-US" b="0" i="1" smtClean="0">
+                        <a:latin typeface="Cambria Math" panose="02040503050406030204" pitchFamily="18" charset="0"/>
+                      </a:rPr>
+                      <m:t>(</m:t>
+                    </m:r>
+                    <m:r>
+                      <a:rPr lang="en-US" b="0" i="1" smtClean="0">
+                        <a:latin typeface="Cambria Math" panose="02040503050406030204" pitchFamily="18" charset="0"/>
+                      </a:rPr>
+                      <m:t>𝜔</m:t>
+                    </m:r>
+                    <m:r>
+                      <a:rPr lang="en-US" b="0" i="1" smtClean="0">
+                        <a:latin typeface="Cambria Math" panose="02040503050406030204" pitchFamily="18" charset="0"/>
+                      </a:rPr>
+                      <m:t>)</m:t>
+                    </m:r>
+                  </m:oMath>
+                </a14:m>
+                <a:r>
+                  <a:rPr lang="en-US" dirty="0"/>
+                  <a:t>) többdimenziós, </a:t>
+                </a:r>
+                <a:r>
+                  <a:rPr lang="en-US" dirty="0" err="1"/>
+                  <a:t>szóval</a:t>
+                </a:r>
+                <a:r>
+                  <a:rPr lang="en-US" dirty="0"/>
+                  <a:t> </a:t>
+                </a:r>
+                <a:r>
+                  <a:rPr lang="en-US" dirty="0" err="1"/>
+                  <a:t>ez</a:t>
+                </a:r>
+                <a:r>
+                  <a:rPr lang="en-US" dirty="0"/>
+                  <a:t> </a:t>
+                </a:r>
+                <a:r>
+                  <a:rPr lang="en-US" dirty="0" err="1"/>
+                  <a:t>így</a:t>
+                </a:r>
+                <a:r>
+                  <a:rPr lang="en-US" dirty="0"/>
+                  <a:t> </a:t>
+                </a:r>
+                <a:r>
+                  <a:rPr lang="en-US" dirty="0" err="1"/>
+                  <a:t>nem</a:t>
+                </a:r>
+                <a:r>
+                  <a:rPr lang="en-US" dirty="0"/>
+                  <a:t> fog </a:t>
+                </a:r>
+                <a:r>
+                  <a:rPr lang="en-US" dirty="0" err="1"/>
+                  <a:t>menni</a:t>
+                </a:r>
+                <a:r>
+                  <a:rPr lang="en-US" dirty="0"/>
+                  <a:t>. </a:t>
+                </a:r>
+                <a:r>
+                  <a:rPr lang="en-US" dirty="0" err="1"/>
+                  <a:t>Viszont</a:t>
+                </a:r>
+                <a:r>
+                  <a:rPr lang="en-US" dirty="0"/>
+                  <a:t>:</a:t>
+                </a:r>
+              </a:p>
+              <a:p>
+                <a:pPr marL="0" indent="0" algn="ctr">
+                  <a:lnSpc>
+                    <a:spcPct val="150000"/>
+                  </a:lnSpc>
+                  <a:buNone/>
+                </a:pPr>
+                <a14:m>
+                  <m:oMathPara xmlns:m="http://schemas.openxmlformats.org/officeDocument/2006/math">
+                    <m:oMathParaPr>
+                      <m:jc m:val="centerGroup"/>
+                    </m:oMathParaPr>
+                    <m:oMath xmlns:m="http://schemas.openxmlformats.org/officeDocument/2006/math">
+                      <m:r>
+                        <a:rPr lang="en-US" b="0" i="1" smtClean="0">
+                          <a:latin typeface="Cambria Math" panose="02040503050406030204" pitchFamily="18" charset="0"/>
+                        </a:rPr>
+                        <m:t>𝑝</m:t>
+                      </m:r>
+                      <m:d>
+                        <m:dPr>
+                          <m:ctrlPr>
+                            <a:rPr lang="en-US" b="0" i="1" smtClean="0">
+                              <a:latin typeface="Cambria Math" panose="02040503050406030204" pitchFamily="18" charset="0"/>
+                            </a:rPr>
+                          </m:ctrlPr>
+                        </m:dPr>
+                        <m:e>
+                          <m:r>
+                            <a:rPr lang="en-US" b="0" i="1" smtClean="0">
+                              <a:latin typeface="Cambria Math" panose="02040503050406030204" pitchFamily="18" charset="0"/>
+                            </a:rPr>
+                            <m:t>𝜃</m:t>
+                          </m:r>
+                          <m:r>
+                            <a:rPr lang="en-US" b="0" i="1" smtClean="0">
+                              <a:latin typeface="Cambria Math" panose="02040503050406030204" pitchFamily="18" charset="0"/>
+                            </a:rPr>
+                            <m:t>,</m:t>
+                          </m:r>
+                          <m:r>
+                            <a:rPr lang="en-US" b="0" i="1" smtClean="0">
+                              <a:latin typeface="Cambria Math" panose="02040503050406030204" pitchFamily="18" charset="0"/>
+                            </a:rPr>
+                            <m:t>𝜙</m:t>
+                          </m:r>
+                        </m:e>
+                      </m:d>
+                      <m:r>
+                        <a:rPr lang="en-US" b="0" i="1" smtClean="0">
+                          <a:latin typeface="Cambria Math" panose="02040503050406030204" pitchFamily="18" charset="0"/>
+                        </a:rPr>
+                        <m:t>=</m:t>
+                      </m:r>
+                      <m:func>
+                        <m:funcPr>
+                          <m:ctrlPr>
+                            <a:rPr lang="en-US" b="0" i="1" smtClean="0">
+                              <a:latin typeface="Cambria Math" panose="02040503050406030204" pitchFamily="18" charset="0"/>
+                            </a:rPr>
+                          </m:ctrlPr>
+                        </m:funcPr>
+                        <m:fName>
+                          <m:r>
+                            <m:rPr>
+                              <m:sty m:val="p"/>
+                            </m:rPr>
+                            <a:rPr lang="en-US" b="0" i="0" smtClean="0">
+                              <a:latin typeface="Cambria Math" panose="02040503050406030204" pitchFamily="18" charset="0"/>
+                            </a:rPr>
+                            <m:t>sin</m:t>
+                          </m:r>
+                        </m:fName>
+                        <m:e>
+                          <m:r>
+                            <a:rPr lang="en-US" b="0" i="1" smtClean="0">
+                              <a:latin typeface="Cambria Math" panose="02040503050406030204" pitchFamily="18" charset="0"/>
+                            </a:rPr>
+                            <m:t>𝜃</m:t>
+                          </m:r>
+                          <m:r>
+                            <a:rPr lang="en-US" b="0" i="1" smtClean="0">
+                              <a:latin typeface="Cambria Math" panose="02040503050406030204" pitchFamily="18" charset="0"/>
+                            </a:rPr>
+                            <m:t> </m:t>
+                          </m:r>
+                          <m:r>
+                            <a:rPr lang="en-US" b="0" i="1" smtClean="0">
+                              <a:latin typeface="Cambria Math" panose="02040503050406030204" pitchFamily="18" charset="0"/>
+                            </a:rPr>
+                            <m:t>𝑝</m:t>
+                          </m:r>
+                          <m:r>
+                            <a:rPr lang="en-US" b="0" i="1" smtClean="0">
+                              <a:latin typeface="Cambria Math" panose="02040503050406030204" pitchFamily="18" charset="0"/>
+                            </a:rPr>
+                            <m:t>(</m:t>
+                          </m:r>
+                          <m:r>
+                            <a:rPr lang="en-US" b="0" i="1" smtClean="0">
+                              <a:latin typeface="Cambria Math" panose="02040503050406030204" pitchFamily="18" charset="0"/>
+                            </a:rPr>
+                            <m:t>𝜔</m:t>
+                          </m:r>
+                          <m:r>
+                            <a:rPr lang="en-US" b="0" i="1" smtClean="0">
+                              <a:latin typeface="Cambria Math" panose="02040503050406030204" pitchFamily="18" charset="0"/>
+                            </a:rPr>
+                            <m:t>)</m:t>
+                          </m:r>
+                        </m:e>
+                      </m:func>
+                    </m:oMath>
+                  </m:oMathPara>
+                </a14:m>
                 <a:endParaRPr lang="en-US" dirty="0"/>
               </a:p>
               <a:p>
@@ -12789,6 +13859,182 @@
                   <a:buFont typeface="Wingdings" panose="05000000000000000000" pitchFamily="2" charset="2"/>
                   <a:buChar char="§"/>
                 </a:pPr>
+                <a:r>
+                  <a:rPr lang="en-US" dirty="0" err="1"/>
+                  <a:t>Először</a:t>
+                </a:r>
+                <a:r>
+                  <a:rPr lang="en-US" dirty="0"/>
+                  <a:t> </a:t>
+                </a:r>
+                <a:r>
+                  <a:rPr lang="en-US" dirty="0" err="1"/>
+                  <a:t>kiszámoljuk</a:t>
+                </a:r>
+                <a:r>
+                  <a:rPr lang="en-US" dirty="0"/>
+                  <a:t> a </a:t>
+                </a:r>
+                <a:r>
+                  <a:rPr lang="en-US" dirty="0" err="1"/>
+                  <a:t>marginális</a:t>
+                </a:r>
+                <a:r>
+                  <a:rPr lang="en-US" dirty="0"/>
+                  <a:t> s</a:t>
+                </a:r>
+                <a:r>
+                  <a:rPr lang="hu-HU" dirty="0"/>
+                  <a:t>ű</a:t>
+                </a:r>
+                <a:r>
+                  <a:rPr lang="en-US" dirty="0"/>
+                  <a:t>r</a:t>
+                </a:r>
+                <a:r>
+                  <a:rPr lang="hu-HU" dirty="0"/>
+                  <a:t>ű</a:t>
+                </a:r>
+                <a:r>
+                  <a:rPr lang="en-US" dirty="0" err="1"/>
+                  <a:t>ségfüggvényt</a:t>
+                </a:r>
+                <a:r>
+                  <a:rPr lang="en-US" dirty="0"/>
+                  <a:t>:</a:t>
+                </a:r>
+              </a:p>
+              <a:p>
+                <a:pPr marL="0" indent="0" algn="ctr">
+                  <a:buNone/>
+                </a:pPr>
+                <a14:m>
+                  <m:oMathPara xmlns:m="http://schemas.openxmlformats.org/officeDocument/2006/math">
+                    <m:oMathParaPr>
+                      <m:jc m:val="centerGroup"/>
+                    </m:oMathParaPr>
+                    <m:oMath xmlns:m="http://schemas.openxmlformats.org/officeDocument/2006/math">
+                      <m:r>
+                        <a:rPr lang="en-US" b="0" i="1" smtClean="0">
+                          <a:latin typeface="Cambria Math" panose="02040503050406030204" pitchFamily="18" charset="0"/>
+                        </a:rPr>
+                        <m:t>𝑝</m:t>
+                      </m:r>
+                      <m:d>
+                        <m:dPr>
+                          <m:ctrlPr>
+                            <a:rPr lang="en-US" b="0" i="1" smtClean="0">
+                              <a:latin typeface="Cambria Math" panose="02040503050406030204" pitchFamily="18" charset="0"/>
+                            </a:rPr>
+                          </m:ctrlPr>
+                        </m:dPr>
+                        <m:e>
+                          <m:r>
+                            <a:rPr lang="en-US" b="0" i="1" smtClean="0">
+                              <a:latin typeface="Cambria Math" panose="02040503050406030204" pitchFamily="18" charset="0"/>
+                            </a:rPr>
+                            <m:t>𝜃</m:t>
+                          </m:r>
+                        </m:e>
+                      </m:d>
+                      <m:r>
+                        <a:rPr lang="en-US" b="0" i="1" smtClean="0">
+                          <a:latin typeface="Cambria Math" panose="02040503050406030204" pitchFamily="18" charset="0"/>
+                        </a:rPr>
+                        <m:t>=</m:t>
+                      </m:r>
+                      <m:nary>
+                        <m:naryPr>
+                          <m:ctrlPr>
+                            <a:rPr lang="en-US" b="0" i="1" smtClean="0">
+                              <a:latin typeface="Cambria Math" panose="02040503050406030204" pitchFamily="18" charset="0"/>
+                            </a:rPr>
+                          </m:ctrlPr>
+                        </m:naryPr>
+                        <m:sub>
+                          <m:r>
+                            <m:rPr>
+                              <m:brk m:alnAt="23"/>
+                            </m:rPr>
+                            <a:rPr lang="en-US" b="0" i="1" smtClean="0">
+                              <a:latin typeface="Cambria Math" panose="02040503050406030204" pitchFamily="18" charset="0"/>
+                            </a:rPr>
+                            <m:t>0</m:t>
+                          </m:r>
+                        </m:sub>
+                        <m:sup>
+                          <m:r>
+                            <a:rPr lang="en-US" b="0" i="1" smtClean="0">
+                              <a:latin typeface="Cambria Math" panose="02040503050406030204" pitchFamily="18" charset="0"/>
+                            </a:rPr>
+                            <m:t>2</m:t>
+                          </m:r>
+                          <m:r>
+                            <a:rPr lang="en-US" b="0" i="1" smtClean="0">
+                              <a:latin typeface="Cambria Math" panose="02040503050406030204" pitchFamily="18" charset="0"/>
+                            </a:rPr>
+                            <m:t>𝜋</m:t>
+                          </m:r>
+                        </m:sup>
+                        <m:e>
+                          <m:r>
+                            <a:rPr lang="en-US" i="1">
+                              <a:latin typeface="Cambria Math" panose="02040503050406030204" pitchFamily="18" charset="0"/>
+                            </a:rPr>
+                            <m:t>𝑝</m:t>
+                          </m:r>
+                          <m:d>
+                            <m:dPr>
+                              <m:ctrlPr>
+                                <a:rPr lang="en-US" i="1">
+                                  <a:latin typeface="Cambria Math" panose="02040503050406030204" pitchFamily="18" charset="0"/>
+                                </a:rPr>
+                              </m:ctrlPr>
+                            </m:dPr>
+                            <m:e>
+                              <m:r>
+                                <a:rPr lang="en-US" i="1">
+                                  <a:latin typeface="Cambria Math" panose="02040503050406030204" pitchFamily="18" charset="0"/>
+                                </a:rPr>
+                                <m:t>𝜃</m:t>
+                              </m:r>
+                              <m:r>
+                                <a:rPr lang="en-US" i="1">
+                                  <a:latin typeface="Cambria Math" panose="02040503050406030204" pitchFamily="18" charset="0"/>
+                                </a:rPr>
+                                <m:t>,</m:t>
+                              </m:r>
+                              <m:r>
+                                <a:rPr lang="en-US" i="1">
+                                  <a:latin typeface="Cambria Math" panose="02040503050406030204" pitchFamily="18" charset="0"/>
+                                </a:rPr>
+                                <m:t>𝜙</m:t>
+                              </m:r>
+                            </m:e>
+                          </m:d>
+                          <m:r>
+                            <a:rPr lang="en-US" i="1">
+                              <a:latin typeface="Cambria Math" panose="02040503050406030204" pitchFamily="18" charset="0"/>
+                            </a:rPr>
+                            <m:t> </m:t>
+                          </m:r>
+                          <m:r>
+                            <a:rPr lang="en-US" i="1">
+                              <a:latin typeface="Cambria Math" panose="02040503050406030204" pitchFamily="18" charset="0"/>
+                            </a:rPr>
+                            <m:t>𝑑</m:t>
+                          </m:r>
+                          <m:r>
+                            <a:rPr lang="en-US" i="1">
+                              <a:latin typeface="Cambria Math" panose="02040503050406030204" pitchFamily="18" charset="0"/>
+                            </a:rPr>
+                            <m:t>𝜙</m:t>
+                          </m:r>
+                        </m:e>
+                      </m:nary>
+                    </m:oMath>
+                  </m:oMathPara>
+                </a14:m>
                 <a:endParaRPr lang="en-US" dirty="0"/>
               </a:p>
               <a:p>
@@ -12796,6 +14042,154 @@
                   <a:buFont typeface="Wingdings" panose="05000000000000000000" pitchFamily="2" charset="2"/>
                   <a:buChar char="§"/>
                 </a:pPr>
+                <a:r>
+                  <a:rPr lang="en-US" dirty="0" err="1"/>
+                  <a:t>Utána</a:t>
+                </a:r>
+                <a:r>
+                  <a:rPr lang="en-US" dirty="0"/>
+                  <a:t> a </a:t>
+                </a:r>
+                <a:r>
+                  <a:rPr lang="en-US" dirty="0" err="1"/>
+                  <a:t>feltételes</a:t>
+                </a:r>
+                <a:r>
+                  <a:rPr lang="en-US" dirty="0"/>
+                  <a:t> </a:t>
+                </a:r>
+                <a:r>
+                  <a:rPr lang="en-US" dirty="0" err="1"/>
+                  <a:t>sűrűségfüggvényt</a:t>
+                </a:r>
+                <a:r>
+                  <a:rPr lang="en-US" dirty="0"/>
+                  <a:t>:</a:t>
+                </a:r>
+              </a:p>
+              <a:p>
+                <a:pPr marL="0" indent="0" algn="ctr">
+                  <a:buNone/>
+                </a:pPr>
+                <a14:m>
+                  <m:oMathPara xmlns:m="http://schemas.openxmlformats.org/officeDocument/2006/math">
+                    <m:oMathParaPr>
+                      <m:jc m:val="centerGroup"/>
+                    </m:oMathParaPr>
+                    <m:oMath xmlns:m="http://schemas.openxmlformats.org/officeDocument/2006/math">
+                      <m:r>
+                        <a:rPr lang="en-US" b="0" i="1" smtClean="0">
+                          <a:latin typeface="Cambria Math" panose="02040503050406030204" pitchFamily="18" charset="0"/>
+                        </a:rPr>
+                        <m:t>𝑝</m:t>
+                      </m:r>
+                      <m:d>
+                        <m:dPr>
+                          <m:ctrlPr>
+                            <a:rPr lang="en-US" b="0" i="1" smtClean="0">
+                              <a:latin typeface="Cambria Math" panose="02040503050406030204" pitchFamily="18" charset="0"/>
+                            </a:rPr>
+                          </m:ctrlPr>
+                        </m:dPr>
+                        <m:e>
+                          <m:r>
+                            <a:rPr lang="en-US" b="0" i="1" smtClean="0">
+                              <a:latin typeface="Cambria Math" panose="02040503050406030204" pitchFamily="18" charset="0"/>
+                            </a:rPr>
+                            <m:t>𝜙</m:t>
+                          </m:r>
+                        </m:e>
+                        <m:e>
+                          <m:r>
+                            <a:rPr lang="en-US" b="0" i="1" smtClean="0">
+                              <a:latin typeface="Cambria Math" panose="02040503050406030204" pitchFamily="18" charset="0"/>
+                            </a:rPr>
+                            <m:t>𝜃</m:t>
+                          </m:r>
+                        </m:e>
+                      </m:d>
+                      <m:r>
+                        <a:rPr lang="en-US" b="0" i="1" smtClean="0">
+                          <a:latin typeface="Cambria Math" panose="02040503050406030204" pitchFamily="18" charset="0"/>
+                        </a:rPr>
+                        <m:t>=</m:t>
+                      </m:r>
+                      <m:f>
+                        <m:fPr>
+                          <m:ctrlPr>
+                            <a:rPr lang="en-US" b="0" i="1" smtClean="0">
+                              <a:latin typeface="Cambria Math" panose="02040503050406030204" pitchFamily="18" charset="0"/>
+                            </a:rPr>
+                          </m:ctrlPr>
+                        </m:fPr>
+                        <m:num>
+                          <m:r>
+                            <a:rPr lang="en-US" b="0" i="1" smtClean="0">
+                              <a:latin typeface="Cambria Math" panose="02040503050406030204" pitchFamily="18" charset="0"/>
+                            </a:rPr>
+                            <m:t>𝑝</m:t>
+                          </m:r>
+                          <m:r>
+                            <a:rPr lang="en-US" b="0" i="1" smtClean="0">
+                              <a:latin typeface="Cambria Math" panose="02040503050406030204" pitchFamily="18" charset="0"/>
+                            </a:rPr>
+                            <m:t>(</m:t>
+                          </m:r>
+                          <m:r>
+                            <a:rPr lang="en-US" b="0" i="1" smtClean="0">
+                              <a:latin typeface="Cambria Math" panose="02040503050406030204" pitchFamily="18" charset="0"/>
+                            </a:rPr>
+                            <m:t>𝜃</m:t>
+                          </m:r>
+                          <m:r>
+                            <a:rPr lang="en-US" b="0" i="1" smtClean="0">
+                              <a:latin typeface="Cambria Math" panose="02040503050406030204" pitchFamily="18" charset="0"/>
+                            </a:rPr>
+                            <m:t>,</m:t>
+                          </m:r>
+                          <m:r>
+                            <a:rPr lang="en-US" b="0" i="1" smtClean="0">
+                              <a:latin typeface="Cambria Math" panose="02040503050406030204" pitchFamily="18" charset="0"/>
+                            </a:rPr>
+                            <m:t>𝜙</m:t>
+                          </m:r>
+                          <m:r>
+                            <a:rPr lang="en-US" b="0" i="1" smtClean="0">
+                              <a:latin typeface="Cambria Math" panose="02040503050406030204" pitchFamily="18" charset="0"/>
+                            </a:rPr>
+                            <m:t>)</m:t>
+                          </m:r>
+                        </m:num>
+                        <m:den>
+                          <m:r>
+                            <a:rPr lang="en-US" b="0" i="1" smtClean="0">
+                              <a:latin typeface="Cambria Math" panose="02040503050406030204" pitchFamily="18" charset="0"/>
+                            </a:rPr>
+                            <m:t>𝑝</m:t>
+                          </m:r>
+                          <m:r>
+                            <a:rPr lang="en-US" b="0" i="1" smtClean="0">
+                              <a:latin typeface="Cambria Math" panose="02040503050406030204" pitchFamily="18" charset="0"/>
+                            </a:rPr>
+                            <m:t>(</m:t>
+                          </m:r>
+                          <m:r>
+                            <a:rPr lang="en-US" b="0" i="1" smtClean="0">
+                              <a:latin typeface="Cambria Math" panose="02040503050406030204" pitchFamily="18" charset="0"/>
+                            </a:rPr>
+                            <m:t>𝜃</m:t>
+                          </m:r>
+                          <m:r>
+                            <a:rPr lang="en-US" b="0" i="1" smtClean="0">
+                              <a:latin typeface="Cambria Math" panose="02040503050406030204" pitchFamily="18" charset="0"/>
+                            </a:rPr>
+                            <m:t>)</m:t>
+                          </m:r>
+                        </m:den>
+                      </m:f>
+                    </m:oMath>
+                  </m:oMathPara>
+                </a14:m>
                 <a:endParaRPr lang="en-US" dirty="0"/>
               </a:p>
               <a:p>
@@ -12805,33 +14199,39 @@
                 </a:pPr>
                 <a:r>
                   <a:rPr lang="en-US" dirty="0" err="1"/>
-                  <a:t>Levezethető</a:t>
-                </a:r>
-                <a:r>
-                  <a:rPr lang="en-US" dirty="0"/>
-                  <a:t> </a:t>
-                </a:r>
-                <a:r>
-                  <a:rPr lang="en-US" dirty="0" err="1">
-                    <a:hlinkClick r:id="rId2"/>
-                  </a:rPr>
-                  <a:t>ezen</a:t>
-                </a:r>
-                <a:r>
-                  <a:rPr lang="en-US" dirty="0"/>
-                  <a:t> </a:t>
-                </a:r>
-                <a:r>
-                  <a:rPr lang="en-US" dirty="0" err="1"/>
-                  <a:t>dolgozat</a:t>
-                </a:r>
-                <a:r>
-                  <a:rPr lang="en-US" dirty="0"/>
-                  <a:t> </a:t>
-                </a:r>
-                <a:r>
-                  <a:rPr lang="en-US" dirty="0" err="1"/>
-                  <a:t>alapján</a:t>
+                  <a:t>Ezekből</a:t>
+                </a:r>
+                <a:r>
+                  <a:rPr lang="en-US" dirty="0"/>
+                  <a:t> </a:t>
+                </a:r>
+                <a:r>
+                  <a:rPr lang="en-US" dirty="0" err="1"/>
+                  <a:t>számolandó</a:t>
+                </a:r>
+                <a:r>
+                  <a:rPr lang="en-US" dirty="0"/>
+                  <a:t> </a:t>
+                </a:r>
+                <a:r>
+                  <a:rPr lang="en-US" dirty="0" err="1"/>
+                  <a:t>ki</a:t>
+                </a:r>
+                <a:r>
+                  <a:rPr lang="en-US" dirty="0"/>
+                  <a:t> </a:t>
+                </a:r>
+                <a:r>
+                  <a:rPr lang="en-US" dirty="0" err="1"/>
+                  <a:t>az</a:t>
+                </a:r>
+                <a:r>
+                  <a:rPr lang="en-US" dirty="0"/>
+                  <a:t> </a:t>
+                </a:r>
+                <a:r>
+                  <a:rPr lang="en-US" dirty="0" err="1"/>
+                  <a:t>eloszlásfüggvény</a:t>
                 </a:r>
                 <a:r>
                   <a:rPr lang="en-US" dirty="0"/>
@@ -12839,54 +14239,49 @@
                 </a:r>
                 <a:r>
                   <a:rPr lang="en-US" dirty="0" err="1"/>
-                  <a:t>annyira</a:t>
-                </a:r>
-                <a:r>
-                  <a:rPr lang="en-US" dirty="0"/>
-                  <a:t> </a:t>
-                </a:r>
-                <a:r>
-                  <a:rPr lang="en-US" dirty="0" err="1"/>
-                  <a:t>nem</a:t>
-                </a:r>
-                <a:r>
-                  <a:rPr lang="en-US" dirty="0"/>
-                  <a:t> </a:t>
-                </a:r>
-                <a:r>
-                  <a:rPr lang="en-US" dirty="0" err="1"/>
-                  <a:t>triviális</a:t>
-                </a:r>
-                <a:r>
-                  <a:rPr lang="en-US" dirty="0"/>
-                  <a:t>…</a:t>
-                </a:r>
-                <a:r>
-                  <a:rPr lang="en-US" dirty="0" err="1"/>
-                  <a:t>talán</a:t>
-                </a:r>
-                <a:r>
-                  <a:rPr lang="en-US" dirty="0"/>
-                  <a:t> </a:t>
-                </a:r>
-                <a:r>
-                  <a:rPr lang="en-US" dirty="0" err="1"/>
-                  <a:t>levezetem</a:t>
-                </a:r>
-                <a:r>
-                  <a:rPr lang="en-US" dirty="0"/>
-                  <a:t> </a:t>
-                </a:r>
-                <a:r>
-                  <a:rPr lang="en-US" dirty="0">
-                    <a:sym typeface="Wingdings" panose="05000000000000000000" pitchFamily="2" charset="2"/>
-                  </a:rPr>
-                  <a:t></a:t>
-                </a:r>
-                <a:r>
-                  <a:rPr lang="en-US" dirty="0"/>
-                  <a:t>)</a:t>
-                </a:r>
+                  <a:t>tipp</a:t>
+                </a:r>
+                <a:r>
+                  <a:rPr lang="en-US" dirty="0"/>
+                  <a:t>: </a:t>
+                </a:r>
+                <a:r>
+                  <a:rPr lang="en-US" dirty="0" err="1"/>
+                  <a:t>integrálod</a:t>
+                </a:r>
+                <a:r>
+                  <a:rPr lang="en-US" dirty="0"/>
+                  <a:t> 0-tól x-</a:t>
+                </a:r>
+                <a:r>
+                  <a:rPr lang="en-US" dirty="0" err="1"/>
+                  <a:t>ig</a:t>
+                </a:r>
+                <a:r>
+                  <a:rPr lang="en-US" dirty="0"/>
+                  <a:t>) </a:t>
+                </a:r>
+                <a:r>
+                  <a:rPr lang="en-US" dirty="0" err="1"/>
+                  <a:t>és</a:t>
+                </a:r>
+                <a:r>
+                  <a:rPr lang="en-US" dirty="0"/>
+                  <a:t> </a:t>
+                </a:r>
+                <a:r>
+                  <a:rPr lang="en-US" dirty="0" err="1"/>
+                  <a:t>az</a:t>
+                </a:r>
+                <a:r>
+                  <a:rPr lang="en-US" dirty="0"/>
+                  <a:t> </a:t>
+                </a:r>
+                <a:r>
+                  <a:rPr lang="en-US" dirty="0" err="1"/>
+                  <a:t>inverze</a:t>
+                </a:r>
+                <a:endParaRPr lang="hu-HU" dirty="0"/>
               </a:p>
             </p:txBody>
           </p:sp>
@@ -12897,7 +14292,7 @@
               <p:cNvPr id="3" name="Content Placeholder 2">
                 <a:extLst>
                   <a:ext uri="{FF2B5EF4-FFF2-40B4-BE49-F238E27FC236}">
-                    <a16:creationId xmlns:a16="http://schemas.microsoft.com/office/drawing/2014/main" id="{F1D06108-E156-4590-9274-21225E15E749}"/>
+                    <a16:creationId xmlns:a16="http://schemas.microsoft.com/office/drawing/2014/main" id="{37D61CA9-663D-4AD8-8D24-EAFDAF9040E3}"/>
                   </a:ext>
                 </a:extLst>
               </p:cNvPr>
@@ -12909,10 +14304,14 @@
               </p:nvPr>
             </p:nvSpPr>
             <p:spPr>
+              <a:xfrm>
+                <a:off x="1097280" y="1845733"/>
+                <a:ext cx="10058400" cy="4525805"/>
+              </a:xfrm>
               <a:blipFill>
                 <a:blip r:embed="rId3"/>
                 <a:stretch>
-                  <a:fillRect l="-1455" t="-1667"/>
+                  <a:fillRect l="-1455" t="-1482"/>
                 </a:stretch>
               </a:blipFill>
             </p:spPr>
@@ -12931,175 +14330,10 @@
           </p:sp>
         </mc:Fallback>
       </mc:AlternateContent>
-      <p:sp>
-        <p:nvSpPr>
-          <p:cNvPr id="4" name="TextBox 3">
-            <a:extLst>
-              <a:ext uri="{FF2B5EF4-FFF2-40B4-BE49-F238E27FC236}">
-                <a16:creationId xmlns:a16="http://schemas.microsoft.com/office/drawing/2014/main" id="{421E41AA-5223-4524-B995-D99504CFEBCF}"/>
-              </a:ext>
-            </a:extLst>
-          </p:cNvPr>
-          <p:cNvSpPr txBox="1"/>
-          <p:nvPr/>
-        </p:nvSpPr>
-        <p:spPr>
-          <a:xfrm>
-            <a:off x="3105912" y="3429000"/>
-            <a:ext cx="6898460" cy="1477328"/>
-          </a:xfrm>
-          <a:prstGeom prst="rect">
-            <a:avLst/>
-          </a:prstGeom>
-          <a:solidFill>
-            <a:schemeClr val="bg1">
-              <a:lumMod val="85000"/>
-            </a:schemeClr>
-          </a:solidFill>
-        </p:spPr>
-        <p:txBody>
-          <a:bodyPr wrap="square" rtlCol="0">
-            <a:spAutoFit/>
-          </a:bodyPr>
-          <a:lstStyle/>
-          <a:p>
-            <a:r>
-              <a:rPr lang="hu-HU" sz="1000" dirty="0">
-                <a:latin typeface="Consolas" panose="020B0609020204030204" pitchFamily="49" charset="0"/>
-              </a:rPr>
-              <a:t>vec3 </a:t>
-            </a:r>
-            <a:r>
-              <a:rPr lang="en-US" sz="1000" dirty="0">
-                <a:latin typeface="Consolas" panose="020B0609020204030204" pitchFamily="49" charset="0"/>
-              </a:rPr>
-              <a:t>Cosine</a:t>
-            </a:r>
-            <a:r>
-              <a:rPr lang="hu-HU" sz="1000" dirty="0">
-                <a:latin typeface="Consolas" panose="020B0609020204030204" pitchFamily="49" charset="0"/>
-              </a:rPr>
-              <a:t>Sample(vec3 n, vec3 pixel, float seed)</a:t>
-            </a:r>
-          </a:p>
-          <a:p>
-            <a:r>
-              <a:rPr lang="hu-HU" sz="1000" dirty="0">
-                <a:latin typeface="Consolas" panose="020B0609020204030204" pitchFamily="49" charset="0"/>
-              </a:rPr>
-              <a:t>{</a:t>
-            </a:r>
-          </a:p>
-          <a:p>
-            <a:r>
-              <a:rPr lang="hu-HU" sz="1000" dirty="0">
-                <a:latin typeface="Consolas" panose="020B0609020204030204" pitchFamily="49" charset="0"/>
-              </a:rPr>
-              <a:t>    float u = Random(pixel, vec3(12.9898, 78.233, 151.7182), seed);</a:t>
-            </a:r>
-          </a:p>
-          <a:p>
-            <a:r>
-              <a:rPr lang="hu-HU" sz="1000" dirty="0">
-                <a:latin typeface="Consolas" panose="020B0609020204030204" pitchFamily="49" charset="0"/>
-              </a:rPr>
-              <a:t>    float v = Random(pixel, vec3(63.7264, 10.873, 623.6736), seed);</a:t>
-            </a:r>
-          </a:p>
-          <a:p>
-            <a:r>
-              <a:rPr lang="hu-HU" sz="1000" dirty="0">
-                <a:latin typeface="Consolas" panose="020B0609020204030204" pitchFamily="49" charset="0"/>
-              </a:rPr>
-              <a:t>    float phi = TWO_PI * u;</a:t>
-            </a:r>
-          </a:p>
-          <a:p>
-            <a:r>
-              <a:rPr lang="hu-HU" sz="1000" dirty="0">
-                <a:latin typeface="Consolas" panose="020B0609020204030204" pitchFamily="49" charset="0"/>
-              </a:rPr>
-              <a:t>    float costheta = </a:t>
-            </a:r>
-            <a:r>
-              <a:rPr lang="en-US" sz="1000" b="1" dirty="0">
-                <a:latin typeface="Consolas" panose="020B0609020204030204" pitchFamily="49" charset="0"/>
-              </a:rPr>
-              <a:t>sqrt(</a:t>
-            </a:r>
-            <a:r>
-              <a:rPr lang="hu-HU" sz="1000" b="1" dirty="0">
-                <a:latin typeface="Consolas" panose="020B0609020204030204" pitchFamily="49" charset="0"/>
-              </a:rPr>
-              <a:t>v</a:t>
-            </a:r>
-            <a:r>
-              <a:rPr lang="en-US" sz="1000" b="1" dirty="0">
-                <a:latin typeface="Consolas" panose="020B0609020204030204" pitchFamily="49" charset="0"/>
-              </a:rPr>
-              <a:t>)</a:t>
-            </a:r>
-            <a:r>
-              <a:rPr lang="hu-HU" sz="1000" dirty="0">
-                <a:latin typeface="Consolas" panose="020B0609020204030204" pitchFamily="49" charset="0"/>
-              </a:rPr>
-              <a:t>;</a:t>
-            </a:r>
-          </a:p>
-          <a:p>
-            <a:endParaRPr lang="hu-HU" sz="1000" dirty="0">
-              <a:latin typeface="Consolas" panose="020B0609020204030204" pitchFamily="49" charset="0"/>
-            </a:endParaRPr>
-          </a:p>
-          <a:p>
-            <a:r>
-              <a:rPr lang="hu-HU" sz="1000" dirty="0">
-                <a:latin typeface="Consolas" panose="020B0609020204030204" pitchFamily="49" charset="0"/>
-              </a:rPr>
-              <a:t>    return</a:t>
-            </a:r>
-            <a:r>
-              <a:rPr lang="en-US" sz="1000" dirty="0">
-                <a:latin typeface="Consolas" panose="020B0609020204030204" pitchFamily="49" charset="0"/>
-              </a:rPr>
-              <a:t> ..</a:t>
-            </a:r>
-            <a:r>
-              <a:rPr lang="hu-HU" sz="1000" dirty="0">
-                <a:latin typeface="Consolas" panose="020B0609020204030204" pitchFamily="49" charset="0"/>
-              </a:rPr>
-              <a:t>;</a:t>
-            </a:r>
-            <a:r>
-              <a:rPr lang="en-US" sz="1000" dirty="0">
-                <a:latin typeface="Consolas" panose="020B0609020204030204" pitchFamily="49" charset="0"/>
-              </a:rPr>
-              <a:t> // </a:t>
-            </a:r>
-            <a:r>
-              <a:rPr lang="en-US" sz="1000" dirty="0" err="1">
-                <a:latin typeface="Consolas" panose="020B0609020204030204" pitchFamily="49" charset="0"/>
-              </a:rPr>
-              <a:t>ugyanaz</a:t>
-            </a:r>
-            <a:endParaRPr lang="hu-HU" sz="1000" dirty="0">
-              <a:latin typeface="Consolas" panose="020B0609020204030204" pitchFamily="49" charset="0"/>
-            </a:endParaRPr>
-          </a:p>
-          <a:p>
-            <a:r>
-              <a:rPr lang="hu-HU" sz="1000" dirty="0">
-                <a:latin typeface="Consolas" panose="020B0609020204030204" pitchFamily="49" charset="0"/>
-              </a:rPr>
-              <a:t>}</a:t>
-            </a:r>
-          </a:p>
-        </p:txBody>
-      </p:sp>
     </p:spTree>
     <p:extLst>
       <p:ext uri="{BB962C8B-B14F-4D97-AF65-F5344CB8AC3E}">
-        <p14:creationId xmlns:p14="http://schemas.microsoft.com/office/powerpoint/2010/main" val="1015595444"/>
+        <p14:creationId xmlns:p14="http://schemas.microsoft.com/office/powerpoint/2010/main" val="3721874009"/>
       </p:ext>
     </p:extLst>
   </p:cSld>

</xml_diff>

<commit_message>
add GGX sampling for path tracer
</commit_message>
<xml_diff>
--- a/PBR_EA_02.pptx
+++ b/PBR_EA_02.pptx
@@ -214,7 +214,7 @@
           <a:p>
             <a:fld id="{3A5A56FF-9D9E-417E-8DB7-17CB8EBF566C}" type="datetimeFigureOut">
               <a:rPr lang="hu-HU" smtClean="0"/>
-              <a:t>2018. 03. 19.</a:t>
+              <a:t>2018. 03. 23.</a:t>
             </a:fld>
             <a:endParaRPr lang="hu-HU"/>
           </a:p>
@@ -956,7 +956,7 @@
           <a:p>
             <a:fld id="{EE90FBA0-FEE2-473A-A4B4-051DFD2DB1BD}" type="datetimeFigureOut">
               <a:rPr lang="en-US" smtClean="0"/>
-              <a:t>3/19/2018</a:t>
+              <a:t>3/23/2018</a:t>
             </a:fld>
             <a:endParaRPr lang="en-US"/>
           </a:p>
@@ -1164,7 +1164,7 @@
           <a:p>
             <a:fld id="{EE90FBA0-FEE2-473A-A4B4-051DFD2DB1BD}" type="datetimeFigureOut">
               <a:rPr lang="en-US" smtClean="0"/>
-              <a:t>3/19/2018</a:t>
+              <a:t>3/23/2018</a:t>
             </a:fld>
             <a:endParaRPr lang="en-US"/>
           </a:p>
@@ -1420,7 +1420,7 @@
           <a:p>
             <a:fld id="{EE90FBA0-FEE2-473A-A4B4-051DFD2DB1BD}" type="datetimeFigureOut">
               <a:rPr lang="en-US" smtClean="0"/>
-              <a:t>3/19/2018</a:t>
+              <a:t>3/23/2018</a:t>
             </a:fld>
             <a:endParaRPr lang="en-US"/>
           </a:p>
@@ -1594,7 +1594,7 @@
           <a:p>
             <a:fld id="{EE90FBA0-FEE2-473A-A4B4-051DFD2DB1BD}" type="datetimeFigureOut">
               <a:rPr lang="en-US" smtClean="0"/>
-              <a:t>3/19/2018</a:t>
+              <a:t>3/23/2018</a:t>
             </a:fld>
             <a:endParaRPr lang="en-US"/>
           </a:p>
@@ -1937,7 +1937,7 @@
           <a:p>
             <a:fld id="{EE90FBA0-FEE2-473A-A4B4-051DFD2DB1BD}" type="datetimeFigureOut">
               <a:rPr lang="en-US" smtClean="0"/>
-              <a:t>3/19/2018</a:t>
+              <a:t>3/23/2018</a:t>
             </a:fld>
             <a:endParaRPr lang="en-US"/>
           </a:p>
@@ -2212,7 +2212,7 @@
           <a:p>
             <a:fld id="{EE90FBA0-FEE2-473A-A4B4-051DFD2DB1BD}" type="datetimeFigureOut">
               <a:rPr lang="en-US" smtClean="0"/>
-              <a:t>3/19/2018</a:t>
+              <a:t>3/23/2018</a:t>
             </a:fld>
             <a:endParaRPr lang="en-US"/>
           </a:p>
@@ -2591,7 +2591,7 @@
           <a:p>
             <a:fld id="{EE90FBA0-FEE2-473A-A4B4-051DFD2DB1BD}" type="datetimeFigureOut">
               <a:rPr lang="en-US" smtClean="0"/>
-              <a:t>3/19/2018</a:t>
+              <a:t>3/23/2018</a:t>
             </a:fld>
             <a:endParaRPr lang="en-US"/>
           </a:p>
@@ -2709,7 +2709,7 @@
           <a:p>
             <a:fld id="{EE90FBA0-FEE2-473A-A4B4-051DFD2DB1BD}" type="datetimeFigureOut">
               <a:rPr lang="en-US" smtClean="0"/>
-              <a:t>3/19/2018</a:t>
+              <a:t>3/23/2018</a:t>
             </a:fld>
             <a:endParaRPr lang="en-US"/>
           </a:p>
@@ -2880,7 +2880,7 @@
           <a:p>
             <a:fld id="{EE90FBA0-FEE2-473A-A4B4-051DFD2DB1BD}" type="datetimeFigureOut">
               <a:rPr lang="en-US" smtClean="0"/>
-              <a:t>3/19/2018</a:t>
+              <a:t>3/23/2018</a:t>
             </a:fld>
             <a:endParaRPr lang="en-US"/>
           </a:p>
@@ -3234,7 +3234,7 @@
           <a:p>
             <a:fld id="{EE90FBA0-FEE2-473A-A4B4-051DFD2DB1BD}" type="datetimeFigureOut">
               <a:rPr lang="en-US" smtClean="0"/>
-              <a:t>3/19/2018</a:t>
+              <a:t>3/23/2018</a:t>
             </a:fld>
             <a:endParaRPr lang="en-US"/>
           </a:p>
@@ -3616,7 +3616,7 @@
           <a:p>
             <a:fld id="{EE90FBA0-FEE2-473A-A4B4-051DFD2DB1BD}" type="datetimeFigureOut">
               <a:rPr lang="en-US" smtClean="0"/>
-              <a:t>3/19/2018</a:t>
+              <a:t>3/23/2018</a:t>
             </a:fld>
             <a:endParaRPr lang="en-US"/>
           </a:p>
@@ -3903,7 +3903,7 @@
           <a:p>
             <a:fld id="{EE90FBA0-FEE2-473A-A4B4-051DFD2DB1BD}" type="datetimeFigureOut">
               <a:rPr lang="en-US" smtClean="0"/>
-              <a:t>3/19/2018</a:t>
+              <a:t>3/23/2018</a:t>
             </a:fld>
             <a:endParaRPr lang="en-US"/>
           </a:p>
@@ -14360,8 +14360,8 @@
           </a:p>
         </p:txBody>
       </p:sp>
-      <mc:AlternateContent xmlns:mc="http://schemas.openxmlformats.org/markup-compatibility/2006" xmlns:a14="http://schemas.microsoft.com/office/drawing/2010/main">
-        <mc:Choice Requires="a14">
+      <mc:AlternateContent xmlns:mc="http://schemas.openxmlformats.org/markup-compatibility/2006">
+        <mc:Choice xmlns:a14="http://schemas.microsoft.com/office/drawing/2010/main" Requires="a14">
           <p:sp>
             <p:nvSpPr>
               <p:cNvPr id="3" name="Content Placeholder 2">
@@ -14564,8 +14564,8 @@
                   <a:t>…</a:t>
                 </a:r>
                 <a:r>
-                  <a:rPr lang="en-US" dirty="0" err="1"/>
-                  <a:t>felgömbre</a:t>
+                  <a:rPr lang="en-US"/>
+                  <a:t>félgömbre</a:t>
                 </a:r>
                 <a:r>
                   <a:rPr lang="en-US" dirty="0"/>
@@ -15217,7 +15217,7 @@
             </p:txBody>
           </p:sp>
         </mc:Choice>
-        <mc:Fallback xmlns="">
+        <mc:Fallback>
           <p:sp>
             <p:nvSpPr>
               <p:cNvPr id="3" name="Content Placeholder 2">

</xml_diff>